<commit_message>
feature(introduction): Baseline description and first run graphic
</commit_message>
<xml_diff>
--- a/Introduction to Deno.pptx
+++ b/Introduction to Deno.pptx
@@ -10,6 +10,8 @@
   <p:sldIdLst>
     <p:sldId id="256" r:id="rId6"/>
     <p:sldId id="257" r:id="rId7"/>
+    <p:sldId id="258" r:id="rId8"/>
+    <p:sldId id="259" r:id="rId9"/>
   </p:sldIdLst>
   <p:sldSz cy="5143500" cx="9144000"/>
   <p:notesSz cx="6858000" cy="9144000"/>
@@ -805,7 +807,7 @@
       </p:grpSpPr>
       <p:sp>
         <p:nvSpPr>
-          <p:cNvPr id="58" name="Google Shape;58;g8c35b87562_0_3:notes"/>
+          <p:cNvPr id="58" name="Google Shape;58;g8c35b87562_0_10:notes"/>
           <p:cNvSpPr/>
           <p:nvPr>
             <p:ph idx="2" type="sldImg"/>
@@ -840,7 +842,205 @@
       </p:sp>
       <p:sp>
         <p:nvSpPr>
-          <p:cNvPr id="59" name="Google Shape;59;g8c35b87562_0_3:notes"/>
+          <p:cNvPr id="59" name="Google Shape;59;g8c35b87562_0_10:notes"/>
+          <p:cNvSpPr txBox="1"/>
+          <p:nvPr>
+            <p:ph idx="1" type="body"/>
+          </p:nvPr>
+        </p:nvSpPr>
+        <p:spPr>
+          <a:xfrm>
+            <a:off x="685800" y="4343400"/>
+            <a:ext cx="5486400" cy="4114800"/>
+          </a:xfrm>
+          <a:prstGeom prst="rect">
+            <a:avLst/>
+          </a:prstGeom>
+        </p:spPr>
+        <p:txBody>
+          <a:bodyPr anchorCtr="0" anchor="t" bIns="91425" lIns="91425" spcFirstLastPara="1" rIns="91425" wrap="square" tIns="91425">
+            <a:noAutofit/>
+          </a:bodyPr>
+          <a:lstStyle/>
+          <a:p>
+            <a:pPr indent="0" lvl="0" marL="0" rtl="0" algn="l">
+              <a:spcBef>
+                <a:spcPts val="0"/>
+              </a:spcBef>
+              <a:spcAft>
+                <a:spcPts val="0"/>
+              </a:spcAft>
+              <a:buNone/>
+            </a:pPr>
+            <a:r>
+              <a:t/>
+            </a:r>
+            <a:endParaRPr/>
+          </a:p>
+        </p:txBody>
+      </p:sp>
+    </p:spTree>
+  </p:cSld>
+  <p:clrMapOvr>
+    <a:masterClrMapping/>
+  </p:clrMapOvr>
+</p:notes>
+</file>
+
+<file path=ppt/notesSlides/notesSlide3.xml><?xml version="1.0" encoding="utf-8"?>
+<p:notes xmlns:a="http://schemas.openxmlformats.org/drawingml/2006/main" xmlns:r="http://schemas.openxmlformats.org/officeDocument/2006/relationships" xmlns:mc="http://schemas.openxmlformats.org/markup-compatibility/2006" xmlns:mv="urn:schemas-microsoft-com:mac:vml" xmlns:p="http://schemas.openxmlformats.org/presentationml/2006/main" xmlns:c="http://schemas.openxmlformats.org/drawingml/2006/chart" xmlns:dgm="http://schemas.openxmlformats.org/drawingml/2006/diagram" xmlns:o="urn:schemas-microsoft-com:office:office" xmlns:v="urn:schemas-microsoft-com:vml" xmlns:pvml="urn:schemas-microsoft-com:office:powerpoint" xmlns:com="http://schemas.openxmlformats.org/drawingml/2006/compatibility" xmlns:p14="http://schemas.microsoft.com/office/powerpoint/2010/main" xmlns:p15="http://schemas.microsoft.com/office/powerpoint/2012/main" showMasterPhAnim="0" showMasterSp="0">
+  <p:cSld>
+    <p:spTree>
+      <p:nvGrpSpPr>
+        <p:cNvPr id="64" name="Shape 64"/>
+        <p:cNvGrpSpPr/>
+        <p:nvPr/>
+      </p:nvGrpSpPr>
+      <p:grpSpPr>
+        <a:xfrm>
+          <a:off x="0" y="0"/>
+          <a:ext cx="0" cy="0"/>
+          <a:chOff x="0" y="0"/>
+          <a:chExt cx="0" cy="0"/>
+        </a:xfrm>
+      </p:grpSpPr>
+      <p:sp>
+        <p:nvSpPr>
+          <p:cNvPr id="65" name="Google Shape;65;g8c35b87562_0_30:notes"/>
+          <p:cNvSpPr/>
+          <p:nvPr>
+            <p:ph idx="2" type="sldImg"/>
+          </p:nvPr>
+        </p:nvSpPr>
+        <p:spPr>
+          <a:xfrm>
+            <a:off x="381300" y="685800"/>
+            <a:ext cx="6096000" cy="3429000"/>
+          </a:xfrm>
+          <a:custGeom>
+            <a:rect b="b" l="l" r="r" t="t"/>
+            <a:pathLst>
+              <a:path extrusionOk="0" h="120000" w="120000">
+                <a:moveTo>
+                  <a:pt x="0" y="0"/>
+                </a:moveTo>
+                <a:lnTo>
+                  <a:pt x="120000" y="0"/>
+                </a:lnTo>
+                <a:lnTo>
+                  <a:pt x="120000" y="120000"/>
+                </a:lnTo>
+                <a:lnTo>
+                  <a:pt x="0" y="120000"/>
+                </a:lnTo>
+                <a:close/>
+              </a:path>
+            </a:pathLst>
+          </a:custGeom>
+        </p:spPr>
+      </p:sp>
+      <p:sp>
+        <p:nvSpPr>
+          <p:cNvPr id="66" name="Google Shape;66;g8c35b87562_0_30:notes"/>
+          <p:cNvSpPr txBox="1"/>
+          <p:nvPr>
+            <p:ph idx="1" type="body"/>
+          </p:nvPr>
+        </p:nvSpPr>
+        <p:spPr>
+          <a:xfrm>
+            <a:off x="685800" y="4343400"/>
+            <a:ext cx="5486400" cy="4114800"/>
+          </a:xfrm>
+          <a:prstGeom prst="rect">
+            <a:avLst/>
+          </a:prstGeom>
+        </p:spPr>
+        <p:txBody>
+          <a:bodyPr anchorCtr="0" anchor="t" bIns="91425" lIns="91425" spcFirstLastPara="1" rIns="91425" wrap="square" tIns="91425">
+            <a:noAutofit/>
+          </a:bodyPr>
+          <a:lstStyle/>
+          <a:p>
+            <a:pPr indent="0" lvl="0" marL="0" rtl="0" algn="l">
+              <a:spcBef>
+                <a:spcPts val="0"/>
+              </a:spcBef>
+              <a:spcAft>
+                <a:spcPts val="0"/>
+              </a:spcAft>
+              <a:buNone/>
+            </a:pPr>
+            <a:r>
+              <a:t/>
+            </a:r>
+            <a:endParaRPr/>
+          </a:p>
+        </p:txBody>
+      </p:sp>
+    </p:spTree>
+  </p:cSld>
+  <p:clrMapOvr>
+    <a:masterClrMapping/>
+  </p:clrMapOvr>
+</p:notes>
+</file>
+
+<file path=ppt/notesSlides/notesSlide4.xml><?xml version="1.0" encoding="utf-8"?>
+<p:notes xmlns:a="http://schemas.openxmlformats.org/drawingml/2006/main" xmlns:r="http://schemas.openxmlformats.org/officeDocument/2006/relationships" xmlns:mc="http://schemas.openxmlformats.org/markup-compatibility/2006" xmlns:mv="urn:schemas-microsoft-com:mac:vml" xmlns:p="http://schemas.openxmlformats.org/presentationml/2006/main" xmlns:c="http://schemas.openxmlformats.org/drawingml/2006/chart" xmlns:dgm="http://schemas.openxmlformats.org/drawingml/2006/diagram" xmlns:o="urn:schemas-microsoft-com:office:office" xmlns:v="urn:schemas-microsoft-com:vml" xmlns:pvml="urn:schemas-microsoft-com:office:powerpoint" xmlns:com="http://schemas.openxmlformats.org/drawingml/2006/compatibility" xmlns:p14="http://schemas.microsoft.com/office/powerpoint/2010/main" xmlns:p15="http://schemas.microsoft.com/office/powerpoint/2012/main" showMasterPhAnim="0" showMasterSp="0">
+  <p:cSld>
+    <p:spTree>
+      <p:nvGrpSpPr>
+        <p:cNvPr id="70" name="Shape 70"/>
+        <p:cNvGrpSpPr/>
+        <p:nvPr/>
+      </p:nvGrpSpPr>
+      <p:grpSpPr>
+        <a:xfrm>
+          <a:off x="0" y="0"/>
+          <a:ext cx="0" cy="0"/>
+          <a:chOff x="0" y="0"/>
+          <a:chExt cx="0" cy="0"/>
+        </a:xfrm>
+      </p:grpSpPr>
+      <p:sp>
+        <p:nvSpPr>
+          <p:cNvPr id="71" name="Google Shape;71;g8c35b87562_0_3:notes"/>
+          <p:cNvSpPr/>
+          <p:nvPr>
+            <p:ph idx="2" type="sldImg"/>
+          </p:nvPr>
+        </p:nvSpPr>
+        <p:spPr>
+          <a:xfrm>
+            <a:off x="381300" y="685800"/>
+            <a:ext cx="6096000" cy="3429000"/>
+          </a:xfrm>
+          <a:custGeom>
+            <a:rect b="b" l="l" r="r" t="t"/>
+            <a:pathLst>
+              <a:path extrusionOk="0" h="120000" w="120000">
+                <a:moveTo>
+                  <a:pt x="0" y="0"/>
+                </a:moveTo>
+                <a:lnTo>
+                  <a:pt x="120000" y="0"/>
+                </a:lnTo>
+                <a:lnTo>
+                  <a:pt x="120000" y="120000"/>
+                </a:lnTo>
+                <a:lnTo>
+                  <a:pt x="0" y="120000"/>
+                </a:lnTo>
+                <a:close/>
+              </a:path>
+            </a:pathLst>
+          </a:custGeom>
+        </p:spPr>
+      </p:sp>
+      <p:sp>
+        <p:nvSpPr>
+          <p:cNvPr id="72" name="Google Shape;72;g8c35b87562_0_3:notes"/>
           <p:cNvSpPr txBox="1"/>
           <p:nvPr>
             <p:ph idx="1" type="body"/>
@@ -5684,9 +5884,355 @@
           <a:chExt cx="0" cy="0"/>
         </a:xfrm>
       </p:grpSpPr>
+      <p:pic>
+        <p:nvPicPr>
+          <p:cNvPr id="61" name="Google Shape;61;p14"/>
+          <p:cNvPicPr preferRelativeResize="0"/>
+          <p:nvPr/>
+        </p:nvPicPr>
+        <p:blipFill>
+          <a:blip r:embed="rId3">
+            <a:alphaModFix/>
+          </a:blip>
+          <a:stretch>
+            <a:fillRect/>
+          </a:stretch>
+        </p:blipFill>
+        <p:spPr>
+          <a:xfrm>
+            <a:off x="0" y="-1"/>
+            <a:ext cx="678075" cy="678075"/>
+          </a:xfrm>
+          <a:prstGeom prst="rect">
+            <a:avLst/>
+          </a:prstGeom>
+          <a:noFill/>
+          <a:ln>
+            <a:noFill/>
+          </a:ln>
+        </p:spPr>
+      </p:pic>
       <p:sp>
         <p:nvSpPr>
-          <p:cNvPr id="61" name="Google Shape;61;p14"/>
+          <p:cNvPr id="62" name="Google Shape;62;p14"/>
+          <p:cNvSpPr txBox="1"/>
+          <p:nvPr>
+            <p:ph idx="4294967295" type="title"/>
+          </p:nvPr>
+        </p:nvSpPr>
+        <p:spPr>
+          <a:xfrm>
+            <a:off x="311700" y="678075"/>
+            <a:ext cx="8520600" cy="572700"/>
+          </a:xfrm>
+          <a:prstGeom prst="rect">
+            <a:avLst/>
+          </a:prstGeom>
+        </p:spPr>
+        <p:txBody>
+          <a:bodyPr anchorCtr="0" anchor="t" bIns="91425" lIns="91425" spcFirstLastPara="1" rIns="91425" wrap="square" tIns="91425">
+            <a:noAutofit/>
+          </a:bodyPr>
+          <a:lstStyle/>
+          <a:p>
+            <a:pPr indent="0" lvl="0" marL="0" rtl="0" algn="l">
+              <a:spcBef>
+                <a:spcPts val="0"/>
+              </a:spcBef>
+              <a:spcAft>
+                <a:spcPts val="0"/>
+              </a:spcAft>
+              <a:buNone/>
+            </a:pPr>
+            <a:r>
+              <a:rPr lang="en"/>
+              <a:t>What is it?</a:t>
+            </a:r>
+            <a:endParaRPr/>
+          </a:p>
+        </p:txBody>
+      </p:sp>
+      <p:sp>
+        <p:nvSpPr>
+          <p:cNvPr id="63" name="Google Shape;63;p14"/>
+          <p:cNvSpPr txBox="1"/>
+          <p:nvPr/>
+        </p:nvSpPr>
+        <p:spPr>
+          <a:xfrm>
+            <a:off x="43575" y="1431175"/>
+            <a:ext cx="8725200" cy="3000000"/>
+          </a:xfrm>
+          <a:prstGeom prst="rect">
+            <a:avLst/>
+          </a:prstGeom>
+          <a:noFill/>
+          <a:ln>
+            <a:noFill/>
+          </a:ln>
+        </p:spPr>
+        <p:txBody>
+          <a:bodyPr anchorCtr="0" anchor="t" bIns="91425" lIns="91425" spcFirstLastPara="1" rIns="91425" wrap="square" tIns="91425">
+            <a:noAutofit/>
+          </a:bodyPr>
+          <a:lstStyle/>
+          <a:p>
+            <a:pPr indent="0" lvl="0" marL="0" rtl="0" algn="l">
+              <a:lnSpc>
+                <a:spcPct val="115000"/>
+              </a:lnSpc>
+              <a:spcBef>
+                <a:spcPts val="1200"/>
+              </a:spcBef>
+              <a:spcAft>
+                <a:spcPts val="0"/>
+              </a:spcAft>
+              <a:buNone/>
+            </a:pPr>
+            <a:r>
+              <a:rPr lang="en" sz="1100">
+                <a:solidFill>
+                  <a:schemeClr val="dk1"/>
+                </a:solidFill>
+              </a:rPr>
+              <a:t>From the website: </a:t>
+            </a:r>
+            <a:r>
+              <a:rPr lang="en" sz="1100">
+                <a:solidFill>
+                  <a:schemeClr val="dk1"/>
+                </a:solidFill>
+              </a:rPr>
+              <a:t>Deno is a simple, modern and secure runtime for JavaScript and TypeScript that uses V8 and is built in Rust.</a:t>
+            </a:r>
+            <a:endParaRPr sz="1100">
+              <a:solidFill>
+                <a:schemeClr val="dk1"/>
+              </a:solidFill>
+            </a:endParaRPr>
+          </a:p>
+          <a:p>
+            <a:pPr indent="-298450" lvl="0" marL="457200" rtl="0" algn="l">
+              <a:lnSpc>
+                <a:spcPct val="115000"/>
+              </a:lnSpc>
+              <a:spcBef>
+                <a:spcPts val="1200"/>
+              </a:spcBef>
+              <a:spcAft>
+                <a:spcPts val="0"/>
+              </a:spcAft>
+              <a:buClr>
+                <a:schemeClr val="dk1"/>
+              </a:buClr>
+              <a:buSzPts val="1100"/>
+              <a:buAutoNum type="arabicPeriod"/>
+            </a:pPr>
+            <a:r>
+              <a:rPr lang="en" sz="1100">
+                <a:solidFill>
+                  <a:schemeClr val="dk1"/>
+                </a:solidFill>
+              </a:rPr>
+              <a:t>Secure by default. No file, network, or environment access, unless explicitly enabled.</a:t>
+            </a:r>
+            <a:endParaRPr sz="1100">
+              <a:solidFill>
+                <a:schemeClr val="dk1"/>
+              </a:solidFill>
+            </a:endParaRPr>
+          </a:p>
+          <a:p>
+            <a:pPr indent="-298450" lvl="0" marL="457200" rtl="0" algn="l">
+              <a:lnSpc>
+                <a:spcPct val="115000"/>
+              </a:lnSpc>
+              <a:spcBef>
+                <a:spcPts val="0"/>
+              </a:spcBef>
+              <a:spcAft>
+                <a:spcPts val="0"/>
+              </a:spcAft>
+              <a:buClr>
+                <a:schemeClr val="dk1"/>
+              </a:buClr>
+              <a:buSzPts val="1100"/>
+              <a:buAutoNum type="arabicPeriod"/>
+            </a:pPr>
+            <a:r>
+              <a:rPr b="1" lang="en" sz="1100">
+                <a:solidFill>
+                  <a:schemeClr val="dk1"/>
+                </a:solidFill>
+              </a:rPr>
+              <a:t>Supports TypeScript out of the box.</a:t>
+            </a:r>
+            <a:endParaRPr b="1" sz="1100">
+              <a:solidFill>
+                <a:schemeClr val="dk1"/>
+              </a:solidFill>
+            </a:endParaRPr>
+          </a:p>
+          <a:p>
+            <a:pPr indent="-298450" lvl="0" marL="457200" rtl="0" algn="l">
+              <a:lnSpc>
+                <a:spcPct val="115000"/>
+              </a:lnSpc>
+              <a:spcBef>
+                <a:spcPts val="0"/>
+              </a:spcBef>
+              <a:spcAft>
+                <a:spcPts val="0"/>
+              </a:spcAft>
+              <a:buClr>
+                <a:schemeClr val="dk1"/>
+              </a:buClr>
+              <a:buSzPts val="1100"/>
+              <a:buAutoNum type="arabicPeriod"/>
+            </a:pPr>
+            <a:r>
+              <a:rPr lang="en" sz="1100">
+                <a:solidFill>
+                  <a:schemeClr val="dk1"/>
+                </a:solidFill>
+              </a:rPr>
+              <a:t>Ships only a single executable file.</a:t>
+            </a:r>
+            <a:endParaRPr sz="1100">
+              <a:solidFill>
+                <a:schemeClr val="dk1"/>
+              </a:solidFill>
+            </a:endParaRPr>
+          </a:p>
+          <a:p>
+            <a:pPr indent="-298450" lvl="0" marL="457200" rtl="0" algn="l">
+              <a:lnSpc>
+                <a:spcPct val="115000"/>
+              </a:lnSpc>
+              <a:spcBef>
+                <a:spcPts val="0"/>
+              </a:spcBef>
+              <a:spcAft>
+                <a:spcPts val="0"/>
+              </a:spcAft>
+              <a:buClr>
+                <a:schemeClr val="dk1"/>
+              </a:buClr>
+              <a:buSzPts val="1100"/>
+              <a:buAutoNum type="arabicPeriod"/>
+            </a:pPr>
+            <a:r>
+              <a:rPr lang="en" sz="1100">
+                <a:solidFill>
+                  <a:schemeClr val="dk1"/>
+                </a:solidFill>
+              </a:rPr>
+              <a:t>Has built-in utilities like a dependency inspector (deno info) and a code formatter (deno fmt).</a:t>
+            </a:r>
+            <a:endParaRPr sz="1100">
+              <a:solidFill>
+                <a:schemeClr val="dk1"/>
+              </a:solidFill>
+            </a:endParaRPr>
+          </a:p>
+          <a:p>
+            <a:pPr indent="-298450" lvl="0" marL="457200" rtl="0" algn="l">
+              <a:lnSpc>
+                <a:spcPct val="115000"/>
+              </a:lnSpc>
+              <a:spcBef>
+                <a:spcPts val="0"/>
+              </a:spcBef>
+              <a:spcAft>
+                <a:spcPts val="0"/>
+              </a:spcAft>
+              <a:buClr>
+                <a:schemeClr val="dk1"/>
+              </a:buClr>
+              <a:buSzPts val="1100"/>
+              <a:buAutoNum type="arabicPeriod"/>
+            </a:pPr>
+            <a:r>
+              <a:rPr lang="en" sz="1100">
+                <a:solidFill>
+                  <a:schemeClr val="dk1"/>
+                </a:solidFill>
+              </a:rPr>
+              <a:t>Has a set of reviewed (audited) </a:t>
+            </a:r>
+            <a:r>
+              <a:rPr b="1" lang="en" sz="1100">
+                <a:solidFill>
+                  <a:schemeClr val="dk1"/>
+                </a:solidFill>
+              </a:rPr>
+              <a:t>standard modules</a:t>
+            </a:r>
+            <a:r>
+              <a:rPr lang="en" sz="1100">
+                <a:solidFill>
+                  <a:schemeClr val="dk1"/>
+                </a:solidFill>
+              </a:rPr>
+              <a:t> that are guaranteed to work with Deno:</a:t>
+            </a:r>
+            <a:r>
+              <a:rPr lang="en" sz="1100">
+                <a:solidFill>
+                  <a:schemeClr val="dk1"/>
+                </a:solidFill>
+                <a:uFill>
+                  <a:noFill/>
+                </a:uFill>
+                <a:hlinkClick r:id="rId4"/>
+              </a:rPr>
+              <a:t> </a:t>
+            </a:r>
+            <a:r>
+              <a:rPr lang="en" sz="1100" u="sng">
+                <a:solidFill>
+                  <a:schemeClr val="hlink"/>
+                </a:solidFill>
+                <a:hlinkClick r:id="rId5"/>
+              </a:rPr>
+              <a:t>deno.land/std</a:t>
+            </a:r>
+            <a:endParaRPr sz="1100" u="sng">
+              <a:solidFill>
+                <a:schemeClr val="hlink"/>
+              </a:solidFill>
+            </a:endParaRPr>
+          </a:p>
+        </p:txBody>
+      </p:sp>
+    </p:spTree>
+  </p:cSld>
+  <p:clrMapOvr>
+    <a:masterClrMapping/>
+  </p:clrMapOvr>
+</p:sld>
+</file>
+
+<file path=ppt/slides/slide3.xml><?xml version="1.0" encoding="utf-8"?>
+<p:sld xmlns:a="http://schemas.openxmlformats.org/drawingml/2006/main" xmlns:r="http://schemas.openxmlformats.org/officeDocument/2006/relationships" xmlns:mc="http://schemas.openxmlformats.org/markup-compatibility/2006" xmlns:mv="urn:schemas-microsoft-com:mac:vml" xmlns:p="http://schemas.openxmlformats.org/presentationml/2006/main" xmlns:c="http://schemas.openxmlformats.org/drawingml/2006/chart" xmlns:dgm="http://schemas.openxmlformats.org/drawingml/2006/diagram" xmlns:o="urn:schemas-microsoft-com:office:office" xmlns:v="urn:schemas-microsoft-com:vml" xmlns:pvml="urn:schemas-microsoft-com:office:powerpoint" xmlns:com="http://schemas.openxmlformats.org/drawingml/2006/compatibility" xmlns:p14="http://schemas.microsoft.com/office/powerpoint/2010/main" xmlns:p15="http://schemas.microsoft.com/office/powerpoint/2012/main">
+  <p:cSld>
+    <p:spTree>
+      <p:nvGrpSpPr>
+        <p:cNvPr id="67" name="Shape 67"/>
+        <p:cNvGrpSpPr/>
+        <p:nvPr/>
+      </p:nvGrpSpPr>
+      <p:grpSpPr>
+        <a:xfrm>
+          <a:off x="0" y="0"/>
+          <a:ext cx="0" cy="0"/>
+          <a:chOff x="0" y="0"/>
+          <a:chExt cx="0" cy="0"/>
+        </a:xfrm>
+      </p:grpSpPr>
+      <p:sp>
+        <p:nvSpPr>
+          <p:cNvPr id="68" name="Google Shape;68;p15"/>
           <p:cNvSpPr txBox="1"/>
           <p:nvPr>
             <p:ph type="title"/>
@@ -5718,6 +6264,99 @@
             </a:pPr>
             <a:r>
               <a:rPr lang="en"/>
+              <a:t>Getting Started</a:t>
+            </a:r>
+            <a:endParaRPr/>
+          </a:p>
+        </p:txBody>
+      </p:sp>
+      <p:pic>
+        <p:nvPicPr>
+          <p:cNvPr id="69" name="Google Shape;69;p15"/>
+          <p:cNvPicPr preferRelativeResize="0"/>
+          <p:nvPr/>
+        </p:nvPicPr>
+        <p:blipFill>
+          <a:blip r:embed="rId3">
+            <a:alphaModFix/>
+          </a:blip>
+          <a:stretch>
+            <a:fillRect/>
+          </a:stretch>
+        </p:blipFill>
+        <p:spPr>
+          <a:xfrm>
+            <a:off x="742950" y="2062150"/>
+            <a:ext cx="7658100" cy="1019175"/>
+          </a:xfrm>
+          <a:prstGeom prst="rect">
+            <a:avLst/>
+          </a:prstGeom>
+          <a:noFill/>
+          <a:ln>
+            <a:noFill/>
+          </a:ln>
+        </p:spPr>
+      </p:pic>
+    </p:spTree>
+  </p:cSld>
+  <p:clrMapOvr>
+    <a:masterClrMapping/>
+  </p:clrMapOvr>
+</p:sld>
+</file>
+
+<file path=ppt/slides/slide4.xml><?xml version="1.0" encoding="utf-8"?>
+<p:sld xmlns:a="http://schemas.openxmlformats.org/drawingml/2006/main" xmlns:r="http://schemas.openxmlformats.org/officeDocument/2006/relationships" xmlns:mc="http://schemas.openxmlformats.org/markup-compatibility/2006" xmlns:mv="urn:schemas-microsoft-com:mac:vml" xmlns:p="http://schemas.openxmlformats.org/presentationml/2006/main" xmlns:c="http://schemas.openxmlformats.org/drawingml/2006/chart" xmlns:dgm="http://schemas.openxmlformats.org/drawingml/2006/diagram" xmlns:o="urn:schemas-microsoft-com:office:office" xmlns:v="urn:schemas-microsoft-com:vml" xmlns:pvml="urn:schemas-microsoft-com:office:powerpoint" xmlns:com="http://schemas.openxmlformats.org/drawingml/2006/compatibility" xmlns:p14="http://schemas.microsoft.com/office/powerpoint/2010/main" xmlns:p15="http://schemas.microsoft.com/office/powerpoint/2012/main">
+  <p:cSld>
+    <p:spTree>
+      <p:nvGrpSpPr>
+        <p:cNvPr id="73" name="Shape 73"/>
+        <p:cNvGrpSpPr/>
+        <p:nvPr/>
+      </p:nvGrpSpPr>
+      <p:grpSpPr>
+        <a:xfrm>
+          <a:off x="0" y="0"/>
+          <a:ext cx="0" cy="0"/>
+          <a:chOff x="0" y="0"/>
+          <a:chExt cx="0" cy="0"/>
+        </a:xfrm>
+      </p:grpSpPr>
+      <p:sp>
+        <p:nvSpPr>
+          <p:cNvPr id="74" name="Google Shape;74;p16"/>
+          <p:cNvSpPr txBox="1"/>
+          <p:nvPr>
+            <p:ph type="title"/>
+          </p:nvPr>
+        </p:nvSpPr>
+        <p:spPr>
+          <a:xfrm>
+            <a:off x="311700" y="678075"/>
+            <a:ext cx="8520600" cy="572700"/>
+          </a:xfrm>
+          <a:prstGeom prst="rect">
+            <a:avLst/>
+          </a:prstGeom>
+        </p:spPr>
+        <p:txBody>
+          <a:bodyPr anchorCtr="0" anchor="t" bIns="91425" lIns="91425" spcFirstLastPara="1" rIns="91425" wrap="square" tIns="91425">
+            <a:noAutofit/>
+          </a:bodyPr>
+          <a:lstStyle/>
+          <a:p>
+            <a:pPr indent="0" lvl="0" marL="0" rtl="0" algn="l">
+              <a:spcBef>
+                <a:spcPts val="0"/>
+              </a:spcBef>
+              <a:spcAft>
+                <a:spcPts val="0"/>
+              </a:spcAft>
+              <a:buNone/>
+            </a:pPr>
+            <a:r>
+              <a:rPr lang="en"/>
               <a:t>References and Resources</a:t>
             </a:r>
             <a:endParaRPr/>
@@ -5726,7 +6365,7 @@
       </p:sp>
       <p:sp>
         <p:nvSpPr>
-          <p:cNvPr id="62" name="Google Shape;62;p14"/>
+          <p:cNvPr id="75" name="Google Shape;75;p16"/>
           <p:cNvSpPr txBox="1"/>
           <p:nvPr>
             <p:ph idx="1" type="body"/>
@@ -5734,7 +6373,7 @@
         </p:nvSpPr>
         <p:spPr>
           <a:xfrm>
-            <a:off x="311700" y="1152475"/>
+            <a:off x="311700" y="1250775"/>
             <a:ext cx="8520600" cy="3416400"/>
           </a:xfrm>
           <a:prstGeom prst="rect">
@@ -5784,12 +6423,66 @@
               <a:buChar char="●"/>
             </a:pPr>
             <a:r>
+              <a:rPr lang="en"/>
+              <a:t>Main website: </a:t>
+            </a:r>
+            <a:r>
+              <a:rPr lang="en" u="sng">
+                <a:solidFill>
+                  <a:schemeClr val="hlink"/>
+                </a:solidFill>
+                <a:hlinkClick r:id="rId4"/>
+              </a:rPr>
+              <a:t>https://deno.land/</a:t>
+            </a:r>
+            <a:endParaRPr/>
+          </a:p>
+          <a:p>
+            <a:pPr indent="-342900" lvl="0" marL="457200" rtl="0" algn="l">
+              <a:spcBef>
+                <a:spcPts val="0"/>
+              </a:spcBef>
+              <a:spcAft>
+                <a:spcPts val="0"/>
+              </a:spcAft>
+              <a:buSzPts val="1800"/>
+              <a:buChar char="●"/>
+            </a:pPr>
+            <a:r>
               <a:t/>
             </a:r>
             <a:endParaRPr/>
           </a:p>
         </p:txBody>
       </p:sp>
+      <p:pic>
+        <p:nvPicPr>
+          <p:cNvPr id="76" name="Google Shape;76;p16"/>
+          <p:cNvPicPr preferRelativeResize="0"/>
+          <p:nvPr/>
+        </p:nvPicPr>
+        <p:blipFill>
+          <a:blip r:embed="rId5">
+            <a:alphaModFix/>
+          </a:blip>
+          <a:stretch>
+            <a:fillRect/>
+          </a:stretch>
+        </p:blipFill>
+        <p:spPr>
+          <a:xfrm>
+            <a:off x="0" y="-1"/>
+            <a:ext cx="678075" cy="678075"/>
+          </a:xfrm>
+          <a:prstGeom prst="rect">
+            <a:avLst/>
+          </a:prstGeom>
+          <a:noFill/>
+          <a:ln>
+            <a:noFill/>
+          </a:ln>
+        </p:spPr>
+      </p:pic>
     </p:spTree>
   </p:cSld>
   <p:clrMapOvr>

</xml_diff>

<commit_message>
feature(install-example): Add install and examples
</commit_message>
<xml_diff>
--- a/Introduction to Deno.pptx
+++ b/Introduction to Deno.pptx
@@ -12,6 +12,9 @@
     <p:sldId id="257" r:id="rId7"/>
     <p:sldId id="258" r:id="rId8"/>
     <p:sldId id="259" r:id="rId9"/>
+    <p:sldId id="260" r:id="rId10"/>
+    <p:sldId id="261" r:id="rId11"/>
+    <p:sldId id="262" r:id="rId12"/>
   </p:sldIdLst>
   <p:sldSz cy="5143500" cx="9144000"/>
   <p:notesSz cx="6858000" cy="9144000"/>
@@ -906,7 +909,7 @@
       </p:grpSpPr>
       <p:sp>
         <p:nvSpPr>
-          <p:cNvPr id="65" name="Google Shape;65;g8c35b87562_0_30:notes"/>
+          <p:cNvPr id="65" name="Google Shape;65;g8c45306dad_0_8:notes"/>
           <p:cNvSpPr/>
           <p:nvPr>
             <p:ph idx="2" type="sldImg"/>
@@ -941,7 +944,7 @@
       </p:sp>
       <p:sp>
         <p:nvSpPr>
-          <p:cNvPr id="66" name="Google Shape;66;g8c35b87562_0_30:notes"/>
+          <p:cNvPr id="66" name="Google Shape;66;g8c45306dad_0_8:notes"/>
           <p:cNvSpPr txBox="1"/>
           <p:nvPr>
             <p:ph idx="1" type="body"/>
@@ -991,7 +994,7 @@
   <p:cSld>
     <p:spTree>
       <p:nvGrpSpPr>
-        <p:cNvPr id="70" name="Shape 70"/>
+        <p:cNvPr id="71" name="Shape 71"/>
         <p:cNvGrpSpPr/>
         <p:nvPr/>
       </p:nvGrpSpPr>
@@ -1005,7 +1008,7 @@
       </p:grpSpPr>
       <p:sp>
         <p:nvSpPr>
-          <p:cNvPr id="71" name="Google Shape;71;g8c35b87562_0_3:notes"/>
+          <p:cNvPr id="72" name="Google Shape;72;g8c45306dad_0_25:notes"/>
           <p:cNvSpPr/>
           <p:nvPr>
             <p:ph idx="2" type="sldImg"/>
@@ -1040,7 +1043,304 @@
       </p:sp>
       <p:sp>
         <p:nvSpPr>
-          <p:cNvPr id="72" name="Google Shape;72;g8c35b87562_0_3:notes"/>
+          <p:cNvPr id="73" name="Google Shape;73;g8c45306dad_0_25:notes"/>
+          <p:cNvSpPr txBox="1"/>
+          <p:nvPr>
+            <p:ph idx="1" type="body"/>
+          </p:nvPr>
+        </p:nvSpPr>
+        <p:spPr>
+          <a:xfrm>
+            <a:off x="685800" y="4343400"/>
+            <a:ext cx="5486400" cy="4114800"/>
+          </a:xfrm>
+          <a:prstGeom prst="rect">
+            <a:avLst/>
+          </a:prstGeom>
+        </p:spPr>
+        <p:txBody>
+          <a:bodyPr anchorCtr="0" anchor="t" bIns="91425" lIns="91425" spcFirstLastPara="1" rIns="91425" wrap="square" tIns="91425">
+            <a:noAutofit/>
+          </a:bodyPr>
+          <a:lstStyle/>
+          <a:p>
+            <a:pPr indent="0" lvl="0" marL="0" rtl="0" algn="l">
+              <a:spcBef>
+                <a:spcPts val="0"/>
+              </a:spcBef>
+              <a:spcAft>
+                <a:spcPts val="0"/>
+              </a:spcAft>
+              <a:buNone/>
+            </a:pPr>
+            <a:r>
+              <a:t/>
+            </a:r>
+            <a:endParaRPr/>
+          </a:p>
+        </p:txBody>
+      </p:sp>
+    </p:spTree>
+  </p:cSld>
+  <p:clrMapOvr>
+    <a:masterClrMapping/>
+  </p:clrMapOvr>
+</p:notes>
+</file>
+
+<file path=ppt/notesSlides/notesSlide5.xml><?xml version="1.0" encoding="utf-8"?>
+<p:notes xmlns:a="http://schemas.openxmlformats.org/drawingml/2006/main" xmlns:r="http://schemas.openxmlformats.org/officeDocument/2006/relationships" xmlns:mc="http://schemas.openxmlformats.org/markup-compatibility/2006" xmlns:mv="urn:schemas-microsoft-com:mac:vml" xmlns:p="http://schemas.openxmlformats.org/presentationml/2006/main" xmlns:c="http://schemas.openxmlformats.org/drawingml/2006/chart" xmlns:dgm="http://schemas.openxmlformats.org/drawingml/2006/diagram" xmlns:o="urn:schemas-microsoft-com:office:office" xmlns:v="urn:schemas-microsoft-com:vml" xmlns:pvml="urn:schemas-microsoft-com:office:powerpoint" xmlns:com="http://schemas.openxmlformats.org/drawingml/2006/compatibility" xmlns:p14="http://schemas.microsoft.com/office/powerpoint/2010/main" xmlns:p15="http://schemas.microsoft.com/office/powerpoint/2012/main" showMasterPhAnim="0" showMasterSp="0">
+  <p:cSld>
+    <p:spTree>
+      <p:nvGrpSpPr>
+        <p:cNvPr id="79" name="Shape 79"/>
+        <p:cNvGrpSpPr/>
+        <p:nvPr/>
+      </p:nvGrpSpPr>
+      <p:grpSpPr>
+        <a:xfrm>
+          <a:off x="0" y="0"/>
+          <a:ext cx="0" cy="0"/>
+          <a:chOff x="0" y="0"/>
+          <a:chExt cx="0" cy="0"/>
+        </a:xfrm>
+      </p:grpSpPr>
+      <p:sp>
+        <p:nvSpPr>
+          <p:cNvPr id="80" name="Google Shape;80;g8c35b87562_0_30:notes"/>
+          <p:cNvSpPr/>
+          <p:nvPr>
+            <p:ph idx="2" type="sldImg"/>
+          </p:nvPr>
+        </p:nvSpPr>
+        <p:spPr>
+          <a:xfrm>
+            <a:off x="381300" y="685800"/>
+            <a:ext cx="6096000" cy="3429000"/>
+          </a:xfrm>
+          <a:custGeom>
+            <a:rect b="b" l="l" r="r" t="t"/>
+            <a:pathLst>
+              <a:path extrusionOk="0" h="120000" w="120000">
+                <a:moveTo>
+                  <a:pt x="0" y="0"/>
+                </a:moveTo>
+                <a:lnTo>
+                  <a:pt x="120000" y="0"/>
+                </a:lnTo>
+                <a:lnTo>
+                  <a:pt x="120000" y="120000"/>
+                </a:lnTo>
+                <a:lnTo>
+                  <a:pt x="0" y="120000"/>
+                </a:lnTo>
+                <a:close/>
+              </a:path>
+            </a:pathLst>
+          </a:custGeom>
+        </p:spPr>
+      </p:sp>
+      <p:sp>
+        <p:nvSpPr>
+          <p:cNvPr id="81" name="Google Shape;81;g8c35b87562_0_30:notes"/>
+          <p:cNvSpPr txBox="1"/>
+          <p:nvPr>
+            <p:ph idx="1" type="body"/>
+          </p:nvPr>
+        </p:nvSpPr>
+        <p:spPr>
+          <a:xfrm>
+            <a:off x="685800" y="4343400"/>
+            <a:ext cx="5486400" cy="4114800"/>
+          </a:xfrm>
+          <a:prstGeom prst="rect">
+            <a:avLst/>
+          </a:prstGeom>
+        </p:spPr>
+        <p:txBody>
+          <a:bodyPr anchorCtr="0" anchor="t" bIns="91425" lIns="91425" spcFirstLastPara="1" rIns="91425" wrap="square" tIns="91425">
+            <a:noAutofit/>
+          </a:bodyPr>
+          <a:lstStyle/>
+          <a:p>
+            <a:pPr indent="0" lvl="0" marL="0" rtl="0" algn="l">
+              <a:spcBef>
+                <a:spcPts val="0"/>
+              </a:spcBef>
+              <a:spcAft>
+                <a:spcPts val="0"/>
+              </a:spcAft>
+              <a:buNone/>
+            </a:pPr>
+            <a:r>
+              <a:t/>
+            </a:r>
+            <a:endParaRPr/>
+          </a:p>
+        </p:txBody>
+      </p:sp>
+    </p:spTree>
+  </p:cSld>
+  <p:clrMapOvr>
+    <a:masterClrMapping/>
+  </p:clrMapOvr>
+</p:notes>
+</file>
+
+<file path=ppt/notesSlides/notesSlide6.xml><?xml version="1.0" encoding="utf-8"?>
+<p:notes xmlns:a="http://schemas.openxmlformats.org/drawingml/2006/main" xmlns:r="http://schemas.openxmlformats.org/officeDocument/2006/relationships" xmlns:mc="http://schemas.openxmlformats.org/markup-compatibility/2006" xmlns:mv="urn:schemas-microsoft-com:mac:vml" xmlns:p="http://schemas.openxmlformats.org/presentationml/2006/main" xmlns:c="http://schemas.openxmlformats.org/drawingml/2006/chart" xmlns:dgm="http://schemas.openxmlformats.org/drawingml/2006/diagram" xmlns:o="urn:schemas-microsoft-com:office:office" xmlns:v="urn:schemas-microsoft-com:vml" xmlns:pvml="urn:schemas-microsoft-com:office:powerpoint" xmlns:com="http://schemas.openxmlformats.org/drawingml/2006/compatibility" xmlns:p14="http://schemas.microsoft.com/office/powerpoint/2010/main" xmlns:p15="http://schemas.microsoft.com/office/powerpoint/2012/main" showMasterPhAnim="0" showMasterSp="0">
+  <p:cSld>
+    <p:spTree>
+      <p:nvGrpSpPr>
+        <p:cNvPr id="88" name="Shape 88"/>
+        <p:cNvGrpSpPr/>
+        <p:nvPr/>
+      </p:nvGrpSpPr>
+      <p:grpSpPr>
+        <a:xfrm>
+          <a:off x="0" y="0"/>
+          <a:ext cx="0" cy="0"/>
+          <a:chOff x="0" y="0"/>
+          <a:chExt cx="0" cy="0"/>
+        </a:xfrm>
+      </p:grpSpPr>
+      <p:sp>
+        <p:nvSpPr>
+          <p:cNvPr id="89" name="Google Shape;89;g8c45306dad_0_19:notes"/>
+          <p:cNvSpPr/>
+          <p:nvPr>
+            <p:ph idx="2" type="sldImg"/>
+          </p:nvPr>
+        </p:nvSpPr>
+        <p:spPr>
+          <a:xfrm>
+            <a:off x="381300" y="685800"/>
+            <a:ext cx="6096000" cy="3429000"/>
+          </a:xfrm>
+          <a:custGeom>
+            <a:rect b="b" l="l" r="r" t="t"/>
+            <a:pathLst>
+              <a:path extrusionOk="0" h="120000" w="120000">
+                <a:moveTo>
+                  <a:pt x="0" y="0"/>
+                </a:moveTo>
+                <a:lnTo>
+                  <a:pt x="120000" y="0"/>
+                </a:lnTo>
+                <a:lnTo>
+                  <a:pt x="120000" y="120000"/>
+                </a:lnTo>
+                <a:lnTo>
+                  <a:pt x="0" y="120000"/>
+                </a:lnTo>
+                <a:close/>
+              </a:path>
+            </a:pathLst>
+          </a:custGeom>
+        </p:spPr>
+      </p:sp>
+      <p:sp>
+        <p:nvSpPr>
+          <p:cNvPr id="90" name="Google Shape;90;g8c45306dad_0_19:notes"/>
+          <p:cNvSpPr txBox="1"/>
+          <p:nvPr>
+            <p:ph idx="1" type="body"/>
+          </p:nvPr>
+        </p:nvSpPr>
+        <p:spPr>
+          <a:xfrm>
+            <a:off x="685800" y="4343400"/>
+            <a:ext cx="5486400" cy="4114800"/>
+          </a:xfrm>
+          <a:prstGeom prst="rect">
+            <a:avLst/>
+          </a:prstGeom>
+        </p:spPr>
+        <p:txBody>
+          <a:bodyPr anchorCtr="0" anchor="t" bIns="91425" lIns="91425" spcFirstLastPara="1" rIns="91425" wrap="square" tIns="91425">
+            <a:noAutofit/>
+          </a:bodyPr>
+          <a:lstStyle/>
+          <a:p>
+            <a:pPr indent="0" lvl="0" marL="0" rtl="0" algn="l">
+              <a:spcBef>
+                <a:spcPts val="0"/>
+              </a:spcBef>
+              <a:spcAft>
+                <a:spcPts val="0"/>
+              </a:spcAft>
+              <a:buNone/>
+            </a:pPr>
+            <a:r>
+              <a:t/>
+            </a:r>
+            <a:endParaRPr/>
+          </a:p>
+        </p:txBody>
+      </p:sp>
+    </p:spTree>
+  </p:cSld>
+  <p:clrMapOvr>
+    <a:masterClrMapping/>
+  </p:clrMapOvr>
+</p:notes>
+</file>
+
+<file path=ppt/notesSlides/notesSlide7.xml><?xml version="1.0" encoding="utf-8"?>
+<p:notes xmlns:a="http://schemas.openxmlformats.org/drawingml/2006/main" xmlns:r="http://schemas.openxmlformats.org/officeDocument/2006/relationships" xmlns:mc="http://schemas.openxmlformats.org/markup-compatibility/2006" xmlns:mv="urn:schemas-microsoft-com:mac:vml" xmlns:p="http://schemas.openxmlformats.org/presentationml/2006/main" xmlns:c="http://schemas.openxmlformats.org/drawingml/2006/chart" xmlns:dgm="http://schemas.openxmlformats.org/drawingml/2006/diagram" xmlns:o="urn:schemas-microsoft-com:office:office" xmlns:v="urn:schemas-microsoft-com:vml" xmlns:pvml="urn:schemas-microsoft-com:office:powerpoint" xmlns:com="http://schemas.openxmlformats.org/drawingml/2006/compatibility" xmlns:p14="http://schemas.microsoft.com/office/powerpoint/2010/main" xmlns:p15="http://schemas.microsoft.com/office/powerpoint/2012/main" showMasterPhAnim="0" showMasterSp="0">
+  <p:cSld>
+    <p:spTree>
+      <p:nvGrpSpPr>
+        <p:cNvPr id="95" name="Shape 95"/>
+        <p:cNvGrpSpPr/>
+        <p:nvPr/>
+      </p:nvGrpSpPr>
+      <p:grpSpPr>
+        <a:xfrm>
+          <a:off x="0" y="0"/>
+          <a:ext cx="0" cy="0"/>
+          <a:chOff x="0" y="0"/>
+          <a:chExt cx="0" cy="0"/>
+        </a:xfrm>
+      </p:grpSpPr>
+      <p:sp>
+        <p:nvSpPr>
+          <p:cNvPr id="96" name="Google Shape;96;g8c35b87562_0_3:notes"/>
+          <p:cNvSpPr/>
+          <p:nvPr>
+            <p:ph idx="2" type="sldImg"/>
+          </p:nvPr>
+        </p:nvSpPr>
+        <p:spPr>
+          <a:xfrm>
+            <a:off x="381300" y="685800"/>
+            <a:ext cx="6096000" cy="3429000"/>
+          </a:xfrm>
+          <a:custGeom>
+            <a:rect b="b" l="l" r="r" t="t"/>
+            <a:pathLst>
+              <a:path extrusionOk="0" h="120000" w="120000">
+                <a:moveTo>
+                  <a:pt x="0" y="0"/>
+                </a:moveTo>
+                <a:lnTo>
+                  <a:pt x="120000" y="0"/>
+                </a:lnTo>
+                <a:lnTo>
+                  <a:pt x="120000" y="120000"/>
+                </a:lnTo>
+                <a:lnTo>
+                  <a:pt x="0" y="120000"/>
+                </a:lnTo>
+                <a:close/>
+              </a:path>
+            </a:pathLst>
+          </a:custGeom>
+        </p:spPr>
+      </p:sp>
+      <p:sp>
+        <p:nvSpPr>
+          <p:cNvPr id="97" name="Google Shape;97;g8c35b87562_0_3:notes"/>
           <p:cNvSpPr txBox="1"/>
           <p:nvPr>
             <p:ph idx="1" type="body"/>
@@ -5922,7 +6222,7 @@
         </p:nvSpPr>
         <p:spPr>
           <a:xfrm>
-            <a:off x="311700" y="678075"/>
+            <a:off x="678075" y="52688"/>
             <a:ext cx="8520600" cy="572700"/>
           </a:xfrm>
           <a:prstGeom prst="rect">
@@ -5990,7 +6290,7 @@
               <a:buNone/>
             </a:pPr>
             <a:r>
-              <a:rPr lang="en" sz="1100">
+              <a:rPr lang="en" sz="1600">
                 <a:solidFill>
                   <a:schemeClr val="dk1"/>
                 </a:solidFill>
@@ -5998,21 +6298,21 @@
               <a:t>From the website: </a:t>
             </a:r>
             <a:r>
-              <a:rPr lang="en" sz="1100">
+              <a:rPr lang="en" sz="1600">
                 <a:solidFill>
                   <a:schemeClr val="dk1"/>
                 </a:solidFill>
               </a:rPr>
               <a:t>Deno is a simple, modern and secure runtime for JavaScript and TypeScript that uses V8 and is built in Rust.</a:t>
             </a:r>
-            <a:endParaRPr sz="1100">
+            <a:endParaRPr sz="1600">
               <a:solidFill>
                 <a:schemeClr val="dk1"/>
               </a:solidFill>
             </a:endParaRPr>
           </a:p>
           <a:p>
-            <a:pPr indent="-298450" lvl="0" marL="457200" rtl="0" algn="l">
+            <a:pPr indent="-330200" lvl="0" marL="457200" rtl="0" algn="l">
               <a:lnSpc>
                 <a:spcPct val="115000"/>
               </a:lnSpc>
@@ -6025,25 +6325,25 @@
               <a:buClr>
                 <a:schemeClr val="dk1"/>
               </a:buClr>
-              <a:buSzPts val="1100"/>
+              <a:buSzPts val="1600"/>
               <a:buAutoNum type="arabicPeriod"/>
             </a:pPr>
             <a:r>
-              <a:rPr lang="en" sz="1100">
+              <a:rPr lang="en" sz="1600">
                 <a:solidFill>
                   <a:schemeClr val="dk1"/>
                 </a:solidFill>
               </a:rPr>
               <a:t>Secure by default. No file, network, or environment access, unless explicitly enabled.</a:t>
             </a:r>
-            <a:endParaRPr sz="1100">
+            <a:endParaRPr sz="1600">
               <a:solidFill>
                 <a:schemeClr val="dk1"/>
               </a:solidFill>
             </a:endParaRPr>
           </a:p>
           <a:p>
-            <a:pPr indent="-298450" lvl="0" marL="457200" rtl="0" algn="l">
+            <a:pPr indent="-330200" lvl="0" marL="457200" rtl="0" algn="l">
               <a:lnSpc>
                 <a:spcPct val="115000"/>
               </a:lnSpc>
@@ -6056,25 +6356,25 @@
               <a:buClr>
                 <a:schemeClr val="dk1"/>
               </a:buClr>
-              <a:buSzPts val="1100"/>
+              <a:buSzPts val="1600"/>
               <a:buAutoNum type="arabicPeriod"/>
             </a:pPr>
             <a:r>
-              <a:rPr b="1" lang="en" sz="1100">
+              <a:rPr b="1" lang="en" sz="1600">
                 <a:solidFill>
                   <a:schemeClr val="dk1"/>
                 </a:solidFill>
               </a:rPr>
               <a:t>Supports TypeScript out of the box.</a:t>
             </a:r>
-            <a:endParaRPr b="1" sz="1100">
+            <a:endParaRPr b="1" sz="1600">
               <a:solidFill>
                 <a:schemeClr val="dk1"/>
               </a:solidFill>
             </a:endParaRPr>
           </a:p>
           <a:p>
-            <a:pPr indent="-298450" lvl="0" marL="457200" rtl="0" algn="l">
+            <a:pPr indent="-330200" lvl="0" marL="457200" rtl="0" algn="l">
               <a:lnSpc>
                 <a:spcPct val="115000"/>
               </a:lnSpc>
@@ -6087,25 +6387,25 @@
               <a:buClr>
                 <a:schemeClr val="dk1"/>
               </a:buClr>
-              <a:buSzPts val="1100"/>
+              <a:buSzPts val="1600"/>
               <a:buAutoNum type="arabicPeriod"/>
             </a:pPr>
             <a:r>
-              <a:rPr lang="en" sz="1100">
+              <a:rPr lang="en" sz="1600">
                 <a:solidFill>
                   <a:schemeClr val="dk1"/>
                 </a:solidFill>
               </a:rPr>
               <a:t>Ships only a single executable file.</a:t>
             </a:r>
-            <a:endParaRPr sz="1100">
+            <a:endParaRPr sz="1600">
               <a:solidFill>
                 <a:schemeClr val="dk1"/>
               </a:solidFill>
             </a:endParaRPr>
           </a:p>
           <a:p>
-            <a:pPr indent="-298450" lvl="0" marL="457200" rtl="0" algn="l">
+            <a:pPr indent="-330200" lvl="0" marL="457200" rtl="0" algn="l">
               <a:lnSpc>
                 <a:spcPct val="115000"/>
               </a:lnSpc>
@@ -6118,25 +6418,41 @@
               <a:buClr>
                 <a:schemeClr val="dk1"/>
               </a:buClr>
-              <a:buSzPts val="1100"/>
+              <a:buSzPts val="1600"/>
               <a:buAutoNum type="arabicPeriod"/>
             </a:pPr>
             <a:r>
-              <a:rPr lang="en" sz="1100">
+              <a:rPr lang="en" sz="1600">
                 <a:solidFill>
                   <a:schemeClr val="dk1"/>
                 </a:solidFill>
               </a:rPr>
-              <a:t>Has built-in utilities like a dependency inspector (deno info) and a code formatter (deno fmt).</a:t>
+              <a:t>Has </a:t>
             </a:r>
-            <a:endParaRPr sz="1100">
+            <a:r>
+              <a:rPr b="1" lang="en" sz="1600">
+                <a:solidFill>
+                  <a:schemeClr val="dk1"/>
+                </a:solidFill>
+              </a:rPr>
+              <a:t>built-in utilities</a:t>
+            </a:r>
+            <a:r>
+              <a:rPr lang="en" sz="1600">
+                <a:solidFill>
+                  <a:schemeClr val="dk1"/>
+                </a:solidFill>
+              </a:rPr>
+              <a:t> like a dependency inspector (deno info) and a code formatter (deno fmt).</a:t>
+            </a:r>
+            <a:endParaRPr sz="1600">
               <a:solidFill>
                 <a:schemeClr val="dk1"/>
               </a:solidFill>
             </a:endParaRPr>
           </a:p>
           <a:p>
-            <a:pPr indent="-298450" lvl="0" marL="457200" rtl="0" algn="l">
+            <a:pPr indent="-330200" lvl="0" marL="457200" rtl="0" algn="l">
               <a:lnSpc>
                 <a:spcPct val="115000"/>
               </a:lnSpc>
@@ -6149,11 +6465,11 @@
               <a:buClr>
                 <a:schemeClr val="dk1"/>
               </a:buClr>
-              <a:buSzPts val="1100"/>
+              <a:buSzPts val="1600"/>
               <a:buAutoNum type="arabicPeriod"/>
             </a:pPr>
             <a:r>
-              <a:rPr lang="en" sz="1100">
+              <a:rPr lang="en" sz="1600">
                 <a:solidFill>
                   <a:schemeClr val="dk1"/>
                 </a:solidFill>
@@ -6161,7 +6477,7 @@
               <a:t>Has a set of reviewed (audited) </a:t>
             </a:r>
             <a:r>
-              <a:rPr b="1" lang="en" sz="1100">
+              <a:rPr b="1" lang="en" sz="1600">
                 <a:solidFill>
                   <a:schemeClr val="dk1"/>
                 </a:solidFill>
@@ -6169,7 +6485,7 @@
               <a:t>standard modules</a:t>
             </a:r>
             <a:r>
-              <a:rPr lang="en" sz="1100">
+              <a:rPr lang="en" sz="1600">
                 <a:solidFill>
                   <a:schemeClr val="dk1"/>
                 </a:solidFill>
@@ -6177,7 +6493,7 @@
               <a:t> that are guaranteed to work with Deno:</a:t>
             </a:r>
             <a:r>
-              <a:rPr lang="en" sz="1100">
+              <a:rPr lang="en" sz="1600">
                 <a:solidFill>
                   <a:schemeClr val="dk1"/>
                 </a:solidFill>
@@ -6189,7 +6505,7 @@
               <a:t> </a:t>
             </a:r>
             <a:r>
-              <a:rPr lang="en" sz="1100" u="sng">
+              <a:rPr lang="en" sz="1600" u="sng">
                 <a:solidFill>
                   <a:schemeClr val="hlink"/>
                 </a:solidFill>
@@ -6197,7 +6513,7 @@
               </a:rPr>
               <a:t>deno.land/std</a:t>
             </a:r>
-            <a:endParaRPr sz="1100" u="sng">
+            <a:endParaRPr sz="1600" u="sng">
               <a:solidFill>
                 <a:schemeClr val="hlink"/>
               </a:solidFill>
@@ -6230,17 +6546,45 @@
           <a:chExt cx="0" cy="0"/>
         </a:xfrm>
       </p:grpSpPr>
+      <p:pic>
+        <p:nvPicPr>
+          <p:cNvPr id="68" name="Google Shape;68;p15"/>
+          <p:cNvPicPr preferRelativeResize="0"/>
+          <p:nvPr/>
+        </p:nvPicPr>
+        <p:blipFill>
+          <a:blip r:embed="rId3">
+            <a:alphaModFix/>
+          </a:blip>
+          <a:stretch>
+            <a:fillRect/>
+          </a:stretch>
+        </p:blipFill>
+        <p:spPr>
+          <a:xfrm>
+            <a:off x="0" y="-1"/>
+            <a:ext cx="678075" cy="678075"/>
+          </a:xfrm>
+          <a:prstGeom prst="rect">
+            <a:avLst/>
+          </a:prstGeom>
+          <a:noFill/>
+          <a:ln>
+            <a:noFill/>
+          </a:ln>
+        </p:spPr>
+      </p:pic>
       <p:sp>
         <p:nvSpPr>
-          <p:cNvPr id="68" name="Google Shape;68;p15"/>
+          <p:cNvPr id="69" name="Google Shape;69;p15"/>
           <p:cNvSpPr txBox="1"/>
           <p:nvPr>
-            <p:ph type="title"/>
+            <p:ph idx="4294967295" type="title"/>
           </p:nvPr>
         </p:nvSpPr>
         <p:spPr>
           <a:xfrm>
-            <a:off x="311700" y="445025"/>
+            <a:off x="678075" y="52688"/>
             <a:ext cx="8520600" cy="572700"/>
           </a:xfrm>
           <a:prstGeom prst="rect">
@@ -6264,7 +6608,268 @@
             </a:pPr>
             <a:r>
               <a:rPr lang="en"/>
-              <a:t>Getting Started</a:t>
+              <a:t>Why do we care?</a:t>
+            </a:r>
+            <a:endParaRPr/>
+          </a:p>
+        </p:txBody>
+      </p:sp>
+      <p:sp>
+        <p:nvSpPr>
+          <p:cNvPr id="70" name="Google Shape;70;p15"/>
+          <p:cNvSpPr txBox="1"/>
+          <p:nvPr/>
+        </p:nvSpPr>
+        <p:spPr>
+          <a:xfrm>
+            <a:off x="43575" y="1431175"/>
+            <a:ext cx="8725200" cy="3000000"/>
+          </a:xfrm>
+          <a:prstGeom prst="rect">
+            <a:avLst/>
+          </a:prstGeom>
+          <a:noFill/>
+          <a:ln>
+            <a:noFill/>
+          </a:ln>
+        </p:spPr>
+        <p:txBody>
+          <a:bodyPr anchorCtr="0" anchor="t" bIns="91425" lIns="91425" spcFirstLastPara="1" rIns="91425" wrap="square" tIns="91425">
+            <a:noAutofit/>
+          </a:bodyPr>
+          <a:lstStyle/>
+          <a:p>
+            <a:pPr indent="-330200" lvl="0" marL="457200" rtl="0" algn="l">
+              <a:lnSpc>
+                <a:spcPct val="115000"/>
+              </a:lnSpc>
+              <a:spcBef>
+                <a:spcPts val="1200"/>
+              </a:spcBef>
+              <a:spcAft>
+                <a:spcPts val="0"/>
+              </a:spcAft>
+              <a:buClr>
+                <a:schemeClr val="dk1"/>
+              </a:buClr>
+              <a:buSzPts val="1600"/>
+              <a:buAutoNum type="arabicPeriod"/>
+            </a:pPr>
+            <a:r>
+              <a:rPr lang="en" sz="1600">
+                <a:solidFill>
+                  <a:schemeClr val="dk1"/>
+                </a:solidFill>
+              </a:rPr>
+              <a:t>Sounds like nodejs? Same person who created nodejs created deno!</a:t>
+            </a:r>
+            <a:endParaRPr sz="1600">
+              <a:solidFill>
+                <a:schemeClr val="dk1"/>
+              </a:solidFill>
+            </a:endParaRPr>
+          </a:p>
+          <a:p>
+            <a:pPr indent="-330200" lvl="0" marL="457200" rtl="0" algn="l">
+              <a:lnSpc>
+                <a:spcPct val="115000"/>
+              </a:lnSpc>
+              <a:spcBef>
+                <a:spcPts val="0"/>
+              </a:spcBef>
+              <a:spcAft>
+                <a:spcPts val="0"/>
+              </a:spcAft>
+              <a:buClr>
+                <a:schemeClr val="dk1"/>
+              </a:buClr>
+              <a:buSzPts val="1600"/>
+              <a:buAutoNum type="arabicPeriod"/>
+            </a:pPr>
+            <a:r>
+              <a:rPr lang="en" sz="1600">
+                <a:solidFill>
+                  <a:schemeClr val="dk1"/>
+                </a:solidFill>
+              </a:rPr>
+              <a:t>Both Javascript and Typescript can be used outside of the browser. No need to transpile, deno works with typescript.</a:t>
+            </a:r>
+            <a:endParaRPr sz="1600">
+              <a:solidFill>
+                <a:schemeClr val="dk1"/>
+              </a:solidFill>
+            </a:endParaRPr>
+          </a:p>
+          <a:p>
+            <a:pPr indent="-330200" lvl="0" marL="457200" rtl="0" algn="l">
+              <a:lnSpc>
+                <a:spcPct val="115000"/>
+              </a:lnSpc>
+              <a:spcBef>
+                <a:spcPts val="0"/>
+              </a:spcBef>
+              <a:spcAft>
+                <a:spcPts val="0"/>
+              </a:spcAft>
+              <a:buClr>
+                <a:schemeClr val="dk1"/>
+              </a:buClr>
+              <a:buSzPts val="1600"/>
+              <a:buAutoNum type="arabicPeriod"/>
+            </a:pPr>
+            <a:r>
+              <a:rPr lang="en" sz="1600">
+                <a:solidFill>
+                  <a:schemeClr val="dk1"/>
+                </a:solidFill>
+              </a:rPr>
+              <a:t>Deno has a standard library.</a:t>
+            </a:r>
+            <a:endParaRPr sz="1600">
+              <a:solidFill>
+                <a:schemeClr val="dk1"/>
+              </a:solidFill>
+            </a:endParaRPr>
+          </a:p>
+          <a:p>
+            <a:pPr indent="-330200" lvl="0" marL="457200" rtl="0" algn="l">
+              <a:lnSpc>
+                <a:spcPct val="115000"/>
+              </a:lnSpc>
+              <a:spcBef>
+                <a:spcPts val="0"/>
+              </a:spcBef>
+              <a:spcAft>
+                <a:spcPts val="0"/>
+              </a:spcAft>
+              <a:buClr>
+                <a:schemeClr val="dk1"/>
+              </a:buClr>
+              <a:buSzPts val="1600"/>
+              <a:buAutoNum type="arabicPeriod"/>
+            </a:pPr>
+            <a:r>
+              <a:rPr lang="en" sz="1600">
+                <a:solidFill>
+                  <a:schemeClr val="dk1"/>
+                </a:solidFill>
+              </a:rPr>
+              <a:t>Deno can use web assembly.</a:t>
+            </a:r>
+            <a:endParaRPr sz="1600">
+              <a:solidFill>
+                <a:schemeClr val="dk1"/>
+              </a:solidFill>
+            </a:endParaRPr>
+          </a:p>
+          <a:p>
+            <a:pPr indent="-330200" lvl="0" marL="457200" rtl="0" algn="l">
+              <a:lnSpc>
+                <a:spcPct val="115000"/>
+              </a:lnSpc>
+              <a:spcBef>
+                <a:spcPts val="0"/>
+              </a:spcBef>
+              <a:spcAft>
+                <a:spcPts val="0"/>
+              </a:spcAft>
+              <a:buClr>
+                <a:schemeClr val="dk1"/>
+              </a:buClr>
+              <a:buSzPts val="1600"/>
+              <a:buAutoNum type="arabicPeriod"/>
+            </a:pPr>
+            <a:r>
+              <a:rPr lang="en" sz="1600">
+                <a:solidFill>
+                  <a:schemeClr val="dk1"/>
+                </a:solidFill>
+              </a:rPr>
+              <a:t>No package.jsons needed! (most controversial change but more later)</a:t>
+            </a:r>
+            <a:endParaRPr sz="1600">
+              <a:solidFill>
+                <a:schemeClr val="dk1"/>
+              </a:solidFill>
+            </a:endParaRPr>
+          </a:p>
+        </p:txBody>
+      </p:sp>
+    </p:spTree>
+  </p:cSld>
+  <p:clrMapOvr>
+    <a:masterClrMapping/>
+  </p:clrMapOvr>
+</p:sld>
+</file>
+
+<file path=ppt/slides/slide4.xml><?xml version="1.0" encoding="utf-8"?>
+<p:sld xmlns:a="http://schemas.openxmlformats.org/drawingml/2006/main" xmlns:r="http://schemas.openxmlformats.org/officeDocument/2006/relationships" xmlns:mc="http://schemas.openxmlformats.org/markup-compatibility/2006" xmlns:mv="urn:schemas-microsoft-com:mac:vml" xmlns:p="http://schemas.openxmlformats.org/presentationml/2006/main" xmlns:c="http://schemas.openxmlformats.org/drawingml/2006/chart" xmlns:dgm="http://schemas.openxmlformats.org/drawingml/2006/diagram" xmlns:o="urn:schemas-microsoft-com:office:office" xmlns:v="urn:schemas-microsoft-com:vml" xmlns:pvml="urn:schemas-microsoft-com:office:powerpoint" xmlns:com="http://schemas.openxmlformats.org/drawingml/2006/compatibility" xmlns:p14="http://schemas.microsoft.com/office/powerpoint/2010/main" xmlns:p15="http://schemas.microsoft.com/office/powerpoint/2012/main">
+  <p:cSld>
+    <p:spTree>
+      <p:nvGrpSpPr>
+        <p:cNvPr id="74" name="Shape 74"/>
+        <p:cNvGrpSpPr/>
+        <p:nvPr/>
+      </p:nvGrpSpPr>
+      <p:grpSpPr>
+        <a:xfrm>
+          <a:off x="0" y="0"/>
+          <a:ext cx="0" cy="0"/>
+          <a:chOff x="0" y="0"/>
+          <a:chExt cx="0" cy="0"/>
+        </a:xfrm>
+      </p:grpSpPr>
+      <p:sp>
+        <p:nvSpPr>
+          <p:cNvPr id="75" name="Google Shape;75;p16"/>
+          <p:cNvSpPr txBox="1"/>
+          <p:nvPr>
+            <p:ph type="title"/>
+          </p:nvPr>
+        </p:nvSpPr>
+        <p:spPr>
+          <a:xfrm>
+            <a:off x="742950" y="105375"/>
+            <a:ext cx="8520600" cy="572700"/>
+          </a:xfrm>
+          <a:prstGeom prst="rect">
+            <a:avLst/>
+          </a:prstGeom>
+        </p:spPr>
+        <p:txBody>
+          <a:bodyPr anchorCtr="0" anchor="t" bIns="91425" lIns="91425" spcFirstLastPara="1" rIns="91425" wrap="square" tIns="91425">
+            <a:noAutofit/>
+          </a:bodyPr>
+          <a:lstStyle/>
+          <a:p>
+            <a:pPr indent="0" lvl="0" marL="0" rtl="0" algn="l">
+              <a:spcBef>
+                <a:spcPts val="0"/>
+              </a:spcBef>
+              <a:spcAft>
+                <a:spcPts val="0"/>
+              </a:spcAft>
+              <a:buNone/>
+            </a:pPr>
+            <a:r>
+              <a:rPr lang="en"/>
+              <a:t>Getting Started - Install and Example</a:t>
+            </a:r>
+            <a:endParaRPr/>
+          </a:p>
+          <a:p>
+            <a:pPr indent="0" lvl="0" marL="0" rtl="0" algn="l">
+              <a:spcBef>
+                <a:spcPts val="0"/>
+              </a:spcBef>
+              <a:spcAft>
+                <a:spcPts val="0"/>
+              </a:spcAft>
+              <a:buNone/>
+            </a:pPr>
+            <a:r>
+              <a:t/>
             </a:r>
             <a:endParaRPr/>
           </a:p>
@@ -6272,7 +6877,7 @@
       </p:sp>
       <p:pic>
         <p:nvPicPr>
-          <p:cNvPr id="69" name="Google Shape;69;p15"/>
+          <p:cNvPr id="76" name="Google Shape;76;p16"/>
           <p:cNvPicPr preferRelativeResize="0"/>
           <p:nvPr/>
         </p:nvPicPr>
@@ -6286,8 +6891,64 @@
         </p:blipFill>
         <p:spPr>
           <a:xfrm>
-            <a:off x="742950" y="2062150"/>
+            <a:off x="742950" y="2251025"/>
             <a:ext cx="7658100" cy="1019175"/>
+          </a:xfrm>
+          <a:prstGeom prst="rect">
+            <a:avLst/>
+          </a:prstGeom>
+          <a:noFill/>
+          <a:ln>
+            <a:noFill/>
+          </a:ln>
+        </p:spPr>
+      </p:pic>
+      <p:pic>
+        <p:nvPicPr>
+          <p:cNvPr id="77" name="Google Shape;77;p16"/>
+          <p:cNvPicPr preferRelativeResize="0"/>
+          <p:nvPr/>
+        </p:nvPicPr>
+        <p:blipFill>
+          <a:blip r:embed="rId4">
+            <a:alphaModFix/>
+          </a:blip>
+          <a:stretch>
+            <a:fillRect/>
+          </a:stretch>
+        </p:blipFill>
+        <p:spPr>
+          <a:xfrm>
+            <a:off x="0" y="-1"/>
+            <a:ext cx="678075" cy="678075"/>
+          </a:xfrm>
+          <a:prstGeom prst="rect">
+            <a:avLst/>
+          </a:prstGeom>
+          <a:noFill/>
+          <a:ln>
+            <a:noFill/>
+          </a:ln>
+        </p:spPr>
+      </p:pic>
+      <p:pic>
+        <p:nvPicPr>
+          <p:cNvPr id="78" name="Google Shape;78;p16"/>
+          <p:cNvPicPr preferRelativeResize="0"/>
+          <p:nvPr/>
+        </p:nvPicPr>
+        <p:blipFill>
+          <a:blip r:embed="rId5">
+            <a:alphaModFix/>
+          </a:blip>
+          <a:stretch>
+            <a:fillRect/>
+          </a:stretch>
+        </p:blipFill>
+        <p:spPr>
+          <a:xfrm>
+            <a:off x="742950" y="1439275"/>
+            <a:ext cx="7200900" cy="304800"/>
           </a:xfrm>
           <a:prstGeom prst="rect">
             <a:avLst/>
@@ -6306,12 +6967,12 @@
 </p:sld>
 </file>
 
-<file path=ppt/slides/slide4.xml><?xml version="1.0" encoding="utf-8"?>
+<file path=ppt/slides/slide5.xml><?xml version="1.0" encoding="utf-8"?>
 <p:sld xmlns:a="http://schemas.openxmlformats.org/drawingml/2006/main" xmlns:r="http://schemas.openxmlformats.org/officeDocument/2006/relationships" xmlns:mc="http://schemas.openxmlformats.org/markup-compatibility/2006" xmlns:mv="urn:schemas-microsoft-com:mac:vml" xmlns:p="http://schemas.openxmlformats.org/presentationml/2006/main" xmlns:c="http://schemas.openxmlformats.org/drawingml/2006/chart" xmlns:dgm="http://schemas.openxmlformats.org/drawingml/2006/diagram" xmlns:o="urn:schemas-microsoft-com:office:office" xmlns:v="urn:schemas-microsoft-com:vml" xmlns:pvml="urn:schemas-microsoft-com:office:powerpoint" xmlns:com="http://schemas.openxmlformats.org/drawingml/2006/compatibility" xmlns:p14="http://schemas.microsoft.com/office/powerpoint/2010/main" xmlns:p15="http://schemas.microsoft.com/office/powerpoint/2012/main">
   <p:cSld>
     <p:spTree>
       <p:nvGrpSpPr>
-        <p:cNvPr id="73" name="Shape 73"/>
+        <p:cNvPr id="82" name="Shape 82"/>
         <p:cNvGrpSpPr/>
         <p:nvPr/>
       </p:nvGrpSpPr>
@@ -6325,7 +6986,320 @@
       </p:grpSpPr>
       <p:sp>
         <p:nvSpPr>
-          <p:cNvPr id="74" name="Google Shape;74;p16"/>
+          <p:cNvPr id="83" name="Google Shape;83;p17"/>
+          <p:cNvSpPr txBox="1"/>
+          <p:nvPr>
+            <p:ph type="title"/>
+          </p:nvPr>
+        </p:nvSpPr>
+        <p:spPr>
+          <a:xfrm>
+            <a:off x="742950" y="105375"/>
+            <a:ext cx="8520600" cy="572700"/>
+          </a:xfrm>
+          <a:prstGeom prst="rect">
+            <a:avLst/>
+          </a:prstGeom>
+        </p:spPr>
+        <p:txBody>
+          <a:bodyPr anchorCtr="0" anchor="t" bIns="91425" lIns="91425" spcFirstLastPara="1" rIns="91425" wrap="square" tIns="91425">
+            <a:noAutofit/>
+          </a:bodyPr>
+          <a:lstStyle/>
+          <a:p>
+            <a:pPr indent="0" lvl="0" marL="0" rtl="0" algn="l">
+              <a:spcBef>
+                <a:spcPts val="0"/>
+              </a:spcBef>
+              <a:spcAft>
+                <a:spcPts val="0"/>
+              </a:spcAft>
+              <a:buNone/>
+            </a:pPr>
+            <a:r>
+              <a:rPr lang="en"/>
+              <a:t>Getting Started - Part 2 (Simple web server)</a:t>
+            </a:r>
+            <a:endParaRPr/>
+          </a:p>
+          <a:p>
+            <a:pPr indent="0" lvl="0" marL="0" rtl="0" algn="l">
+              <a:spcBef>
+                <a:spcPts val="0"/>
+              </a:spcBef>
+              <a:spcAft>
+                <a:spcPts val="0"/>
+              </a:spcAft>
+              <a:buNone/>
+            </a:pPr>
+            <a:r>
+              <a:t/>
+            </a:r>
+            <a:endParaRPr/>
+          </a:p>
+        </p:txBody>
+      </p:sp>
+      <p:pic>
+        <p:nvPicPr>
+          <p:cNvPr id="84" name="Google Shape;84;p17"/>
+          <p:cNvPicPr preferRelativeResize="0"/>
+          <p:nvPr/>
+        </p:nvPicPr>
+        <p:blipFill>
+          <a:blip r:embed="rId3">
+            <a:alphaModFix/>
+          </a:blip>
+          <a:stretch>
+            <a:fillRect/>
+          </a:stretch>
+        </p:blipFill>
+        <p:spPr>
+          <a:xfrm>
+            <a:off x="0" y="-1"/>
+            <a:ext cx="678075" cy="678075"/>
+          </a:xfrm>
+          <a:prstGeom prst="rect">
+            <a:avLst/>
+          </a:prstGeom>
+          <a:noFill/>
+          <a:ln>
+            <a:noFill/>
+          </a:ln>
+        </p:spPr>
+      </p:pic>
+      <p:pic>
+        <p:nvPicPr>
+          <p:cNvPr id="85" name="Google Shape;85;p17"/>
+          <p:cNvPicPr preferRelativeResize="0"/>
+          <p:nvPr/>
+        </p:nvPicPr>
+        <p:blipFill>
+          <a:blip r:embed="rId4">
+            <a:alphaModFix/>
+          </a:blip>
+          <a:stretch>
+            <a:fillRect/>
+          </a:stretch>
+        </p:blipFill>
+        <p:spPr>
+          <a:xfrm>
+            <a:off x="228600" y="3345075"/>
+            <a:ext cx="8839200" cy="342062"/>
+          </a:xfrm>
+          <a:prstGeom prst="rect">
+            <a:avLst/>
+          </a:prstGeom>
+          <a:noFill/>
+          <a:ln>
+            <a:noFill/>
+          </a:ln>
+        </p:spPr>
+      </p:pic>
+      <p:pic>
+        <p:nvPicPr>
+          <p:cNvPr id="86" name="Google Shape;86;p17"/>
+          <p:cNvPicPr preferRelativeResize="0"/>
+          <p:nvPr/>
+        </p:nvPicPr>
+        <p:blipFill>
+          <a:blip r:embed="rId5">
+            <a:alphaModFix/>
+          </a:blip>
+          <a:stretch>
+            <a:fillRect/>
+          </a:stretch>
+        </p:blipFill>
+        <p:spPr>
+          <a:xfrm>
+            <a:off x="228600" y="4022637"/>
+            <a:ext cx="3057525" cy="714375"/>
+          </a:xfrm>
+          <a:prstGeom prst="rect">
+            <a:avLst/>
+          </a:prstGeom>
+          <a:noFill/>
+          <a:ln>
+            <a:noFill/>
+          </a:ln>
+        </p:spPr>
+      </p:pic>
+      <p:pic>
+        <p:nvPicPr>
+          <p:cNvPr id="87" name="Google Shape;87;p17"/>
+          <p:cNvPicPr preferRelativeResize="0"/>
+          <p:nvPr/>
+        </p:nvPicPr>
+        <p:blipFill>
+          <a:blip r:embed="rId6">
+            <a:alphaModFix/>
+          </a:blip>
+          <a:stretch>
+            <a:fillRect/>
+          </a:stretch>
+        </p:blipFill>
+        <p:spPr>
+          <a:xfrm>
+            <a:off x="228600" y="1561775"/>
+            <a:ext cx="6572250" cy="1371600"/>
+          </a:xfrm>
+          <a:prstGeom prst="rect">
+            <a:avLst/>
+          </a:prstGeom>
+          <a:noFill/>
+          <a:ln>
+            <a:noFill/>
+          </a:ln>
+        </p:spPr>
+      </p:pic>
+    </p:spTree>
+  </p:cSld>
+  <p:clrMapOvr>
+    <a:masterClrMapping/>
+  </p:clrMapOvr>
+</p:sld>
+</file>
+
+<file path=ppt/slides/slide6.xml><?xml version="1.0" encoding="utf-8"?>
+<p:sld xmlns:a="http://schemas.openxmlformats.org/drawingml/2006/main" xmlns:r="http://schemas.openxmlformats.org/officeDocument/2006/relationships" xmlns:mc="http://schemas.openxmlformats.org/markup-compatibility/2006" xmlns:mv="urn:schemas-microsoft-com:mac:vml" xmlns:p="http://schemas.openxmlformats.org/presentationml/2006/main" xmlns:c="http://schemas.openxmlformats.org/drawingml/2006/chart" xmlns:dgm="http://schemas.openxmlformats.org/drawingml/2006/diagram" xmlns:o="urn:schemas-microsoft-com:office:office" xmlns:v="urn:schemas-microsoft-com:vml" xmlns:pvml="urn:schemas-microsoft-com:office:powerpoint" xmlns:com="http://schemas.openxmlformats.org/drawingml/2006/compatibility" xmlns:p14="http://schemas.microsoft.com/office/powerpoint/2010/main" xmlns:p15="http://schemas.microsoft.com/office/powerpoint/2012/main">
+  <p:cSld>
+    <p:spTree>
+      <p:nvGrpSpPr>
+        <p:cNvPr id="91" name="Shape 91"/>
+        <p:cNvGrpSpPr/>
+        <p:nvPr/>
+      </p:nvGrpSpPr>
+      <p:grpSpPr>
+        <a:xfrm>
+          <a:off x="0" y="0"/>
+          <a:ext cx="0" cy="0"/>
+          <a:chOff x="0" y="0"/>
+          <a:chExt cx="0" cy="0"/>
+        </a:xfrm>
+      </p:grpSpPr>
+      <p:sp>
+        <p:nvSpPr>
+          <p:cNvPr id="92" name="Google Shape;92;p18"/>
+          <p:cNvSpPr txBox="1"/>
+          <p:nvPr>
+            <p:ph type="title"/>
+          </p:nvPr>
+        </p:nvSpPr>
+        <p:spPr>
+          <a:xfrm>
+            <a:off x="742950" y="105375"/>
+            <a:ext cx="8520600" cy="572700"/>
+          </a:xfrm>
+          <a:prstGeom prst="rect">
+            <a:avLst/>
+          </a:prstGeom>
+        </p:spPr>
+        <p:txBody>
+          <a:bodyPr anchorCtr="0" anchor="t" bIns="91425" lIns="91425" spcFirstLastPara="1" rIns="91425" wrap="square" tIns="91425">
+            <a:noAutofit/>
+          </a:bodyPr>
+          <a:lstStyle/>
+          <a:p>
+            <a:pPr indent="0" lvl="0" marL="0" rtl="0" algn="l">
+              <a:spcBef>
+                <a:spcPts val="0"/>
+              </a:spcBef>
+              <a:spcAft>
+                <a:spcPts val="0"/>
+              </a:spcAft>
+              <a:buNone/>
+            </a:pPr>
+            <a:r>
+              <a:rPr lang="en"/>
+              <a:t>Getting Started - Part 3 (Mor complicated)</a:t>
+            </a:r>
+            <a:endParaRPr/>
+          </a:p>
+        </p:txBody>
+      </p:sp>
+      <p:pic>
+        <p:nvPicPr>
+          <p:cNvPr id="93" name="Google Shape;93;p18"/>
+          <p:cNvPicPr preferRelativeResize="0"/>
+          <p:nvPr/>
+        </p:nvPicPr>
+        <p:blipFill>
+          <a:blip r:embed="rId3">
+            <a:alphaModFix/>
+          </a:blip>
+          <a:stretch>
+            <a:fillRect/>
+          </a:stretch>
+        </p:blipFill>
+        <p:spPr>
+          <a:xfrm>
+            <a:off x="678075" y="1277550"/>
+            <a:ext cx="7658100" cy="1019175"/>
+          </a:xfrm>
+          <a:prstGeom prst="rect">
+            <a:avLst/>
+          </a:prstGeom>
+          <a:noFill/>
+          <a:ln>
+            <a:noFill/>
+          </a:ln>
+        </p:spPr>
+      </p:pic>
+      <p:pic>
+        <p:nvPicPr>
+          <p:cNvPr id="94" name="Google Shape;94;p18"/>
+          <p:cNvPicPr preferRelativeResize="0"/>
+          <p:nvPr/>
+        </p:nvPicPr>
+        <p:blipFill>
+          <a:blip r:embed="rId4">
+            <a:alphaModFix/>
+          </a:blip>
+          <a:stretch>
+            <a:fillRect/>
+          </a:stretch>
+        </p:blipFill>
+        <p:spPr>
+          <a:xfrm>
+            <a:off x="0" y="-1"/>
+            <a:ext cx="678075" cy="678075"/>
+          </a:xfrm>
+          <a:prstGeom prst="rect">
+            <a:avLst/>
+          </a:prstGeom>
+          <a:noFill/>
+          <a:ln>
+            <a:noFill/>
+          </a:ln>
+        </p:spPr>
+      </p:pic>
+    </p:spTree>
+  </p:cSld>
+  <p:clrMapOvr>
+    <a:masterClrMapping/>
+  </p:clrMapOvr>
+</p:sld>
+</file>
+
+<file path=ppt/slides/slide7.xml><?xml version="1.0" encoding="utf-8"?>
+<p:sld xmlns:a="http://schemas.openxmlformats.org/drawingml/2006/main" xmlns:r="http://schemas.openxmlformats.org/officeDocument/2006/relationships" xmlns:mc="http://schemas.openxmlformats.org/markup-compatibility/2006" xmlns:mv="urn:schemas-microsoft-com:mac:vml" xmlns:p="http://schemas.openxmlformats.org/presentationml/2006/main" xmlns:c="http://schemas.openxmlformats.org/drawingml/2006/chart" xmlns:dgm="http://schemas.openxmlformats.org/drawingml/2006/diagram" xmlns:o="urn:schemas-microsoft-com:office:office" xmlns:v="urn:schemas-microsoft-com:vml" xmlns:pvml="urn:schemas-microsoft-com:office:powerpoint" xmlns:com="http://schemas.openxmlformats.org/drawingml/2006/compatibility" xmlns:p14="http://schemas.microsoft.com/office/powerpoint/2010/main" xmlns:p15="http://schemas.microsoft.com/office/powerpoint/2012/main">
+  <p:cSld>
+    <p:spTree>
+      <p:nvGrpSpPr>
+        <p:cNvPr id="98" name="Shape 98"/>
+        <p:cNvGrpSpPr/>
+        <p:nvPr/>
+      </p:nvGrpSpPr>
+      <p:grpSpPr>
+        <a:xfrm>
+          <a:off x="0" y="0"/>
+          <a:ext cx="0" cy="0"/>
+          <a:chOff x="0" y="0"/>
+          <a:chExt cx="0" cy="0"/>
+        </a:xfrm>
+      </p:grpSpPr>
+      <p:sp>
+        <p:nvSpPr>
+          <p:cNvPr id="99" name="Google Shape;99;p19"/>
           <p:cNvSpPr txBox="1"/>
           <p:nvPr>
             <p:ph type="title"/>
@@ -6365,7 +7339,7 @@
       </p:sp>
       <p:sp>
         <p:nvSpPr>
-          <p:cNvPr id="75" name="Google Shape;75;p16"/>
+          <p:cNvPr id="100" name="Google Shape;100;p19"/>
           <p:cNvSpPr txBox="1"/>
           <p:nvPr>
             <p:ph idx="1" type="body"/>
@@ -6457,7 +7431,7 @@
       </p:sp>
       <p:pic>
         <p:nvPicPr>
-          <p:cNvPr id="76" name="Google Shape;76;p16"/>
+          <p:cNvPr id="101" name="Google Shape;101;p19"/>
           <p:cNvPicPr preferRelativeResize="0"/>
           <p:nvPr/>
         </p:nvPicPr>

</xml_diff>

<commit_message>
feature(example-programs): Documentation example programs
</commit_message>
<xml_diff>
--- a/Introduction to Deno.pptx
+++ b/Introduction to Deno.pptx
@@ -15,6 +15,7 @@
     <p:sldId id="260" r:id="rId10"/>
     <p:sldId id="261" r:id="rId11"/>
     <p:sldId id="262" r:id="rId12"/>
+    <p:sldId id="263" r:id="rId13"/>
   </p:sldIdLst>
   <p:sldSz cy="5143500" cx="9144000"/>
   <p:notesSz cx="6858000" cy="9144000"/>
@@ -1305,7 +1306,7 @@
       </p:grpSpPr>
       <p:sp>
         <p:nvSpPr>
-          <p:cNvPr id="96" name="Google Shape;96;g8c35b87562_0_3:notes"/>
+          <p:cNvPr id="96" name="Google Shape;96;g8dcc881f7e_0_17:notes"/>
           <p:cNvSpPr/>
           <p:nvPr>
             <p:ph idx="2" type="sldImg"/>
@@ -1340,7 +1341,106 @@
       </p:sp>
       <p:sp>
         <p:nvSpPr>
-          <p:cNvPr id="97" name="Google Shape;97;g8c35b87562_0_3:notes"/>
+          <p:cNvPr id="97" name="Google Shape;97;g8dcc881f7e_0_17:notes"/>
+          <p:cNvSpPr txBox="1"/>
+          <p:nvPr>
+            <p:ph idx="1" type="body"/>
+          </p:nvPr>
+        </p:nvSpPr>
+        <p:spPr>
+          <a:xfrm>
+            <a:off x="685800" y="4343400"/>
+            <a:ext cx="5486400" cy="4114800"/>
+          </a:xfrm>
+          <a:prstGeom prst="rect">
+            <a:avLst/>
+          </a:prstGeom>
+        </p:spPr>
+        <p:txBody>
+          <a:bodyPr anchorCtr="0" anchor="t" bIns="91425" lIns="91425" spcFirstLastPara="1" rIns="91425" wrap="square" tIns="91425">
+            <a:noAutofit/>
+          </a:bodyPr>
+          <a:lstStyle/>
+          <a:p>
+            <a:pPr indent="0" lvl="0" marL="0" rtl="0" algn="l">
+              <a:spcBef>
+                <a:spcPts val="0"/>
+              </a:spcBef>
+              <a:spcAft>
+                <a:spcPts val="0"/>
+              </a:spcAft>
+              <a:buNone/>
+            </a:pPr>
+            <a:r>
+              <a:t/>
+            </a:r>
+            <a:endParaRPr/>
+          </a:p>
+        </p:txBody>
+      </p:sp>
+    </p:spTree>
+  </p:cSld>
+  <p:clrMapOvr>
+    <a:masterClrMapping/>
+  </p:clrMapOvr>
+</p:notes>
+</file>
+
+<file path=ppt/notesSlides/notesSlide8.xml><?xml version="1.0" encoding="utf-8"?>
+<p:notes xmlns:a="http://schemas.openxmlformats.org/drawingml/2006/main" xmlns:r="http://schemas.openxmlformats.org/officeDocument/2006/relationships" xmlns:mc="http://schemas.openxmlformats.org/markup-compatibility/2006" xmlns:mv="urn:schemas-microsoft-com:mac:vml" xmlns:p="http://schemas.openxmlformats.org/presentationml/2006/main" xmlns:c="http://schemas.openxmlformats.org/drawingml/2006/chart" xmlns:dgm="http://schemas.openxmlformats.org/drawingml/2006/diagram" xmlns:o="urn:schemas-microsoft-com:office:office" xmlns:v="urn:schemas-microsoft-com:vml" xmlns:pvml="urn:schemas-microsoft-com:office:powerpoint" xmlns:com="http://schemas.openxmlformats.org/drawingml/2006/compatibility" xmlns:p14="http://schemas.microsoft.com/office/powerpoint/2010/main" xmlns:p15="http://schemas.microsoft.com/office/powerpoint/2012/main" showMasterPhAnim="0" showMasterSp="0">
+  <p:cSld>
+    <p:spTree>
+      <p:nvGrpSpPr>
+        <p:cNvPr id="102" name="Shape 102"/>
+        <p:cNvGrpSpPr/>
+        <p:nvPr/>
+      </p:nvGrpSpPr>
+      <p:grpSpPr>
+        <a:xfrm>
+          <a:off x="0" y="0"/>
+          <a:ext cx="0" cy="0"/>
+          <a:chOff x="0" y="0"/>
+          <a:chExt cx="0" cy="0"/>
+        </a:xfrm>
+      </p:grpSpPr>
+      <p:sp>
+        <p:nvSpPr>
+          <p:cNvPr id="103" name="Google Shape;103;g8c35b87562_0_3:notes"/>
+          <p:cNvSpPr/>
+          <p:nvPr>
+            <p:ph idx="2" type="sldImg"/>
+          </p:nvPr>
+        </p:nvSpPr>
+        <p:spPr>
+          <a:xfrm>
+            <a:off x="381300" y="685800"/>
+            <a:ext cx="6096000" cy="3429000"/>
+          </a:xfrm>
+          <a:custGeom>
+            <a:rect b="b" l="l" r="r" t="t"/>
+            <a:pathLst>
+              <a:path extrusionOk="0" h="120000" w="120000">
+                <a:moveTo>
+                  <a:pt x="0" y="0"/>
+                </a:moveTo>
+                <a:lnTo>
+                  <a:pt x="120000" y="0"/>
+                </a:lnTo>
+                <a:lnTo>
+                  <a:pt x="120000" y="120000"/>
+                </a:lnTo>
+                <a:lnTo>
+                  <a:pt x="0" y="120000"/>
+                </a:lnTo>
+                <a:close/>
+              </a:path>
+            </a:pathLst>
+          </a:custGeom>
+        </p:spPr>
+      </p:sp>
+      <p:sp>
+        <p:nvSpPr>
+          <p:cNvPr id="104" name="Google Shape;104;g8c35b87562_0_3:notes"/>
           <p:cNvSpPr txBox="1"/>
           <p:nvPr>
             <p:ph idx="1" type="body"/>
@@ -7210,7 +7310,7 @@
             </a:pPr>
             <a:r>
               <a:rPr lang="en"/>
-              <a:t>Getting Started - Part 3 (Mor complicated)</a:t>
+              <a:t>Getting Started - Part 3 (More complicated)</a:t>
             </a:r>
             <a:endParaRPr/>
           </a:p>
@@ -7232,34 +7332,6 @@
         </p:blipFill>
         <p:spPr>
           <a:xfrm>
-            <a:off x="678075" y="1277550"/>
-            <a:ext cx="7658100" cy="1019175"/>
-          </a:xfrm>
-          <a:prstGeom prst="rect">
-            <a:avLst/>
-          </a:prstGeom>
-          <a:noFill/>
-          <a:ln>
-            <a:noFill/>
-          </a:ln>
-        </p:spPr>
-      </p:pic>
-      <p:pic>
-        <p:nvPicPr>
-          <p:cNvPr id="94" name="Google Shape;94;p18"/>
-          <p:cNvPicPr preferRelativeResize="0"/>
-          <p:nvPr/>
-        </p:nvPicPr>
-        <p:blipFill>
-          <a:blip r:embed="rId4">
-            <a:alphaModFix/>
-          </a:blip>
-          <a:stretch>
-            <a:fillRect/>
-          </a:stretch>
-        </p:blipFill>
-        <p:spPr>
-          <a:xfrm>
             <a:off x="0" y="-1"/>
             <a:ext cx="678075" cy="678075"/>
           </a:xfrm>
@@ -7272,6 +7344,233 @@
           </a:ln>
         </p:spPr>
       </p:pic>
+      <p:sp>
+        <p:nvSpPr>
+          <p:cNvPr id="94" name="Google Shape;94;p18"/>
+          <p:cNvSpPr txBox="1"/>
+          <p:nvPr/>
+        </p:nvSpPr>
+        <p:spPr>
+          <a:xfrm>
+            <a:off x="588450" y="1598275"/>
+            <a:ext cx="8027700" cy="3116700"/>
+          </a:xfrm>
+          <a:prstGeom prst="rect">
+            <a:avLst/>
+          </a:prstGeom>
+          <a:noFill/>
+          <a:ln>
+            <a:noFill/>
+          </a:ln>
+        </p:spPr>
+        <p:txBody>
+          <a:bodyPr anchorCtr="0" anchor="t" bIns="91425" lIns="91425" spcFirstLastPara="1" rIns="91425" wrap="square" tIns="91425">
+            <a:noAutofit/>
+          </a:bodyPr>
+          <a:lstStyle/>
+          <a:p>
+            <a:pPr indent="0" lvl="0" marL="0" rtl="0" algn="l">
+              <a:spcBef>
+                <a:spcPts val="0"/>
+              </a:spcBef>
+              <a:spcAft>
+                <a:spcPts val="0"/>
+              </a:spcAft>
+              <a:buNone/>
+            </a:pPr>
+            <a:r>
+              <a:rPr lang="en"/>
+              <a:t>Other example programs (all based on https://deno.land/manual):</a:t>
+            </a:r>
+            <a:endParaRPr/>
+          </a:p>
+          <a:p>
+            <a:pPr indent="-317500" lvl="0" marL="457200" rtl="0" algn="l">
+              <a:spcBef>
+                <a:spcPts val="0"/>
+              </a:spcBef>
+              <a:spcAft>
+                <a:spcPts val="0"/>
+              </a:spcAft>
+              <a:buSzPts val="1400"/>
+              <a:buChar char="●"/>
+            </a:pPr>
+            <a:r>
+              <a:rPr lang="en"/>
+              <a:t>Making an HTTP request</a:t>
+            </a:r>
+            <a:endParaRPr/>
+          </a:p>
+          <a:p>
+            <a:pPr indent="-317500" lvl="0" marL="457200" rtl="0" algn="l">
+              <a:spcBef>
+                <a:spcPts val="0"/>
+              </a:spcBef>
+              <a:spcAft>
+                <a:spcPts val="0"/>
+              </a:spcAft>
+              <a:buSzPts val="1400"/>
+              <a:buChar char="●"/>
+            </a:pPr>
+            <a:r>
+              <a:rPr lang="en"/>
+              <a:t>Reading Files</a:t>
+            </a:r>
+            <a:endParaRPr/>
+          </a:p>
+          <a:p>
+            <a:pPr indent="-317500" lvl="0" marL="457200" rtl="0" algn="l">
+              <a:spcBef>
+                <a:spcPts val="0"/>
+              </a:spcBef>
+              <a:spcAft>
+                <a:spcPts val="0"/>
+              </a:spcAft>
+              <a:buSzPts val="1400"/>
+              <a:buChar char="●"/>
+            </a:pPr>
+            <a:r>
+              <a:rPr lang="en"/>
+              <a:t>TCP server</a:t>
+            </a:r>
+            <a:endParaRPr/>
+          </a:p>
+          <a:p>
+            <a:pPr indent="-317500" lvl="0" marL="457200" rtl="0" algn="l">
+              <a:spcBef>
+                <a:spcPts val="0"/>
+              </a:spcBef>
+              <a:spcAft>
+                <a:spcPts val="0"/>
+              </a:spcAft>
+              <a:buSzPts val="1400"/>
+              <a:buChar char="●"/>
+            </a:pPr>
+            <a:r>
+              <a:rPr lang="en"/>
+              <a:t>An implementation of the unix "cat" program</a:t>
+            </a:r>
+            <a:endParaRPr/>
+          </a:p>
+          <a:p>
+            <a:pPr indent="-317500" lvl="0" marL="457200" rtl="0" algn="l">
+              <a:spcBef>
+                <a:spcPts val="0"/>
+              </a:spcBef>
+              <a:spcAft>
+                <a:spcPts val="0"/>
+              </a:spcAft>
+              <a:buSzPts val="1400"/>
+              <a:buChar char="●"/>
+            </a:pPr>
+            <a:r>
+              <a:rPr lang="en"/>
+              <a:t>File server</a:t>
+            </a:r>
+            <a:endParaRPr/>
+          </a:p>
+          <a:p>
+            <a:pPr indent="-317500" lvl="0" marL="457200" rtl="0" algn="l">
+              <a:spcBef>
+                <a:spcPts val="0"/>
+              </a:spcBef>
+              <a:spcAft>
+                <a:spcPts val="0"/>
+              </a:spcAft>
+              <a:buSzPts val="1400"/>
+              <a:buChar char="●"/>
+            </a:pPr>
+            <a:r>
+              <a:rPr lang="en"/>
+              <a:t>TCP echo server</a:t>
+            </a:r>
+            <a:endParaRPr/>
+          </a:p>
+          <a:p>
+            <a:pPr indent="-317500" lvl="0" marL="457200" rtl="0" algn="l">
+              <a:spcBef>
+                <a:spcPts val="0"/>
+              </a:spcBef>
+              <a:spcAft>
+                <a:spcPts val="0"/>
+              </a:spcAft>
+              <a:buSzPts val="1400"/>
+              <a:buChar char="●"/>
+            </a:pPr>
+            <a:r>
+              <a:rPr lang="en"/>
+              <a:t>Run subprocess</a:t>
+            </a:r>
+            <a:endParaRPr/>
+          </a:p>
+          <a:p>
+            <a:pPr indent="-317500" lvl="0" marL="457200" rtl="0" algn="l">
+              <a:spcBef>
+                <a:spcPts val="0"/>
+              </a:spcBef>
+              <a:spcAft>
+                <a:spcPts val="0"/>
+              </a:spcAft>
+              <a:buSzPts val="1400"/>
+              <a:buChar char="●"/>
+            </a:pPr>
+            <a:r>
+              <a:rPr lang="en"/>
+              <a:t>Inspecting and revoking permissions</a:t>
+            </a:r>
+            <a:endParaRPr/>
+          </a:p>
+          <a:p>
+            <a:pPr indent="-317500" lvl="0" marL="457200" rtl="0" algn="l">
+              <a:spcBef>
+                <a:spcPts val="0"/>
+              </a:spcBef>
+              <a:spcAft>
+                <a:spcPts val="0"/>
+              </a:spcAft>
+              <a:buSzPts val="1400"/>
+              <a:buChar char="●"/>
+            </a:pPr>
+            <a:r>
+              <a:rPr lang="en"/>
+              <a:t>Handle OS Signals</a:t>
+            </a:r>
+            <a:endParaRPr/>
+          </a:p>
+          <a:p>
+            <a:pPr indent="-317500" lvl="0" marL="457200" rtl="0" algn="l">
+              <a:spcBef>
+                <a:spcPts val="0"/>
+              </a:spcBef>
+              <a:spcAft>
+                <a:spcPts val="0"/>
+              </a:spcAft>
+              <a:buSzPts val="1400"/>
+              <a:buChar char="●"/>
+            </a:pPr>
+            <a:r>
+              <a:rPr lang="en"/>
+              <a:t>File system events</a:t>
+            </a:r>
+            <a:endParaRPr/>
+          </a:p>
+          <a:p>
+            <a:pPr indent="0" lvl="0" marL="457200" rtl="0" algn="l">
+              <a:spcBef>
+                <a:spcPts val="0"/>
+              </a:spcBef>
+              <a:spcAft>
+                <a:spcPts val="0"/>
+              </a:spcAft>
+              <a:buNone/>
+            </a:pPr>
+            <a:r>
+              <a:t/>
+            </a:r>
+            <a:endParaRPr/>
+          </a:p>
+        </p:txBody>
+      </p:sp>
     </p:spTree>
   </p:cSld>
   <p:clrMapOvr>
@@ -7307,6 +7606,326 @@
         </p:nvSpPr>
         <p:spPr>
           <a:xfrm>
+            <a:off x="742950" y="105375"/>
+            <a:ext cx="8520600" cy="572700"/>
+          </a:xfrm>
+          <a:prstGeom prst="rect">
+            <a:avLst/>
+          </a:prstGeom>
+        </p:spPr>
+        <p:txBody>
+          <a:bodyPr anchorCtr="0" anchor="t" bIns="91425" lIns="91425" spcFirstLastPara="1" rIns="91425" wrap="square" tIns="91425">
+            <a:noAutofit/>
+          </a:bodyPr>
+          <a:lstStyle/>
+          <a:p>
+            <a:pPr indent="0" lvl="0" marL="0" rtl="0" algn="l">
+              <a:spcBef>
+                <a:spcPts val="0"/>
+              </a:spcBef>
+              <a:spcAft>
+                <a:spcPts val="0"/>
+              </a:spcAft>
+              <a:buNone/>
+            </a:pPr>
+            <a:r>
+              <a:rPr lang="en"/>
+              <a:t>Getting Started - Part 3 (More complicated)</a:t>
+            </a:r>
+            <a:endParaRPr/>
+          </a:p>
+        </p:txBody>
+      </p:sp>
+      <p:pic>
+        <p:nvPicPr>
+          <p:cNvPr id="100" name="Google Shape;100;p19"/>
+          <p:cNvPicPr preferRelativeResize="0"/>
+          <p:nvPr/>
+        </p:nvPicPr>
+        <p:blipFill>
+          <a:blip r:embed="rId3">
+            <a:alphaModFix/>
+          </a:blip>
+          <a:stretch>
+            <a:fillRect/>
+          </a:stretch>
+        </p:blipFill>
+        <p:spPr>
+          <a:xfrm>
+            <a:off x="0" y="-1"/>
+            <a:ext cx="678075" cy="678075"/>
+          </a:xfrm>
+          <a:prstGeom prst="rect">
+            <a:avLst/>
+          </a:prstGeom>
+          <a:noFill/>
+          <a:ln>
+            <a:noFill/>
+          </a:ln>
+        </p:spPr>
+      </p:pic>
+      <p:sp>
+        <p:nvSpPr>
+          <p:cNvPr id="101" name="Google Shape;101;p19"/>
+          <p:cNvSpPr txBox="1"/>
+          <p:nvPr/>
+        </p:nvSpPr>
+        <p:spPr>
+          <a:xfrm>
+            <a:off x="588450" y="1598275"/>
+            <a:ext cx="8027700" cy="3116700"/>
+          </a:xfrm>
+          <a:prstGeom prst="rect">
+            <a:avLst/>
+          </a:prstGeom>
+          <a:noFill/>
+          <a:ln>
+            <a:noFill/>
+          </a:ln>
+        </p:spPr>
+        <p:txBody>
+          <a:bodyPr anchorCtr="0" anchor="t" bIns="91425" lIns="91425" spcFirstLastPara="1" rIns="91425" wrap="square" tIns="91425">
+            <a:noAutofit/>
+          </a:bodyPr>
+          <a:lstStyle/>
+          <a:p>
+            <a:pPr indent="0" lvl="0" marL="0" rtl="0" algn="l">
+              <a:spcBef>
+                <a:spcPts val="0"/>
+              </a:spcBef>
+              <a:spcAft>
+                <a:spcPts val="0"/>
+              </a:spcAft>
+              <a:buNone/>
+            </a:pPr>
+            <a:r>
+              <a:rPr lang="en"/>
+              <a:t>Other example programs (all based on https://deno.land/manual):</a:t>
+            </a:r>
+            <a:endParaRPr/>
+          </a:p>
+          <a:p>
+            <a:pPr indent="-317500" lvl="0" marL="457200" rtl="0" algn="l">
+              <a:spcBef>
+                <a:spcPts val="0"/>
+              </a:spcBef>
+              <a:spcAft>
+                <a:spcPts val="0"/>
+              </a:spcAft>
+              <a:buSzPts val="1400"/>
+              <a:buChar char="●"/>
+            </a:pPr>
+            <a:r>
+              <a:rPr lang="en"/>
+              <a:t>Making an HTTP request</a:t>
+            </a:r>
+            <a:endParaRPr/>
+          </a:p>
+          <a:p>
+            <a:pPr indent="-317500" lvl="0" marL="457200" rtl="0" algn="l">
+              <a:spcBef>
+                <a:spcPts val="0"/>
+              </a:spcBef>
+              <a:spcAft>
+                <a:spcPts val="0"/>
+              </a:spcAft>
+              <a:buSzPts val="1400"/>
+              <a:buChar char="●"/>
+            </a:pPr>
+            <a:r>
+              <a:rPr lang="en"/>
+              <a:t>Reading Files</a:t>
+            </a:r>
+            <a:endParaRPr/>
+          </a:p>
+          <a:p>
+            <a:pPr indent="-317500" lvl="0" marL="457200" rtl="0" algn="l">
+              <a:spcBef>
+                <a:spcPts val="0"/>
+              </a:spcBef>
+              <a:spcAft>
+                <a:spcPts val="0"/>
+              </a:spcAft>
+              <a:buSzPts val="1400"/>
+              <a:buChar char="●"/>
+            </a:pPr>
+            <a:r>
+              <a:rPr lang="en"/>
+              <a:t>TCP server</a:t>
+            </a:r>
+            <a:endParaRPr/>
+          </a:p>
+          <a:p>
+            <a:pPr indent="-317500" lvl="0" marL="457200" rtl="0" algn="l">
+              <a:spcBef>
+                <a:spcPts val="0"/>
+              </a:spcBef>
+              <a:spcAft>
+                <a:spcPts val="0"/>
+              </a:spcAft>
+              <a:buSzPts val="1400"/>
+              <a:buChar char="●"/>
+            </a:pPr>
+            <a:r>
+              <a:rPr lang="en"/>
+              <a:t>An implementation of the unix "cat" program</a:t>
+            </a:r>
+            <a:endParaRPr/>
+          </a:p>
+          <a:p>
+            <a:pPr indent="-317500" lvl="0" marL="457200" rtl="0" algn="l">
+              <a:spcBef>
+                <a:spcPts val="0"/>
+              </a:spcBef>
+              <a:spcAft>
+                <a:spcPts val="0"/>
+              </a:spcAft>
+              <a:buSzPts val="1400"/>
+              <a:buChar char="●"/>
+            </a:pPr>
+            <a:r>
+              <a:rPr lang="en"/>
+              <a:t>File server</a:t>
+            </a:r>
+            <a:endParaRPr/>
+          </a:p>
+          <a:p>
+            <a:pPr indent="-317500" lvl="0" marL="457200" rtl="0" algn="l">
+              <a:spcBef>
+                <a:spcPts val="0"/>
+              </a:spcBef>
+              <a:spcAft>
+                <a:spcPts val="0"/>
+              </a:spcAft>
+              <a:buSzPts val="1400"/>
+              <a:buChar char="●"/>
+            </a:pPr>
+            <a:r>
+              <a:rPr lang="en"/>
+              <a:t>TCP echo server</a:t>
+            </a:r>
+            <a:endParaRPr/>
+          </a:p>
+          <a:p>
+            <a:pPr indent="-317500" lvl="0" marL="457200" rtl="0" algn="l">
+              <a:spcBef>
+                <a:spcPts val="0"/>
+              </a:spcBef>
+              <a:spcAft>
+                <a:spcPts val="0"/>
+              </a:spcAft>
+              <a:buSzPts val="1400"/>
+              <a:buChar char="●"/>
+            </a:pPr>
+            <a:r>
+              <a:rPr lang="en"/>
+              <a:t>Run subprocess</a:t>
+            </a:r>
+            <a:endParaRPr/>
+          </a:p>
+          <a:p>
+            <a:pPr indent="-317500" lvl="0" marL="457200" rtl="0" algn="l">
+              <a:spcBef>
+                <a:spcPts val="0"/>
+              </a:spcBef>
+              <a:spcAft>
+                <a:spcPts val="0"/>
+              </a:spcAft>
+              <a:buSzPts val="1400"/>
+              <a:buChar char="●"/>
+            </a:pPr>
+            <a:r>
+              <a:rPr lang="en"/>
+              <a:t>Inspecting and revoking permissions</a:t>
+            </a:r>
+            <a:endParaRPr/>
+          </a:p>
+          <a:p>
+            <a:pPr indent="-317500" lvl="0" marL="457200" rtl="0" algn="l">
+              <a:spcBef>
+                <a:spcPts val="0"/>
+              </a:spcBef>
+              <a:spcAft>
+                <a:spcPts val="0"/>
+              </a:spcAft>
+              <a:buSzPts val="1400"/>
+              <a:buChar char="●"/>
+            </a:pPr>
+            <a:r>
+              <a:rPr lang="en"/>
+              <a:t>Handle OS Signals</a:t>
+            </a:r>
+            <a:endParaRPr/>
+          </a:p>
+          <a:p>
+            <a:pPr indent="-317500" lvl="0" marL="457200" rtl="0" algn="l">
+              <a:spcBef>
+                <a:spcPts val="0"/>
+              </a:spcBef>
+              <a:spcAft>
+                <a:spcPts val="0"/>
+              </a:spcAft>
+              <a:buSzPts val="1400"/>
+              <a:buChar char="●"/>
+            </a:pPr>
+            <a:r>
+              <a:rPr lang="en"/>
+              <a:t>File system events</a:t>
+            </a:r>
+            <a:endParaRPr/>
+          </a:p>
+          <a:p>
+            <a:pPr indent="0" lvl="0" marL="457200" rtl="0" algn="l">
+              <a:spcBef>
+                <a:spcPts val="0"/>
+              </a:spcBef>
+              <a:spcAft>
+                <a:spcPts val="0"/>
+              </a:spcAft>
+              <a:buNone/>
+            </a:pPr>
+            <a:r>
+              <a:t/>
+            </a:r>
+            <a:endParaRPr/>
+          </a:p>
+        </p:txBody>
+      </p:sp>
+    </p:spTree>
+  </p:cSld>
+  <p:clrMapOvr>
+    <a:masterClrMapping/>
+  </p:clrMapOvr>
+</p:sld>
+</file>
+
+<file path=ppt/slides/slide8.xml><?xml version="1.0" encoding="utf-8"?>
+<p:sld xmlns:a="http://schemas.openxmlformats.org/drawingml/2006/main" xmlns:r="http://schemas.openxmlformats.org/officeDocument/2006/relationships" xmlns:mc="http://schemas.openxmlformats.org/markup-compatibility/2006" xmlns:mv="urn:schemas-microsoft-com:mac:vml" xmlns:p="http://schemas.openxmlformats.org/presentationml/2006/main" xmlns:c="http://schemas.openxmlformats.org/drawingml/2006/chart" xmlns:dgm="http://schemas.openxmlformats.org/drawingml/2006/diagram" xmlns:o="urn:schemas-microsoft-com:office:office" xmlns:v="urn:schemas-microsoft-com:vml" xmlns:pvml="urn:schemas-microsoft-com:office:powerpoint" xmlns:com="http://schemas.openxmlformats.org/drawingml/2006/compatibility" xmlns:p14="http://schemas.microsoft.com/office/powerpoint/2010/main" xmlns:p15="http://schemas.microsoft.com/office/powerpoint/2012/main">
+  <p:cSld>
+    <p:spTree>
+      <p:nvGrpSpPr>
+        <p:cNvPr id="105" name="Shape 105"/>
+        <p:cNvGrpSpPr/>
+        <p:nvPr/>
+      </p:nvGrpSpPr>
+      <p:grpSpPr>
+        <a:xfrm>
+          <a:off x="0" y="0"/>
+          <a:ext cx="0" cy="0"/>
+          <a:chOff x="0" y="0"/>
+          <a:chExt cx="0" cy="0"/>
+        </a:xfrm>
+      </p:grpSpPr>
+      <p:sp>
+        <p:nvSpPr>
+          <p:cNvPr id="106" name="Google Shape;106;p20"/>
+          <p:cNvSpPr txBox="1"/>
+          <p:nvPr>
+            <p:ph type="title"/>
+          </p:nvPr>
+        </p:nvSpPr>
+        <p:spPr>
+          <a:xfrm>
             <a:off x="311700" y="678075"/>
             <a:ext cx="8520600" cy="572700"/>
           </a:xfrm>
@@ -7339,7 +7958,7 @@
       </p:sp>
       <p:sp>
         <p:nvSpPr>
-          <p:cNvPr id="100" name="Google Shape;100;p19"/>
+          <p:cNvPr id="107" name="Google Shape;107;p20"/>
           <p:cNvSpPr txBox="1"/>
           <p:nvPr>
             <p:ph idx="1" type="body"/>
@@ -7423,6 +8042,58 @@
               <a:buChar char="●"/>
             </a:pPr>
             <a:r>
+              <a:rPr lang="en"/>
+              <a:t>Documentation and example programs: </a:t>
+            </a:r>
+            <a:r>
+              <a:rPr lang="en" u="sng">
+                <a:solidFill>
+                  <a:schemeClr val="hlink"/>
+                </a:solidFill>
+                <a:hlinkClick r:id="rId5"/>
+              </a:rPr>
+              <a:t>https://deno.land/manual</a:t>
+            </a:r>
+            <a:endParaRPr/>
+          </a:p>
+          <a:p>
+            <a:pPr indent="-342900" lvl="0" marL="457200" rtl="0" algn="l">
+              <a:spcBef>
+                <a:spcPts val="0"/>
+              </a:spcBef>
+              <a:spcAft>
+                <a:spcPts val="0"/>
+              </a:spcAft>
+              <a:buSzPts val="1800"/>
+              <a:buChar char="●"/>
+            </a:pPr>
+            <a:r>
+              <a:rPr lang="en"/>
+              <a:t>FreeCodeCamp more in depth 6 hour talk: </a:t>
+            </a:r>
+            <a:r>
+              <a:rPr lang="en" u="sng">
+                <a:solidFill>
+                  <a:schemeClr val="hlink"/>
+                </a:solidFill>
+                <a:hlinkClick r:id="rId6"/>
+              </a:rPr>
+              <a:t>https://www.youtube.com/watch?v=TQUy8ENesGY</a:t>
+            </a:r>
+            <a:endParaRPr/>
+          </a:p>
+          <a:p>
+            <a:pPr indent="-342900" lvl="0" marL="457200" rtl="0" algn="l">
+              <a:spcBef>
+                <a:spcPts val="0"/>
+              </a:spcBef>
+              <a:spcAft>
+                <a:spcPts val="0"/>
+              </a:spcAft>
+              <a:buSzPts val="1800"/>
+              <a:buChar char="●"/>
+            </a:pPr>
+            <a:r>
               <a:t/>
             </a:r>
             <a:endParaRPr/>
@@ -7431,12 +8102,12 @@
       </p:sp>
       <p:pic>
         <p:nvPicPr>
-          <p:cNvPr id="101" name="Google Shape;101;p19"/>
+          <p:cNvPr id="108" name="Google Shape;108;p20"/>
           <p:cNvPicPr preferRelativeResize="0"/>
           <p:nvPr/>
         </p:nvPicPr>
         <p:blipFill>
-          <a:blip r:embed="rId5">
+          <a:blip r:embed="rId7">
             <a:alphaModFix/>
           </a:blip>
           <a:stretch>

</xml_diff>

<commit_message>
DENO todo app (#10)
* feature(deno-oak-route): throw in routes

* feature(deno-oak-todo): Color console

* feature(deno-oak-todo): todo controller and routes

* feature(deno-oak-todo): todos with stubs

* feature(deno-oak-todo): todo by id

* feature(deno-oak-todo): Update todos

* feature(deno-oak-todo): Complete API with stubs

* feature(deno-oak-todo): README

* feature(deno-oak-todo): not found and logger within API.
</commit_message>
<xml_diff>
--- a/Introduction to Deno.pptx
+++ b/Introduction to Deno.pptx
@@ -16,6 +16,7 @@
     <p:sldId id="261" r:id="rId11"/>
     <p:sldId id="262" r:id="rId12"/>
     <p:sldId id="263" r:id="rId13"/>
+    <p:sldId id="264" r:id="rId14"/>
   </p:sldIdLst>
   <p:sldSz cy="5143500" cx="9144000"/>
   <p:notesSz cx="6858000" cy="9144000"/>
@@ -1391,7 +1392,7 @@
   <p:cSld>
     <p:spTree>
       <p:nvGrpSpPr>
-        <p:cNvPr id="102" name="Shape 102"/>
+        <p:cNvPr id="108" name="Shape 108"/>
         <p:cNvGrpSpPr/>
         <p:nvPr/>
       </p:nvGrpSpPr>
@@ -1405,7 +1406,7 @@
       </p:grpSpPr>
       <p:sp>
         <p:nvSpPr>
-          <p:cNvPr id="103" name="Google Shape;103;g8c35b87562_0_3:notes"/>
+          <p:cNvPr id="109" name="Google Shape;109;g8dd82441ea_0_0:notes"/>
           <p:cNvSpPr/>
           <p:nvPr>
             <p:ph idx="2" type="sldImg"/>
@@ -1440,7 +1441,106 @@
       </p:sp>
       <p:sp>
         <p:nvSpPr>
-          <p:cNvPr id="104" name="Google Shape;104;g8c35b87562_0_3:notes"/>
+          <p:cNvPr id="110" name="Google Shape;110;g8dd82441ea_0_0:notes"/>
+          <p:cNvSpPr txBox="1"/>
+          <p:nvPr>
+            <p:ph idx="1" type="body"/>
+          </p:nvPr>
+        </p:nvSpPr>
+        <p:spPr>
+          <a:xfrm>
+            <a:off x="685800" y="4343400"/>
+            <a:ext cx="5486400" cy="4114800"/>
+          </a:xfrm>
+          <a:prstGeom prst="rect">
+            <a:avLst/>
+          </a:prstGeom>
+        </p:spPr>
+        <p:txBody>
+          <a:bodyPr anchorCtr="0" anchor="t" bIns="91425" lIns="91425" spcFirstLastPara="1" rIns="91425" wrap="square" tIns="91425">
+            <a:noAutofit/>
+          </a:bodyPr>
+          <a:lstStyle/>
+          <a:p>
+            <a:pPr indent="0" lvl="0" marL="0" rtl="0" algn="l">
+              <a:spcBef>
+                <a:spcPts val="0"/>
+              </a:spcBef>
+              <a:spcAft>
+                <a:spcPts val="0"/>
+              </a:spcAft>
+              <a:buNone/>
+            </a:pPr>
+            <a:r>
+              <a:t/>
+            </a:r>
+            <a:endParaRPr/>
+          </a:p>
+        </p:txBody>
+      </p:sp>
+    </p:spTree>
+  </p:cSld>
+  <p:clrMapOvr>
+    <a:masterClrMapping/>
+  </p:clrMapOvr>
+</p:notes>
+</file>
+
+<file path=ppt/notesSlides/notesSlide9.xml><?xml version="1.0" encoding="utf-8"?>
+<p:notes xmlns:a="http://schemas.openxmlformats.org/drawingml/2006/main" xmlns:r="http://schemas.openxmlformats.org/officeDocument/2006/relationships" xmlns:mc="http://schemas.openxmlformats.org/markup-compatibility/2006" xmlns:mv="urn:schemas-microsoft-com:mac:vml" xmlns:p="http://schemas.openxmlformats.org/presentationml/2006/main" xmlns:c="http://schemas.openxmlformats.org/drawingml/2006/chart" xmlns:dgm="http://schemas.openxmlformats.org/drawingml/2006/diagram" xmlns:o="urn:schemas-microsoft-com:office:office" xmlns:v="urn:schemas-microsoft-com:vml" xmlns:pvml="urn:schemas-microsoft-com:office:powerpoint" xmlns:com="http://schemas.openxmlformats.org/drawingml/2006/compatibility" xmlns:p14="http://schemas.microsoft.com/office/powerpoint/2010/main" xmlns:p15="http://schemas.microsoft.com/office/powerpoint/2012/main" showMasterPhAnim="0" showMasterSp="0">
+  <p:cSld>
+    <p:spTree>
+      <p:nvGrpSpPr>
+        <p:cNvPr id="114" name="Shape 114"/>
+        <p:cNvGrpSpPr/>
+        <p:nvPr/>
+      </p:nvGrpSpPr>
+      <p:grpSpPr>
+        <a:xfrm>
+          <a:off x="0" y="0"/>
+          <a:ext cx="0" cy="0"/>
+          <a:chOff x="0" y="0"/>
+          <a:chExt cx="0" cy="0"/>
+        </a:xfrm>
+      </p:grpSpPr>
+      <p:sp>
+        <p:nvSpPr>
+          <p:cNvPr id="115" name="Google Shape;115;g8c35b87562_0_3:notes"/>
+          <p:cNvSpPr/>
+          <p:nvPr>
+            <p:ph idx="2" type="sldImg"/>
+          </p:nvPr>
+        </p:nvSpPr>
+        <p:spPr>
+          <a:xfrm>
+            <a:off x="381300" y="685800"/>
+            <a:ext cx="6096000" cy="3429000"/>
+          </a:xfrm>
+          <a:custGeom>
+            <a:rect b="b" l="l" r="r" t="t"/>
+            <a:pathLst>
+              <a:path extrusionOk="0" h="120000" w="120000">
+                <a:moveTo>
+                  <a:pt x="0" y="0"/>
+                </a:moveTo>
+                <a:lnTo>
+                  <a:pt x="120000" y="0"/>
+                </a:lnTo>
+                <a:lnTo>
+                  <a:pt x="120000" y="120000"/>
+                </a:lnTo>
+                <a:lnTo>
+                  <a:pt x="0" y="120000"/>
+                </a:lnTo>
+                <a:close/>
+              </a:path>
+            </a:pathLst>
+          </a:custGeom>
+        </p:spPr>
+      </p:sp>
+      <p:sp>
+        <p:nvSpPr>
+          <p:cNvPr id="116" name="Google Shape;116;g8c35b87562_0_3:notes"/>
           <p:cNvSpPr txBox="1"/>
           <p:nvPr>
             <p:ph idx="1" type="body"/>
@@ -7630,7 +7730,7 @@
             </a:pPr>
             <a:r>
               <a:rPr lang="en"/>
-              <a:t>Getting Started - Part 3 (More complicated)</a:t>
+              <a:t>Example REST API</a:t>
             </a:r>
             <a:endParaRPr/>
           </a:p>
@@ -7672,8 +7772,8 @@
         </p:nvSpPr>
         <p:spPr>
           <a:xfrm>
-            <a:off x="588450" y="1598275"/>
-            <a:ext cx="8027700" cy="3116700"/>
+            <a:off x="558150" y="1155100"/>
+            <a:ext cx="8027700" cy="900900"/>
           </a:xfrm>
           <a:prstGeom prst="rect">
             <a:avLst/>
@@ -7700,7 +7800,22 @@
             </a:pPr>
             <a:r>
               <a:rPr lang="en"/>
-              <a:t>Other example programs (all based on https://deno.land/manual):</a:t>
+              <a:t>How to build a RESTFUL API with deno?</a:t>
+            </a:r>
+            <a:endParaRPr/>
+          </a:p>
+          <a:p>
+            <a:pPr indent="0" lvl="0" marL="0" rtl="0" algn="l">
+              <a:spcBef>
+                <a:spcPts val="0"/>
+              </a:spcBef>
+              <a:spcAft>
+                <a:spcPts val="0"/>
+              </a:spcAft>
+              <a:buNone/>
+            </a:pPr>
+            <a:r>
+              <a:t/>
             </a:r>
             <a:endParaRPr/>
           </a:p>
@@ -7717,7 +7832,7 @@
             </a:pPr>
             <a:r>
               <a:rPr lang="en"/>
-              <a:t>Making an HTTP request</a:t>
+              <a:t>Deno (duh)</a:t>
             </a:r>
             <a:endParaRPr/>
           </a:p>
@@ -7734,7 +7849,7 @@
             </a:pPr>
             <a:r>
               <a:rPr lang="en"/>
-              <a:t>Reading Files</a:t>
+              <a:t>OAK: A middleware framework for Deno's net server</a:t>
             </a:r>
             <a:endParaRPr/>
           </a:p>
@@ -7751,131 +7866,12 @@
             </a:pPr>
             <a:r>
               <a:rPr lang="en"/>
-              <a:t>TCP server</a:t>
+              <a:t>PostgreSQL: The World's Most Advanced Open Source Relational Database</a:t>
             </a:r>
             <a:endParaRPr/>
           </a:p>
           <a:p>
-            <a:pPr indent="-317500" lvl="0" marL="457200" rtl="0" algn="l">
-              <a:spcBef>
-                <a:spcPts val="0"/>
-              </a:spcBef>
-              <a:spcAft>
-                <a:spcPts val="0"/>
-              </a:spcAft>
-              <a:buSzPts val="1400"/>
-              <a:buChar char="●"/>
-            </a:pPr>
-            <a:r>
-              <a:rPr lang="en"/>
-              <a:t>An implementation of the unix "cat" program</a:t>
-            </a:r>
-            <a:endParaRPr/>
-          </a:p>
-          <a:p>
-            <a:pPr indent="-317500" lvl="0" marL="457200" rtl="0" algn="l">
-              <a:spcBef>
-                <a:spcPts val="0"/>
-              </a:spcBef>
-              <a:spcAft>
-                <a:spcPts val="0"/>
-              </a:spcAft>
-              <a:buSzPts val="1400"/>
-              <a:buChar char="●"/>
-            </a:pPr>
-            <a:r>
-              <a:rPr lang="en"/>
-              <a:t>File server</a:t>
-            </a:r>
-            <a:endParaRPr/>
-          </a:p>
-          <a:p>
-            <a:pPr indent="-317500" lvl="0" marL="457200" rtl="0" algn="l">
-              <a:spcBef>
-                <a:spcPts val="0"/>
-              </a:spcBef>
-              <a:spcAft>
-                <a:spcPts val="0"/>
-              </a:spcAft>
-              <a:buSzPts val="1400"/>
-              <a:buChar char="●"/>
-            </a:pPr>
-            <a:r>
-              <a:rPr lang="en"/>
-              <a:t>TCP echo server</a:t>
-            </a:r>
-            <a:endParaRPr/>
-          </a:p>
-          <a:p>
-            <a:pPr indent="-317500" lvl="0" marL="457200" rtl="0" algn="l">
-              <a:spcBef>
-                <a:spcPts val="0"/>
-              </a:spcBef>
-              <a:spcAft>
-                <a:spcPts val="0"/>
-              </a:spcAft>
-              <a:buSzPts val="1400"/>
-              <a:buChar char="●"/>
-            </a:pPr>
-            <a:r>
-              <a:rPr lang="en"/>
-              <a:t>Run subprocess</a:t>
-            </a:r>
-            <a:endParaRPr/>
-          </a:p>
-          <a:p>
-            <a:pPr indent="-317500" lvl="0" marL="457200" rtl="0" algn="l">
-              <a:spcBef>
-                <a:spcPts val="0"/>
-              </a:spcBef>
-              <a:spcAft>
-                <a:spcPts val="0"/>
-              </a:spcAft>
-              <a:buSzPts val="1400"/>
-              <a:buChar char="●"/>
-            </a:pPr>
-            <a:r>
-              <a:rPr lang="en"/>
-              <a:t>Inspecting and revoking permissions</a:t>
-            </a:r>
-            <a:endParaRPr/>
-          </a:p>
-          <a:p>
-            <a:pPr indent="-317500" lvl="0" marL="457200" rtl="0" algn="l">
-              <a:spcBef>
-                <a:spcPts val="0"/>
-              </a:spcBef>
-              <a:spcAft>
-                <a:spcPts val="0"/>
-              </a:spcAft>
-              <a:buSzPts val="1400"/>
-              <a:buChar char="●"/>
-            </a:pPr>
-            <a:r>
-              <a:rPr lang="en"/>
-              <a:t>Handle OS Signals</a:t>
-            </a:r>
-            <a:endParaRPr/>
-          </a:p>
-          <a:p>
-            <a:pPr indent="-317500" lvl="0" marL="457200" rtl="0" algn="l">
-              <a:spcBef>
-                <a:spcPts val="0"/>
-              </a:spcBef>
-              <a:spcAft>
-                <a:spcPts val="0"/>
-              </a:spcAft>
-              <a:buSzPts val="1400"/>
-              <a:buChar char="●"/>
-            </a:pPr>
-            <a:r>
-              <a:rPr lang="en"/>
-              <a:t>File system events</a:t>
-            </a:r>
-            <a:endParaRPr/>
-          </a:p>
-          <a:p>
-            <a:pPr indent="0" lvl="0" marL="457200" rtl="0" algn="l">
+            <a:pPr indent="0" lvl="0" marL="0" rtl="0" algn="l">
               <a:spcBef>
                 <a:spcPts val="0"/>
               </a:spcBef>
@@ -7888,6 +7884,235 @@
               <a:t/>
             </a:r>
             <a:endParaRPr/>
+          </a:p>
+          <a:p>
+            <a:pPr indent="0" lvl="0" marL="0" rtl="0" algn="l">
+              <a:spcBef>
+                <a:spcPts val="0"/>
+              </a:spcBef>
+              <a:spcAft>
+                <a:spcPts val="0"/>
+              </a:spcAft>
+              <a:buNone/>
+            </a:pPr>
+            <a:r>
+              <a:t/>
+            </a:r>
+            <a:endParaRPr/>
+          </a:p>
+        </p:txBody>
+      </p:sp>
+      <p:pic>
+        <p:nvPicPr>
+          <p:cNvPr id="102" name="Google Shape;102;p19"/>
+          <p:cNvPicPr preferRelativeResize="0"/>
+          <p:nvPr/>
+        </p:nvPicPr>
+        <p:blipFill>
+          <a:blip r:embed="rId4">
+            <a:alphaModFix/>
+          </a:blip>
+          <a:stretch>
+            <a:fillRect/>
+          </a:stretch>
+        </p:blipFill>
+        <p:spPr>
+          <a:xfrm>
+            <a:off x="2941625" y="3409375"/>
+            <a:ext cx="1206150" cy="1206150"/>
+          </a:xfrm>
+          <a:prstGeom prst="rect">
+            <a:avLst/>
+          </a:prstGeom>
+          <a:noFill/>
+          <a:ln>
+            <a:noFill/>
+          </a:ln>
+        </p:spPr>
+      </p:pic>
+      <p:pic>
+        <p:nvPicPr>
+          <p:cNvPr id="103" name="Google Shape;103;p19"/>
+          <p:cNvPicPr preferRelativeResize="0"/>
+          <p:nvPr/>
+        </p:nvPicPr>
+        <p:blipFill>
+          <a:blip r:embed="rId5">
+            <a:alphaModFix/>
+          </a:blip>
+          <a:stretch>
+            <a:fillRect/>
+          </a:stretch>
+        </p:blipFill>
+        <p:spPr>
+          <a:xfrm>
+            <a:off x="5045025" y="3345688"/>
+            <a:ext cx="1293300" cy="1333524"/>
+          </a:xfrm>
+          <a:prstGeom prst="rect">
+            <a:avLst/>
+          </a:prstGeom>
+          <a:noFill/>
+          <a:ln>
+            <a:noFill/>
+          </a:ln>
+        </p:spPr>
+      </p:pic>
+      <p:pic>
+        <p:nvPicPr>
+          <p:cNvPr id="104" name="Google Shape;104;p19"/>
+          <p:cNvPicPr preferRelativeResize="0"/>
+          <p:nvPr/>
+        </p:nvPicPr>
+        <p:blipFill>
+          <a:blip r:embed="rId3">
+            <a:alphaModFix/>
+          </a:blip>
+          <a:stretch>
+            <a:fillRect/>
+          </a:stretch>
+        </p:blipFill>
+        <p:spPr>
+          <a:xfrm>
+            <a:off x="712275" y="3302124"/>
+            <a:ext cx="1293299" cy="1293299"/>
+          </a:xfrm>
+          <a:prstGeom prst="rect">
+            <a:avLst/>
+          </a:prstGeom>
+          <a:noFill/>
+          <a:ln>
+            <a:noFill/>
+          </a:ln>
+        </p:spPr>
+      </p:pic>
+      <p:sp>
+        <p:nvSpPr>
+          <p:cNvPr id="105" name="Google Shape;105;p19"/>
+          <p:cNvSpPr txBox="1"/>
+          <p:nvPr/>
+        </p:nvSpPr>
+        <p:spPr>
+          <a:xfrm>
+            <a:off x="2281150" y="3704725"/>
+            <a:ext cx="384900" cy="488100"/>
+          </a:xfrm>
+          <a:prstGeom prst="rect">
+            <a:avLst/>
+          </a:prstGeom>
+          <a:noFill/>
+          <a:ln>
+            <a:noFill/>
+          </a:ln>
+        </p:spPr>
+        <p:txBody>
+          <a:bodyPr anchorCtr="0" anchor="t" bIns="91425" lIns="91425" spcFirstLastPara="1" rIns="91425" wrap="square" tIns="91425">
+            <a:noAutofit/>
+          </a:bodyPr>
+          <a:lstStyle/>
+          <a:p>
+            <a:pPr indent="0" lvl="0" marL="0" rtl="0" algn="l">
+              <a:spcBef>
+                <a:spcPts val="0"/>
+              </a:spcBef>
+              <a:spcAft>
+                <a:spcPts val="0"/>
+              </a:spcAft>
+              <a:buNone/>
+            </a:pPr>
+            <a:r>
+              <a:rPr lang="en" sz="3700"/>
+              <a:t>+</a:t>
+            </a:r>
+            <a:endParaRPr sz="3700"/>
+          </a:p>
+        </p:txBody>
+      </p:sp>
+      <p:sp>
+        <p:nvSpPr>
+          <p:cNvPr id="106" name="Google Shape;106;p19"/>
+          <p:cNvSpPr txBox="1"/>
+          <p:nvPr/>
+        </p:nvSpPr>
+        <p:spPr>
+          <a:xfrm>
+            <a:off x="4423350" y="3673450"/>
+            <a:ext cx="443400" cy="678000"/>
+          </a:xfrm>
+          <a:prstGeom prst="rect">
+            <a:avLst/>
+          </a:prstGeom>
+          <a:noFill/>
+          <a:ln>
+            <a:noFill/>
+          </a:ln>
+        </p:spPr>
+        <p:txBody>
+          <a:bodyPr anchorCtr="0" anchor="t" bIns="91425" lIns="91425" spcFirstLastPara="1" rIns="91425" wrap="square" tIns="91425">
+            <a:noAutofit/>
+          </a:bodyPr>
+          <a:lstStyle/>
+          <a:p>
+            <a:pPr indent="0" lvl="0" marL="0" rtl="0" algn="l">
+              <a:spcBef>
+                <a:spcPts val="0"/>
+              </a:spcBef>
+              <a:spcAft>
+                <a:spcPts val="0"/>
+              </a:spcAft>
+              <a:buNone/>
+            </a:pPr>
+            <a:r>
+              <a:rPr lang="en" sz="3700">
+                <a:solidFill>
+                  <a:schemeClr val="dk1"/>
+                </a:solidFill>
+              </a:rPr>
+              <a:t>+</a:t>
+            </a:r>
+            <a:endParaRPr/>
+          </a:p>
+        </p:txBody>
+      </p:sp>
+      <p:sp>
+        <p:nvSpPr>
+          <p:cNvPr id="107" name="Google Shape;107;p19"/>
+          <p:cNvSpPr txBox="1"/>
+          <p:nvPr/>
+        </p:nvSpPr>
+        <p:spPr>
+          <a:xfrm>
+            <a:off x="7003300" y="3726850"/>
+            <a:ext cx="4184400" cy="488100"/>
+          </a:xfrm>
+          <a:prstGeom prst="rect">
+            <a:avLst/>
+          </a:prstGeom>
+          <a:noFill/>
+          <a:ln>
+            <a:noFill/>
+          </a:ln>
+        </p:spPr>
+        <p:txBody>
+          <a:bodyPr anchorCtr="0" anchor="t" bIns="91425" lIns="91425" spcFirstLastPara="1" rIns="91425" wrap="square" tIns="91425">
+            <a:noAutofit/>
+          </a:bodyPr>
+          <a:lstStyle/>
+          <a:p>
+            <a:pPr indent="0" lvl="0" marL="0" rtl="0" algn="l">
+              <a:spcBef>
+                <a:spcPts val="0"/>
+              </a:spcBef>
+              <a:spcAft>
+                <a:spcPts val="0"/>
+              </a:spcAft>
+              <a:buNone/>
+            </a:pPr>
+            <a:r>
+              <a:rPr lang="en" sz="3700"/>
+              <a:t>=</a:t>
+            </a:r>
+            <a:endParaRPr sz="3700"/>
           </a:p>
         </p:txBody>
       </p:sp>
@@ -7904,7 +8129,7 @@
   <p:cSld>
     <p:spTree>
       <p:nvGrpSpPr>
-        <p:cNvPr id="105" name="Shape 105"/>
+        <p:cNvPr id="111" name="Shape 111"/>
         <p:cNvGrpSpPr/>
         <p:nvPr/>
       </p:nvGrpSpPr>
@@ -7918,7 +8143,7 @@
       </p:grpSpPr>
       <p:sp>
         <p:nvSpPr>
-          <p:cNvPr id="106" name="Google Shape;106;p20"/>
+          <p:cNvPr id="112" name="Google Shape;112;p20"/>
           <p:cNvSpPr txBox="1"/>
           <p:nvPr>
             <p:ph type="title"/>
@@ -7926,7 +8151,7 @@
         </p:nvSpPr>
         <p:spPr>
           <a:xfrm>
-            <a:off x="311700" y="678075"/>
+            <a:off x="311700" y="445025"/>
             <a:ext cx="8520600" cy="572700"/>
           </a:xfrm>
           <a:prstGeom prst="rect">
@@ -7949,6 +8174,122 @@
               <a:buNone/>
             </a:pPr>
             <a:r>
+              <a:t/>
+            </a:r>
+            <a:endParaRPr/>
+          </a:p>
+        </p:txBody>
+      </p:sp>
+      <p:sp>
+        <p:nvSpPr>
+          <p:cNvPr id="113" name="Google Shape;113;p20"/>
+          <p:cNvSpPr txBox="1"/>
+          <p:nvPr>
+            <p:ph idx="1" type="body"/>
+          </p:nvPr>
+        </p:nvSpPr>
+        <p:spPr>
+          <a:xfrm>
+            <a:off x="311700" y="1152475"/>
+            <a:ext cx="8520600" cy="3416400"/>
+          </a:xfrm>
+          <a:prstGeom prst="rect">
+            <a:avLst/>
+          </a:prstGeom>
+        </p:spPr>
+        <p:txBody>
+          <a:bodyPr anchorCtr="0" anchor="t" bIns="91425" lIns="91425" spcFirstLastPara="1" rIns="91425" wrap="square" tIns="91425">
+            <a:noAutofit/>
+          </a:bodyPr>
+          <a:lstStyle/>
+          <a:p>
+            <a:pPr indent="0" lvl="0" marL="0" rtl="0" algn="l">
+              <a:lnSpc>
+                <a:spcPct val="100000"/>
+              </a:lnSpc>
+              <a:spcBef>
+                <a:spcPts val="0"/>
+              </a:spcBef>
+              <a:spcAft>
+                <a:spcPts val="0"/>
+              </a:spcAft>
+              <a:buClr>
+                <a:schemeClr val="dk1"/>
+              </a:buClr>
+              <a:buSzPts val="1100"/>
+              <a:buFont typeface="Arial"/>
+              <a:buNone/>
+            </a:pPr>
+            <a:r>
+              <a:rPr lang="en" sz="1400">
+                <a:solidFill>
+                  <a:schemeClr val="dk1"/>
+                </a:solidFill>
+              </a:rPr>
+              <a:t>Following guide here: https://github.com/bradtraversy/deno-rest-api)</a:t>
+            </a:r>
+            <a:endParaRPr/>
+          </a:p>
+        </p:txBody>
+      </p:sp>
+    </p:spTree>
+  </p:cSld>
+  <p:clrMapOvr>
+    <a:masterClrMapping/>
+  </p:clrMapOvr>
+</p:sld>
+</file>
+
+<file path=ppt/slides/slide9.xml><?xml version="1.0" encoding="utf-8"?>
+<p:sld xmlns:a="http://schemas.openxmlformats.org/drawingml/2006/main" xmlns:r="http://schemas.openxmlformats.org/officeDocument/2006/relationships" xmlns:mc="http://schemas.openxmlformats.org/markup-compatibility/2006" xmlns:mv="urn:schemas-microsoft-com:mac:vml" xmlns:p="http://schemas.openxmlformats.org/presentationml/2006/main" xmlns:c="http://schemas.openxmlformats.org/drawingml/2006/chart" xmlns:dgm="http://schemas.openxmlformats.org/drawingml/2006/diagram" xmlns:o="urn:schemas-microsoft-com:office:office" xmlns:v="urn:schemas-microsoft-com:vml" xmlns:pvml="urn:schemas-microsoft-com:office:powerpoint" xmlns:com="http://schemas.openxmlformats.org/drawingml/2006/compatibility" xmlns:p14="http://schemas.microsoft.com/office/powerpoint/2010/main" xmlns:p15="http://schemas.microsoft.com/office/powerpoint/2012/main">
+  <p:cSld>
+    <p:spTree>
+      <p:nvGrpSpPr>
+        <p:cNvPr id="117" name="Shape 117"/>
+        <p:cNvGrpSpPr/>
+        <p:nvPr/>
+      </p:nvGrpSpPr>
+      <p:grpSpPr>
+        <a:xfrm>
+          <a:off x="0" y="0"/>
+          <a:ext cx="0" cy="0"/>
+          <a:chOff x="0" y="0"/>
+          <a:chExt cx="0" cy="0"/>
+        </a:xfrm>
+      </p:grpSpPr>
+      <p:sp>
+        <p:nvSpPr>
+          <p:cNvPr id="118" name="Google Shape;118;p21"/>
+          <p:cNvSpPr txBox="1"/>
+          <p:nvPr>
+            <p:ph type="title"/>
+          </p:nvPr>
+        </p:nvSpPr>
+        <p:spPr>
+          <a:xfrm>
+            <a:off x="678075" y="105375"/>
+            <a:ext cx="8520600" cy="572700"/>
+          </a:xfrm>
+          <a:prstGeom prst="rect">
+            <a:avLst/>
+          </a:prstGeom>
+        </p:spPr>
+        <p:txBody>
+          <a:bodyPr anchorCtr="0" anchor="t" bIns="91425" lIns="91425" spcFirstLastPara="1" rIns="91425" wrap="square" tIns="91425">
+            <a:noAutofit/>
+          </a:bodyPr>
+          <a:lstStyle/>
+          <a:p>
+            <a:pPr indent="0" lvl="0" marL="0" rtl="0" algn="l">
+              <a:spcBef>
+                <a:spcPts val="0"/>
+              </a:spcBef>
+              <a:spcAft>
+                <a:spcPts val="0"/>
+              </a:spcAft>
+              <a:buNone/>
+            </a:pPr>
+            <a:r>
               <a:rPr lang="en"/>
               <a:t>References and Resources</a:t>
             </a:r>
@@ -7958,7 +8299,7 @@
       </p:sp>
       <p:sp>
         <p:nvSpPr>
-          <p:cNvPr id="107" name="Google Shape;107;p20"/>
+          <p:cNvPr id="119" name="Google Shape;119;p21"/>
           <p:cNvSpPr txBox="1"/>
           <p:nvPr>
             <p:ph idx="1" type="body"/>
@@ -7966,7 +8307,7 @@
         </p:nvSpPr>
         <p:spPr>
           <a:xfrm>
-            <a:off x="311700" y="1250775"/>
+            <a:off x="311700" y="905775"/>
             <a:ext cx="8520600" cy="3416400"/>
           </a:xfrm>
           <a:prstGeom prst="rect">
@@ -8094,7 +8435,69 @@
               <a:buChar char="●"/>
             </a:pPr>
             <a:r>
-              <a:t/>
+              <a:rPr lang="en"/>
+              <a:t>Deno crash course with Rest API: </a:t>
+            </a:r>
+            <a:r>
+              <a:rPr lang="en" u="sng">
+                <a:solidFill>
+                  <a:schemeClr val="hlink"/>
+                </a:solidFill>
+                <a:hlinkClick r:id="rId7"/>
+              </a:rPr>
+              <a:t>https://www.youtube.com/watch?v=NHHhiqwcfRM&amp;t=5s</a:t>
+            </a:r>
+            <a:endParaRPr/>
+          </a:p>
+          <a:p>
+            <a:pPr indent="-342900" lvl="0" marL="457200" rtl="0" algn="l">
+              <a:spcBef>
+                <a:spcPts val="0"/>
+              </a:spcBef>
+              <a:spcAft>
+                <a:spcPts val="0"/>
+              </a:spcAft>
+              <a:buSzPts val="1800"/>
+              <a:buChar char="●"/>
+            </a:pPr>
+            <a:r>
+              <a:rPr lang="en"/>
+              <a:t>Oak REST API: </a:t>
+            </a:r>
+            <a:r>
+              <a:rPr lang="en" u="sng">
+                <a:solidFill>
+                  <a:schemeClr val="hlink"/>
+                </a:solidFill>
+                <a:hlinkClick r:id="rId8"/>
+              </a:rPr>
+              <a:t>https://github.com/oakserver/oak</a:t>
+            </a:r>
+            <a:endParaRPr/>
+          </a:p>
+          <a:p>
+            <a:pPr indent="-342900" lvl="0" marL="457200" rtl="0" algn="l">
+              <a:spcBef>
+                <a:spcPts val="0"/>
+              </a:spcBef>
+              <a:spcAft>
+                <a:spcPts val="0"/>
+              </a:spcAft>
+              <a:buSzPts val="1800"/>
+              <a:buChar char="●"/>
+            </a:pPr>
+            <a:r>
+              <a:rPr lang="en"/>
+              <a:t>Other Oak REST API: </a:t>
+            </a:r>
+            <a:r>
+              <a:rPr lang="en" u="sng">
+                <a:solidFill>
+                  <a:schemeClr val="hlink"/>
+                </a:solidFill>
+                <a:hlinkClick r:id="rId9"/>
+              </a:rPr>
+              <a:t>https://medium.com/javascript-in-plain-english/building-crud-apis-using-deno-and-oak-9f71ec106b0e</a:t>
             </a:r>
             <a:endParaRPr/>
           </a:p>
@@ -8102,12 +8505,12 @@
       </p:sp>
       <p:pic>
         <p:nvPicPr>
-          <p:cNvPr id="108" name="Google Shape;108;p20"/>
+          <p:cNvPr id="120" name="Google Shape;120;p21"/>
           <p:cNvPicPr preferRelativeResize="0"/>
           <p:nvPr/>
         </p:nvPicPr>
         <p:blipFill>
-          <a:blip r:embed="rId7">
+          <a:blip r:embed="rId10">
             <a:alphaModFix/>
           </a:blip>
           <a:stretch>
@@ -8137,6 +8540,285 @@
 </file>
 
 <file path=ppt/theme/theme1.xml><?xml version="1.0" encoding="utf-8"?>
+<a:theme xmlns:a="http://schemas.openxmlformats.org/drawingml/2006/main" xmlns:r="http://schemas.openxmlformats.org/officeDocument/2006/relationships">
+  <a:themeElements>
+    <a:clrScheme name="Default">
+      <a:dk1>
+        <a:srgbClr val="000000"/>
+      </a:dk1>
+      <a:lt1>
+        <a:srgbClr val="FFFFFF"/>
+      </a:lt1>
+      <a:dk2>
+        <a:srgbClr val="158158"/>
+      </a:dk2>
+      <a:lt2>
+        <a:srgbClr val="F3F3F3"/>
+      </a:lt2>
+      <a:accent1>
+        <a:srgbClr val="058DC7"/>
+      </a:accent1>
+      <a:accent2>
+        <a:srgbClr val="50B432"/>
+      </a:accent2>
+      <a:accent3>
+        <a:srgbClr val="ED561B"/>
+      </a:accent3>
+      <a:accent4>
+        <a:srgbClr val="EDEF00"/>
+      </a:accent4>
+      <a:accent5>
+        <a:srgbClr val="24CBE5"/>
+      </a:accent5>
+      <a:accent6>
+        <a:srgbClr val="64E572"/>
+      </a:accent6>
+      <a:hlink>
+        <a:srgbClr val="2200CC"/>
+      </a:hlink>
+      <a:folHlink>
+        <a:srgbClr val="551A8B"/>
+      </a:folHlink>
+    </a:clrScheme>
+    <a:fontScheme name="Office">
+      <a:majorFont>
+        <a:latin typeface="Arial"/>
+        <a:ea typeface=""/>
+        <a:cs typeface=""/>
+        <a:font script="Jpan" typeface="ＭＳ Ｐゴシック"/>
+        <a:font script="Hang" typeface="맑은 고딕"/>
+        <a:font script="Hans" typeface="宋体"/>
+        <a:font script="Hant" typeface="新細明體"/>
+        <a:font script="Arab" typeface="Times New Roman"/>
+        <a:font script="Hebr" typeface="Times New Roman"/>
+        <a:font script="Thai" typeface="Angsana New"/>
+        <a:font script="Ethi" typeface="Nyala"/>
+        <a:font script="Beng" typeface="Vrinda"/>
+        <a:font script="Gujr" typeface="Shruti"/>
+        <a:font script="Khmr" typeface="MoolBoran"/>
+        <a:font script="Knda" typeface="Tunga"/>
+        <a:font script="Guru" typeface="Raavi"/>
+        <a:font script="Cans" typeface="Euphemia"/>
+        <a:font script="Cher" typeface="Plantagenet Cherokee"/>
+        <a:font script="Yiii" typeface="Microsoft Yi Baiti"/>
+        <a:font script="Tibt" typeface="Microsoft Himalaya"/>
+        <a:font script="Thaa" typeface="MV Boli"/>
+        <a:font script="Deva" typeface="Mangal"/>
+        <a:font script="Telu" typeface="Gautami"/>
+        <a:font script="Taml" typeface="Latha"/>
+        <a:font script="Syrc" typeface="Estrangelo Edessa"/>
+        <a:font script="Orya" typeface="Kalinga"/>
+        <a:font script="Mlym" typeface="Kartika"/>
+        <a:font script="Laoo" typeface="DokChampa"/>
+        <a:font script="Sinh" typeface="Iskoola Pota"/>
+        <a:font script="Mong" typeface="Mongolian Baiti"/>
+        <a:font script="Viet" typeface="Times New Roman"/>
+        <a:font script="Uigh" typeface="Microsoft Uighur"/>
+        <a:font script="Geor" typeface="Sylfaen"/>
+      </a:majorFont>
+      <a:minorFont>
+        <a:latin typeface="Arial"/>
+        <a:ea typeface=""/>
+        <a:cs typeface=""/>
+        <a:font script="Jpan" typeface="ＭＳ Ｐゴシック"/>
+        <a:font script="Hang" typeface="맑은 고딕"/>
+        <a:font script="Hans" typeface="宋体"/>
+        <a:font script="Hant" typeface="新細明體"/>
+        <a:font script="Arab" typeface="Arial"/>
+        <a:font script="Hebr" typeface="Arial"/>
+        <a:font script="Thai" typeface="Cordia New"/>
+        <a:font script="Ethi" typeface="Nyala"/>
+        <a:font script="Beng" typeface="Vrinda"/>
+        <a:font script="Gujr" typeface="Shruti"/>
+        <a:font script="Khmr" typeface="DaunPenh"/>
+        <a:font script="Knda" typeface="Tunga"/>
+        <a:font script="Guru" typeface="Raavi"/>
+        <a:font script="Cans" typeface="Euphemia"/>
+        <a:font script="Cher" typeface="Plantagenet Cherokee"/>
+        <a:font script="Yiii" typeface="Microsoft Yi Baiti"/>
+        <a:font script="Tibt" typeface="Microsoft Himalaya"/>
+        <a:font script="Thaa" typeface="MV Boli"/>
+        <a:font script="Deva" typeface="Mangal"/>
+        <a:font script="Telu" typeface="Gautami"/>
+        <a:font script="Taml" typeface="Latha"/>
+        <a:font script="Syrc" typeface="Estrangelo Edessa"/>
+        <a:font script="Orya" typeface="Kalinga"/>
+        <a:font script="Mlym" typeface="Kartika"/>
+        <a:font script="Laoo" typeface="DokChampa"/>
+        <a:font script="Sinh" typeface="Iskoola Pota"/>
+        <a:font script="Mong" typeface="Mongolian Baiti"/>
+        <a:font script="Viet" typeface="Arial"/>
+        <a:font script="Uigh" typeface="Microsoft Uighur"/>
+        <a:font script="Geor" typeface="Sylfaen"/>
+      </a:minorFont>
+    </a:fontScheme>
+    <a:fmtScheme name="Office">
+      <a:fillStyleLst>
+        <a:solidFill>
+          <a:schemeClr val="phClr"/>
+        </a:solidFill>
+        <a:gradFill rotWithShape="1">
+          <a:gsLst>
+            <a:gs pos="0">
+              <a:schemeClr val="phClr">
+                <a:tint val="50000"/>
+                <a:satMod val="300000"/>
+              </a:schemeClr>
+            </a:gs>
+            <a:gs pos="35000">
+              <a:schemeClr val="phClr">
+                <a:tint val="37000"/>
+                <a:satMod val="300000"/>
+              </a:schemeClr>
+            </a:gs>
+            <a:gs pos="100000">
+              <a:schemeClr val="phClr">
+                <a:tint val="15000"/>
+                <a:satMod val="350000"/>
+              </a:schemeClr>
+            </a:gs>
+          </a:gsLst>
+          <a:lin ang="16200000" scaled="1"/>
+        </a:gradFill>
+        <a:gradFill rotWithShape="1">
+          <a:gsLst>
+            <a:gs pos="0">
+              <a:schemeClr val="phClr">
+                <a:tint val="100000"/>
+                <a:shade val="100000"/>
+                <a:satMod val="130000"/>
+              </a:schemeClr>
+            </a:gs>
+            <a:gs pos="100000">
+              <a:schemeClr val="phClr">
+                <a:tint val="50000"/>
+                <a:shade val="100000"/>
+                <a:satMod val="350000"/>
+              </a:schemeClr>
+            </a:gs>
+          </a:gsLst>
+          <a:lin ang="16200000" scaled="0"/>
+        </a:gradFill>
+      </a:fillStyleLst>
+      <a:lnStyleLst>
+        <a:ln w="9525" cap="flat" cmpd="sng" algn="ctr">
+          <a:solidFill>
+            <a:schemeClr val="phClr">
+              <a:shade val="95000"/>
+              <a:satMod val="105000"/>
+            </a:schemeClr>
+          </a:solidFill>
+          <a:prstDash val="solid"/>
+        </a:ln>
+        <a:ln w="25400" cap="flat" cmpd="sng" algn="ctr">
+          <a:solidFill>
+            <a:schemeClr val="phClr"/>
+          </a:solidFill>
+          <a:prstDash val="solid"/>
+        </a:ln>
+        <a:ln w="38100" cap="flat" cmpd="sng" algn="ctr">
+          <a:solidFill>
+            <a:schemeClr val="phClr"/>
+          </a:solidFill>
+          <a:prstDash val="solid"/>
+        </a:ln>
+      </a:lnStyleLst>
+      <a:effectStyleLst>
+        <a:effectStyle>
+          <a:effectLst>
+            <a:outerShdw blurRad="40000" dist="20000" dir="5400000" rotWithShape="0">
+              <a:srgbClr val="000000">
+                <a:alpha val="38000"/>
+              </a:srgbClr>
+            </a:outerShdw>
+          </a:effectLst>
+        </a:effectStyle>
+        <a:effectStyle>
+          <a:effectLst>
+            <a:outerShdw blurRad="40000" dist="23000" dir="5400000" rotWithShape="0">
+              <a:srgbClr val="000000">
+                <a:alpha val="35000"/>
+              </a:srgbClr>
+            </a:outerShdw>
+          </a:effectLst>
+        </a:effectStyle>
+        <a:effectStyle>
+          <a:effectLst>
+            <a:outerShdw blurRad="40000" dist="23000" dir="5400000" rotWithShape="0">
+              <a:srgbClr val="000000">
+                <a:alpha val="35000"/>
+              </a:srgbClr>
+            </a:outerShdw>
+          </a:effectLst>
+          <a:scene3d>
+            <a:camera prst="orthographicFront">
+              <a:rot lat="0" lon="0" rev="0"/>
+            </a:camera>
+            <a:lightRig rig="threePt" dir="t">
+              <a:rot lat="0" lon="0" rev="1200000"/>
+            </a:lightRig>
+          </a:scene3d>
+          <a:sp3d>
+            <a:bevelT w="63500" h="25400"/>
+          </a:sp3d>
+        </a:effectStyle>
+      </a:effectStyleLst>
+      <a:bgFillStyleLst>
+        <a:solidFill>
+          <a:schemeClr val="phClr"/>
+        </a:solidFill>
+        <a:gradFill rotWithShape="1">
+          <a:gsLst>
+            <a:gs pos="0">
+              <a:schemeClr val="phClr">
+                <a:tint val="40000"/>
+                <a:satMod val="350000"/>
+              </a:schemeClr>
+            </a:gs>
+            <a:gs pos="40000">
+              <a:schemeClr val="phClr">
+                <a:tint val="45000"/>
+                <a:shade val="99000"/>
+                <a:satMod val="350000"/>
+              </a:schemeClr>
+            </a:gs>
+            <a:gs pos="100000">
+              <a:schemeClr val="phClr">
+                <a:shade val="20000"/>
+                <a:satMod val="255000"/>
+              </a:schemeClr>
+            </a:gs>
+          </a:gsLst>
+          <a:path path="circle">
+            <a:fillToRect l="50000" t="-80000" r="50000" b="180000"/>
+          </a:path>
+        </a:gradFill>
+        <a:gradFill rotWithShape="1">
+          <a:gsLst>
+            <a:gs pos="0">
+              <a:schemeClr val="phClr">
+                <a:tint val="80000"/>
+                <a:satMod val="300000"/>
+              </a:schemeClr>
+            </a:gs>
+            <a:gs pos="100000">
+              <a:schemeClr val="phClr">
+                <a:shade val="30000"/>
+                <a:satMod val="200000"/>
+              </a:schemeClr>
+            </a:gs>
+          </a:gsLst>
+          <a:path path="circle">
+            <a:fillToRect l="50000" t="50000" r="50000" b="50000"/>
+          </a:path>
+        </a:gradFill>
+      </a:bgFillStyleLst>
+    </a:fmtScheme>
+  </a:themeElements>
+</a:theme>
+</file>
+
+<file path=ppt/theme/theme2.xml><?xml version="1.0" encoding="utf-8"?>
 <a:theme xmlns:a="http://schemas.openxmlformats.org/drawingml/2006/main" xmlns:r="http://schemas.openxmlformats.org/officeDocument/2006/relationships" name="Simple Light">
   <a:themeElements>
     <a:clrScheme name="Simple Light">
@@ -8413,283 +9095,4 @@
     </a:fmtScheme>
   </a:themeElements>
 </a:theme>
-</file>
-
-<file path=ppt/theme/theme2.xml><?xml version="1.0" encoding="utf-8"?>
-<a:theme xmlns:a="http://schemas.openxmlformats.org/drawingml/2006/main" xmlns:r="http://schemas.openxmlformats.org/officeDocument/2006/relationships">
-  <a:themeElements>
-    <a:clrScheme name="Default">
-      <a:dk1>
-        <a:srgbClr val="000000"/>
-      </a:dk1>
-      <a:lt1>
-        <a:srgbClr val="FFFFFF"/>
-      </a:lt1>
-      <a:dk2>
-        <a:srgbClr val="158158"/>
-      </a:dk2>
-      <a:lt2>
-        <a:srgbClr val="F3F3F3"/>
-      </a:lt2>
-      <a:accent1>
-        <a:srgbClr val="058DC7"/>
-      </a:accent1>
-      <a:accent2>
-        <a:srgbClr val="50B432"/>
-      </a:accent2>
-      <a:accent3>
-        <a:srgbClr val="ED561B"/>
-      </a:accent3>
-      <a:accent4>
-        <a:srgbClr val="EDEF00"/>
-      </a:accent4>
-      <a:accent5>
-        <a:srgbClr val="24CBE5"/>
-      </a:accent5>
-      <a:accent6>
-        <a:srgbClr val="64E572"/>
-      </a:accent6>
-      <a:hlink>
-        <a:srgbClr val="2200CC"/>
-      </a:hlink>
-      <a:folHlink>
-        <a:srgbClr val="551A8B"/>
-      </a:folHlink>
-    </a:clrScheme>
-    <a:fontScheme name="Office">
-      <a:majorFont>
-        <a:latin typeface="Arial"/>
-        <a:ea typeface=""/>
-        <a:cs typeface=""/>
-        <a:font script="Jpan" typeface="ＭＳ Ｐゴシック"/>
-        <a:font script="Hang" typeface="맑은 고딕"/>
-        <a:font script="Hans" typeface="宋体"/>
-        <a:font script="Hant" typeface="新細明體"/>
-        <a:font script="Arab" typeface="Times New Roman"/>
-        <a:font script="Hebr" typeface="Times New Roman"/>
-        <a:font script="Thai" typeface="Angsana New"/>
-        <a:font script="Ethi" typeface="Nyala"/>
-        <a:font script="Beng" typeface="Vrinda"/>
-        <a:font script="Gujr" typeface="Shruti"/>
-        <a:font script="Khmr" typeface="MoolBoran"/>
-        <a:font script="Knda" typeface="Tunga"/>
-        <a:font script="Guru" typeface="Raavi"/>
-        <a:font script="Cans" typeface="Euphemia"/>
-        <a:font script="Cher" typeface="Plantagenet Cherokee"/>
-        <a:font script="Yiii" typeface="Microsoft Yi Baiti"/>
-        <a:font script="Tibt" typeface="Microsoft Himalaya"/>
-        <a:font script="Thaa" typeface="MV Boli"/>
-        <a:font script="Deva" typeface="Mangal"/>
-        <a:font script="Telu" typeface="Gautami"/>
-        <a:font script="Taml" typeface="Latha"/>
-        <a:font script="Syrc" typeface="Estrangelo Edessa"/>
-        <a:font script="Orya" typeface="Kalinga"/>
-        <a:font script="Mlym" typeface="Kartika"/>
-        <a:font script="Laoo" typeface="DokChampa"/>
-        <a:font script="Sinh" typeface="Iskoola Pota"/>
-        <a:font script="Mong" typeface="Mongolian Baiti"/>
-        <a:font script="Viet" typeface="Times New Roman"/>
-        <a:font script="Uigh" typeface="Microsoft Uighur"/>
-        <a:font script="Geor" typeface="Sylfaen"/>
-      </a:majorFont>
-      <a:minorFont>
-        <a:latin typeface="Arial"/>
-        <a:ea typeface=""/>
-        <a:cs typeface=""/>
-        <a:font script="Jpan" typeface="ＭＳ Ｐゴシック"/>
-        <a:font script="Hang" typeface="맑은 고딕"/>
-        <a:font script="Hans" typeface="宋体"/>
-        <a:font script="Hant" typeface="新細明體"/>
-        <a:font script="Arab" typeface="Arial"/>
-        <a:font script="Hebr" typeface="Arial"/>
-        <a:font script="Thai" typeface="Cordia New"/>
-        <a:font script="Ethi" typeface="Nyala"/>
-        <a:font script="Beng" typeface="Vrinda"/>
-        <a:font script="Gujr" typeface="Shruti"/>
-        <a:font script="Khmr" typeface="DaunPenh"/>
-        <a:font script="Knda" typeface="Tunga"/>
-        <a:font script="Guru" typeface="Raavi"/>
-        <a:font script="Cans" typeface="Euphemia"/>
-        <a:font script="Cher" typeface="Plantagenet Cherokee"/>
-        <a:font script="Yiii" typeface="Microsoft Yi Baiti"/>
-        <a:font script="Tibt" typeface="Microsoft Himalaya"/>
-        <a:font script="Thaa" typeface="MV Boli"/>
-        <a:font script="Deva" typeface="Mangal"/>
-        <a:font script="Telu" typeface="Gautami"/>
-        <a:font script="Taml" typeface="Latha"/>
-        <a:font script="Syrc" typeface="Estrangelo Edessa"/>
-        <a:font script="Orya" typeface="Kalinga"/>
-        <a:font script="Mlym" typeface="Kartika"/>
-        <a:font script="Laoo" typeface="DokChampa"/>
-        <a:font script="Sinh" typeface="Iskoola Pota"/>
-        <a:font script="Mong" typeface="Mongolian Baiti"/>
-        <a:font script="Viet" typeface="Arial"/>
-        <a:font script="Uigh" typeface="Microsoft Uighur"/>
-        <a:font script="Geor" typeface="Sylfaen"/>
-      </a:minorFont>
-    </a:fontScheme>
-    <a:fmtScheme name="Office">
-      <a:fillStyleLst>
-        <a:solidFill>
-          <a:schemeClr val="phClr"/>
-        </a:solidFill>
-        <a:gradFill rotWithShape="1">
-          <a:gsLst>
-            <a:gs pos="0">
-              <a:schemeClr val="phClr">
-                <a:tint val="50000"/>
-                <a:satMod val="300000"/>
-              </a:schemeClr>
-            </a:gs>
-            <a:gs pos="35000">
-              <a:schemeClr val="phClr">
-                <a:tint val="37000"/>
-                <a:satMod val="300000"/>
-              </a:schemeClr>
-            </a:gs>
-            <a:gs pos="100000">
-              <a:schemeClr val="phClr">
-                <a:tint val="15000"/>
-                <a:satMod val="350000"/>
-              </a:schemeClr>
-            </a:gs>
-          </a:gsLst>
-          <a:lin ang="16200000" scaled="1"/>
-        </a:gradFill>
-        <a:gradFill rotWithShape="1">
-          <a:gsLst>
-            <a:gs pos="0">
-              <a:schemeClr val="phClr">
-                <a:tint val="100000"/>
-                <a:shade val="100000"/>
-                <a:satMod val="130000"/>
-              </a:schemeClr>
-            </a:gs>
-            <a:gs pos="100000">
-              <a:schemeClr val="phClr">
-                <a:tint val="50000"/>
-                <a:shade val="100000"/>
-                <a:satMod val="350000"/>
-              </a:schemeClr>
-            </a:gs>
-          </a:gsLst>
-          <a:lin ang="16200000" scaled="0"/>
-        </a:gradFill>
-      </a:fillStyleLst>
-      <a:lnStyleLst>
-        <a:ln w="9525" cap="flat" cmpd="sng" algn="ctr">
-          <a:solidFill>
-            <a:schemeClr val="phClr">
-              <a:shade val="95000"/>
-              <a:satMod val="105000"/>
-            </a:schemeClr>
-          </a:solidFill>
-          <a:prstDash val="solid"/>
-        </a:ln>
-        <a:ln w="25400" cap="flat" cmpd="sng" algn="ctr">
-          <a:solidFill>
-            <a:schemeClr val="phClr"/>
-          </a:solidFill>
-          <a:prstDash val="solid"/>
-        </a:ln>
-        <a:ln w="38100" cap="flat" cmpd="sng" algn="ctr">
-          <a:solidFill>
-            <a:schemeClr val="phClr"/>
-          </a:solidFill>
-          <a:prstDash val="solid"/>
-        </a:ln>
-      </a:lnStyleLst>
-      <a:effectStyleLst>
-        <a:effectStyle>
-          <a:effectLst>
-            <a:outerShdw blurRad="40000" dist="20000" dir="5400000" rotWithShape="0">
-              <a:srgbClr val="000000">
-                <a:alpha val="38000"/>
-              </a:srgbClr>
-            </a:outerShdw>
-          </a:effectLst>
-        </a:effectStyle>
-        <a:effectStyle>
-          <a:effectLst>
-            <a:outerShdw blurRad="40000" dist="23000" dir="5400000" rotWithShape="0">
-              <a:srgbClr val="000000">
-                <a:alpha val="35000"/>
-              </a:srgbClr>
-            </a:outerShdw>
-          </a:effectLst>
-        </a:effectStyle>
-        <a:effectStyle>
-          <a:effectLst>
-            <a:outerShdw blurRad="40000" dist="23000" dir="5400000" rotWithShape="0">
-              <a:srgbClr val="000000">
-                <a:alpha val="35000"/>
-              </a:srgbClr>
-            </a:outerShdw>
-          </a:effectLst>
-          <a:scene3d>
-            <a:camera prst="orthographicFront">
-              <a:rot lat="0" lon="0" rev="0"/>
-            </a:camera>
-            <a:lightRig rig="threePt" dir="t">
-              <a:rot lat="0" lon="0" rev="1200000"/>
-            </a:lightRig>
-          </a:scene3d>
-          <a:sp3d>
-            <a:bevelT w="63500" h="25400"/>
-          </a:sp3d>
-        </a:effectStyle>
-      </a:effectStyleLst>
-      <a:bgFillStyleLst>
-        <a:solidFill>
-          <a:schemeClr val="phClr"/>
-        </a:solidFill>
-        <a:gradFill rotWithShape="1">
-          <a:gsLst>
-            <a:gs pos="0">
-              <a:schemeClr val="phClr">
-                <a:tint val="40000"/>
-                <a:satMod val="350000"/>
-              </a:schemeClr>
-            </a:gs>
-            <a:gs pos="40000">
-              <a:schemeClr val="phClr">
-                <a:tint val="45000"/>
-                <a:shade val="99000"/>
-                <a:satMod val="350000"/>
-              </a:schemeClr>
-            </a:gs>
-            <a:gs pos="100000">
-              <a:schemeClr val="phClr">
-                <a:shade val="20000"/>
-                <a:satMod val="255000"/>
-              </a:schemeClr>
-            </a:gs>
-          </a:gsLst>
-          <a:path path="circle">
-            <a:fillToRect l="50000" t="-80000" r="50000" b="180000"/>
-          </a:path>
-        </a:gradFill>
-        <a:gradFill rotWithShape="1">
-          <a:gsLst>
-            <a:gs pos="0">
-              <a:schemeClr val="phClr">
-                <a:tint val="80000"/>
-                <a:satMod val="300000"/>
-              </a:schemeClr>
-            </a:gs>
-            <a:gs pos="100000">
-              <a:schemeClr val="phClr">
-                <a:shade val="30000"/>
-                <a:satMod val="200000"/>
-              </a:schemeClr>
-            </a:gs>
-          </a:gsLst>
-          <a:path path="circle">
-            <a:fillToRect l="50000" t="50000" r="50000" b="50000"/>
-          </a:path>
-        </a:gradFill>
-      </a:bgFillStyleLst>
-    </a:fmtScheme>
-  </a:themeElements>
-</a:theme>
 </file>
</xml_diff>

<commit_message>
feature(deno-web): Deno webassembly based on prior talk and example code
</commit_message>
<xml_diff>
--- a/Introduction to Deno.pptx
+++ b/Introduction to Deno.pptx
@@ -1,6 +1,6 @@
 
 <file path=ppt/presentation.xml><?xml version="1.0" encoding="utf-8"?>
-<p:presentation xmlns:a="http://schemas.openxmlformats.org/drawingml/2006/main" xmlns:r="http://schemas.openxmlformats.org/officeDocument/2006/relationships" xmlns:mc="http://schemas.openxmlformats.org/markup-compatibility/2006" xmlns:mv="urn:schemas-microsoft-com:mac:vml" xmlns:p="http://schemas.openxmlformats.org/presentationml/2006/main" xmlns:c="http://schemas.openxmlformats.org/drawingml/2006/chart" xmlns:dgm="http://schemas.openxmlformats.org/drawingml/2006/diagram" xmlns:o="urn:schemas-microsoft-com:office:office" xmlns:v="urn:schemas-microsoft-com:vml" xmlns:pvml="urn:schemas-microsoft-com:office:powerpoint" xmlns:com="http://schemas.openxmlformats.org/drawingml/2006/compatibility" xmlns:p14="http://schemas.microsoft.com/office/powerpoint/2010/main" xmlns:p15="http://schemas.microsoft.com/office/powerpoint/2012/main" autoCompressPictures="0" strictFirstAndLastChars="0" saveSubsetFonts="1">
+<p:presentation xmlns:a="http://schemas.openxmlformats.org/drawingml/2006/main" xmlns:r="http://schemas.openxmlformats.org/officeDocument/2006/relationships" xmlns:mc="http://schemas.openxmlformats.org/markup-compatibility/2006" xmlns:mv="urn:schemas-microsoft-com:mac:vml" xmlns:p="http://schemas.openxmlformats.org/presentationml/2006/main" xmlns:c="http://schemas.openxmlformats.org/drawingml/2006/chart" xmlns:dgm="http://schemas.openxmlformats.org/drawingml/2006/diagram" xmlns:o="urn:schemas-microsoft-com:office:office" xmlns:v="urn:schemas-microsoft-com:vml" xmlns:pvml="urn:schemas-microsoft-com:office:powerpoint" xmlns:com="http://schemas.openxmlformats.org/drawingml/2006/compatibility" xmlns:p14="http://schemas.microsoft.com/office/powerpoint/2010/main" xmlns:p15="http://schemas.microsoft.com/office/powerpoint/2012/main" xmlns:ahyp="http://schemas.microsoft.com/office/drawing/2018/hyperlinkcolor" autoCompressPictures="0" strictFirstAndLastChars="0" saveSubsetFonts="1">
   <p:sldMasterIdLst>
     <p:sldMasterId id="2147483659" r:id="rId4"/>
   </p:sldMasterIdLst>
@@ -17,6 +17,9 @@
     <p:sldId id="262" r:id="rId12"/>
     <p:sldId id="263" r:id="rId13"/>
     <p:sldId id="264" r:id="rId14"/>
+    <p:sldId id="265" r:id="rId15"/>
+    <p:sldId id="266" r:id="rId16"/>
+    <p:sldId id="267" r:id="rId17"/>
   </p:sldIdLst>
   <p:sldSz cy="5143500" cx="9144000"/>
   <p:notesSz cx="6858000" cy="9144000"/>
@@ -269,7 +272,7 @@
 </file>
 
 <file path=ppt/notesMasters/notesMaster1.xml><?xml version="1.0" encoding="utf-8"?>
-<p:notesMaster xmlns:a="http://schemas.openxmlformats.org/drawingml/2006/main" xmlns:r="http://schemas.openxmlformats.org/officeDocument/2006/relationships" xmlns:mc="http://schemas.openxmlformats.org/markup-compatibility/2006" xmlns:mv="urn:schemas-microsoft-com:mac:vml" xmlns:p="http://schemas.openxmlformats.org/presentationml/2006/main" xmlns:c="http://schemas.openxmlformats.org/drawingml/2006/chart" xmlns:dgm="http://schemas.openxmlformats.org/drawingml/2006/diagram" xmlns:o="urn:schemas-microsoft-com:office:office" xmlns:v="urn:schemas-microsoft-com:vml" xmlns:pvml="urn:schemas-microsoft-com:office:powerpoint" xmlns:com="http://schemas.openxmlformats.org/drawingml/2006/compatibility" xmlns:p14="http://schemas.microsoft.com/office/powerpoint/2010/main" xmlns:p15="http://schemas.microsoft.com/office/powerpoint/2012/main">
+<p:notesMaster xmlns:a="http://schemas.openxmlformats.org/drawingml/2006/main" xmlns:r="http://schemas.openxmlformats.org/officeDocument/2006/relationships" xmlns:mc="http://schemas.openxmlformats.org/markup-compatibility/2006" xmlns:mv="urn:schemas-microsoft-com:mac:vml" xmlns:p="http://schemas.openxmlformats.org/presentationml/2006/main" xmlns:c="http://schemas.openxmlformats.org/drawingml/2006/chart" xmlns:dgm="http://schemas.openxmlformats.org/drawingml/2006/diagram" xmlns:o="urn:schemas-microsoft-com:office:office" xmlns:v="urn:schemas-microsoft-com:vml" xmlns:pvml="urn:schemas-microsoft-com:office:powerpoint" xmlns:com="http://schemas.openxmlformats.org/drawingml/2006/compatibility" xmlns:p14="http://schemas.microsoft.com/office/powerpoint/2010/main" xmlns:p15="http://schemas.microsoft.com/office/powerpoint/2012/main" xmlns:ahyp="http://schemas.microsoft.com/office/drawing/2018/hyperlinkcolor">
   <p:cSld>
     <p:spTree>
       <p:nvGrpSpPr>
@@ -695,7 +698,7 @@
 </file>
 
 <file path=ppt/notesSlides/notesSlide1.xml><?xml version="1.0" encoding="utf-8"?>
-<p:notes xmlns:a="http://schemas.openxmlformats.org/drawingml/2006/main" xmlns:r="http://schemas.openxmlformats.org/officeDocument/2006/relationships" xmlns:mc="http://schemas.openxmlformats.org/markup-compatibility/2006" xmlns:mv="urn:schemas-microsoft-com:mac:vml" xmlns:p="http://schemas.openxmlformats.org/presentationml/2006/main" xmlns:c="http://schemas.openxmlformats.org/drawingml/2006/chart" xmlns:dgm="http://schemas.openxmlformats.org/drawingml/2006/diagram" xmlns:o="urn:schemas-microsoft-com:office:office" xmlns:v="urn:schemas-microsoft-com:vml" xmlns:pvml="urn:schemas-microsoft-com:office:powerpoint" xmlns:com="http://schemas.openxmlformats.org/drawingml/2006/compatibility" xmlns:p14="http://schemas.microsoft.com/office/powerpoint/2010/main" xmlns:p15="http://schemas.microsoft.com/office/powerpoint/2012/main" showMasterPhAnim="0" showMasterSp="0">
+<p:notes xmlns:a="http://schemas.openxmlformats.org/drawingml/2006/main" xmlns:r="http://schemas.openxmlformats.org/officeDocument/2006/relationships" xmlns:mc="http://schemas.openxmlformats.org/markup-compatibility/2006" xmlns:mv="urn:schemas-microsoft-com:mac:vml" xmlns:p="http://schemas.openxmlformats.org/presentationml/2006/main" xmlns:c="http://schemas.openxmlformats.org/drawingml/2006/chart" xmlns:dgm="http://schemas.openxmlformats.org/drawingml/2006/diagram" xmlns:o="urn:schemas-microsoft-com:office:office" xmlns:v="urn:schemas-microsoft-com:vml" xmlns:pvml="urn:schemas-microsoft-com:office:powerpoint" xmlns:com="http://schemas.openxmlformats.org/drawingml/2006/compatibility" xmlns:p14="http://schemas.microsoft.com/office/powerpoint/2010/main" xmlns:p15="http://schemas.microsoft.com/office/powerpoint/2012/main" xmlns:ahyp="http://schemas.microsoft.com/office/drawing/2018/hyperlinkcolor" showMasterPhAnim="0" showMasterSp="0">
   <p:cSld>
     <p:spTree>
       <p:nvGrpSpPr>
@@ -793,8 +796,305 @@
 </p:notes>
 </file>
 
+<file path=ppt/notesSlides/notesSlide10.xml><?xml version="1.0" encoding="utf-8"?>
+<p:notes xmlns:a="http://schemas.openxmlformats.org/drawingml/2006/main" xmlns:r="http://schemas.openxmlformats.org/officeDocument/2006/relationships" xmlns:mc="http://schemas.openxmlformats.org/markup-compatibility/2006" xmlns:mv="urn:schemas-microsoft-com:mac:vml" xmlns:p="http://schemas.openxmlformats.org/presentationml/2006/main" xmlns:c="http://schemas.openxmlformats.org/drawingml/2006/chart" xmlns:dgm="http://schemas.openxmlformats.org/drawingml/2006/diagram" xmlns:o="urn:schemas-microsoft-com:office:office" xmlns:v="urn:schemas-microsoft-com:vml" xmlns:pvml="urn:schemas-microsoft-com:office:powerpoint" xmlns:com="http://schemas.openxmlformats.org/drawingml/2006/compatibility" xmlns:p14="http://schemas.microsoft.com/office/powerpoint/2010/main" xmlns:p15="http://schemas.microsoft.com/office/powerpoint/2012/main" xmlns:ahyp="http://schemas.microsoft.com/office/drawing/2018/hyperlinkcolor" showMasterPhAnim="0" showMasterSp="0">
+  <p:cSld>
+    <p:spTree>
+      <p:nvGrpSpPr>
+        <p:cNvPr id="123" name="Shape 123"/>
+        <p:cNvGrpSpPr/>
+        <p:nvPr/>
+      </p:nvGrpSpPr>
+      <p:grpSpPr>
+        <a:xfrm>
+          <a:off x="0" y="0"/>
+          <a:ext cx="0" cy="0"/>
+          <a:chOff x="0" y="0"/>
+          <a:chExt cx="0" cy="0"/>
+        </a:xfrm>
+      </p:grpSpPr>
+      <p:sp>
+        <p:nvSpPr>
+          <p:cNvPr id="124" name="Google Shape;124;g8fb1f6987e_0_61:notes"/>
+          <p:cNvSpPr/>
+          <p:nvPr>
+            <p:ph idx="2" type="sldImg"/>
+          </p:nvPr>
+        </p:nvSpPr>
+        <p:spPr>
+          <a:xfrm>
+            <a:off x="381300" y="685800"/>
+            <a:ext cx="6096000" cy="3429000"/>
+          </a:xfrm>
+          <a:custGeom>
+            <a:rect b="b" l="l" r="r" t="t"/>
+            <a:pathLst>
+              <a:path extrusionOk="0" h="120000" w="120000">
+                <a:moveTo>
+                  <a:pt x="0" y="0"/>
+                </a:moveTo>
+                <a:lnTo>
+                  <a:pt x="120000" y="0"/>
+                </a:lnTo>
+                <a:lnTo>
+                  <a:pt x="120000" y="120000"/>
+                </a:lnTo>
+                <a:lnTo>
+                  <a:pt x="0" y="120000"/>
+                </a:lnTo>
+                <a:close/>
+              </a:path>
+            </a:pathLst>
+          </a:custGeom>
+        </p:spPr>
+      </p:sp>
+      <p:sp>
+        <p:nvSpPr>
+          <p:cNvPr id="125" name="Google Shape;125;g8fb1f6987e_0_61:notes"/>
+          <p:cNvSpPr txBox="1"/>
+          <p:nvPr>
+            <p:ph idx="1" type="body"/>
+          </p:nvPr>
+        </p:nvSpPr>
+        <p:spPr>
+          <a:xfrm>
+            <a:off x="685800" y="4343400"/>
+            <a:ext cx="5486400" cy="4114800"/>
+          </a:xfrm>
+          <a:prstGeom prst="rect">
+            <a:avLst/>
+          </a:prstGeom>
+        </p:spPr>
+        <p:txBody>
+          <a:bodyPr anchorCtr="0" anchor="t" bIns="91425" lIns="91425" spcFirstLastPara="1" rIns="91425" wrap="square" tIns="91425">
+            <a:noAutofit/>
+          </a:bodyPr>
+          <a:lstStyle/>
+          <a:p>
+            <a:pPr indent="0" lvl="0" marL="0" rtl="0" algn="l">
+              <a:spcBef>
+                <a:spcPts val="0"/>
+              </a:spcBef>
+              <a:spcAft>
+                <a:spcPts val="0"/>
+              </a:spcAft>
+              <a:buNone/>
+            </a:pPr>
+            <a:r>
+              <a:t/>
+            </a:r>
+            <a:endParaRPr/>
+          </a:p>
+        </p:txBody>
+      </p:sp>
+    </p:spTree>
+  </p:cSld>
+  <p:clrMapOvr>
+    <a:masterClrMapping/>
+  </p:clrMapOvr>
+</p:notes>
+</file>
+
+<file path=ppt/notesSlides/notesSlide11.xml><?xml version="1.0" encoding="utf-8"?>
+<p:notes xmlns:a="http://schemas.openxmlformats.org/drawingml/2006/main" xmlns:r="http://schemas.openxmlformats.org/officeDocument/2006/relationships" xmlns:mc="http://schemas.openxmlformats.org/markup-compatibility/2006" xmlns:mv="urn:schemas-microsoft-com:mac:vml" xmlns:p="http://schemas.openxmlformats.org/presentationml/2006/main" xmlns:c="http://schemas.openxmlformats.org/drawingml/2006/chart" xmlns:dgm="http://schemas.openxmlformats.org/drawingml/2006/diagram" xmlns:o="urn:schemas-microsoft-com:office:office" xmlns:v="urn:schemas-microsoft-com:vml" xmlns:pvml="urn:schemas-microsoft-com:office:powerpoint" xmlns:com="http://schemas.openxmlformats.org/drawingml/2006/compatibility" xmlns:p14="http://schemas.microsoft.com/office/powerpoint/2010/main" xmlns:p15="http://schemas.microsoft.com/office/powerpoint/2012/main" xmlns:ahyp="http://schemas.microsoft.com/office/drawing/2018/hyperlinkcolor" showMasterPhAnim="0" showMasterSp="0">
+  <p:cSld>
+    <p:spTree>
+      <p:nvGrpSpPr>
+        <p:cNvPr id="130" name="Shape 130"/>
+        <p:cNvGrpSpPr/>
+        <p:nvPr/>
+      </p:nvGrpSpPr>
+      <p:grpSpPr>
+        <a:xfrm>
+          <a:off x="0" y="0"/>
+          <a:ext cx="0" cy="0"/>
+          <a:chOff x="0" y="0"/>
+          <a:chExt cx="0" cy="0"/>
+        </a:xfrm>
+      </p:grpSpPr>
+      <p:sp>
+        <p:nvSpPr>
+          <p:cNvPr id="131" name="Google Shape;131;g8fb1f6987e_1_7:notes"/>
+          <p:cNvSpPr/>
+          <p:nvPr>
+            <p:ph idx="2" type="sldImg"/>
+          </p:nvPr>
+        </p:nvSpPr>
+        <p:spPr>
+          <a:xfrm>
+            <a:off x="381300" y="685800"/>
+            <a:ext cx="6096000" cy="3429000"/>
+          </a:xfrm>
+          <a:custGeom>
+            <a:rect b="b" l="l" r="r" t="t"/>
+            <a:pathLst>
+              <a:path extrusionOk="0" h="120000" w="120000">
+                <a:moveTo>
+                  <a:pt x="0" y="0"/>
+                </a:moveTo>
+                <a:lnTo>
+                  <a:pt x="120000" y="0"/>
+                </a:lnTo>
+                <a:lnTo>
+                  <a:pt x="120000" y="120000"/>
+                </a:lnTo>
+                <a:lnTo>
+                  <a:pt x="0" y="120000"/>
+                </a:lnTo>
+                <a:close/>
+              </a:path>
+            </a:pathLst>
+          </a:custGeom>
+        </p:spPr>
+      </p:sp>
+      <p:sp>
+        <p:nvSpPr>
+          <p:cNvPr id="132" name="Google Shape;132;g8fb1f6987e_1_7:notes"/>
+          <p:cNvSpPr txBox="1"/>
+          <p:nvPr>
+            <p:ph idx="1" type="body"/>
+          </p:nvPr>
+        </p:nvSpPr>
+        <p:spPr>
+          <a:xfrm>
+            <a:off x="685800" y="4343400"/>
+            <a:ext cx="5486400" cy="4114800"/>
+          </a:xfrm>
+          <a:prstGeom prst="rect">
+            <a:avLst/>
+          </a:prstGeom>
+        </p:spPr>
+        <p:txBody>
+          <a:bodyPr anchorCtr="0" anchor="t" bIns="91425" lIns="91425" spcFirstLastPara="1" rIns="91425" wrap="square" tIns="91425">
+            <a:noAutofit/>
+          </a:bodyPr>
+          <a:lstStyle/>
+          <a:p>
+            <a:pPr indent="0" lvl="0" marL="0" rtl="0" algn="l">
+              <a:spcBef>
+                <a:spcPts val="0"/>
+              </a:spcBef>
+              <a:spcAft>
+                <a:spcPts val="0"/>
+              </a:spcAft>
+              <a:buNone/>
+            </a:pPr>
+            <a:r>
+              <a:t/>
+            </a:r>
+            <a:endParaRPr/>
+          </a:p>
+        </p:txBody>
+      </p:sp>
+    </p:spTree>
+  </p:cSld>
+  <p:clrMapOvr>
+    <a:masterClrMapping/>
+  </p:clrMapOvr>
+</p:notes>
+</file>
+
+<file path=ppt/notesSlides/notesSlide12.xml><?xml version="1.0" encoding="utf-8"?>
+<p:notes xmlns:a="http://schemas.openxmlformats.org/drawingml/2006/main" xmlns:r="http://schemas.openxmlformats.org/officeDocument/2006/relationships" xmlns:mc="http://schemas.openxmlformats.org/markup-compatibility/2006" xmlns:mv="urn:schemas-microsoft-com:mac:vml" xmlns:p="http://schemas.openxmlformats.org/presentationml/2006/main" xmlns:c="http://schemas.openxmlformats.org/drawingml/2006/chart" xmlns:dgm="http://schemas.openxmlformats.org/drawingml/2006/diagram" xmlns:o="urn:schemas-microsoft-com:office:office" xmlns:v="urn:schemas-microsoft-com:vml" xmlns:pvml="urn:schemas-microsoft-com:office:powerpoint" xmlns:com="http://schemas.openxmlformats.org/drawingml/2006/compatibility" xmlns:p14="http://schemas.microsoft.com/office/powerpoint/2010/main" xmlns:p15="http://schemas.microsoft.com/office/powerpoint/2012/main" xmlns:ahyp="http://schemas.microsoft.com/office/drawing/2018/hyperlinkcolor" showMasterPhAnim="0" showMasterSp="0">
+  <p:cSld>
+    <p:spTree>
+      <p:nvGrpSpPr>
+        <p:cNvPr id="136" name="Shape 136"/>
+        <p:cNvGrpSpPr/>
+        <p:nvPr/>
+      </p:nvGrpSpPr>
+      <p:grpSpPr>
+        <a:xfrm>
+          <a:off x="0" y="0"/>
+          <a:ext cx="0" cy="0"/>
+          <a:chOff x="0" y="0"/>
+          <a:chExt cx="0" cy="0"/>
+        </a:xfrm>
+      </p:grpSpPr>
+      <p:sp>
+        <p:nvSpPr>
+          <p:cNvPr id="137" name="Google Shape;137;g8c35b87562_0_3:notes"/>
+          <p:cNvSpPr/>
+          <p:nvPr>
+            <p:ph idx="2" type="sldImg"/>
+          </p:nvPr>
+        </p:nvSpPr>
+        <p:spPr>
+          <a:xfrm>
+            <a:off x="381300" y="685800"/>
+            <a:ext cx="6096000" cy="3429000"/>
+          </a:xfrm>
+          <a:custGeom>
+            <a:rect b="b" l="l" r="r" t="t"/>
+            <a:pathLst>
+              <a:path extrusionOk="0" h="120000" w="120000">
+                <a:moveTo>
+                  <a:pt x="0" y="0"/>
+                </a:moveTo>
+                <a:lnTo>
+                  <a:pt x="120000" y="0"/>
+                </a:lnTo>
+                <a:lnTo>
+                  <a:pt x="120000" y="120000"/>
+                </a:lnTo>
+                <a:lnTo>
+                  <a:pt x="0" y="120000"/>
+                </a:lnTo>
+                <a:close/>
+              </a:path>
+            </a:pathLst>
+          </a:custGeom>
+        </p:spPr>
+      </p:sp>
+      <p:sp>
+        <p:nvSpPr>
+          <p:cNvPr id="138" name="Google Shape;138;g8c35b87562_0_3:notes"/>
+          <p:cNvSpPr txBox="1"/>
+          <p:nvPr>
+            <p:ph idx="1" type="body"/>
+          </p:nvPr>
+        </p:nvSpPr>
+        <p:spPr>
+          <a:xfrm>
+            <a:off x="685800" y="4343400"/>
+            <a:ext cx="5486400" cy="4114800"/>
+          </a:xfrm>
+          <a:prstGeom prst="rect">
+            <a:avLst/>
+          </a:prstGeom>
+        </p:spPr>
+        <p:txBody>
+          <a:bodyPr anchorCtr="0" anchor="t" bIns="91425" lIns="91425" spcFirstLastPara="1" rIns="91425" wrap="square" tIns="91425">
+            <a:noAutofit/>
+          </a:bodyPr>
+          <a:lstStyle/>
+          <a:p>
+            <a:pPr indent="0" lvl="0" marL="0" rtl="0" algn="l">
+              <a:spcBef>
+                <a:spcPts val="0"/>
+              </a:spcBef>
+              <a:spcAft>
+                <a:spcPts val="0"/>
+              </a:spcAft>
+              <a:buNone/>
+            </a:pPr>
+            <a:r>
+              <a:t/>
+            </a:r>
+            <a:endParaRPr/>
+          </a:p>
+        </p:txBody>
+      </p:sp>
+    </p:spTree>
+  </p:cSld>
+  <p:clrMapOvr>
+    <a:masterClrMapping/>
+  </p:clrMapOvr>
+</p:notes>
+</file>
+
 <file path=ppt/notesSlides/notesSlide2.xml><?xml version="1.0" encoding="utf-8"?>
-<p:notes xmlns:a="http://schemas.openxmlformats.org/drawingml/2006/main" xmlns:r="http://schemas.openxmlformats.org/officeDocument/2006/relationships" xmlns:mc="http://schemas.openxmlformats.org/markup-compatibility/2006" xmlns:mv="urn:schemas-microsoft-com:mac:vml" xmlns:p="http://schemas.openxmlformats.org/presentationml/2006/main" xmlns:c="http://schemas.openxmlformats.org/drawingml/2006/chart" xmlns:dgm="http://schemas.openxmlformats.org/drawingml/2006/diagram" xmlns:o="urn:schemas-microsoft-com:office:office" xmlns:v="urn:schemas-microsoft-com:vml" xmlns:pvml="urn:schemas-microsoft-com:office:powerpoint" xmlns:com="http://schemas.openxmlformats.org/drawingml/2006/compatibility" xmlns:p14="http://schemas.microsoft.com/office/powerpoint/2010/main" xmlns:p15="http://schemas.microsoft.com/office/powerpoint/2012/main" showMasterPhAnim="0" showMasterSp="0">
+<p:notes xmlns:a="http://schemas.openxmlformats.org/drawingml/2006/main" xmlns:r="http://schemas.openxmlformats.org/officeDocument/2006/relationships" xmlns:mc="http://schemas.openxmlformats.org/markup-compatibility/2006" xmlns:mv="urn:schemas-microsoft-com:mac:vml" xmlns:p="http://schemas.openxmlformats.org/presentationml/2006/main" xmlns:c="http://schemas.openxmlformats.org/drawingml/2006/chart" xmlns:dgm="http://schemas.openxmlformats.org/drawingml/2006/diagram" xmlns:o="urn:schemas-microsoft-com:office:office" xmlns:v="urn:schemas-microsoft-com:vml" xmlns:pvml="urn:schemas-microsoft-com:office:powerpoint" xmlns:com="http://schemas.openxmlformats.org/drawingml/2006/compatibility" xmlns:p14="http://schemas.microsoft.com/office/powerpoint/2010/main" xmlns:p15="http://schemas.microsoft.com/office/powerpoint/2012/main" xmlns:ahyp="http://schemas.microsoft.com/office/drawing/2018/hyperlinkcolor" showMasterPhAnim="0" showMasterSp="0">
   <p:cSld>
     <p:spTree>
       <p:nvGrpSpPr>
@@ -893,7 +1193,7 @@
 </file>
 
 <file path=ppt/notesSlides/notesSlide3.xml><?xml version="1.0" encoding="utf-8"?>
-<p:notes xmlns:a="http://schemas.openxmlformats.org/drawingml/2006/main" xmlns:r="http://schemas.openxmlformats.org/officeDocument/2006/relationships" xmlns:mc="http://schemas.openxmlformats.org/markup-compatibility/2006" xmlns:mv="urn:schemas-microsoft-com:mac:vml" xmlns:p="http://schemas.openxmlformats.org/presentationml/2006/main" xmlns:c="http://schemas.openxmlformats.org/drawingml/2006/chart" xmlns:dgm="http://schemas.openxmlformats.org/drawingml/2006/diagram" xmlns:o="urn:schemas-microsoft-com:office:office" xmlns:v="urn:schemas-microsoft-com:vml" xmlns:pvml="urn:schemas-microsoft-com:office:powerpoint" xmlns:com="http://schemas.openxmlformats.org/drawingml/2006/compatibility" xmlns:p14="http://schemas.microsoft.com/office/powerpoint/2010/main" xmlns:p15="http://schemas.microsoft.com/office/powerpoint/2012/main" showMasterPhAnim="0" showMasterSp="0">
+<p:notes xmlns:a="http://schemas.openxmlformats.org/drawingml/2006/main" xmlns:r="http://schemas.openxmlformats.org/officeDocument/2006/relationships" xmlns:mc="http://schemas.openxmlformats.org/markup-compatibility/2006" xmlns:mv="urn:schemas-microsoft-com:mac:vml" xmlns:p="http://schemas.openxmlformats.org/presentationml/2006/main" xmlns:c="http://schemas.openxmlformats.org/drawingml/2006/chart" xmlns:dgm="http://schemas.openxmlformats.org/drawingml/2006/diagram" xmlns:o="urn:schemas-microsoft-com:office:office" xmlns:v="urn:schemas-microsoft-com:vml" xmlns:pvml="urn:schemas-microsoft-com:office:powerpoint" xmlns:com="http://schemas.openxmlformats.org/drawingml/2006/compatibility" xmlns:p14="http://schemas.microsoft.com/office/powerpoint/2010/main" xmlns:p15="http://schemas.microsoft.com/office/powerpoint/2012/main" xmlns:ahyp="http://schemas.microsoft.com/office/drawing/2018/hyperlinkcolor" showMasterPhAnim="0" showMasterSp="0">
   <p:cSld>
     <p:spTree>
       <p:nvGrpSpPr>
@@ -992,7 +1292,7 @@
 </file>
 
 <file path=ppt/notesSlides/notesSlide4.xml><?xml version="1.0" encoding="utf-8"?>
-<p:notes xmlns:a="http://schemas.openxmlformats.org/drawingml/2006/main" xmlns:r="http://schemas.openxmlformats.org/officeDocument/2006/relationships" xmlns:mc="http://schemas.openxmlformats.org/markup-compatibility/2006" xmlns:mv="urn:schemas-microsoft-com:mac:vml" xmlns:p="http://schemas.openxmlformats.org/presentationml/2006/main" xmlns:c="http://schemas.openxmlformats.org/drawingml/2006/chart" xmlns:dgm="http://schemas.openxmlformats.org/drawingml/2006/diagram" xmlns:o="urn:schemas-microsoft-com:office:office" xmlns:v="urn:schemas-microsoft-com:vml" xmlns:pvml="urn:schemas-microsoft-com:office:powerpoint" xmlns:com="http://schemas.openxmlformats.org/drawingml/2006/compatibility" xmlns:p14="http://schemas.microsoft.com/office/powerpoint/2010/main" xmlns:p15="http://schemas.microsoft.com/office/powerpoint/2012/main" showMasterPhAnim="0" showMasterSp="0">
+<p:notes xmlns:a="http://schemas.openxmlformats.org/drawingml/2006/main" xmlns:r="http://schemas.openxmlformats.org/officeDocument/2006/relationships" xmlns:mc="http://schemas.openxmlformats.org/markup-compatibility/2006" xmlns:mv="urn:schemas-microsoft-com:mac:vml" xmlns:p="http://schemas.openxmlformats.org/presentationml/2006/main" xmlns:c="http://schemas.openxmlformats.org/drawingml/2006/chart" xmlns:dgm="http://schemas.openxmlformats.org/drawingml/2006/diagram" xmlns:o="urn:schemas-microsoft-com:office:office" xmlns:v="urn:schemas-microsoft-com:vml" xmlns:pvml="urn:schemas-microsoft-com:office:powerpoint" xmlns:com="http://schemas.openxmlformats.org/drawingml/2006/compatibility" xmlns:p14="http://schemas.microsoft.com/office/powerpoint/2010/main" xmlns:p15="http://schemas.microsoft.com/office/powerpoint/2012/main" xmlns:ahyp="http://schemas.microsoft.com/office/drawing/2018/hyperlinkcolor" showMasterPhAnim="0" showMasterSp="0">
   <p:cSld>
     <p:spTree>
       <p:nvGrpSpPr>
@@ -1091,11 +1391,11 @@
 </file>
 
 <file path=ppt/notesSlides/notesSlide5.xml><?xml version="1.0" encoding="utf-8"?>
-<p:notes xmlns:a="http://schemas.openxmlformats.org/drawingml/2006/main" xmlns:r="http://schemas.openxmlformats.org/officeDocument/2006/relationships" xmlns:mc="http://schemas.openxmlformats.org/markup-compatibility/2006" xmlns:mv="urn:schemas-microsoft-com:mac:vml" xmlns:p="http://schemas.openxmlformats.org/presentationml/2006/main" xmlns:c="http://schemas.openxmlformats.org/drawingml/2006/chart" xmlns:dgm="http://schemas.openxmlformats.org/drawingml/2006/diagram" xmlns:o="urn:schemas-microsoft-com:office:office" xmlns:v="urn:schemas-microsoft-com:vml" xmlns:pvml="urn:schemas-microsoft-com:office:powerpoint" xmlns:com="http://schemas.openxmlformats.org/drawingml/2006/compatibility" xmlns:p14="http://schemas.microsoft.com/office/powerpoint/2010/main" xmlns:p15="http://schemas.microsoft.com/office/powerpoint/2012/main" showMasterPhAnim="0" showMasterSp="0">
+<p:notes xmlns:a="http://schemas.openxmlformats.org/drawingml/2006/main" xmlns:r="http://schemas.openxmlformats.org/officeDocument/2006/relationships" xmlns:mc="http://schemas.openxmlformats.org/markup-compatibility/2006" xmlns:mv="urn:schemas-microsoft-com:mac:vml" xmlns:p="http://schemas.openxmlformats.org/presentationml/2006/main" xmlns:c="http://schemas.openxmlformats.org/drawingml/2006/chart" xmlns:dgm="http://schemas.openxmlformats.org/drawingml/2006/diagram" xmlns:o="urn:schemas-microsoft-com:office:office" xmlns:v="urn:schemas-microsoft-com:vml" xmlns:pvml="urn:schemas-microsoft-com:office:powerpoint" xmlns:com="http://schemas.openxmlformats.org/drawingml/2006/compatibility" xmlns:p14="http://schemas.microsoft.com/office/powerpoint/2010/main" xmlns:p15="http://schemas.microsoft.com/office/powerpoint/2012/main" xmlns:ahyp="http://schemas.microsoft.com/office/drawing/2018/hyperlinkcolor" showMasterPhAnim="0" showMasterSp="0">
   <p:cSld>
     <p:spTree>
       <p:nvGrpSpPr>
-        <p:cNvPr id="79" name="Shape 79"/>
+        <p:cNvPr id="80" name="Shape 80"/>
         <p:cNvGrpSpPr/>
         <p:nvPr/>
       </p:nvGrpSpPr>
@@ -1109,7 +1409,7 @@
       </p:grpSpPr>
       <p:sp>
         <p:nvSpPr>
-          <p:cNvPr id="80" name="Google Shape;80;g8c35b87562_0_30:notes"/>
+          <p:cNvPr id="81" name="Google Shape;81;g8c35b87562_0_30:notes"/>
           <p:cNvSpPr/>
           <p:nvPr>
             <p:ph idx="2" type="sldImg"/>
@@ -1144,7 +1444,7 @@
       </p:sp>
       <p:sp>
         <p:nvSpPr>
-          <p:cNvPr id="81" name="Google Shape;81;g8c35b87562_0_30:notes"/>
+          <p:cNvPr id="82" name="Google Shape;82;g8c35b87562_0_30:notes"/>
           <p:cNvSpPr txBox="1"/>
           <p:nvPr>
             <p:ph idx="1" type="body"/>
@@ -1190,11 +1490,11 @@
 </file>
 
 <file path=ppt/notesSlides/notesSlide6.xml><?xml version="1.0" encoding="utf-8"?>
-<p:notes xmlns:a="http://schemas.openxmlformats.org/drawingml/2006/main" xmlns:r="http://schemas.openxmlformats.org/officeDocument/2006/relationships" xmlns:mc="http://schemas.openxmlformats.org/markup-compatibility/2006" xmlns:mv="urn:schemas-microsoft-com:mac:vml" xmlns:p="http://schemas.openxmlformats.org/presentationml/2006/main" xmlns:c="http://schemas.openxmlformats.org/drawingml/2006/chart" xmlns:dgm="http://schemas.openxmlformats.org/drawingml/2006/diagram" xmlns:o="urn:schemas-microsoft-com:office:office" xmlns:v="urn:schemas-microsoft-com:vml" xmlns:pvml="urn:schemas-microsoft-com:office:powerpoint" xmlns:com="http://schemas.openxmlformats.org/drawingml/2006/compatibility" xmlns:p14="http://schemas.microsoft.com/office/powerpoint/2010/main" xmlns:p15="http://schemas.microsoft.com/office/powerpoint/2012/main" showMasterPhAnim="0" showMasterSp="0">
+<p:notes xmlns:a="http://schemas.openxmlformats.org/drawingml/2006/main" xmlns:r="http://schemas.openxmlformats.org/officeDocument/2006/relationships" xmlns:mc="http://schemas.openxmlformats.org/markup-compatibility/2006" xmlns:mv="urn:schemas-microsoft-com:mac:vml" xmlns:p="http://schemas.openxmlformats.org/presentationml/2006/main" xmlns:c="http://schemas.openxmlformats.org/drawingml/2006/chart" xmlns:dgm="http://schemas.openxmlformats.org/drawingml/2006/diagram" xmlns:o="urn:schemas-microsoft-com:office:office" xmlns:v="urn:schemas-microsoft-com:vml" xmlns:pvml="urn:schemas-microsoft-com:office:powerpoint" xmlns:com="http://schemas.openxmlformats.org/drawingml/2006/compatibility" xmlns:p14="http://schemas.microsoft.com/office/powerpoint/2010/main" xmlns:p15="http://schemas.microsoft.com/office/powerpoint/2012/main" xmlns:ahyp="http://schemas.microsoft.com/office/drawing/2018/hyperlinkcolor" showMasterPhAnim="0" showMasterSp="0">
   <p:cSld>
     <p:spTree>
       <p:nvGrpSpPr>
-        <p:cNvPr id="88" name="Shape 88"/>
+        <p:cNvPr id="89" name="Shape 89"/>
         <p:cNvGrpSpPr/>
         <p:nvPr/>
       </p:nvGrpSpPr>
@@ -1208,7 +1508,7 @@
       </p:grpSpPr>
       <p:sp>
         <p:nvSpPr>
-          <p:cNvPr id="89" name="Google Shape;89;g8c45306dad_0_19:notes"/>
+          <p:cNvPr id="90" name="Google Shape;90;g8c45306dad_0_19:notes"/>
           <p:cNvSpPr/>
           <p:nvPr>
             <p:ph idx="2" type="sldImg"/>
@@ -1243,7 +1543,7 @@
       </p:sp>
       <p:sp>
         <p:nvSpPr>
-          <p:cNvPr id="90" name="Google Shape;90;g8c45306dad_0_19:notes"/>
+          <p:cNvPr id="91" name="Google Shape;91;g8c45306dad_0_19:notes"/>
           <p:cNvSpPr txBox="1"/>
           <p:nvPr>
             <p:ph idx="1" type="body"/>
@@ -1289,11 +1589,11 @@
 </file>
 
 <file path=ppt/notesSlides/notesSlide7.xml><?xml version="1.0" encoding="utf-8"?>
-<p:notes xmlns:a="http://schemas.openxmlformats.org/drawingml/2006/main" xmlns:r="http://schemas.openxmlformats.org/officeDocument/2006/relationships" xmlns:mc="http://schemas.openxmlformats.org/markup-compatibility/2006" xmlns:mv="urn:schemas-microsoft-com:mac:vml" xmlns:p="http://schemas.openxmlformats.org/presentationml/2006/main" xmlns:c="http://schemas.openxmlformats.org/drawingml/2006/chart" xmlns:dgm="http://schemas.openxmlformats.org/drawingml/2006/diagram" xmlns:o="urn:schemas-microsoft-com:office:office" xmlns:v="urn:schemas-microsoft-com:vml" xmlns:pvml="urn:schemas-microsoft-com:office:powerpoint" xmlns:com="http://schemas.openxmlformats.org/drawingml/2006/compatibility" xmlns:p14="http://schemas.microsoft.com/office/powerpoint/2010/main" xmlns:p15="http://schemas.microsoft.com/office/powerpoint/2012/main" showMasterPhAnim="0" showMasterSp="0">
+<p:notes xmlns:a="http://schemas.openxmlformats.org/drawingml/2006/main" xmlns:r="http://schemas.openxmlformats.org/officeDocument/2006/relationships" xmlns:mc="http://schemas.openxmlformats.org/markup-compatibility/2006" xmlns:mv="urn:schemas-microsoft-com:mac:vml" xmlns:p="http://schemas.openxmlformats.org/presentationml/2006/main" xmlns:c="http://schemas.openxmlformats.org/drawingml/2006/chart" xmlns:dgm="http://schemas.openxmlformats.org/drawingml/2006/diagram" xmlns:o="urn:schemas-microsoft-com:office:office" xmlns:v="urn:schemas-microsoft-com:vml" xmlns:pvml="urn:schemas-microsoft-com:office:powerpoint" xmlns:com="http://schemas.openxmlformats.org/drawingml/2006/compatibility" xmlns:p14="http://schemas.microsoft.com/office/powerpoint/2010/main" xmlns:p15="http://schemas.microsoft.com/office/powerpoint/2012/main" xmlns:ahyp="http://schemas.microsoft.com/office/drawing/2018/hyperlinkcolor" showMasterPhAnim="0" showMasterSp="0">
   <p:cSld>
     <p:spTree>
       <p:nvGrpSpPr>
-        <p:cNvPr id="95" name="Shape 95"/>
+        <p:cNvPr id="96" name="Shape 96"/>
         <p:cNvGrpSpPr/>
         <p:nvPr/>
       </p:nvGrpSpPr>
@@ -1307,7 +1607,7 @@
       </p:grpSpPr>
       <p:sp>
         <p:nvSpPr>
-          <p:cNvPr id="96" name="Google Shape;96;g8dcc881f7e_0_17:notes"/>
+          <p:cNvPr id="97" name="Google Shape;97;g8dcc881f7e_0_17:notes"/>
           <p:cNvSpPr/>
           <p:nvPr>
             <p:ph idx="2" type="sldImg"/>
@@ -1342,7 +1642,7 @@
       </p:sp>
       <p:sp>
         <p:nvSpPr>
-          <p:cNvPr id="97" name="Google Shape;97;g8dcc881f7e_0_17:notes"/>
+          <p:cNvPr id="98" name="Google Shape;98;g8dcc881f7e_0_17:notes"/>
           <p:cNvSpPr txBox="1"/>
           <p:nvPr>
             <p:ph idx="1" type="body"/>
@@ -1388,11 +1688,11 @@
 </file>
 
 <file path=ppt/notesSlides/notesSlide8.xml><?xml version="1.0" encoding="utf-8"?>
-<p:notes xmlns:a="http://schemas.openxmlformats.org/drawingml/2006/main" xmlns:r="http://schemas.openxmlformats.org/officeDocument/2006/relationships" xmlns:mc="http://schemas.openxmlformats.org/markup-compatibility/2006" xmlns:mv="urn:schemas-microsoft-com:mac:vml" xmlns:p="http://schemas.openxmlformats.org/presentationml/2006/main" xmlns:c="http://schemas.openxmlformats.org/drawingml/2006/chart" xmlns:dgm="http://schemas.openxmlformats.org/drawingml/2006/diagram" xmlns:o="urn:schemas-microsoft-com:office:office" xmlns:v="urn:schemas-microsoft-com:vml" xmlns:pvml="urn:schemas-microsoft-com:office:powerpoint" xmlns:com="http://schemas.openxmlformats.org/drawingml/2006/compatibility" xmlns:p14="http://schemas.microsoft.com/office/powerpoint/2010/main" xmlns:p15="http://schemas.microsoft.com/office/powerpoint/2012/main" showMasterPhAnim="0" showMasterSp="0">
+<p:notes xmlns:a="http://schemas.openxmlformats.org/drawingml/2006/main" xmlns:r="http://schemas.openxmlformats.org/officeDocument/2006/relationships" xmlns:mc="http://schemas.openxmlformats.org/markup-compatibility/2006" xmlns:mv="urn:schemas-microsoft-com:mac:vml" xmlns:p="http://schemas.openxmlformats.org/presentationml/2006/main" xmlns:c="http://schemas.openxmlformats.org/drawingml/2006/chart" xmlns:dgm="http://schemas.openxmlformats.org/drawingml/2006/diagram" xmlns:o="urn:schemas-microsoft-com:office:office" xmlns:v="urn:schemas-microsoft-com:vml" xmlns:pvml="urn:schemas-microsoft-com:office:powerpoint" xmlns:com="http://schemas.openxmlformats.org/drawingml/2006/compatibility" xmlns:p14="http://schemas.microsoft.com/office/powerpoint/2010/main" xmlns:p15="http://schemas.microsoft.com/office/powerpoint/2012/main" xmlns:ahyp="http://schemas.microsoft.com/office/drawing/2018/hyperlinkcolor" showMasterPhAnim="0" showMasterSp="0">
   <p:cSld>
     <p:spTree>
       <p:nvGrpSpPr>
-        <p:cNvPr id="108" name="Shape 108"/>
+        <p:cNvPr id="109" name="Shape 109"/>
         <p:cNvGrpSpPr/>
         <p:nvPr/>
       </p:nvGrpSpPr>
@@ -1406,7 +1706,7 @@
       </p:grpSpPr>
       <p:sp>
         <p:nvSpPr>
-          <p:cNvPr id="109" name="Google Shape;109;g8dd82441ea_0_0:notes"/>
+          <p:cNvPr id="110" name="Google Shape;110;g8fb1f6987e_0_12:notes"/>
           <p:cNvSpPr/>
           <p:nvPr>
             <p:ph idx="2" type="sldImg"/>
@@ -1441,7 +1741,7 @@
       </p:sp>
       <p:sp>
         <p:nvSpPr>
-          <p:cNvPr id="110" name="Google Shape;110;g8dd82441ea_0_0:notes"/>
+          <p:cNvPr id="111" name="Google Shape;111;g8fb1f6987e_0_12:notes"/>
           <p:cNvSpPr txBox="1"/>
           <p:nvPr>
             <p:ph idx="1" type="body"/>
@@ -1487,11 +1787,11 @@
 </file>
 
 <file path=ppt/notesSlides/notesSlide9.xml><?xml version="1.0" encoding="utf-8"?>
-<p:notes xmlns:a="http://schemas.openxmlformats.org/drawingml/2006/main" xmlns:r="http://schemas.openxmlformats.org/officeDocument/2006/relationships" xmlns:mc="http://schemas.openxmlformats.org/markup-compatibility/2006" xmlns:mv="urn:schemas-microsoft-com:mac:vml" xmlns:p="http://schemas.openxmlformats.org/presentationml/2006/main" xmlns:c="http://schemas.openxmlformats.org/drawingml/2006/chart" xmlns:dgm="http://schemas.openxmlformats.org/drawingml/2006/diagram" xmlns:o="urn:schemas-microsoft-com:office:office" xmlns:v="urn:schemas-microsoft-com:vml" xmlns:pvml="urn:schemas-microsoft-com:office:powerpoint" xmlns:com="http://schemas.openxmlformats.org/drawingml/2006/compatibility" xmlns:p14="http://schemas.microsoft.com/office/powerpoint/2010/main" xmlns:p15="http://schemas.microsoft.com/office/powerpoint/2012/main" showMasterPhAnim="0" showMasterSp="0">
+<p:notes xmlns:a="http://schemas.openxmlformats.org/drawingml/2006/main" xmlns:r="http://schemas.openxmlformats.org/officeDocument/2006/relationships" xmlns:mc="http://schemas.openxmlformats.org/markup-compatibility/2006" xmlns:mv="urn:schemas-microsoft-com:mac:vml" xmlns:p="http://schemas.openxmlformats.org/presentationml/2006/main" xmlns:c="http://schemas.openxmlformats.org/drawingml/2006/chart" xmlns:dgm="http://schemas.openxmlformats.org/drawingml/2006/diagram" xmlns:o="urn:schemas-microsoft-com:office:office" xmlns:v="urn:schemas-microsoft-com:vml" xmlns:pvml="urn:schemas-microsoft-com:office:powerpoint" xmlns:com="http://schemas.openxmlformats.org/drawingml/2006/compatibility" xmlns:p14="http://schemas.microsoft.com/office/powerpoint/2010/main" xmlns:p15="http://schemas.microsoft.com/office/powerpoint/2012/main" xmlns:ahyp="http://schemas.microsoft.com/office/drawing/2018/hyperlinkcolor" showMasterPhAnim="0" showMasterSp="0">
   <p:cSld>
     <p:spTree>
       <p:nvGrpSpPr>
-        <p:cNvPr id="114" name="Shape 114"/>
+        <p:cNvPr id="116" name="Shape 116"/>
         <p:cNvGrpSpPr/>
         <p:nvPr/>
       </p:nvGrpSpPr>
@@ -1505,7 +1805,7 @@
       </p:grpSpPr>
       <p:sp>
         <p:nvSpPr>
-          <p:cNvPr id="115" name="Google Shape;115;g8c35b87562_0_3:notes"/>
+          <p:cNvPr id="117" name="Google Shape;117;g8fb1f6987e_0_48:notes"/>
           <p:cNvSpPr/>
           <p:nvPr>
             <p:ph idx="2" type="sldImg"/>
@@ -1540,7 +1840,7 @@
       </p:sp>
       <p:sp>
         <p:nvSpPr>
-          <p:cNvPr id="116" name="Google Shape;116;g8c35b87562_0_3:notes"/>
+          <p:cNvPr id="118" name="Google Shape;118;g8fb1f6987e_0_48:notes"/>
           <p:cNvSpPr txBox="1"/>
           <p:nvPr>
             <p:ph idx="1" type="body"/>
@@ -1586,7 +1886,7 @@
 </file>
 
 <file path=ppt/slideLayouts/slideLayout1.xml><?xml version="1.0" encoding="utf-8"?>
-<p:sldLayout xmlns:a="http://schemas.openxmlformats.org/drawingml/2006/main" xmlns:r="http://schemas.openxmlformats.org/officeDocument/2006/relationships" xmlns:mc="http://schemas.openxmlformats.org/markup-compatibility/2006" xmlns:mv="urn:schemas-microsoft-com:mac:vml" xmlns:p="http://schemas.openxmlformats.org/presentationml/2006/main" xmlns:c="http://schemas.openxmlformats.org/drawingml/2006/chart" xmlns:dgm="http://schemas.openxmlformats.org/drawingml/2006/diagram" xmlns:o="urn:schemas-microsoft-com:office:office" xmlns:v="urn:schemas-microsoft-com:vml" xmlns:pvml="urn:schemas-microsoft-com:office:powerpoint" xmlns:com="http://schemas.openxmlformats.org/drawingml/2006/compatibility" xmlns:p14="http://schemas.microsoft.com/office/powerpoint/2010/main" xmlns:p15="http://schemas.microsoft.com/office/powerpoint/2012/main" matchingName="Title slide" type="title">
+<p:sldLayout xmlns:a="http://schemas.openxmlformats.org/drawingml/2006/main" xmlns:r="http://schemas.openxmlformats.org/officeDocument/2006/relationships" xmlns:mc="http://schemas.openxmlformats.org/markup-compatibility/2006" xmlns:mv="urn:schemas-microsoft-com:mac:vml" xmlns:p="http://schemas.openxmlformats.org/presentationml/2006/main" xmlns:c="http://schemas.openxmlformats.org/drawingml/2006/chart" xmlns:dgm="http://schemas.openxmlformats.org/drawingml/2006/diagram" xmlns:o="urn:schemas-microsoft-com:office:office" xmlns:v="urn:schemas-microsoft-com:vml" xmlns:pvml="urn:schemas-microsoft-com:office:powerpoint" xmlns:com="http://schemas.openxmlformats.org/drawingml/2006/compatibility" xmlns:p14="http://schemas.microsoft.com/office/powerpoint/2010/main" xmlns:p15="http://schemas.microsoft.com/office/powerpoint/2012/main" xmlns:ahyp="http://schemas.microsoft.com/office/drawing/2018/hyperlinkcolor" matchingName="Title slide" type="title">
   <p:cSld name="TITLE">
     <p:spTree>
       <p:nvGrpSpPr>
@@ -1965,7 +2265,7 @@
 </file>
 
 <file path=ppt/slideLayouts/slideLayout10.xml><?xml version="1.0" encoding="utf-8"?>
-<p:sldLayout xmlns:a="http://schemas.openxmlformats.org/drawingml/2006/main" xmlns:r="http://schemas.openxmlformats.org/officeDocument/2006/relationships" xmlns:mc="http://schemas.openxmlformats.org/markup-compatibility/2006" xmlns:mv="urn:schemas-microsoft-com:mac:vml" xmlns:p="http://schemas.openxmlformats.org/presentationml/2006/main" xmlns:c="http://schemas.openxmlformats.org/drawingml/2006/chart" xmlns:dgm="http://schemas.openxmlformats.org/drawingml/2006/diagram" xmlns:o="urn:schemas-microsoft-com:office:office" xmlns:v="urn:schemas-microsoft-com:vml" xmlns:pvml="urn:schemas-microsoft-com:office:powerpoint" xmlns:com="http://schemas.openxmlformats.org/drawingml/2006/compatibility" xmlns:p14="http://schemas.microsoft.com/office/powerpoint/2010/main" xmlns:p15="http://schemas.microsoft.com/office/powerpoint/2012/main" matchingName="Big number">
+<p:sldLayout xmlns:a="http://schemas.openxmlformats.org/drawingml/2006/main" xmlns:r="http://schemas.openxmlformats.org/officeDocument/2006/relationships" xmlns:mc="http://schemas.openxmlformats.org/markup-compatibility/2006" xmlns:mv="urn:schemas-microsoft-com:mac:vml" xmlns:p="http://schemas.openxmlformats.org/presentationml/2006/main" xmlns:c="http://schemas.openxmlformats.org/drawingml/2006/chart" xmlns:dgm="http://schemas.openxmlformats.org/drawingml/2006/diagram" xmlns:o="urn:schemas-microsoft-com:office:office" xmlns:v="urn:schemas-microsoft-com:vml" xmlns:pvml="urn:schemas-microsoft-com:office:powerpoint" xmlns:com="http://schemas.openxmlformats.org/drawingml/2006/compatibility" xmlns:p14="http://schemas.microsoft.com/office/powerpoint/2010/main" xmlns:p15="http://schemas.microsoft.com/office/powerpoint/2012/main" xmlns:ahyp="http://schemas.microsoft.com/office/drawing/2018/hyperlinkcolor" matchingName="Big number">
   <p:cSld name="BIG_NUMBER">
     <p:spTree>
       <p:nvGrpSpPr>
@@ -2321,7 +2621,7 @@
 </file>
 
 <file path=ppt/slideLayouts/slideLayout11.xml><?xml version="1.0" encoding="utf-8"?>
-<p:sldLayout xmlns:a="http://schemas.openxmlformats.org/drawingml/2006/main" xmlns:r="http://schemas.openxmlformats.org/officeDocument/2006/relationships" xmlns:mc="http://schemas.openxmlformats.org/markup-compatibility/2006" xmlns:mv="urn:schemas-microsoft-com:mac:vml" xmlns:p="http://schemas.openxmlformats.org/presentationml/2006/main" xmlns:c="http://schemas.openxmlformats.org/drawingml/2006/chart" xmlns:dgm="http://schemas.openxmlformats.org/drawingml/2006/diagram" xmlns:o="urn:schemas-microsoft-com:office:office" xmlns:v="urn:schemas-microsoft-com:vml" xmlns:pvml="urn:schemas-microsoft-com:office:powerpoint" xmlns:com="http://schemas.openxmlformats.org/drawingml/2006/compatibility" xmlns:p14="http://schemas.microsoft.com/office/powerpoint/2010/main" xmlns:p15="http://schemas.microsoft.com/office/powerpoint/2012/main" matchingName="Blank" type="blank">
+<p:sldLayout xmlns:a="http://schemas.openxmlformats.org/drawingml/2006/main" xmlns:r="http://schemas.openxmlformats.org/officeDocument/2006/relationships" xmlns:mc="http://schemas.openxmlformats.org/markup-compatibility/2006" xmlns:mv="urn:schemas-microsoft-com:mac:vml" xmlns:p="http://schemas.openxmlformats.org/presentationml/2006/main" xmlns:c="http://schemas.openxmlformats.org/drawingml/2006/chart" xmlns:dgm="http://schemas.openxmlformats.org/drawingml/2006/diagram" xmlns:o="urn:schemas-microsoft-com:office:office" xmlns:v="urn:schemas-microsoft-com:vml" xmlns:pvml="urn:schemas-microsoft-com:office:powerpoint" xmlns:com="http://schemas.openxmlformats.org/drawingml/2006/compatibility" xmlns:p14="http://schemas.microsoft.com/office/powerpoint/2010/main" xmlns:p15="http://schemas.microsoft.com/office/powerpoint/2012/main" xmlns:ahyp="http://schemas.microsoft.com/office/drawing/2018/hyperlinkcolor" matchingName="Blank" type="blank">
   <p:cSld name="BLANK">
     <p:spTree>
       <p:nvGrpSpPr>
@@ -2423,7 +2723,7 @@
 </file>
 
 <file path=ppt/slideLayouts/slideLayout2.xml><?xml version="1.0" encoding="utf-8"?>
-<p:sldLayout xmlns:a="http://schemas.openxmlformats.org/drawingml/2006/main" xmlns:r="http://schemas.openxmlformats.org/officeDocument/2006/relationships" xmlns:mc="http://schemas.openxmlformats.org/markup-compatibility/2006" xmlns:mv="urn:schemas-microsoft-com:mac:vml" xmlns:p="http://schemas.openxmlformats.org/presentationml/2006/main" xmlns:c="http://schemas.openxmlformats.org/drawingml/2006/chart" xmlns:dgm="http://schemas.openxmlformats.org/drawingml/2006/diagram" xmlns:o="urn:schemas-microsoft-com:office:office" xmlns:v="urn:schemas-microsoft-com:vml" xmlns:pvml="urn:schemas-microsoft-com:office:powerpoint" xmlns:com="http://schemas.openxmlformats.org/drawingml/2006/compatibility" xmlns:p14="http://schemas.microsoft.com/office/powerpoint/2010/main" xmlns:p15="http://schemas.microsoft.com/office/powerpoint/2012/main" matchingName="Section header" type="secHead">
+<p:sldLayout xmlns:a="http://schemas.openxmlformats.org/drawingml/2006/main" xmlns:r="http://schemas.openxmlformats.org/officeDocument/2006/relationships" xmlns:mc="http://schemas.openxmlformats.org/markup-compatibility/2006" xmlns:mv="urn:schemas-microsoft-com:mac:vml" xmlns:p="http://schemas.openxmlformats.org/presentationml/2006/main" xmlns:c="http://schemas.openxmlformats.org/drawingml/2006/chart" xmlns:dgm="http://schemas.openxmlformats.org/drawingml/2006/diagram" xmlns:o="urn:schemas-microsoft-com:office:office" xmlns:v="urn:schemas-microsoft-com:vml" xmlns:pvml="urn:schemas-microsoft-com:office:powerpoint" xmlns:com="http://schemas.openxmlformats.org/drawingml/2006/compatibility" xmlns:p14="http://schemas.microsoft.com/office/powerpoint/2010/main" xmlns:p15="http://schemas.microsoft.com/office/powerpoint/2012/main" xmlns:ahyp="http://schemas.microsoft.com/office/drawing/2018/hyperlinkcolor" matchingName="Section header" type="secHead">
   <p:cSld name="SECTION_HEADER">
     <p:spTree>
       <p:nvGrpSpPr>
@@ -2650,7 +2950,7 @@
 </file>
 
 <file path=ppt/slideLayouts/slideLayout3.xml><?xml version="1.0" encoding="utf-8"?>
-<p:sldLayout xmlns:a="http://schemas.openxmlformats.org/drawingml/2006/main" xmlns:r="http://schemas.openxmlformats.org/officeDocument/2006/relationships" xmlns:mc="http://schemas.openxmlformats.org/markup-compatibility/2006" xmlns:mv="urn:schemas-microsoft-com:mac:vml" xmlns:p="http://schemas.openxmlformats.org/presentationml/2006/main" xmlns:c="http://schemas.openxmlformats.org/drawingml/2006/chart" xmlns:dgm="http://schemas.openxmlformats.org/drawingml/2006/diagram" xmlns:o="urn:schemas-microsoft-com:office:office" xmlns:v="urn:schemas-microsoft-com:vml" xmlns:pvml="urn:schemas-microsoft-com:office:powerpoint" xmlns:com="http://schemas.openxmlformats.org/drawingml/2006/compatibility" xmlns:p14="http://schemas.microsoft.com/office/powerpoint/2010/main" xmlns:p15="http://schemas.microsoft.com/office/powerpoint/2012/main" matchingName="Title and body" type="tx">
+<p:sldLayout xmlns:a="http://schemas.openxmlformats.org/drawingml/2006/main" xmlns:r="http://schemas.openxmlformats.org/officeDocument/2006/relationships" xmlns:mc="http://schemas.openxmlformats.org/markup-compatibility/2006" xmlns:mv="urn:schemas-microsoft-com:mac:vml" xmlns:p="http://schemas.openxmlformats.org/presentationml/2006/main" xmlns:c="http://schemas.openxmlformats.org/drawingml/2006/chart" xmlns:dgm="http://schemas.openxmlformats.org/drawingml/2006/diagram" xmlns:o="urn:schemas-microsoft-com:office:office" xmlns:v="urn:schemas-microsoft-com:vml" xmlns:pvml="urn:schemas-microsoft-com:office:powerpoint" xmlns:com="http://schemas.openxmlformats.org/drawingml/2006/compatibility" xmlns:p14="http://schemas.microsoft.com/office/powerpoint/2010/main" xmlns:p15="http://schemas.microsoft.com/office/powerpoint/2012/main" xmlns:ahyp="http://schemas.microsoft.com/office/drawing/2018/hyperlinkcolor" matchingName="Title and body" type="tx">
   <p:cSld name="TITLE_AND_BODY">
     <p:spTree>
       <p:nvGrpSpPr>
@@ -3002,7 +3302,7 @@
 </file>
 
 <file path=ppt/slideLayouts/slideLayout4.xml><?xml version="1.0" encoding="utf-8"?>
-<p:sldLayout xmlns:a="http://schemas.openxmlformats.org/drawingml/2006/main" xmlns:r="http://schemas.openxmlformats.org/officeDocument/2006/relationships" xmlns:mc="http://schemas.openxmlformats.org/markup-compatibility/2006" xmlns:mv="urn:schemas-microsoft-com:mac:vml" xmlns:p="http://schemas.openxmlformats.org/presentationml/2006/main" xmlns:c="http://schemas.openxmlformats.org/drawingml/2006/chart" xmlns:dgm="http://schemas.openxmlformats.org/drawingml/2006/diagram" xmlns:o="urn:schemas-microsoft-com:office:office" xmlns:v="urn:schemas-microsoft-com:vml" xmlns:pvml="urn:schemas-microsoft-com:office:powerpoint" xmlns:com="http://schemas.openxmlformats.org/drawingml/2006/compatibility" xmlns:p14="http://schemas.microsoft.com/office/powerpoint/2010/main" xmlns:p15="http://schemas.microsoft.com/office/powerpoint/2012/main" matchingName="Title and two columns" type="twoColTx">
+<p:sldLayout xmlns:a="http://schemas.openxmlformats.org/drawingml/2006/main" xmlns:r="http://schemas.openxmlformats.org/officeDocument/2006/relationships" xmlns:mc="http://schemas.openxmlformats.org/markup-compatibility/2006" xmlns:mv="urn:schemas-microsoft-com:mac:vml" xmlns:p="http://schemas.openxmlformats.org/presentationml/2006/main" xmlns:c="http://schemas.openxmlformats.org/drawingml/2006/chart" xmlns:dgm="http://schemas.openxmlformats.org/drawingml/2006/diagram" xmlns:o="urn:schemas-microsoft-com:office:office" xmlns:v="urn:schemas-microsoft-com:vml" xmlns:pvml="urn:schemas-microsoft-com:office:powerpoint" xmlns:com="http://schemas.openxmlformats.org/drawingml/2006/compatibility" xmlns:p14="http://schemas.microsoft.com/office/powerpoint/2010/main" xmlns:p15="http://schemas.microsoft.com/office/powerpoint/2012/main" xmlns:ahyp="http://schemas.microsoft.com/office/drawing/2018/hyperlinkcolor" matchingName="Title and two columns" type="twoColTx">
   <p:cSld name="TITLE_AND_TWO_COLUMNS">
     <p:spTree>
       <p:nvGrpSpPr>
@@ -3479,7 +3779,7 @@
 </file>
 
 <file path=ppt/slideLayouts/slideLayout5.xml><?xml version="1.0" encoding="utf-8"?>
-<p:sldLayout xmlns:a="http://schemas.openxmlformats.org/drawingml/2006/main" xmlns:r="http://schemas.openxmlformats.org/officeDocument/2006/relationships" xmlns:mc="http://schemas.openxmlformats.org/markup-compatibility/2006" xmlns:mv="urn:schemas-microsoft-com:mac:vml" xmlns:p="http://schemas.openxmlformats.org/presentationml/2006/main" xmlns:c="http://schemas.openxmlformats.org/drawingml/2006/chart" xmlns:dgm="http://schemas.openxmlformats.org/drawingml/2006/diagram" xmlns:o="urn:schemas-microsoft-com:office:office" xmlns:v="urn:schemas-microsoft-com:vml" xmlns:pvml="urn:schemas-microsoft-com:office:powerpoint" xmlns:com="http://schemas.openxmlformats.org/drawingml/2006/compatibility" xmlns:p14="http://schemas.microsoft.com/office/powerpoint/2010/main" xmlns:p15="http://schemas.microsoft.com/office/powerpoint/2012/main" matchingName="Title only" type="titleOnly">
+<p:sldLayout xmlns:a="http://schemas.openxmlformats.org/drawingml/2006/main" xmlns:r="http://schemas.openxmlformats.org/officeDocument/2006/relationships" xmlns:mc="http://schemas.openxmlformats.org/markup-compatibility/2006" xmlns:mv="urn:schemas-microsoft-com:mac:vml" xmlns:p="http://schemas.openxmlformats.org/presentationml/2006/main" xmlns:c="http://schemas.openxmlformats.org/drawingml/2006/chart" xmlns:dgm="http://schemas.openxmlformats.org/drawingml/2006/diagram" xmlns:o="urn:schemas-microsoft-com:office:office" xmlns:v="urn:schemas-microsoft-com:vml" xmlns:pvml="urn:schemas-microsoft-com:office:powerpoint" xmlns:com="http://schemas.openxmlformats.org/drawingml/2006/compatibility" xmlns:p14="http://schemas.microsoft.com/office/powerpoint/2010/main" xmlns:p15="http://schemas.microsoft.com/office/powerpoint/2012/main" xmlns:ahyp="http://schemas.microsoft.com/office/drawing/2018/hyperlinkcolor" matchingName="Title only" type="titleOnly">
   <p:cSld name="TITLE_ONLY">
     <p:spTree>
       <p:nvGrpSpPr>
@@ -3706,7 +4006,7 @@
 </file>
 
 <file path=ppt/slideLayouts/slideLayout6.xml><?xml version="1.0" encoding="utf-8"?>
-<p:sldLayout xmlns:a="http://schemas.openxmlformats.org/drawingml/2006/main" xmlns:r="http://schemas.openxmlformats.org/officeDocument/2006/relationships" xmlns:mc="http://schemas.openxmlformats.org/markup-compatibility/2006" xmlns:mv="urn:schemas-microsoft-com:mac:vml" xmlns:p="http://schemas.openxmlformats.org/presentationml/2006/main" xmlns:c="http://schemas.openxmlformats.org/drawingml/2006/chart" xmlns:dgm="http://schemas.openxmlformats.org/drawingml/2006/diagram" xmlns:o="urn:schemas-microsoft-com:office:office" xmlns:v="urn:schemas-microsoft-com:vml" xmlns:pvml="urn:schemas-microsoft-com:office:powerpoint" xmlns:com="http://schemas.openxmlformats.org/drawingml/2006/compatibility" xmlns:p14="http://schemas.microsoft.com/office/powerpoint/2010/main" xmlns:p15="http://schemas.microsoft.com/office/powerpoint/2012/main" matchingName="One column text">
+<p:sldLayout xmlns:a="http://schemas.openxmlformats.org/drawingml/2006/main" xmlns:r="http://schemas.openxmlformats.org/officeDocument/2006/relationships" xmlns:mc="http://schemas.openxmlformats.org/markup-compatibility/2006" xmlns:mv="urn:schemas-microsoft-com:mac:vml" xmlns:p="http://schemas.openxmlformats.org/presentationml/2006/main" xmlns:c="http://schemas.openxmlformats.org/drawingml/2006/chart" xmlns:dgm="http://schemas.openxmlformats.org/drawingml/2006/diagram" xmlns:o="urn:schemas-microsoft-com:office:office" xmlns:v="urn:schemas-microsoft-com:vml" xmlns:pvml="urn:schemas-microsoft-com:office:powerpoint" xmlns:com="http://schemas.openxmlformats.org/drawingml/2006/compatibility" xmlns:p14="http://schemas.microsoft.com/office/powerpoint/2010/main" xmlns:p15="http://schemas.microsoft.com/office/powerpoint/2012/main" xmlns:ahyp="http://schemas.microsoft.com/office/drawing/2018/hyperlinkcolor" matchingName="One column text">
   <p:cSld name="ONE_COLUMN_TEXT">
     <p:spTree>
       <p:nvGrpSpPr>
@@ -4058,7 +4358,7 @@
 </file>
 
 <file path=ppt/slideLayouts/slideLayout7.xml><?xml version="1.0" encoding="utf-8"?>
-<p:sldLayout xmlns:a="http://schemas.openxmlformats.org/drawingml/2006/main" xmlns:r="http://schemas.openxmlformats.org/officeDocument/2006/relationships" xmlns:mc="http://schemas.openxmlformats.org/markup-compatibility/2006" xmlns:mv="urn:schemas-microsoft-com:mac:vml" xmlns:p="http://schemas.openxmlformats.org/presentationml/2006/main" xmlns:c="http://schemas.openxmlformats.org/drawingml/2006/chart" xmlns:dgm="http://schemas.openxmlformats.org/drawingml/2006/diagram" xmlns:o="urn:schemas-microsoft-com:office:office" xmlns:v="urn:schemas-microsoft-com:vml" xmlns:pvml="urn:schemas-microsoft-com:office:powerpoint" xmlns:com="http://schemas.openxmlformats.org/drawingml/2006/compatibility" xmlns:p14="http://schemas.microsoft.com/office/powerpoint/2010/main" xmlns:p15="http://schemas.microsoft.com/office/powerpoint/2012/main" matchingName="Main point">
+<p:sldLayout xmlns:a="http://schemas.openxmlformats.org/drawingml/2006/main" xmlns:r="http://schemas.openxmlformats.org/officeDocument/2006/relationships" xmlns:mc="http://schemas.openxmlformats.org/markup-compatibility/2006" xmlns:mv="urn:schemas-microsoft-com:mac:vml" xmlns:p="http://schemas.openxmlformats.org/presentationml/2006/main" xmlns:c="http://schemas.openxmlformats.org/drawingml/2006/chart" xmlns:dgm="http://schemas.openxmlformats.org/drawingml/2006/diagram" xmlns:o="urn:schemas-microsoft-com:office:office" xmlns:v="urn:schemas-microsoft-com:vml" xmlns:pvml="urn:schemas-microsoft-com:office:powerpoint" xmlns:com="http://schemas.openxmlformats.org/drawingml/2006/compatibility" xmlns:p14="http://schemas.microsoft.com/office/powerpoint/2010/main" xmlns:p15="http://schemas.microsoft.com/office/powerpoint/2012/main" xmlns:ahyp="http://schemas.microsoft.com/office/drawing/2018/hyperlinkcolor" matchingName="Main point">
   <p:cSld name="MAIN_POINT">
     <p:spTree>
       <p:nvGrpSpPr>
@@ -4285,7 +4585,7 @@
 </file>
 
 <file path=ppt/slideLayouts/slideLayout8.xml><?xml version="1.0" encoding="utf-8"?>
-<p:sldLayout xmlns:a="http://schemas.openxmlformats.org/drawingml/2006/main" xmlns:r="http://schemas.openxmlformats.org/officeDocument/2006/relationships" xmlns:mc="http://schemas.openxmlformats.org/markup-compatibility/2006" xmlns:mv="urn:schemas-microsoft-com:mac:vml" xmlns:p="http://schemas.openxmlformats.org/presentationml/2006/main" xmlns:c="http://schemas.openxmlformats.org/drawingml/2006/chart" xmlns:dgm="http://schemas.openxmlformats.org/drawingml/2006/diagram" xmlns:o="urn:schemas-microsoft-com:office:office" xmlns:v="urn:schemas-microsoft-com:vml" xmlns:pvml="urn:schemas-microsoft-com:office:powerpoint" xmlns:com="http://schemas.openxmlformats.org/drawingml/2006/compatibility" xmlns:p14="http://schemas.microsoft.com/office/powerpoint/2010/main" xmlns:p15="http://schemas.microsoft.com/office/powerpoint/2012/main" matchingName="Section title and description">
+<p:sldLayout xmlns:a="http://schemas.openxmlformats.org/drawingml/2006/main" xmlns:r="http://schemas.openxmlformats.org/officeDocument/2006/relationships" xmlns:mc="http://schemas.openxmlformats.org/markup-compatibility/2006" xmlns:mv="urn:schemas-microsoft-com:mac:vml" xmlns:p="http://schemas.openxmlformats.org/presentationml/2006/main" xmlns:c="http://schemas.openxmlformats.org/drawingml/2006/chart" xmlns:dgm="http://schemas.openxmlformats.org/drawingml/2006/diagram" xmlns:o="urn:schemas-microsoft-com:office:office" xmlns:v="urn:schemas-microsoft-com:vml" xmlns:pvml="urn:schemas-microsoft-com:office:powerpoint" xmlns:com="http://schemas.openxmlformats.org/drawingml/2006/compatibility" xmlns:p14="http://schemas.microsoft.com/office/powerpoint/2010/main" xmlns:p15="http://schemas.microsoft.com/office/powerpoint/2012/main" xmlns:ahyp="http://schemas.microsoft.com/office/drawing/2018/hyperlinkcolor" matchingName="Section title and description">
   <p:cSld name="SECTION_TITLE_AND_DESCRIPTION">
     <p:spTree>
       <p:nvGrpSpPr>
@@ -4832,7 +5132,7 @@
 </file>
 
 <file path=ppt/slideLayouts/slideLayout9.xml><?xml version="1.0" encoding="utf-8"?>
-<p:sldLayout xmlns:a="http://schemas.openxmlformats.org/drawingml/2006/main" xmlns:r="http://schemas.openxmlformats.org/officeDocument/2006/relationships" xmlns:mc="http://schemas.openxmlformats.org/markup-compatibility/2006" xmlns:mv="urn:schemas-microsoft-com:mac:vml" xmlns:p="http://schemas.openxmlformats.org/presentationml/2006/main" xmlns:c="http://schemas.openxmlformats.org/drawingml/2006/chart" xmlns:dgm="http://schemas.openxmlformats.org/drawingml/2006/diagram" xmlns:o="urn:schemas-microsoft-com:office:office" xmlns:v="urn:schemas-microsoft-com:vml" xmlns:pvml="urn:schemas-microsoft-com:office:powerpoint" xmlns:com="http://schemas.openxmlformats.org/drawingml/2006/compatibility" xmlns:p14="http://schemas.microsoft.com/office/powerpoint/2010/main" xmlns:p15="http://schemas.microsoft.com/office/powerpoint/2012/main" matchingName="Caption">
+<p:sldLayout xmlns:a="http://schemas.openxmlformats.org/drawingml/2006/main" xmlns:r="http://schemas.openxmlformats.org/officeDocument/2006/relationships" xmlns:mc="http://schemas.openxmlformats.org/markup-compatibility/2006" xmlns:mv="urn:schemas-microsoft-com:mac:vml" xmlns:p="http://schemas.openxmlformats.org/presentationml/2006/main" xmlns:c="http://schemas.openxmlformats.org/drawingml/2006/chart" xmlns:dgm="http://schemas.openxmlformats.org/drawingml/2006/diagram" xmlns:o="urn:schemas-microsoft-com:office:office" xmlns:v="urn:schemas-microsoft-com:vml" xmlns:pvml="urn:schemas-microsoft-com:office:powerpoint" xmlns:com="http://schemas.openxmlformats.org/drawingml/2006/compatibility" xmlns:p14="http://schemas.microsoft.com/office/powerpoint/2010/main" xmlns:p15="http://schemas.microsoft.com/office/powerpoint/2012/main" xmlns:ahyp="http://schemas.microsoft.com/office/drawing/2018/hyperlinkcolor" matchingName="Caption">
   <p:cSld name="CAPTION_ONLY">
     <p:spTree>
       <p:nvGrpSpPr>
@@ -4974,7 +5274,7 @@
 </file>
 
 <file path=ppt/slideMasters/slideMaster1.xml><?xml version="1.0" encoding="utf-8"?>
-<p:sldMaster xmlns:a="http://schemas.openxmlformats.org/drawingml/2006/main" xmlns:r="http://schemas.openxmlformats.org/officeDocument/2006/relationships" xmlns:mc="http://schemas.openxmlformats.org/markup-compatibility/2006" xmlns:mv="urn:schemas-microsoft-com:mac:vml" xmlns:p="http://schemas.openxmlformats.org/presentationml/2006/main" xmlns:c="http://schemas.openxmlformats.org/drawingml/2006/chart" xmlns:dgm="http://schemas.openxmlformats.org/drawingml/2006/diagram" xmlns:o="urn:schemas-microsoft-com:office:office" xmlns:v="urn:schemas-microsoft-com:vml" xmlns:pvml="urn:schemas-microsoft-com:office:powerpoint" xmlns:com="http://schemas.openxmlformats.org/drawingml/2006/compatibility" xmlns:p14="http://schemas.microsoft.com/office/powerpoint/2010/main" xmlns:p15="http://schemas.microsoft.com/office/powerpoint/2012/main">
+<p:sldMaster xmlns:a="http://schemas.openxmlformats.org/drawingml/2006/main" xmlns:r="http://schemas.openxmlformats.org/officeDocument/2006/relationships" xmlns:mc="http://schemas.openxmlformats.org/markup-compatibility/2006" xmlns:mv="urn:schemas-microsoft-com:mac:vml" xmlns:p="http://schemas.openxmlformats.org/presentationml/2006/main" xmlns:c="http://schemas.openxmlformats.org/drawingml/2006/chart" xmlns:dgm="http://schemas.openxmlformats.org/drawingml/2006/diagram" xmlns:o="urn:schemas-microsoft-com:office:office" xmlns:v="urn:schemas-microsoft-com:vml" xmlns:pvml="urn:schemas-microsoft-com:office:powerpoint" xmlns:com="http://schemas.openxmlformats.org/drawingml/2006/compatibility" xmlns:p14="http://schemas.microsoft.com/office/powerpoint/2010/main" xmlns:p15="http://schemas.microsoft.com/office/powerpoint/2012/main" xmlns:ahyp="http://schemas.microsoft.com/office/drawing/2018/hyperlinkcolor">
   <p:cSld name="simple-light-2">
     <p:bg>
       <p:bgPr>
@@ -6235,7 +6535,7 @@
 </file>
 
 <file path=ppt/slides/slide1.xml><?xml version="1.0" encoding="utf-8"?>
-<p:sld xmlns:a="http://schemas.openxmlformats.org/drawingml/2006/main" xmlns:r="http://schemas.openxmlformats.org/officeDocument/2006/relationships" xmlns:mc="http://schemas.openxmlformats.org/markup-compatibility/2006" xmlns:mv="urn:schemas-microsoft-com:mac:vml" xmlns:p="http://schemas.openxmlformats.org/presentationml/2006/main" xmlns:c="http://schemas.openxmlformats.org/drawingml/2006/chart" xmlns:dgm="http://schemas.openxmlformats.org/drawingml/2006/diagram" xmlns:o="urn:schemas-microsoft-com:office:office" xmlns:v="urn:schemas-microsoft-com:vml" xmlns:pvml="urn:schemas-microsoft-com:office:powerpoint" xmlns:com="http://schemas.openxmlformats.org/drawingml/2006/compatibility" xmlns:p14="http://schemas.microsoft.com/office/powerpoint/2010/main" xmlns:p15="http://schemas.microsoft.com/office/powerpoint/2012/main">
+<p:sld xmlns:a="http://schemas.openxmlformats.org/drawingml/2006/main" xmlns:r="http://schemas.openxmlformats.org/officeDocument/2006/relationships" xmlns:mc="http://schemas.openxmlformats.org/markup-compatibility/2006" xmlns:mv="urn:schemas-microsoft-com:mac:vml" xmlns:p="http://schemas.openxmlformats.org/presentationml/2006/main" xmlns:c="http://schemas.openxmlformats.org/drawingml/2006/chart" xmlns:dgm="http://schemas.openxmlformats.org/drawingml/2006/diagram" xmlns:o="urn:schemas-microsoft-com:office:office" xmlns:v="urn:schemas-microsoft-com:vml" xmlns:pvml="urn:schemas-microsoft-com:office:powerpoint" xmlns:com="http://schemas.openxmlformats.org/drawingml/2006/compatibility" xmlns:p14="http://schemas.microsoft.com/office/powerpoint/2010/main" xmlns:p15="http://schemas.microsoft.com/office/powerpoint/2012/main" xmlns:ahyp="http://schemas.microsoft.com/office/drawing/2018/hyperlinkcolor">
   <p:cSld>
     <p:spTree>
       <p:nvGrpSpPr>
@@ -6367,8 +6667,771 @@
 </p:sld>
 </file>
 
+<file path=ppt/slides/slide10.xml><?xml version="1.0" encoding="utf-8"?>
+<p:sld xmlns:a="http://schemas.openxmlformats.org/drawingml/2006/main" xmlns:r="http://schemas.openxmlformats.org/officeDocument/2006/relationships" xmlns:mc="http://schemas.openxmlformats.org/markup-compatibility/2006" xmlns:mv="urn:schemas-microsoft-com:mac:vml" xmlns:p="http://schemas.openxmlformats.org/presentationml/2006/main" xmlns:c="http://schemas.openxmlformats.org/drawingml/2006/chart" xmlns:dgm="http://schemas.openxmlformats.org/drawingml/2006/diagram" xmlns:o="urn:schemas-microsoft-com:office:office" xmlns:v="urn:schemas-microsoft-com:vml" xmlns:pvml="urn:schemas-microsoft-com:office:powerpoint" xmlns:com="http://schemas.openxmlformats.org/drawingml/2006/compatibility" xmlns:p14="http://schemas.microsoft.com/office/powerpoint/2010/main" xmlns:p15="http://schemas.microsoft.com/office/powerpoint/2012/main" xmlns:ahyp="http://schemas.microsoft.com/office/drawing/2018/hyperlinkcolor">
+  <p:cSld>
+    <p:spTree>
+      <p:nvGrpSpPr>
+        <p:cNvPr id="126" name="Shape 126"/>
+        <p:cNvGrpSpPr/>
+        <p:nvPr/>
+      </p:nvGrpSpPr>
+      <p:grpSpPr>
+        <a:xfrm>
+          <a:off x="0" y="0"/>
+          <a:ext cx="0" cy="0"/>
+          <a:chOff x="0" y="0"/>
+          <a:chExt cx="0" cy="0"/>
+        </a:xfrm>
+      </p:grpSpPr>
+      <p:sp>
+        <p:nvSpPr>
+          <p:cNvPr id="127" name="Google Shape;127;p22"/>
+          <p:cNvSpPr txBox="1"/>
+          <p:nvPr>
+            <p:ph type="title"/>
+          </p:nvPr>
+        </p:nvSpPr>
+        <p:spPr>
+          <a:xfrm>
+            <a:off x="742950" y="105375"/>
+            <a:ext cx="8520600" cy="572700"/>
+          </a:xfrm>
+          <a:prstGeom prst="rect">
+            <a:avLst/>
+          </a:prstGeom>
+        </p:spPr>
+        <p:txBody>
+          <a:bodyPr anchorCtr="0" anchor="t" bIns="91425" lIns="91425" spcFirstLastPara="1" rIns="91425" wrap="square" tIns="91425">
+            <a:noAutofit/>
+          </a:bodyPr>
+          <a:lstStyle/>
+          <a:p>
+            <a:pPr indent="0" lvl="0" marL="0" rtl="0" algn="l">
+              <a:spcBef>
+                <a:spcPts val="0"/>
+              </a:spcBef>
+              <a:spcAft>
+                <a:spcPts val="0"/>
+              </a:spcAft>
+              <a:buNone/>
+            </a:pPr>
+            <a:r>
+              <a:rPr lang="en"/>
+              <a:t>Conclusions</a:t>
+            </a:r>
+            <a:endParaRPr b="1" sz="2300"/>
+          </a:p>
+          <a:p>
+            <a:pPr indent="0" lvl="0" marL="0" rtl="0" algn="l">
+              <a:spcBef>
+                <a:spcPts val="0"/>
+              </a:spcBef>
+              <a:spcAft>
+                <a:spcPts val="0"/>
+              </a:spcAft>
+              <a:buNone/>
+            </a:pPr>
+            <a:r>
+              <a:t/>
+            </a:r>
+            <a:endParaRPr/>
+          </a:p>
+        </p:txBody>
+      </p:sp>
+      <p:pic>
+        <p:nvPicPr>
+          <p:cNvPr id="128" name="Google Shape;128;p22"/>
+          <p:cNvPicPr preferRelativeResize="0"/>
+          <p:nvPr/>
+        </p:nvPicPr>
+        <p:blipFill>
+          <a:blip r:embed="rId3">
+            <a:alphaModFix/>
+          </a:blip>
+          <a:stretch>
+            <a:fillRect/>
+          </a:stretch>
+        </p:blipFill>
+        <p:spPr>
+          <a:xfrm>
+            <a:off x="0" y="-1"/>
+            <a:ext cx="678075" cy="678075"/>
+          </a:xfrm>
+          <a:prstGeom prst="rect">
+            <a:avLst/>
+          </a:prstGeom>
+          <a:noFill/>
+          <a:ln>
+            <a:noFill/>
+          </a:ln>
+        </p:spPr>
+      </p:pic>
+      <p:sp>
+        <p:nvSpPr>
+          <p:cNvPr id="129" name="Google Shape;129;p22"/>
+          <p:cNvSpPr txBox="1"/>
+          <p:nvPr/>
+        </p:nvSpPr>
+        <p:spPr>
+          <a:xfrm>
+            <a:off x="558150" y="1347225"/>
+            <a:ext cx="8027700" cy="3116700"/>
+          </a:xfrm>
+          <a:prstGeom prst="rect">
+            <a:avLst/>
+          </a:prstGeom>
+          <a:noFill/>
+          <a:ln>
+            <a:noFill/>
+          </a:ln>
+        </p:spPr>
+        <p:txBody>
+          <a:bodyPr anchorCtr="0" anchor="t" bIns="91425" lIns="91425" spcFirstLastPara="1" rIns="91425" wrap="square" tIns="91425">
+            <a:noAutofit/>
+          </a:bodyPr>
+          <a:lstStyle/>
+          <a:p>
+            <a:pPr indent="0" lvl="0" marL="0" rtl="0" algn="l">
+              <a:spcBef>
+                <a:spcPts val="0"/>
+              </a:spcBef>
+              <a:spcAft>
+                <a:spcPts val="0"/>
+              </a:spcAft>
+              <a:buNone/>
+            </a:pPr>
+            <a:r>
+              <a:rPr lang="en"/>
+              <a:t>Deno has some </a:t>
+            </a:r>
+            <a:r>
+              <a:rPr lang="en"/>
+              <a:t>great</a:t>
+            </a:r>
+            <a:r>
+              <a:rPr lang="en"/>
+              <a:t> ideas: </a:t>
+            </a:r>
+            <a:endParaRPr/>
+          </a:p>
+          <a:p>
+            <a:pPr indent="-317500" lvl="0" marL="457200" rtl="0" algn="l">
+              <a:spcBef>
+                <a:spcPts val="0"/>
+              </a:spcBef>
+              <a:spcAft>
+                <a:spcPts val="0"/>
+              </a:spcAft>
+              <a:buSzPts val="1400"/>
+              <a:buChar char="●"/>
+            </a:pPr>
+            <a:r>
+              <a:rPr lang="en"/>
+              <a:t>Supports both Javascript and Typescript out of the box. </a:t>
+            </a:r>
+            <a:endParaRPr/>
+          </a:p>
+          <a:p>
+            <a:pPr indent="-317500" lvl="0" marL="457200" rtl="0" algn="l">
+              <a:spcBef>
+                <a:spcPts val="0"/>
+              </a:spcBef>
+              <a:spcAft>
+                <a:spcPts val="0"/>
+              </a:spcAft>
+              <a:buSzPts val="1400"/>
+              <a:buChar char="●"/>
+            </a:pPr>
+            <a:r>
+              <a:rPr lang="en"/>
+              <a:t>Has easy to use bindings for WebAssembly.</a:t>
+            </a:r>
+            <a:endParaRPr/>
+          </a:p>
+          <a:p>
+            <a:pPr indent="-317500" lvl="0" marL="457200" rtl="0" algn="l">
+              <a:spcBef>
+                <a:spcPts val="0"/>
+              </a:spcBef>
+              <a:spcAft>
+                <a:spcPts val="0"/>
+              </a:spcAft>
+              <a:buSzPts val="1400"/>
+              <a:buChar char="●"/>
+            </a:pPr>
+            <a:r>
+              <a:rPr lang="en"/>
+              <a:t>Works very well on </a:t>
+            </a:r>
+            <a:r>
+              <a:rPr lang="en"/>
+              <a:t>server-side</a:t>
+            </a:r>
+            <a:r>
+              <a:rPr lang="en"/>
+              <a:t> Typescript.</a:t>
+            </a:r>
+            <a:endParaRPr/>
+          </a:p>
+          <a:p>
+            <a:pPr indent="0" lvl="0" marL="0" rtl="0" algn="l">
+              <a:spcBef>
+                <a:spcPts val="0"/>
+              </a:spcBef>
+              <a:spcAft>
+                <a:spcPts val="0"/>
+              </a:spcAft>
+              <a:buNone/>
+            </a:pPr>
+            <a:r>
+              <a:t/>
+            </a:r>
+            <a:endParaRPr/>
+          </a:p>
+          <a:p>
+            <a:pPr indent="0" lvl="0" marL="0" rtl="0" algn="l">
+              <a:spcBef>
+                <a:spcPts val="0"/>
+              </a:spcBef>
+              <a:spcAft>
+                <a:spcPts val="0"/>
+              </a:spcAft>
+              <a:buNone/>
+            </a:pPr>
+            <a:r>
+              <a:rPr lang="en"/>
+              <a:t>3rd party Deno </a:t>
+            </a:r>
+            <a:r>
+              <a:rPr lang="en"/>
+              <a:t>Libraries</a:t>
+            </a:r>
+            <a:r>
+              <a:rPr lang="en"/>
+              <a:t> need work:</a:t>
+            </a:r>
+            <a:endParaRPr/>
+          </a:p>
+          <a:p>
+            <a:pPr indent="-317500" lvl="0" marL="457200" rtl="0" algn="l">
+              <a:spcBef>
+                <a:spcPts val="0"/>
+              </a:spcBef>
+              <a:spcAft>
+                <a:spcPts val="0"/>
+              </a:spcAft>
+              <a:buSzPts val="1400"/>
+              <a:buChar char="●"/>
+            </a:pPr>
+            <a:r>
+              <a:rPr lang="en"/>
+              <a:t>When doing </a:t>
+            </a:r>
+            <a:r>
+              <a:rPr lang="en"/>
+              <a:t>research</a:t>
+            </a:r>
+            <a:r>
+              <a:rPr lang="en"/>
+              <a:t> for this project, lots of third parties doing the same things (REST API, ORMS, etc…) with </a:t>
+            </a:r>
+            <a:r>
+              <a:rPr lang="en"/>
+              <a:t>varying</a:t>
+            </a:r>
+            <a:r>
+              <a:rPr lang="en"/>
+              <a:t> degrees of longevity. </a:t>
+            </a:r>
+            <a:endParaRPr/>
+          </a:p>
+          <a:p>
+            <a:pPr indent="-317500" lvl="0" marL="457200" rtl="0" algn="l">
+              <a:spcBef>
+                <a:spcPts val="0"/>
+              </a:spcBef>
+              <a:spcAft>
+                <a:spcPts val="0"/>
+              </a:spcAft>
+              <a:buSzPts val="1400"/>
+              <a:buChar char="●"/>
+            </a:pPr>
+            <a:r>
+              <a:rPr lang="en"/>
+              <a:t>Issues with installing 3rd parties that do not support the most recent version of Deno.</a:t>
+            </a:r>
+            <a:endParaRPr/>
+          </a:p>
+          <a:p>
+            <a:pPr indent="0" lvl="0" marL="0" rtl="0" algn="l">
+              <a:spcBef>
+                <a:spcPts val="0"/>
+              </a:spcBef>
+              <a:spcAft>
+                <a:spcPts val="0"/>
+              </a:spcAft>
+              <a:buNone/>
+            </a:pPr>
+            <a:r>
+              <a:t/>
+            </a:r>
+            <a:endParaRPr/>
+          </a:p>
+          <a:p>
+            <a:pPr indent="0" lvl="0" marL="0" rtl="0" algn="l">
+              <a:spcBef>
+                <a:spcPts val="0"/>
+              </a:spcBef>
+              <a:spcAft>
+                <a:spcPts val="0"/>
+              </a:spcAft>
+              <a:buNone/>
+            </a:pPr>
+            <a:r>
+              <a:rPr lang="en"/>
+              <a:t>Opinionated:</a:t>
+            </a:r>
+            <a:endParaRPr/>
+          </a:p>
+          <a:p>
+            <a:pPr indent="-317500" lvl="0" marL="457200" rtl="0" algn="l">
+              <a:spcBef>
+                <a:spcPts val="0"/>
+              </a:spcBef>
+              <a:spcAft>
+                <a:spcPts val="0"/>
+              </a:spcAft>
+              <a:buSzPts val="1400"/>
+              <a:buChar char="●"/>
+            </a:pPr>
+            <a:r>
+              <a:rPr lang="en"/>
+              <a:t>You will either love or hate the import of libraries in deno.</a:t>
+            </a:r>
+            <a:endParaRPr/>
+          </a:p>
+          <a:p>
+            <a:pPr indent="-317500" lvl="0" marL="457200" rtl="0" algn="l">
+              <a:spcBef>
+                <a:spcPts val="0"/>
+              </a:spcBef>
+              <a:spcAft>
+                <a:spcPts val="0"/>
+              </a:spcAft>
+              <a:buSzPts val="1400"/>
+              <a:buChar char="●"/>
+            </a:pPr>
+            <a:r>
+              <a:rPr lang="en"/>
+              <a:t>When dealing with import errors, found myself forking and adding fixes to own github repositories.</a:t>
+            </a:r>
+            <a:endParaRPr/>
+          </a:p>
+        </p:txBody>
+      </p:sp>
+    </p:spTree>
+  </p:cSld>
+  <p:clrMapOvr>
+    <a:masterClrMapping/>
+  </p:clrMapOvr>
+</p:sld>
+</file>
+
+<file path=ppt/slides/slide11.xml><?xml version="1.0" encoding="utf-8"?>
+<p:sld xmlns:a="http://schemas.openxmlformats.org/drawingml/2006/main" xmlns:r="http://schemas.openxmlformats.org/officeDocument/2006/relationships" xmlns:mc="http://schemas.openxmlformats.org/markup-compatibility/2006" xmlns:mv="urn:schemas-microsoft-com:mac:vml" xmlns:p="http://schemas.openxmlformats.org/presentationml/2006/main" xmlns:c="http://schemas.openxmlformats.org/drawingml/2006/chart" xmlns:dgm="http://schemas.openxmlformats.org/drawingml/2006/diagram" xmlns:o="urn:schemas-microsoft-com:office:office" xmlns:v="urn:schemas-microsoft-com:vml" xmlns:pvml="urn:schemas-microsoft-com:office:powerpoint" xmlns:com="http://schemas.openxmlformats.org/drawingml/2006/compatibility" xmlns:p14="http://schemas.microsoft.com/office/powerpoint/2010/main" xmlns:p15="http://schemas.microsoft.com/office/powerpoint/2012/main" xmlns:ahyp="http://schemas.microsoft.com/office/drawing/2018/hyperlinkcolor">
+  <p:cSld>
+    <p:spTree>
+      <p:nvGrpSpPr>
+        <p:cNvPr id="133" name="Shape 133"/>
+        <p:cNvGrpSpPr/>
+        <p:nvPr/>
+      </p:nvGrpSpPr>
+      <p:grpSpPr>
+        <a:xfrm>
+          <a:off x="0" y="0"/>
+          <a:ext cx="0" cy="0"/>
+          <a:chOff x="0" y="0"/>
+          <a:chExt cx="0" cy="0"/>
+        </a:xfrm>
+      </p:grpSpPr>
+      <p:sp>
+        <p:nvSpPr>
+          <p:cNvPr id="134" name="Google Shape;134;p23"/>
+          <p:cNvSpPr txBox="1"/>
+          <p:nvPr>
+            <p:ph type="ctrTitle"/>
+          </p:nvPr>
+        </p:nvSpPr>
+        <p:spPr>
+          <a:xfrm>
+            <a:off x="231783" y="1908675"/>
+            <a:ext cx="8520600" cy="2052600"/>
+          </a:xfrm>
+          <a:prstGeom prst="rect">
+            <a:avLst/>
+          </a:prstGeom>
+        </p:spPr>
+        <p:txBody>
+          <a:bodyPr anchorCtr="0" anchor="b" bIns="91425" lIns="91425" spcFirstLastPara="1" rIns="91425" wrap="square" tIns="91425">
+            <a:noAutofit/>
+          </a:bodyPr>
+          <a:lstStyle/>
+          <a:p>
+            <a:pPr indent="0" lvl="0" marL="0" rtl="0" algn="ctr">
+              <a:spcBef>
+                <a:spcPts val="0"/>
+              </a:spcBef>
+              <a:spcAft>
+                <a:spcPts val="0"/>
+              </a:spcAft>
+              <a:buNone/>
+            </a:pPr>
+            <a:r>
+              <a:rPr lang="en"/>
+              <a:t>Questions?</a:t>
+            </a:r>
+            <a:endParaRPr/>
+          </a:p>
+        </p:txBody>
+      </p:sp>
+      <p:pic>
+        <p:nvPicPr>
+          <p:cNvPr id="135" name="Google Shape;135;p23"/>
+          <p:cNvPicPr preferRelativeResize="0"/>
+          <p:nvPr/>
+        </p:nvPicPr>
+        <p:blipFill>
+          <a:blip r:embed="rId3">
+            <a:alphaModFix/>
+          </a:blip>
+          <a:stretch>
+            <a:fillRect/>
+          </a:stretch>
+        </p:blipFill>
+        <p:spPr>
+          <a:xfrm>
+            <a:off x="2961600" y="0"/>
+            <a:ext cx="3148150" cy="3148124"/>
+          </a:xfrm>
+          <a:prstGeom prst="rect">
+            <a:avLst/>
+          </a:prstGeom>
+          <a:noFill/>
+          <a:ln>
+            <a:noFill/>
+          </a:ln>
+        </p:spPr>
+      </p:pic>
+    </p:spTree>
+  </p:cSld>
+  <p:clrMapOvr>
+    <a:masterClrMapping/>
+  </p:clrMapOvr>
+</p:sld>
+</file>
+
+<file path=ppt/slides/slide12.xml><?xml version="1.0" encoding="utf-8"?>
+<p:sld xmlns:a="http://schemas.openxmlformats.org/drawingml/2006/main" xmlns:r="http://schemas.openxmlformats.org/officeDocument/2006/relationships" xmlns:mc="http://schemas.openxmlformats.org/markup-compatibility/2006" xmlns:mv="urn:schemas-microsoft-com:mac:vml" xmlns:p="http://schemas.openxmlformats.org/presentationml/2006/main" xmlns:c="http://schemas.openxmlformats.org/drawingml/2006/chart" xmlns:dgm="http://schemas.openxmlformats.org/drawingml/2006/diagram" xmlns:o="urn:schemas-microsoft-com:office:office" xmlns:v="urn:schemas-microsoft-com:vml" xmlns:pvml="urn:schemas-microsoft-com:office:powerpoint" xmlns:com="http://schemas.openxmlformats.org/drawingml/2006/compatibility" xmlns:p14="http://schemas.microsoft.com/office/powerpoint/2010/main" xmlns:p15="http://schemas.microsoft.com/office/powerpoint/2012/main" xmlns:ahyp="http://schemas.microsoft.com/office/drawing/2018/hyperlinkcolor">
+  <p:cSld>
+    <p:spTree>
+      <p:nvGrpSpPr>
+        <p:cNvPr id="139" name="Shape 139"/>
+        <p:cNvGrpSpPr/>
+        <p:nvPr/>
+      </p:nvGrpSpPr>
+      <p:grpSpPr>
+        <a:xfrm>
+          <a:off x="0" y="0"/>
+          <a:ext cx="0" cy="0"/>
+          <a:chOff x="0" y="0"/>
+          <a:chExt cx="0" cy="0"/>
+        </a:xfrm>
+      </p:grpSpPr>
+      <p:sp>
+        <p:nvSpPr>
+          <p:cNvPr id="140" name="Google Shape;140;p24"/>
+          <p:cNvSpPr txBox="1"/>
+          <p:nvPr>
+            <p:ph type="title"/>
+          </p:nvPr>
+        </p:nvSpPr>
+        <p:spPr>
+          <a:xfrm>
+            <a:off x="678075" y="105375"/>
+            <a:ext cx="8520600" cy="572700"/>
+          </a:xfrm>
+          <a:prstGeom prst="rect">
+            <a:avLst/>
+          </a:prstGeom>
+        </p:spPr>
+        <p:txBody>
+          <a:bodyPr anchorCtr="0" anchor="t" bIns="91425" lIns="91425" spcFirstLastPara="1" rIns="91425" wrap="square" tIns="91425">
+            <a:noAutofit/>
+          </a:bodyPr>
+          <a:lstStyle/>
+          <a:p>
+            <a:pPr indent="0" lvl="0" marL="0" rtl="0" algn="l">
+              <a:spcBef>
+                <a:spcPts val="0"/>
+              </a:spcBef>
+              <a:spcAft>
+                <a:spcPts val="0"/>
+              </a:spcAft>
+              <a:buNone/>
+            </a:pPr>
+            <a:r>
+              <a:rPr lang="en"/>
+              <a:t>References and Resources</a:t>
+            </a:r>
+            <a:endParaRPr/>
+          </a:p>
+        </p:txBody>
+      </p:sp>
+      <p:sp>
+        <p:nvSpPr>
+          <p:cNvPr id="141" name="Google Shape;141;p24"/>
+          <p:cNvSpPr txBox="1"/>
+          <p:nvPr>
+            <p:ph idx="1" type="body"/>
+          </p:nvPr>
+        </p:nvSpPr>
+        <p:spPr>
+          <a:xfrm>
+            <a:off x="311700" y="905775"/>
+            <a:ext cx="8520600" cy="3416400"/>
+          </a:xfrm>
+          <a:prstGeom prst="rect">
+            <a:avLst/>
+          </a:prstGeom>
+        </p:spPr>
+        <p:txBody>
+          <a:bodyPr anchorCtr="0" anchor="t" bIns="91425" lIns="91425" spcFirstLastPara="1" rIns="91425" wrap="square" tIns="91425">
+            <a:noAutofit/>
+          </a:bodyPr>
+          <a:lstStyle/>
+          <a:p>
+            <a:pPr indent="-342900" lvl="0" marL="457200" rtl="0" algn="l">
+              <a:spcBef>
+                <a:spcPts val="0"/>
+              </a:spcBef>
+              <a:spcAft>
+                <a:spcPts val="0"/>
+              </a:spcAft>
+              <a:buSzPts val="1800"/>
+              <a:buChar char="●"/>
+            </a:pPr>
+            <a:r>
+              <a:rPr lang="en"/>
+              <a:t>Logo from </a:t>
+            </a:r>
+            <a:r>
+              <a:rPr lang="en" u="sng">
+                <a:solidFill>
+                  <a:schemeClr val="hlink"/>
+                </a:solidFill>
+                <a:hlinkClick r:id="rId3"/>
+              </a:rPr>
+              <a:t>https://github.com/denolib/high-res-deno-logo/blob/master/deno_hr_circle.svg</a:t>
+            </a:r>
+            <a:endParaRPr/>
+          </a:p>
+          <a:p>
+            <a:pPr indent="-342900" lvl="0" marL="457200" rtl="0" algn="l">
+              <a:spcBef>
+                <a:spcPts val="0"/>
+              </a:spcBef>
+              <a:spcAft>
+                <a:spcPts val="0"/>
+              </a:spcAft>
+              <a:buSzPts val="1800"/>
+              <a:buChar char="●"/>
+            </a:pPr>
+            <a:r>
+              <a:rPr lang="en"/>
+              <a:t>Main website: </a:t>
+            </a:r>
+            <a:r>
+              <a:rPr lang="en" u="sng">
+                <a:solidFill>
+                  <a:schemeClr val="hlink"/>
+                </a:solidFill>
+                <a:hlinkClick r:id="rId4"/>
+              </a:rPr>
+              <a:t>https://deno.land/</a:t>
+            </a:r>
+            <a:endParaRPr/>
+          </a:p>
+          <a:p>
+            <a:pPr indent="-342900" lvl="0" marL="457200" rtl="0" algn="l">
+              <a:spcBef>
+                <a:spcPts val="0"/>
+              </a:spcBef>
+              <a:spcAft>
+                <a:spcPts val="0"/>
+              </a:spcAft>
+              <a:buSzPts val="1800"/>
+              <a:buChar char="●"/>
+            </a:pPr>
+            <a:r>
+              <a:rPr lang="en"/>
+              <a:t>Documentation and example programs: </a:t>
+            </a:r>
+            <a:r>
+              <a:rPr lang="en" u="sng">
+                <a:solidFill>
+                  <a:schemeClr val="hlink"/>
+                </a:solidFill>
+                <a:hlinkClick r:id="rId5"/>
+              </a:rPr>
+              <a:t>https://deno.land/manual</a:t>
+            </a:r>
+            <a:endParaRPr/>
+          </a:p>
+          <a:p>
+            <a:pPr indent="-342900" lvl="0" marL="457200" rtl="0" algn="l">
+              <a:spcBef>
+                <a:spcPts val="0"/>
+              </a:spcBef>
+              <a:spcAft>
+                <a:spcPts val="0"/>
+              </a:spcAft>
+              <a:buSzPts val="1800"/>
+              <a:buChar char="●"/>
+            </a:pPr>
+            <a:r>
+              <a:rPr lang="en"/>
+              <a:t>FreeCodeCamp more in depth 6 hour talk: </a:t>
+            </a:r>
+            <a:r>
+              <a:rPr lang="en" u="sng">
+                <a:solidFill>
+                  <a:schemeClr val="hlink"/>
+                </a:solidFill>
+                <a:hlinkClick r:id="rId6"/>
+              </a:rPr>
+              <a:t>https://www.youtube.com/watch?v=TQUy8ENesGY</a:t>
+            </a:r>
+            <a:endParaRPr/>
+          </a:p>
+          <a:p>
+            <a:pPr indent="-342900" lvl="0" marL="457200" rtl="0" algn="l">
+              <a:spcBef>
+                <a:spcPts val="0"/>
+              </a:spcBef>
+              <a:spcAft>
+                <a:spcPts val="0"/>
+              </a:spcAft>
+              <a:buSzPts val="1800"/>
+              <a:buChar char="●"/>
+            </a:pPr>
+            <a:r>
+              <a:rPr lang="en"/>
+              <a:t>Deno crash course with Rest API: </a:t>
+            </a:r>
+            <a:r>
+              <a:rPr lang="en" u="sng">
+                <a:solidFill>
+                  <a:schemeClr val="hlink"/>
+                </a:solidFill>
+                <a:hlinkClick r:id="rId7"/>
+              </a:rPr>
+              <a:t>https://www.youtube.com/watch?v=NHHhiqwcfRM&amp;t=5s</a:t>
+            </a:r>
+            <a:endParaRPr/>
+          </a:p>
+          <a:p>
+            <a:pPr indent="-342900" lvl="0" marL="457200" rtl="0" algn="l">
+              <a:spcBef>
+                <a:spcPts val="0"/>
+              </a:spcBef>
+              <a:spcAft>
+                <a:spcPts val="0"/>
+              </a:spcAft>
+              <a:buSzPts val="1800"/>
+              <a:buChar char="●"/>
+            </a:pPr>
+            <a:r>
+              <a:rPr lang="en"/>
+              <a:t>Oak REST API: </a:t>
+            </a:r>
+            <a:r>
+              <a:rPr lang="en" u="sng">
+                <a:solidFill>
+                  <a:schemeClr val="hlink"/>
+                </a:solidFill>
+                <a:hlinkClick r:id="rId8"/>
+              </a:rPr>
+              <a:t>https://github.com/oakserver/oak</a:t>
+            </a:r>
+            <a:endParaRPr/>
+          </a:p>
+          <a:p>
+            <a:pPr indent="-342900" lvl="0" marL="457200" rtl="0" algn="l">
+              <a:spcBef>
+                <a:spcPts val="0"/>
+              </a:spcBef>
+              <a:spcAft>
+                <a:spcPts val="0"/>
+              </a:spcAft>
+              <a:buSzPts val="1800"/>
+              <a:buChar char="●"/>
+            </a:pPr>
+            <a:r>
+              <a:rPr lang="en"/>
+              <a:t>Other Oak REST API: </a:t>
+            </a:r>
+            <a:r>
+              <a:rPr lang="en" u="sng">
+                <a:solidFill>
+                  <a:schemeClr val="hlink"/>
+                </a:solidFill>
+                <a:hlinkClick r:id="rId9"/>
+              </a:rPr>
+              <a:t>https://medium.com/javascript-in-plain-english/building-crud-apis-using-deno-and-oak-9f71ec106b0e</a:t>
+            </a:r>
+            <a:endParaRPr/>
+          </a:p>
+        </p:txBody>
+      </p:sp>
+      <p:pic>
+        <p:nvPicPr>
+          <p:cNvPr id="142" name="Google Shape;142;p24"/>
+          <p:cNvPicPr preferRelativeResize="0"/>
+          <p:nvPr/>
+        </p:nvPicPr>
+        <p:blipFill>
+          <a:blip r:embed="rId10">
+            <a:alphaModFix/>
+          </a:blip>
+          <a:stretch>
+            <a:fillRect/>
+          </a:stretch>
+        </p:blipFill>
+        <p:spPr>
+          <a:xfrm>
+            <a:off x="0" y="-1"/>
+            <a:ext cx="678075" cy="678075"/>
+          </a:xfrm>
+          <a:prstGeom prst="rect">
+            <a:avLst/>
+          </a:prstGeom>
+          <a:noFill/>
+          <a:ln>
+            <a:noFill/>
+          </a:ln>
+        </p:spPr>
+      </p:pic>
+    </p:spTree>
+  </p:cSld>
+  <p:clrMapOvr>
+    <a:masterClrMapping/>
+  </p:clrMapOvr>
+</p:sld>
+</file>
+
 <file path=ppt/slides/slide2.xml><?xml version="1.0" encoding="utf-8"?>
-<p:sld xmlns:a="http://schemas.openxmlformats.org/drawingml/2006/main" xmlns:r="http://schemas.openxmlformats.org/officeDocument/2006/relationships" xmlns:mc="http://schemas.openxmlformats.org/markup-compatibility/2006" xmlns:mv="urn:schemas-microsoft-com:mac:vml" xmlns:p="http://schemas.openxmlformats.org/presentationml/2006/main" xmlns:c="http://schemas.openxmlformats.org/drawingml/2006/chart" xmlns:dgm="http://schemas.openxmlformats.org/drawingml/2006/diagram" xmlns:o="urn:schemas-microsoft-com:office:office" xmlns:v="urn:schemas-microsoft-com:vml" xmlns:pvml="urn:schemas-microsoft-com:office:powerpoint" xmlns:com="http://schemas.openxmlformats.org/drawingml/2006/compatibility" xmlns:p14="http://schemas.microsoft.com/office/powerpoint/2010/main" xmlns:p15="http://schemas.microsoft.com/office/powerpoint/2012/main">
+<p:sld xmlns:a="http://schemas.openxmlformats.org/drawingml/2006/main" xmlns:r="http://schemas.openxmlformats.org/officeDocument/2006/relationships" xmlns:mc="http://schemas.openxmlformats.org/markup-compatibility/2006" xmlns:mv="urn:schemas-microsoft-com:mac:vml" xmlns:p="http://schemas.openxmlformats.org/presentationml/2006/main" xmlns:c="http://schemas.openxmlformats.org/drawingml/2006/chart" xmlns:dgm="http://schemas.openxmlformats.org/drawingml/2006/diagram" xmlns:o="urn:schemas-microsoft-com:office:office" xmlns:v="urn:schemas-microsoft-com:vml" xmlns:pvml="urn:schemas-microsoft-com:office:powerpoint" xmlns:com="http://schemas.openxmlformats.org/drawingml/2006/compatibility" xmlns:p14="http://schemas.microsoft.com/office/powerpoint/2010/main" xmlns:p15="http://schemas.microsoft.com/office/powerpoint/2012/main" xmlns:ahyp="http://schemas.microsoft.com/office/drawing/2018/hyperlinkcolor">
   <p:cSld>
     <p:spTree>
       <p:nvGrpSpPr>
@@ -6730,7 +7793,7 @@
 </file>
 
 <file path=ppt/slides/slide3.xml><?xml version="1.0" encoding="utf-8"?>
-<p:sld xmlns:a="http://schemas.openxmlformats.org/drawingml/2006/main" xmlns:r="http://schemas.openxmlformats.org/officeDocument/2006/relationships" xmlns:mc="http://schemas.openxmlformats.org/markup-compatibility/2006" xmlns:mv="urn:schemas-microsoft-com:mac:vml" xmlns:p="http://schemas.openxmlformats.org/presentationml/2006/main" xmlns:c="http://schemas.openxmlformats.org/drawingml/2006/chart" xmlns:dgm="http://schemas.openxmlformats.org/drawingml/2006/diagram" xmlns:o="urn:schemas-microsoft-com:office:office" xmlns:v="urn:schemas-microsoft-com:vml" xmlns:pvml="urn:schemas-microsoft-com:office:powerpoint" xmlns:com="http://schemas.openxmlformats.org/drawingml/2006/compatibility" xmlns:p14="http://schemas.microsoft.com/office/powerpoint/2010/main" xmlns:p15="http://schemas.microsoft.com/office/powerpoint/2012/main">
+<p:sld xmlns:a="http://schemas.openxmlformats.org/drawingml/2006/main" xmlns:r="http://schemas.openxmlformats.org/officeDocument/2006/relationships" xmlns:mc="http://schemas.openxmlformats.org/markup-compatibility/2006" xmlns:mv="urn:schemas-microsoft-com:mac:vml" xmlns:p="http://schemas.openxmlformats.org/presentationml/2006/main" xmlns:c="http://schemas.openxmlformats.org/drawingml/2006/chart" xmlns:dgm="http://schemas.openxmlformats.org/drawingml/2006/diagram" xmlns:o="urn:schemas-microsoft-com:office:office" xmlns:v="urn:schemas-microsoft-com:vml" xmlns:pvml="urn:schemas-microsoft-com:office:powerpoint" xmlns:com="http://schemas.openxmlformats.org/drawingml/2006/compatibility" xmlns:p14="http://schemas.microsoft.com/office/powerpoint/2010/main" xmlns:p15="http://schemas.microsoft.com/office/powerpoint/2012/main" xmlns:ahyp="http://schemas.microsoft.com/office/drawing/2018/hyperlinkcolor">
   <p:cSld>
     <p:spTree>
       <p:nvGrpSpPr>
@@ -7004,7 +8067,7 @@
 </file>
 
 <file path=ppt/slides/slide4.xml><?xml version="1.0" encoding="utf-8"?>
-<p:sld xmlns:a="http://schemas.openxmlformats.org/drawingml/2006/main" xmlns:r="http://schemas.openxmlformats.org/officeDocument/2006/relationships" xmlns:mc="http://schemas.openxmlformats.org/markup-compatibility/2006" xmlns:mv="urn:schemas-microsoft-com:mac:vml" xmlns:p="http://schemas.openxmlformats.org/presentationml/2006/main" xmlns:c="http://schemas.openxmlformats.org/drawingml/2006/chart" xmlns:dgm="http://schemas.openxmlformats.org/drawingml/2006/diagram" xmlns:o="urn:schemas-microsoft-com:office:office" xmlns:v="urn:schemas-microsoft-com:vml" xmlns:pvml="urn:schemas-microsoft-com:office:powerpoint" xmlns:com="http://schemas.openxmlformats.org/drawingml/2006/compatibility" xmlns:p14="http://schemas.microsoft.com/office/powerpoint/2010/main" xmlns:p15="http://schemas.microsoft.com/office/powerpoint/2012/main">
+<p:sld xmlns:a="http://schemas.openxmlformats.org/drawingml/2006/main" xmlns:r="http://schemas.openxmlformats.org/officeDocument/2006/relationships" xmlns:mc="http://schemas.openxmlformats.org/markup-compatibility/2006" xmlns:mv="urn:schemas-microsoft-com:mac:vml" xmlns:p="http://schemas.openxmlformats.org/presentationml/2006/main" xmlns:c="http://schemas.openxmlformats.org/drawingml/2006/chart" xmlns:dgm="http://schemas.openxmlformats.org/drawingml/2006/diagram" xmlns:o="urn:schemas-microsoft-com:office:office" xmlns:v="urn:schemas-microsoft-com:vml" xmlns:pvml="urn:schemas-microsoft-com:office:powerpoint" xmlns:com="http://schemas.openxmlformats.org/drawingml/2006/compatibility" xmlns:p14="http://schemas.microsoft.com/office/powerpoint/2010/main" xmlns:p15="http://schemas.microsoft.com/office/powerpoint/2012/main" xmlns:ahyp="http://schemas.microsoft.com/office/drawing/2018/hyperlinkcolor">
   <p:cSld>
     <p:spTree>
       <p:nvGrpSpPr>
@@ -7159,6 +8222,34 @@
           </a:ln>
         </p:spPr>
       </p:pic>
+      <p:pic>
+        <p:nvPicPr>
+          <p:cNvPr id="79" name="Google Shape;79;p16"/>
+          <p:cNvPicPr preferRelativeResize="0"/>
+          <p:nvPr/>
+        </p:nvPicPr>
+        <p:blipFill>
+          <a:blip r:embed="rId6">
+            <a:alphaModFix/>
+          </a:blip>
+          <a:stretch>
+            <a:fillRect/>
+          </a:stretch>
+        </p:blipFill>
+        <p:spPr>
+          <a:xfrm>
+            <a:off x="742950" y="3458925"/>
+            <a:ext cx="3228975" cy="1257300"/>
+          </a:xfrm>
+          <a:prstGeom prst="rect">
+            <a:avLst/>
+          </a:prstGeom>
+          <a:noFill/>
+          <a:ln>
+            <a:noFill/>
+          </a:ln>
+        </p:spPr>
+      </p:pic>
     </p:spTree>
   </p:cSld>
   <p:clrMapOvr>
@@ -7168,11 +8259,11 @@
 </file>
 
 <file path=ppt/slides/slide5.xml><?xml version="1.0" encoding="utf-8"?>
-<p:sld xmlns:a="http://schemas.openxmlformats.org/drawingml/2006/main" xmlns:r="http://schemas.openxmlformats.org/officeDocument/2006/relationships" xmlns:mc="http://schemas.openxmlformats.org/markup-compatibility/2006" xmlns:mv="urn:schemas-microsoft-com:mac:vml" xmlns:p="http://schemas.openxmlformats.org/presentationml/2006/main" xmlns:c="http://schemas.openxmlformats.org/drawingml/2006/chart" xmlns:dgm="http://schemas.openxmlformats.org/drawingml/2006/diagram" xmlns:o="urn:schemas-microsoft-com:office:office" xmlns:v="urn:schemas-microsoft-com:vml" xmlns:pvml="urn:schemas-microsoft-com:office:powerpoint" xmlns:com="http://schemas.openxmlformats.org/drawingml/2006/compatibility" xmlns:p14="http://schemas.microsoft.com/office/powerpoint/2010/main" xmlns:p15="http://schemas.microsoft.com/office/powerpoint/2012/main">
+<p:sld xmlns:a="http://schemas.openxmlformats.org/drawingml/2006/main" xmlns:r="http://schemas.openxmlformats.org/officeDocument/2006/relationships" xmlns:mc="http://schemas.openxmlformats.org/markup-compatibility/2006" xmlns:mv="urn:schemas-microsoft-com:mac:vml" xmlns:p="http://schemas.openxmlformats.org/presentationml/2006/main" xmlns:c="http://schemas.openxmlformats.org/drawingml/2006/chart" xmlns:dgm="http://schemas.openxmlformats.org/drawingml/2006/diagram" xmlns:o="urn:schemas-microsoft-com:office:office" xmlns:v="urn:schemas-microsoft-com:vml" xmlns:pvml="urn:schemas-microsoft-com:office:powerpoint" xmlns:com="http://schemas.openxmlformats.org/drawingml/2006/compatibility" xmlns:p14="http://schemas.microsoft.com/office/powerpoint/2010/main" xmlns:p15="http://schemas.microsoft.com/office/powerpoint/2012/main" xmlns:ahyp="http://schemas.microsoft.com/office/drawing/2018/hyperlinkcolor">
   <p:cSld>
     <p:spTree>
       <p:nvGrpSpPr>
-        <p:cNvPr id="82" name="Shape 82"/>
+        <p:cNvPr id="83" name="Shape 83"/>
         <p:cNvGrpSpPr/>
         <p:nvPr/>
       </p:nvGrpSpPr>
@@ -7186,7 +8277,7 @@
       </p:grpSpPr>
       <p:sp>
         <p:nvSpPr>
-          <p:cNvPr id="83" name="Google Shape;83;p17"/>
+          <p:cNvPr id="84" name="Google Shape;84;p17"/>
           <p:cNvSpPr txBox="1"/>
           <p:nvPr>
             <p:ph type="title"/>
@@ -7241,7 +8332,7 @@
       </p:sp>
       <p:pic>
         <p:nvPicPr>
-          <p:cNvPr id="84" name="Google Shape;84;p17"/>
+          <p:cNvPr id="85" name="Google Shape;85;p17"/>
           <p:cNvPicPr preferRelativeResize="0"/>
           <p:nvPr/>
         </p:nvPicPr>
@@ -7269,7 +8360,7 @@
       </p:pic>
       <p:pic>
         <p:nvPicPr>
-          <p:cNvPr id="85" name="Google Shape;85;p17"/>
+          <p:cNvPr id="86" name="Google Shape;86;p17"/>
           <p:cNvPicPr preferRelativeResize="0"/>
           <p:nvPr/>
         </p:nvPicPr>
@@ -7297,7 +8388,7 @@
       </p:pic>
       <p:pic>
         <p:nvPicPr>
-          <p:cNvPr id="86" name="Google Shape;86;p17"/>
+          <p:cNvPr id="87" name="Google Shape;87;p17"/>
           <p:cNvPicPr preferRelativeResize="0"/>
           <p:nvPr/>
         </p:nvPicPr>
@@ -7325,7 +8416,7 @@
       </p:pic>
       <p:pic>
         <p:nvPicPr>
-          <p:cNvPr id="87" name="Google Shape;87;p17"/>
+          <p:cNvPr id="88" name="Google Shape;88;p17"/>
           <p:cNvPicPr preferRelativeResize="0"/>
           <p:nvPr/>
         </p:nvPicPr>
@@ -7360,11 +8451,11 @@
 </file>
 
 <file path=ppt/slides/slide6.xml><?xml version="1.0" encoding="utf-8"?>
-<p:sld xmlns:a="http://schemas.openxmlformats.org/drawingml/2006/main" xmlns:r="http://schemas.openxmlformats.org/officeDocument/2006/relationships" xmlns:mc="http://schemas.openxmlformats.org/markup-compatibility/2006" xmlns:mv="urn:schemas-microsoft-com:mac:vml" xmlns:p="http://schemas.openxmlformats.org/presentationml/2006/main" xmlns:c="http://schemas.openxmlformats.org/drawingml/2006/chart" xmlns:dgm="http://schemas.openxmlformats.org/drawingml/2006/diagram" xmlns:o="urn:schemas-microsoft-com:office:office" xmlns:v="urn:schemas-microsoft-com:vml" xmlns:pvml="urn:schemas-microsoft-com:office:powerpoint" xmlns:com="http://schemas.openxmlformats.org/drawingml/2006/compatibility" xmlns:p14="http://schemas.microsoft.com/office/powerpoint/2010/main" xmlns:p15="http://schemas.microsoft.com/office/powerpoint/2012/main">
+<p:sld xmlns:a="http://schemas.openxmlformats.org/drawingml/2006/main" xmlns:r="http://schemas.openxmlformats.org/officeDocument/2006/relationships" xmlns:mc="http://schemas.openxmlformats.org/markup-compatibility/2006" xmlns:mv="urn:schemas-microsoft-com:mac:vml" xmlns:p="http://schemas.openxmlformats.org/presentationml/2006/main" xmlns:c="http://schemas.openxmlformats.org/drawingml/2006/chart" xmlns:dgm="http://schemas.openxmlformats.org/drawingml/2006/diagram" xmlns:o="urn:schemas-microsoft-com:office:office" xmlns:v="urn:schemas-microsoft-com:vml" xmlns:pvml="urn:schemas-microsoft-com:office:powerpoint" xmlns:com="http://schemas.openxmlformats.org/drawingml/2006/compatibility" xmlns:p14="http://schemas.microsoft.com/office/powerpoint/2010/main" xmlns:p15="http://schemas.microsoft.com/office/powerpoint/2012/main" xmlns:ahyp="http://schemas.microsoft.com/office/drawing/2018/hyperlinkcolor">
   <p:cSld>
     <p:spTree>
       <p:nvGrpSpPr>
-        <p:cNvPr id="91" name="Shape 91"/>
+        <p:cNvPr id="92" name="Shape 92"/>
         <p:cNvGrpSpPr/>
         <p:nvPr/>
       </p:nvGrpSpPr>
@@ -7378,7 +8469,7 @@
       </p:grpSpPr>
       <p:sp>
         <p:nvSpPr>
-          <p:cNvPr id="92" name="Google Shape;92;p18"/>
+          <p:cNvPr id="93" name="Google Shape;93;p18"/>
           <p:cNvSpPr txBox="1"/>
           <p:nvPr>
             <p:ph type="title"/>
@@ -7418,7 +8509,7 @@
       </p:sp>
       <p:pic>
         <p:nvPicPr>
-          <p:cNvPr id="93" name="Google Shape;93;p18"/>
+          <p:cNvPr id="94" name="Google Shape;94;p18"/>
           <p:cNvPicPr preferRelativeResize="0"/>
           <p:nvPr/>
         </p:nvPicPr>
@@ -7446,7 +8537,7 @@
       </p:pic>
       <p:sp>
         <p:nvSpPr>
-          <p:cNvPr id="94" name="Google Shape;94;p18"/>
+          <p:cNvPr id="95" name="Google Shape;95;p18"/>
           <p:cNvSpPr txBox="1"/>
           <p:nvPr/>
         </p:nvSpPr>
@@ -7680,11 +8771,11 @@
 </file>
 
 <file path=ppt/slides/slide7.xml><?xml version="1.0" encoding="utf-8"?>
-<p:sld xmlns:a="http://schemas.openxmlformats.org/drawingml/2006/main" xmlns:r="http://schemas.openxmlformats.org/officeDocument/2006/relationships" xmlns:mc="http://schemas.openxmlformats.org/markup-compatibility/2006" xmlns:mv="urn:schemas-microsoft-com:mac:vml" xmlns:p="http://schemas.openxmlformats.org/presentationml/2006/main" xmlns:c="http://schemas.openxmlformats.org/drawingml/2006/chart" xmlns:dgm="http://schemas.openxmlformats.org/drawingml/2006/diagram" xmlns:o="urn:schemas-microsoft-com:office:office" xmlns:v="urn:schemas-microsoft-com:vml" xmlns:pvml="urn:schemas-microsoft-com:office:powerpoint" xmlns:com="http://schemas.openxmlformats.org/drawingml/2006/compatibility" xmlns:p14="http://schemas.microsoft.com/office/powerpoint/2010/main" xmlns:p15="http://schemas.microsoft.com/office/powerpoint/2012/main">
+<p:sld xmlns:a="http://schemas.openxmlformats.org/drawingml/2006/main" xmlns:r="http://schemas.openxmlformats.org/officeDocument/2006/relationships" xmlns:mc="http://schemas.openxmlformats.org/markup-compatibility/2006" xmlns:mv="urn:schemas-microsoft-com:mac:vml" xmlns:p="http://schemas.openxmlformats.org/presentationml/2006/main" xmlns:c="http://schemas.openxmlformats.org/drawingml/2006/chart" xmlns:dgm="http://schemas.openxmlformats.org/drawingml/2006/diagram" xmlns:o="urn:schemas-microsoft-com:office:office" xmlns:v="urn:schemas-microsoft-com:vml" xmlns:pvml="urn:schemas-microsoft-com:office:powerpoint" xmlns:com="http://schemas.openxmlformats.org/drawingml/2006/compatibility" xmlns:p14="http://schemas.microsoft.com/office/powerpoint/2010/main" xmlns:p15="http://schemas.microsoft.com/office/powerpoint/2012/main" xmlns:ahyp="http://schemas.microsoft.com/office/drawing/2018/hyperlinkcolor">
   <p:cSld>
     <p:spTree>
       <p:nvGrpSpPr>
-        <p:cNvPr id="98" name="Shape 98"/>
+        <p:cNvPr id="99" name="Shape 99"/>
         <p:cNvGrpSpPr/>
         <p:nvPr/>
       </p:nvGrpSpPr>
@@ -7698,7 +8789,7 @@
       </p:grpSpPr>
       <p:sp>
         <p:nvSpPr>
-          <p:cNvPr id="99" name="Google Shape;99;p19"/>
+          <p:cNvPr id="100" name="Google Shape;100;p19"/>
           <p:cNvSpPr txBox="1"/>
           <p:nvPr>
             <p:ph type="title"/>
@@ -7738,7 +8829,7 @@
       </p:sp>
       <p:pic>
         <p:nvPicPr>
-          <p:cNvPr id="100" name="Google Shape;100;p19"/>
+          <p:cNvPr id="101" name="Google Shape;101;p19"/>
           <p:cNvPicPr preferRelativeResize="0"/>
           <p:nvPr/>
         </p:nvPicPr>
@@ -7766,7 +8857,7 @@
       </p:pic>
       <p:sp>
         <p:nvSpPr>
-          <p:cNvPr id="101" name="Google Shape;101;p19"/>
+          <p:cNvPr id="102" name="Google Shape;102;p19"/>
           <p:cNvSpPr txBox="1"/>
           <p:nvPr/>
         </p:nvSpPr>
@@ -7904,7 +8995,7 @@
       </p:sp>
       <p:pic>
         <p:nvPicPr>
-          <p:cNvPr id="102" name="Google Shape;102;p19"/>
+          <p:cNvPr id="103" name="Google Shape;103;p19"/>
           <p:cNvPicPr preferRelativeResize="0"/>
           <p:nvPr/>
         </p:nvPicPr>
@@ -7918,36 +9009,8 @@
         </p:blipFill>
         <p:spPr>
           <a:xfrm>
-            <a:off x="2941625" y="3409375"/>
+            <a:off x="3668125" y="3389613"/>
             <a:ext cx="1206150" cy="1206150"/>
-          </a:xfrm>
-          <a:prstGeom prst="rect">
-            <a:avLst/>
-          </a:prstGeom>
-          <a:noFill/>
-          <a:ln>
-            <a:noFill/>
-          </a:ln>
-        </p:spPr>
-      </p:pic>
-      <p:pic>
-        <p:nvPicPr>
-          <p:cNvPr id="103" name="Google Shape;103;p19"/>
-          <p:cNvPicPr preferRelativeResize="0"/>
-          <p:nvPr/>
-        </p:nvPicPr>
-        <p:blipFill>
-          <a:blip r:embed="rId5">
-            <a:alphaModFix/>
-          </a:blip>
-          <a:stretch>
-            <a:fillRect/>
-          </a:stretch>
-        </p:blipFill>
-        <p:spPr>
-          <a:xfrm>
-            <a:off x="5045025" y="3345688"/>
-            <a:ext cx="1293300" cy="1333524"/>
           </a:xfrm>
           <a:prstGeom prst="rect">
             <a:avLst/>
@@ -7965,6 +9028,34 @@
           <p:nvPr/>
         </p:nvPicPr>
         <p:blipFill>
+          <a:blip r:embed="rId5">
+            <a:alphaModFix/>
+          </a:blip>
+          <a:stretch>
+            <a:fillRect/>
+          </a:stretch>
+        </p:blipFill>
+        <p:spPr>
+          <a:xfrm>
+            <a:off x="5771525" y="3325925"/>
+            <a:ext cx="1293300" cy="1333524"/>
+          </a:xfrm>
+          <a:prstGeom prst="rect">
+            <a:avLst/>
+          </a:prstGeom>
+          <a:noFill/>
+          <a:ln>
+            <a:noFill/>
+          </a:ln>
+        </p:spPr>
+      </p:pic>
+      <p:pic>
+        <p:nvPicPr>
+          <p:cNvPr id="105" name="Google Shape;105;p19"/>
+          <p:cNvPicPr preferRelativeResize="0"/>
+          <p:nvPr/>
+        </p:nvPicPr>
+        <p:blipFill>
           <a:blip r:embed="rId3">
             <a:alphaModFix/>
           </a:blip>
@@ -7974,7 +9065,7 @@
         </p:blipFill>
         <p:spPr>
           <a:xfrm>
-            <a:off x="712275" y="3302124"/>
+            <a:off x="1438775" y="3282362"/>
             <a:ext cx="1293299" cy="1293299"/>
           </a:xfrm>
           <a:prstGeom prst="rect">
@@ -7988,13 +9079,13 @@
       </p:pic>
       <p:sp>
         <p:nvSpPr>
-          <p:cNvPr id="105" name="Google Shape;105;p19"/>
+          <p:cNvPr id="106" name="Google Shape;106;p19"/>
           <p:cNvSpPr txBox="1"/>
           <p:nvPr/>
         </p:nvSpPr>
         <p:spPr>
           <a:xfrm>
-            <a:off x="2281150" y="3704725"/>
+            <a:off x="3007650" y="3684963"/>
             <a:ext cx="384900" cy="488100"/>
           </a:xfrm>
           <a:prstGeom prst="rect">
@@ -8030,13 +9121,13 @@
       </p:sp>
       <p:sp>
         <p:nvSpPr>
-          <p:cNvPr id="106" name="Google Shape;106;p19"/>
+          <p:cNvPr id="107" name="Google Shape;107;p19"/>
           <p:cNvSpPr txBox="1"/>
           <p:nvPr/>
         </p:nvSpPr>
         <p:spPr>
           <a:xfrm>
-            <a:off x="4423350" y="3673450"/>
+            <a:off x="5149850" y="3653688"/>
             <a:ext cx="443400" cy="678000"/>
           </a:xfrm>
           <a:prstGeom prst="rect">
@@ -8076,7 +9167,7 @@
       </p:sp>
       <p:sp>
         <p:nvSpPr>
-          <p:cNvPr id="107" name="Google Shape;107;p19"/>
+          <p:cNvPr id="108" name="Google Shape;108;p19"/>
           <p:cNvSpPr txBox="1"/>
           <p:nvPr/>
         </p:nvSpPr>
@@ -8109,8 +9200,7 @@
               <a:buNone/>
             </a:pPr>
             <a:r>
-              <a:rPr lang="en" sz="3700"/>
-              <a:t>=</a:t>
+              <a:t/>
             </a:r>
             <a:endParaRPr sz="3700"/>
           </a:p>
@@ -8125,11 +9215,11 @@
 </file>
 
 <file path=ppt/slides/slide8.xml><?xml version="1.0" encoding="utf-8"?>
-<p:sld xmlns:a="http://schemas.openxmlformats.org/drawingml/2006/main" xmlns:r="http://schemas.openxmlformats.org/officeDocument/2006/relationships" xmlns:mc="http://schemas.openxmlformats.org/markup-compatibility/2006" xmlns:mv="urn:schemas-microsoft-com:mac:vml" xmlns:p="http://schemas.openxmlformats.org/presentationml/2006/main" xmlns:c="http://schemas.openxmlformats.org/drawingml/2006/chart" xmlns:dgm="http://schemas.openxmlformats.org/drawingml/2006/diagram" xmlns:o="urn:schemas-microsoft-com:office:office" xmlns:v="urn:schemas-microsoft-com:vml" xmlns:pvml="urn:schemas-microsoft-com:office:powerpoint" xmlns:com="http://schemas.openxmlformats.org/drawingml/2006/compatibility" xmlns:p14="http://schemas.microsoft.com/office/powerpoint/2010/main" xmlns:p15="http://schemas.microsoft.com/office/powerpoint/2012/main">
+<p:sld xmlns:a="http://schemas.openxmlformats.org/drawingml/2006/main" xmlns:r="http://schemas.openxmlformats.org/officeDocument/2006/relationships" xmlns:mc="http://schemas.openxmlformats.org/markup-compatibility/2006" xmlns:mv="urn:schemas-microsoft-com:mac:vml" xmlns:p="http://schemas.openxmlformats.org/presentationml/2006/main" xmlns:c="http://schemas.openxmlformats.org/drawingml/2006/chart" xmlns:dgm="http://schemas.openxmlformats.org/drawingml/2006/diagram" xmlns:o="urn:schemas-microsoft-com:office:office" xmlns:v="urn:schemas-microsoft-com:vml" xmlns:pvml="urn:schemas-microsoft-com:office:powerpoint" xmlns:com="http://schemas.openxmlformats.org/drawingml/2006/compatibility" xmlns:p14="http://schemas.microsoft.com/office/powerpoint/2010/main" xmlns:p15="http://schemas.microsoft.com/office/powerpoint/2012/main" xmlns:ahyp="http://schemas.microsoft.com/office/drawing/2018/hyperlinkcolor">
   <p:cSld>
     <p:spTree>
       <p:nvGrpSpPr>
-        <p:cNvPr id="111" name="Shape 111"/>
+        <p:cNvPr id="112" name="Shape 112"/>
         <p:cNvGrpSpPr/>
         <p:nvPr/>
       </p:nvGrpSpPr>
@@ -8143,7 +9233,7 @@
       </p:grpSpPr>
       <p:sp>
         <p:nvSpPr>
-          <p:cNvPr id="112" name="Google Shape;112;p20"/>
+          <p:cNvPr id="113" name="Google Shape;113;p20"/>
           <p:cNvSpPr txBox="1"/>
           <p:nvPr>
             <p:ph type="title"/>
@@ -8151,7 +9241,7 @@
         </p:nvSpPr>
         <p:spPr>
           <a:xfrm>
-            <a:off x="311700" y="445025"/>
+            <a:off x="742950" y="105375"/>
             <a:ext cx="8520600" cy="572700"/>
           </a:xfrm>
           <a:prstGeom prst="rect">
@@ -8174,330 +9264,23 @@
               <a:buNone/>
             </a:pPr>
             <a:r>
+              <a:rPr lang="en"/>
+              <a:t>WebAssembly</a:t>
+            </a:r>
+            <a:endParaRPr b="1" sz="2300"/>
+          </a:p>
+          <a:p>
+            <a:pPr indent="0" lvl="0" marL="0" rtl="0" algn="l">
+              <a:spcBef>
+                <a:spcPts val="0"/>
+              </a:spcBef>
+              <a:spcAft>
+                <a:spcPts val="0"/>
+              </a:spcAft>
+              <a:buNone/>
+            </a:pPr>
+            <a:r>
               <a:t/>
-            </a:r>
-            <a:endParaRPr/>
-          </a:p>
-        </p:txBody>
-      </p:sp>
-      <p:sp>
-        <p:nvSpPr>
-          <p:cNvPr id="113" name="Google Shape;113;p20"/>
-          <p:cNvSpPr txBox="1"/>
-          <p:nvPr>
-            <p:ph idx="1" type="body"/>
-          </p:nvPr>
-        </p:nvSpPr>
-        <p:spPr>
-          <a:xfrm>
-            <a:off x="311700" y="1152475"/>
-            <a:ext cx="8520600" cy="3416400"/>
-          </a:xfrm>
-          <a:prstGeom prst="rect">
-            <a:avLst/>
-          </a:prstGeom>
-        </p:spPr>
-        <p:txBody>
-          <a:bodyPr anchorCtr="0" anchor="t" bIns="91425" lIns="91425" spcFirstLastPara="1" rIns="91425" wrap="square" tIns="91425">
-            <a:noAutofit/>
-          </a:bodyPr>
-          <a:lstStyle/>
-          <a:p>
-            <a:pPr indent="0" lvl="0" marL="0" rtl="0" algn="l">
-              <a:lnSpc>
-                <a:spcPct val="100000"/>
-              </a:lnSpc>
-              <a:spcBef>
-                <a:spcPts val="0"/>
-              </a:spcBef>
-              <a:spcAft>
-                <a:spcPts val="0"/>
-              </a:spcAft>
-              <a:buClr>
-                <a:schemeClr val="dk1"/>
-              </a:buClr>
-              <a:buSzPts val="1100"/>
-              <a:buFont typeface="Arial"/>
-              <a:buNone/>
-            </a:pPr>
-            <a:r>
-              <a:rPr lang="en" sz="1400">
-                <a:solidFill>
-                  <a:schemeClr val="dk1"/>
-                </a:solidFill>
-              </a:rPr>
-              <a:t>Following guide here: https://github.com/bradtraversy/deno-rest-api)</a:t>
-            </a:r>
-            <a:endParaRPr/>
-          </a:p>
-        </p:txBody>
-      </p:sp>
-    </p:spTree>
-  </p:cSld>
-  <p:clrMapOvr>
-    <a:masterClrMapping/>
-  </p:clrMapOvr>
-</p:sld>
-</file>
-
-<file path=ppt/slides/slide9.xml><?xml version="1.0" encoding="utf-8"?>
-<p:sld xmlns:a="http://schemas.openxmlformats.org/drawingml/2006/main" xmlns:r="http://schemas.openxmlformats.org/officeDocument/2006/relationships" xmlns:mc="http://schemas.openxmlformats.org/markup-compatibility/2006" xmlns:mv="urn:schemas-microsoft-com:mac:vml" xmlns:p="http://schemas.openxmlformats.org/presentationml/2006/main" xmlns:c="http://schemas.openxmlformats.org/drawingml/2006/chart" xmlns:dgm="http://schemas.openxmlformats.org/drawingml/2006/diagram" xmlns:o="urn:schemas-microsoft-com:office:office" xmlns:v="urn:schemas-microsoft-com:vml" xmlns:pvml="urn:schemas-microsoft-com:office:powerpoint" xmlns:com="http://schemas.openxmlformats.org/drawingml/2006/compatibility" xmlns:p14="http://schemas.microsoft.com/office/powerpoint/2010/main" xmlns:p15="http://schemas.microsoft.com/office/powerpoint/2012/main">
-  <p:cSld>
-    <p:spTree>
-      <p:nvGrpSpPr>
-        <p:cNvPr id="117" name="Shape 117"/>
-        <p:cNvGrpSpPr/>
-        <p:nvPr/>
-      </p:nvGrpSpPr>
-      <p:grpSpPr>
-        <a:xfrm>
-          <a:off x="0" y="0"/>
-          <a:ext cx="0" cy="0"/>
-          <a:chOff x="0" y="0"/>
-          <a:chExt cx="0" cy="0"/>
-        </a:xfrm>
-      </p:grpSpPr>
-      <p:sp>
-        <p:nvSpPr>
-          <p:cNvPr id="118" name="Google Shape;118;p21"/>
-          <p:cNvSpPr txBox="1"/>
-          <p:nvPr>
-            <p:ph type="title"/>
-          </p:nvPr>
-        </p:nvSpPr>
-        <p:spPr>
-          <a:xfrm>
-            <a:off x="678075" y="105375"/>
-            <a:ext cx="8520600" cy="572700"/>
-          </a:xfrm>
-          <a:prstGeom prst="rect">
-            <a:avLst/>
-          </a:prstGeom>
-        </p:spPr>
-        <p:txBody>
-          <a:bodyPr anchorCtr="0" anchor="t" bIns="91425" lIns="91425" spcFirstLastPara="1" rIns="91425" wrap="square" tIns="91425">
-            <a:noAutofit/>
-          </a:bodyPr>
-          <a:lstStyle/>
-          <a:p>
-            <a:pPr indent="0" lvl="0" marL="0" rtl="0" algn="l">
-              <a:spcBef>
-                <a:spcPts val="0"/>
-              </a:spcBef>
-              <a:spcAft>
-                <a:spcPts val="0"/>
-              </a:spcAft>
-              <a:buNone/>
-            </a:pPr>
-            <a:r>
-              <a:rPr lang="en"/>
-              <a:t>References and Resources</a:t>
-            </a:r>
-            <a:endParaRPr/>
-          </a:p>
-        </p:txBody>
-      </p:sp>
-      <p:sp>
-        <p:nvSpPr>
-          <p:cNvPr id="119" name="Google Shape;119;p21"/>
-          <p:cNvSpPr txBox="1"/>
-          <p:nvPr>
-            <p:ph idx="1" type="body"/>
-          </p:nvPr>
-        </p:nvSpPr>
-        <p:spPr>
-          <a:xfrm>
-            <a:off x="311700" y="905775"/>
-            <a:ext cx="8520600" cy="3416400"/>
-          </a:xfrm>
-          <a:prstGeom prst="rect">
-            <a:avLst/>
-          </a:prstGeom>
-        </p:spPr>
-        <p:txBody>
-          <a:bodyPr anchorCtr="0" anchor="t" bIns="91425" lIns="91425" spcFirstLastPara="1" rIns="91425" wrap="square" tIns="91425">
-            <a:noAutofit/>
-          </a:bodyPr>
-          <a:lstStyle/>
-          <a:p>
-            <a:pPr indent="-342900" lvl="0" marL="457200" rtl="0" algn="l">
-              <a:spcBef>
-                <a:spcPts val="0"/>
-              </a:spcBef>
-              <a:spcAft>
-                <a:spcPts val="0"/>
-              </a:spcAft>
-              <a:buSzPts val="1800"/>
-              <a:buChar char="●"/>
-            </a:pPr>
-            <a:r>
-              <a:rPr lang="en"/>
-              <a:t>Logo from </a:t>
-            </a:r>
-            <a:r>
-              <a:rPr lang="en" u="sng">
-                <a:solidFill>
-                  <a:schemeClr val="hlink"/>
-                </a:solidFill>
-                <a:hlinkClick r:id="rId3"/>
-              </a:rPr>
-              <a:t>https://github.com/denolib/high-res-deno-logo/blob/master/deno_hr_circle.svg</a:t>
-            </a:r>
-            <a:endParaRPr/>
-          </a:p>
-          <a:p>
-            <a:pPr indent="-342900" lvl="0" marL="457200" rtl="0" algn="l">
-              <a:spcBef>
-                <a:spcPts val="0"/>
-              </a:spcBef>
-              <a:spcAft>
-                <a:spcPts val="0"/>
-              </a:spcAft>
-              <a:buSzPts val="1800"/>
-              <a:buChar char="●"/>
-            </a:pPr>
-            <a:r>
-              <a:rPr lang="en"/>
-              <a:t>Main website: </a:t>
-            </a:r>
-            <a:r>
-              <a:rPr lang="en" u="sng">
-                <a:solidFill>
-                  <a:schemeClr val="hlink"/>
-                </a:solidFill>
-                <a:hlinkClick r:id="rId4"/>
-              </a:rPr>
-              <a:t>https://deno.land/</a:t>
-            </a:r>
-            <a:endParaRPr/>
-          </a:p>
-          <a:p>
-            <a:pPr indent="-342900" lvl="0" marL="457200" rtl="0" algn="l">
-              <a:spcBef>
-                <a:spcPts val="0"/>
-              </a:spcBef>
-              <a:spcAft>
-                <a:spcPts val="0"/>
-              </a:spcAft>
-              <a:buSzPts val="1800"/>
-              <a:buChar char="●"/>
-            </a:pPr>
-            <a:r>
-              <a:rPr lang="en"/>
-              <a:t>Documentation and example programs: </a:t>
-            </a:r>
-            <a:r>
-              <a:rPr lang="en" u="sng">
-                <a:solidFill>
-                  <a:schemeClr val="hlink"/>
-                </a:solidFill>
-                <a:hlinkClick r:id="rId5"/>
-              </a:rPr>
-              <a:t>https://deno.land/manual</a:t>
-            </a:r>
-            <a:endParaRPr/>
-          </a:p>
-          <a:p>
-            <a:pPr indent="-342900" lvl="0" marL="457200" rtl="0" algn="l">
-              <a:spcBef>
-                <a:spcPts val="0"/>
-              </a:spcBef>
-              <a:spcAft>
-                <a:spcPts val="0"/>
-              </a:spcAft>
-              <a:buSzPts val="1800"/>
-              <a:buChar char="●"/>
-            </a:pPr>
-            <a:r>
-              <a:rPr lang="en"/>
-              <a:t>FreeCodeCamp more in depth 6 hour talk: </a:t>
-            </a:r>
-            <a:r>
-              <a:rPr lang="en" u="sng">
-                <a:solidFill>
-                  <a:schemeClr val="hlink"/>
-                </a:solidFill>
-                <a:hlinkClick r:id="rId6"/>
-              </a:rPr>
-              <a:t>https://www.youtube.com/watch?v=TQUy8ENesGY</a:t>
-            </a:r>
-            <a:endParaRPr/>
-          </a:p>
-          <a:p>
-            <a:pPr indent="-342900" lvl="0" marL="457200" rtl="0" algn="l">
-              <a:spcBef>
-                <a:spcPts val="0"/>
-              </a:spcBef>
-              <a:spcAft>
-                <a:spcPts val="0"/>
-              </a:spcAft>
-              <a:buSzPts val="1800"/>
-              <a:buChar char="●"/>
-            </a:pPr>
-            <a:r>
-              <a:rPr lang="en"/>
-              <a:t>Deno crash course with Rest API: </a:t>
-            </a:r>
-            <a:r>
-              <a:rPr lang="en" u="sng">
-                <a:solidFill>
-                  <a:schemeClr val="hlink"/>
-                </a:solidFill>
-                <a:hlinkClick r:id="rId7"/>
-              </a:rPr>
-              <a:t>https://www.youtube.com/watch?v=NHHhiqwcfRM&amp;t=5s</a:t>
-            </a:r>
-            <a:endParaRPr/>
-          </a:p>
-          <a:p>
-            <a:pPr indent="-342900" lvl="0" marL="457200" rtl="0" algn="l">
-              <a:spcBef>
-                <a:spcPts val="0"/>
-              </a:spcBef>
-              <a:spcAft>
-                <a:spcPts val="0"/>
-              </a:spcAft>
-              <a:buSzPts val="1800"/>
-              <a:buChar char="●"/>
-            </a:pPr>
-            <a:r>
-              <a:rPr lang="en"/>
-              <a:t>Oak REST API: </a:t>
-            </a:r>
-            <a:r>
-              <a:rPr lang="en" u="sng">
-                <a:solidFill>
-                  <a:schemeClr val="hlink"/>
-                </a:solidFill>
-                <a:hlinkClick r:id="rId8"/>
-              </a:rPr>
-              <a:t>https://github.com/oakserver/oak</a:t>
-            </a:r>
-            <a:endParaRPr/>
-          </a:p>
-          <a:p>
-            <a:pPr indent="-342900" lvl="0" marL="457200" rtl="0" algn="l">
-              <a:spcBef>
-                <a:spcPts val="0"/>
-              </a:spcBef>
-              <a:spcAft>
-                <a:spcPts val="0"/>
-              </a:spcAft>
-              <a:buSzPts val="1800"/>
-              <a:buChar char="●"/>
-            </a:pPr>
-            <a:r>
-              <a:rPr lang="en"/>
-              <a:t>Other Oak REST API: </a:t>
-            </a:r>
-            <a:r>
-              <a:rPr lang="en" u="sng">
-                <a:solidFill>
-                  <a:schemeClr val="hlink"/>
-                </a:solidFill>
-                <a:hlinkClick r:id="rId9"/>
-              </a:rPr>
-              <a:t>https://medium.com/javascript-in-plain-english/building-crud-apis-using-deno-and-oak-9f71ec106b0e</a:t>
             </a:r>
             <a:endParaRPr/>
           </a:p>
@@ -8505,12 +9288,12 @@
       </p:sp>
       <p:pic>
         <p:nvPicPr>
-          <p:cNvPr id="120" name="Google Shape;120;p21"/>
+          <p:cNvPr id="114" name="Google Shape;114;p20"/>
           <p:cNvPicPr preferRelativeResize="0"/>
           <p:nvPr/>
         </p:nvPicPr>
         <p:blipFill>
-          <a:blip r:embed="rId10">
+          <a:blip r:embed="rId3">
             <a:alphaModFix/>
           </a:blip>
           <a:stretch>
@@ -8531,6 +9314,584 @@
           </a:ln>
         </p:spPr>
       </p:pic>
+      <p:sp>
+        <p:nvSpPr>
+          <p:cNvPr id="115" name="Google Shape;115;p20"/>
+          <p:cNvSpPr txBox="1"/>
+          <p:nvPr/>
+        </p:nvSpPr>
+        <p:spPr>
+          <a:xfrm>
+            <a:off x="558150" y="1347225"/>
+            <a:ext cx="8027700" cy="3116700"/>
+          </a:xfrm>
+          <a:prstGeom prst="rect">
+            <a:avLst/>
+          </a:prstGeom>
+          <a:noFill/>
+          <a:ln>
+            <a:noFill/>
+          </a:ln>
+        </p:spPr>
+        <p:txBody>
+          <a:bodyPr anchorCtr="0" anchor="t" bIns="91425" lIns="91425" spcFirstLastPara="1" rIns="91425" wrap="square" tIns="91425">
+            <a:noAutofit/>
+          </a:bodyPr>
+          <a:lstStyle/>
+          <a:p>
+            <a:pPr indent="-317500" lvl="0" marL="457200" rtl="0" algn="l">
+              <a:spcBef>
+                <a:spcPts val="0"/>
+              </a:spcBef>
+              <a:spcAft>
+                <a:spcPts val="0"/>
+              </a:spcAft>
+              <a:buSzPts val="1400"/>
+              <a:buChar char="●"/>
+            </a:pPr>
+            <a:r>
+              <a:rPr lang="en"/>
+              <a:t>Deno/Node.js/Browsers execute JavaScript on C/C++ based runtimes.</a:t>
+            </a:r>
+            <a:endParaRPr/>
+          </a:p>
+          <a:p>
+            <a:pPr indent="-317500" lvl="0" marL="457200" rtl="0" algn="l">
+              <a:spcBef>
+                <a:spcPts val="0"/>
+              </a:spcBef>
+              <a:spcAft>
+                <a:spcPts val="0"/>
+              </a:spcAft>
+              <a:buSzPts val="1400"/>
+              <a:buChar char="●"/>
+            </a:pPr>
+            <a:r>
+              <a:rPr lang="en"/>
+              <a:t>Allows developers to use compiled languages and libraries on the web (and everything else)!</a:t>
+            </a:r>
+            <a:endParaRPr/>
+          </a:p>
+          <a:p>
+            <a:pPr indent="-317500" lvl="0" marL="457200" rtl="0" algn="l">
+              <a:spcBef>
+                <a:spcPts val="0"/>
+              </a:spcBef>
+              <a:spcAft>
+                <a:spcPts val="0"/>
+              </a:spcAft>
+              <a:buSzPts val="1400"/>
+              <a:buChar char="●"/>
+            </a:pPr>
+            <a:r>
+              <a:rPr lang="en"/>
+              <a:t>Most modern day browsers already support WebAssembly as a standard.</a:t>
+            </a:r>
+            <a:endParaRPr/>
+          </a:p>
+          <a:p>
+            <a:pPr indent="0" lvl="0" marL="0" rtl="0" algn="l">
+              <a:spcBef>
+                <a:spcPts val="0"/>
+              </a:spcBef>
+              <a:spcAft>
+                <a:spcPts val="0"/>
+              </a:spcAft>
+              <a:buNone/>
+            </a:pPr>
+            <a:r>
+              <a:t/>
+            </a:r>
+            <a:endParaRPr/>
+          </a:p>
+          <a:p>
+            <a:pPr indent="0" lvl="0" marL="0" rtl="0" algn="l">
+              <a:spcBef>
+                <a:spcPts val="0"/>
+              </a:spcBef>
+              <a:spcAft>
+                <a:spcPts val="0"/>
+              </a:spcAft>
+              <a:buNone/>
+            </a:pPr>
+            <a:r>
+              <a:t/>
+            </a:r>
+            <a:endParaRPr/>
+          </a:p>
+          <a:p>
+            <a:pPr indent="0" lvl="0" marL="0" rtl="0" algn="l">
+              <a:spcBef>
+                <a:spcPts val="0"/>
+              </a:spcBef>
+              <a:spcAft>
+                <a:spcPts val="0"/>
+              </a:spcAft>
+              <a:buNone/>
+            </a:pPr>
+            <a:r>
+              <a:t/>
+            </a:r>
+            <a:endParaRPr/>
+          </a:p>
+          <a:p>
+            <a:pPr indent="0" lvl="0" marL="0" rtl="0" algn="l">
+              <a:spcBef>
+                <a:spcPts val="0"/>
+              </a:spcBef>
+              <a:spcAft>
+                <a:spcPts val="0"/>
+              </a:spcAft>
+              <a:buNone/>
+            </a:pPr>
+            <a:r>
+              <a:rPr lang="en" sz="1600"/>
+              <a:t>Example:</a:t>
+            </a:r>
+            <a:endParaRPr sz="1600"/>
+          </a:p>
+          <a:p>
+            <a:pPr indent="0" lvl="0" marL="0" rtl="0" algn="l">
+              <a:spcBef>
+                <a:spcPts val="0"/>
+              </a:spcBef>
+              <a:spcAft>
+                <a:spcPts val="0"/>
+              </a:spcAft>
+              <a:buNone/>
+            </a:pPr>
+            <a:r>
+              <a:rPr lang="en"/>
+              <a:t>LISP interpreter in the browser (javascript bindings into C -&gt; LISP)!</a:t>
+            </a:r>
+            <a:endParaRPr/>
+          </a:p>
+          <a:p>
+            <a:pPr indent="0" lvl="0" marL="0" rtl="0" algn="l">
+              <a:spcBef>
+                <a:spcPts val="0"/>
+              </a:spcBef>
+              <a:spcAft>
+                <a:spcPts val="0"/>
+              </a:spcAft>
+              <a:buNone/>
+            </a:pPr>
+            <a:r>
+              <a:rPr lang="en" u="sng">
+                <a:solidFill>
+                  <a:schemeClr val="hlink"/>
+                </a:solidFill>
+                <a:hlinkClick r:id="rId4"/>
+              </a:rPr>
+              <a:t>https://github.com/michaelachrisco/ToyLisp</a:t>
+            </a:r>
+            <a:endParaRPr/>
+          </a:p>
+          <a:p>
+            <a:pPr indent="0" lvl="0" marL="0" rtl="0" algn="l">
+              <a:spcBef>
+                <a:spcPts val="0"/>
+              </a:spcBef>
+              <a:spcAft>
+                <a:spcPts val="0"/>
+              </a:spcAft>
+              <a:buNone/>
+            </a:pPr>
+            <a:r>
+              <a:t/>
+            </a:r>
+            <a:endParaRPr/>
+          </a:p>
+          <a:p>
+            <a:pPr indent="0" lvl="0" marL="0" rtl="0" algn="l">
+              <a:spcBef>
+                <a:spcPts val="0"/>
+              </a:spcBef>
+              <a:spcAft>
+                <a:spcPts val="0"/>
+              </a:spcAft>
+              <a:buNone/>
+            </a:pPr>
+            <a:r>
+              <a:t/>
+            </a:r>
+            <a:endParaRPr/>
+          </a:p>
+          <a:p>
+            <a:pPr indent="0" lvl="0" marL="0" rtl="0" algn="l">
+              <a:spcBef>
+                <a:spcPts val="0"/>
+              </a:spcBef>
+              <a:spcAft>
+                <a:spcPts val="0"/>
+              </a:spcAft>
+              <a:buNone/>
+            </a:pPr>
+            <a:r>
+              <a:rPr b="1" lang="en"/>
+              <a:t>Warning: This is a talk in itself!</a:t>
+            </a:r>
+            <a:endParaRPr b="1"/>
+          </a:p>
+        </p:txBody>
+      </p:sp>
+    </p:spTree>
+  </p:cSld>
+  <p:clrMapOvr>
+    <a:masterClrMapping/>
+  </p:clrMapOvr>
+</p:sld>
+</file>
+
+<file path=ppt/slides/slide9.xml><?xml version="1.0" encoding="utf-8"?>
+<p:sld xmlns:a="http://schemas.openxmlformats.org/drawingml/2006/main" xmlns:r="http://schemas.openxmlformats.org/officeDocument/2006/relationships" xmlns:mc="http://schemas.openxmlformats.org/markup-compatibility/2006" xmlns:mv="urn:schemas-microsoft-com:mac:vml" xmlns:p="http://schemas.openxmlformats.org/presentationml/2006/main" xmlns:c="http://schemas.openxmlformats.org/drawingml/2006/chart" xmlns:dgm="http://schemas.openxmlformats.org/drawingml/2006/diagram" xmlns:o="urn:schemas-microsoft-com:office:office" xmlns:v="urn:schemas-microsoft-com:vml" xmlns:pvml="urn:schemas-microsoft-com:office:powerpoint" xmlns:com="http://schemas.openxmlformats.org/drawingml/2006/compatibility" xmlns:p14="http://schemas.microsoft.com/office/powerpoint/2010/main" xmlns:p15="http://schemas.microsoft.com/office/powerpoint/2012/main" xmlns:ahyp="http://schemas.microsoft.com/office/drawing/2018/hyperlinkcolor">
+  <p:cSld>
+    <p:spTree>
+      <p:nvGrpSpPr>
+        <p:cNvPr id="119" name="Shape 119"/>
+        <p:cNvGrpSpPr/>
+        <p:nvPr/>
+      </p:nvGrpSpPr>
+      <p:grpSpPr>
+        <a:xfrm>
+          <a:off x="0" y="0"/>
+          <a:ext cx="0" cy="0"/>
+          <a:chOff x="0" y="0"/>
+          <a:chExt cx="0" cy="0"/>
+        </a:xfrm>
+      </p:grpSpPr>
+      <p:sp>
+        <p:nvSpPr>
+          <p:cNvPr id="120" name="Google Shape;120;p21"/>
+          <p:cNvSpPr txBox="1"/>
+          <p:nvPr>
+            <p:ph type="title"/>
+          </p:nvPr>
+        </p:nvSpPr>
+        <p:spPr>
+          <a:xfrm>
+            <a:off x="742950" y="105375"/>
+            <a:ext cx="8520600" cy="572700"/>
+          </a:xfrm>
+          <a:prstGeom prst="rect">
+            <a:avLst/>
+          </a:prstGeom>
+        </p:spPr>
+        <p:txBody>
+          <a:bodyPr anchorCtr="0" anchor="t" bIns="91425" lIns="91425" spcFirstLastPara="1" rIns="91425" wrap="square" tIns="91425">
+            <a:noAutofit/>
+          </a:bodyPr>
+          <a:lstStyle/>
+          <a:p>
+            <a:pPr indent="0" lvl="0" marL="0" rtl="0" algn="l">
+              <a:spcBef>
+                <a:spcPts val="0"/>
+              </a:spcBef>
+              <a:spcAft>
+                <a:spcPts val="0"/>
+              </a:spcAft>
+              <a:buNone/>
+            </a:pPr>
+            <a:r>
+              <a:rPr lang="en"/>
+              <a:t>Deno + </a:t>
+            </a:r>
+            <a:r>
+              <a:rPr lang="en"/>
+              <a:t>WebAssembly</a:t>
+            </a:r>
+            <a:endParaRPr b="1" sz="2300"/>
+          </a:p>
+          <a:p>
+            <a:pPr indent="0" lvl="0" marL="0" rtl="0" algn="l">
+              <a:spcBef>
+                <a:spcPts val="0"/>
+              </a:spcBef>
+              <a:spcAft>
+                <a:spcPts val="0"/>
+              </a:spcAft>
+              <a:buNone/>
+            </a:pPr>
+            <a:r>
+              <a:t/>
+            </a:r>
+            <a:endParaRPr/>
+          </a:p>
+        </p:txBody>
+      </p:sp>
+      <p:pic>
+        <p:nvPicPr>
+          <p:cNvPr id="121" name="Google Shape;121;p21"/>
+          <p:cNvPicPr preferRelativeResize="0"/>
+          <p:nvPr/>
+        </p:nvPicPr>
+        <p:blipFill>
+          <a:blip r:embed="rId3">
+            <a:alphaModFix/>
+          </a:blip>
+          <a:stretch>
+            <a:fillRect/>
+          </a:stretch>
+        </p:blipFill>
+        <p:spPr>
+          <a:xfrm>
+            <a:off x="0" y="-1"/>
+            <a:ext cx="678075" cy="678075"/>
+          </a:xfrm>
+          <a:prstGeom prst="rect">
+            <a:avLst/>
+          </a:prstGeom>
+          <a:noFill/>
+          <a:ln>
+            <a:noFill/>
+          </a:ln>
+        </p:spPr>
+      </p:pic>
+      <p:sp>
+        <p:nvSpPr>
+          <p:cNvPr id="122" name="Google Shape;122;p21"/>
+          <p:cNvSpPr txBox="1"/>
+          <p:nvPr/>
+        </p:nvSpPr>
+        <p:spPr>
+          <a:xfrm>
+            <a:off x="558150" y="1347225"/>
+            <a:ext cx="8027700" cy="3116700"/>
+          </a:xfrm>
+          <a:prstGeom prst="rect">
+            <a:avLst/>
+          </a:prstGeom>
+          <a:noFill/>
+          <a:ln>
+            <a:noFill/>
+          </a:ln>
+        </p:spPr>
+        <p:txBody>
+          <a:bodyPr anchorCtr="0" anchor="t" bIns="91425" lIns="91425" spcFirstLastPara="1" rIns="91425" wrap="square" tIns="91425">
+            <a:noAutofit/>
+          </a:bodyPr>
+          <a:lstStyle/>
+          <a:p>
+            <a:pPr indent="-317500" lvl="0" marL="457200" rtl="0" algn="l">
+              <a:spcBef>
+                <a:spcPts val="0"/>
+              </a:spcBef>
+              <a:spcAft>
+                <a:spcPts val="0"/>
+              </a:spcAft>
+              <a:buSzPts val="1400"/>
+              <a:buChar char="●"/>
+            </a:pPr>
+            <a:r>
+              <a:rPr lang="en"/>
+              <a:t>Deno supports WebAssembly out of the box.</a:t>
+            </a:r>
+            <a:endParaRPr/>
+          </a:p>
+          <a:p>
+            <a:pPr indent="-317500" lvl="0" marL="457200" rtl="0" algn="l">
+              <a:spcBef>
+                <a:spcPts val="0"/>
+              </a:spcBef>
+              <a:spcAft>
+                <a:spcPts val="0"/>
+              </a:spcAft>
+              <a:buSzPts val="1400"/>
+              <a:buChar char="●"/>
+            </a:pPr>
+            <a:r>
+              <a:rPr lang="en"/>
+              <a:t>C/C++/Rust/Go and many more work with Deno bindings.</a:t>
+            </a:r>
+            <a:endParaRPr/>
+          </a:p>
+          <a:p>
+            <a:pPr indent="-317500" lvl="0" marL="457200" rtl="0" algn="l">
+              <a:spcBef>
+                <a:spcPts val="0"/>
+              </a:spcBef>
+              <a:spcAft>
+                <a:spcPts val="0"/>
+              </a:spcAft>
+              <a:buSzPts val="1400"/>
+              <a:buChar char="●"/>
+            </a:pPr>
+            <a:r>
+              <a:rPr lang="en"/>
+              <a:t>Most modern day browsers already support WebAssembly as a standard.</a:t>
+            </a:r>
+            <a:endParaRPr/>
+          </a:p>
+          <a:p>
+            <a:pPr indent="0" lvl="0" marL="0" rtl="0" algn="l">
+              <a:spcBef>
+                <a:spcPts val="0"/>
+              </a:spcBef>
+              <a:spcAft>
+                <a:spcPts val="0"/>
+              </a:spcAft>
+              <a:buNone/>
+            </a:pPr>
+            <a:r>
+              <a:t/>
+            </a:r>
+            <a:endParaRPr/>
+          </a:p>
+          <a:p>
+            <a:pPr indent="0" lvl="0" marL="0" rtl="0" algn="l">
+              <a:spcBef>
+                <a:spcPts val="0"/>
+              </a:spcBef>
+              <a:spcAft>
+                <a:spcPts val="0"/>
+              </a:spcAft>
+              <a:buNone/>
+            </a:pPr>
+            <a:r>
+              <a:t/>
+            </a:r>
+            <a:endParaRPr/>
+          </a:p>
+          <a:p>
+            <a:pPr indent="0" lvl="0" marL="0" rtl="0" algn="l">
+              <a:spcBef>
+                <a:spcPts val="0"/>
+              </a:spcBef>
+              <a:spcAft>
+                <a:spcPts val="0"/>
+              </a:spcAft>
+              <a:buNone/>
+            </a:pPr>
+            <a:r>
+              <a:t/>
+            </a:r>
+            <a:endParaRPr/>
+          </a:p>
+          <a:p>
+            <a:pPr indent="0" lvl="0" marL="0" rtl="0" algn="l">
+              <a:spcBef>
+                <a:spcPts val="0"/>
+              </a:spcBef>
+              <a:spcAft>
+                <a:spcPts val="0"/>
+              </a:spcAft>
+              <a:buNone/>
+            </a:pPr>
+            <a:r>
+              <a:rPr lang="en" sz="1600"/>
+              <a:t>Practical </a:t>
+            </a:r>
+            <a:r>
+              <a:rPr lang="en" sz="1600"/>
+              <a:t>Example:</a:t>
+            </a:r>
+            <a:endParaRPr sz="1600"/>
+          </a:p>
+          <a:p>
+            <a:pPr indent="0" lvl="0" marL="0" rtl="0" algn="l">
+              <a:spcBef>
+                <a:spcPts val="0"/>
+              </a:spcBef>
+              <a:spcAft>
+                <a:spcPts val="0"/>
+              </a:spcAft>
+              <a:buNone/>
+            </a:pPr>
+            <a:r>
+              <a:rPr lang="en" sz="1600"/>
+              <a:t>Creating </a:t>
+            </a:r>
+            <a:r>
+              <a:rPr lang="en" sz="1600"/>
+              <a:t>web-based GUIs for desktop applications with Rust and Deno.</a:t>
+            </a:r>
+            <a:endParaRPr sz="1600"/>
+          </a:p>
+          <a:p>
+            <a:pPr indent="0" lvl="0" marL="0" rtl="0" algn="l">
+              <a:spcBef>
+                <a:spcPts val="0"/>
+              </a:spcBef>
+              <a:spcAft>
+                <a:spcPts val="0"/>
+              </a:spcAft>
+              <a:buNone/>
+            </a:pPr>
+            <a:r>
+              <a:rPr lang="en" sz="1600"/>
+              <a:t>Heavily based on work here:</a:t>
+            </a:r>
+            <a:endParaRPr sz="1600"/>
+          </a:p>
+          <a:p>
+            <a:pPr indent="0" lvl="0" marL="0" rtl="0" algn="l">
+              <a:spcBef>
+                <a:spcPts val="0"/>
+              </a:spcBef>
+              <a:spcAft>
+                <a:spcPts val="0"/>
+              </a:spcAft>
+              <a:buNone/>
+            </a:pPr>
+            <a:r>
+              <a:rPr lang="en" u="sng">
+                <a:solidFill>
+                  <a:schemeClr val="hlink"/>
+                </a:solidFill>
+                <a:hlinkClick r:id="rId4"/>
+              </a:rPr>
+              <a:t>https://github.com/webview/webview_deno</a:t>
+            </a:r>
+            <a:endParaRPr/>
+          </a:p>
+          <a:p>
+            <a:pPr indent="0" lvl="0" marL="0" rtl="0" algn="l">
+              <a:spcBef>
+                <a:spcPts val="0"/>
+              </a:spcBef>
+              <a:spcAft>
+                <a:spcPts val="0"/>
+              </a:spcAft>
+              <a:buNone/>
+            </a:pPr>
+            <a:r>
+              <a:t/>
+            </a:r>
+            <a:endParaRPr/>
+          </a:p>
+          <a:p>
+            <a:pPr indent="0" lvl="0" marL="0" rtl="0" algn="l">
+              <a:spcBef>
+                <a:spcPts val="0"/>
+              </a:spcBef>
+              <a:spcAft>
+                <a:spcPts val="0"/>
+              </a:spcAft>
+              <a:buNone/>
+            </a:pPr>
+            <a:r>
+              <a:t/>
+            </a:r>
+            <a:endParaRPr/>
+          </a:p>
+          <a:p>
+            <a:pPr indent="0" lvl="0" marL="0" rtl="0" algn="l">
+              <a:spcBef>
+                <a:spcPts val="0"/>
+              </a:spcBef>
+              <a:spcAft>
+                <a:spcPts val="0"/>
+              </a:spcAft>
+              <a:buNone/>
+            </a:pPr>
+            <a:r>
+              <a:rPr b="1" lang="en"/>
+              <a:t>Warning: This is a talk in itself!</a:t>
+            </a:r>
+            <a:endParaRPr b="1"/>
+          </a:p>
+        </p:txBody>
+      </p:sp>
     </p:spTree>
   </p:cSld>
   <p:clrMapOvr>

</xml_diff>

<commit_message>
feature(Presentation): Last minute changes and graphics
</commit_message>
<xml_diff>
--- a/Introduction to Deno.pptx
+++ b/Introduction to Deno.pptx
@@ -20,6 +20,10 @@
     <p:sldId id="265" r:id="rId15"/>
     <p:sldId id="266" r:id="rId16"/>
     <p:sldId id="267" r:id="rId17"/>
+    <p:sldId id="268" r:id="rId18"/>
+    <p:sldId id="269" r:id="rId19"/>
+    <p:sldId id="270" r:id="rId20"/>
+    <p:sldId id="271" r:id="rId21"/>
   </p:sldIdLst>
   <p:sldSz cy="5143500" cx="9144000"/>
   <p:notesSz cx="6858000" cy="9144000"/>
@@ -914,7 +918,7 @@
       </p:grpSpPr>
       <p:sp>
         <p:nvSpPr>
-          <p:cNvPr id="131" name="Google Shape;131;g8fb1f6987e_1_7:notes"/>
+          <p:cNvPr id="131" name="Google Shape;131;g90698affdd_1_6:notes"/>
           <p:cNvSpPr/>
           <p:nvPr>
             <p:ph idx="2" type="sldImg"/>
@@ -949,7 +953,7 @@
       </p:sp>
       <p:sp>
         <p:nvSpPr>
-          <p:cNvPr id="132" name="Google Shape;132;g8fb1f6987e_1_7:notes"/>
+          <p:cNvPr id="132" name="Google Shape;132;g90698affdd_1_6:notes"/>
           <p:cNvSpPr txBox="1"/>
           <p:nvPr>
             <p:ph idx="1" type="body"/>
@@ -980,7 +984,12 @@
               <a:buNone/>
             </a:pPr>
             <a:r>
-              <a:t/>
+              <a:rPr lang="en" sz="1600">
+                <a:solidFill>
+                  <a:schemeClr val="dk1"/>
+                </a:solidFill>
+              </a:rPr>
+              <a:t>fs events ops (auto update deno/node)</a:t>
             </a:r>
             <a:endParaRPr/>
           </a:p>
@@ -999,7 +1008,7 @@
   <p:cSld>
     <p:spTree>
       <p:nvGrpSpPr>
-        <p:cNvPr id="136" name="Shape 136"/>
+        <p:cNvPr id="137" name="Shape 137"/>
         <p:cNvGrpSpPr/>
         <p:nvPr/>
       </p:nvGrpSpPr>
@@ -1013,7 +1022,7 @@
       </p:grpSpPr>
       <p:sp>
         <p:nvSpPr>
-          <p:cNvPr id="137" name="Google Shape;137;g8c35b87562_0_3:notes"/>
+          <p:cNvPr id="138" name="Google Shape;138;g90698affdd_1_12:notes"/>
           <p:cNvSpPr/>
           <p:nvPr>
             <p:ph idx="2" type="sldImg"/>
@@ -1048,7 +1057,403 @@
       </p:sp>
       <p:sp>
         <p:nvSpPr>
-          <p:cNvPr id="138" name="Google Shape;138;g8c35b87562_0_3:notes"/>
+          <p:cNvPr id="139" name="Google Shape;139;g90698affdd_1_12:notes"/>
+          <p:cNvSpPr txBox="1"/>
+          <p:nvPr>
+            <p:ph idx="1" type="body"/>
+          </p:nvPr>
+        </p:nvSpPr>
+        <p:spPr>
+          <a:xfrm>
+            <a:off x="685800" y="4343400"/>
+            <a:ext cx="5486400" cy="4114800"/>
+          </a:xfrm>
+          <a:prstGeom prst="rect">
+            <a:avLst/>
+          </a:prstGeom>
+        </p:spPr>
+        <p:txBody>
+          <a:bodyPr anchorCtr="0" anchor="t" bIns="91425" lIns="91425" spcFirstLastPara="1" rIns="91425" wrap="square" tIns="91425">
+            <a:noAutofit/>
+          </a:bodyPr>
+          <a:lstStyle/>
+          <a:p>
+            <a:pPr indent="0" lvl="0" marL="0" rtl="0" algn="l">
+              <a:spcBef>
+                <a:spcPts val="0"/>
+              </a:spcBef>
+              <a:spcAft>
+                <a:spcPts val="0"/>
+              </a:spcAft>
+              <a:buNone/>
+            </a:pPr>
+            <a:r>
+              <a:t/>
+            </a:r>
+            <a:endParaRPr/>
+          </a:p>
+        </p:txBody>
+      </p:sp>
+    </p:spTree>
+  </p:cSld>
+  <p:clrMapOvr>
+    <a:masterClrMapping/>
+  </p:clrMapOvr>
+</p:notes>
+</file>
+
+<file path=ppt/notesSlides/notesSlide13.xml><?xml version="1.0" encoding="utf-8"?>
+<p:notes xmlns:a="http://schemas.openxmlformats.org/drawingml/2006/main" xmlns:r="http://schemas.openxmlformats.org/officeDocument/2006/relationships" xmlns:mc="http://schemas.openxmlformats.org/markup-compatibility/2006" xmlns:mv="urn:schemas-microsoft-com:mac:vml" xmlns:p="http://schemas.openxmlformats.org/presentationml/2006/main" xmlns:c="http://schemas.openxmlformats.org/drawingml/2006/chart" xmlns:dgm="http://schemas.openxmlformats.org/drawingml/2006/diagram" xmlns:o="urn:schemas-microsoft-com:office:office" xmlns:v="urn:schemas-microsoft-com:vml" xmlns:pvml="urn:schemas-microsoft-com:office:powerpoint" xmlns:com="http://schemas.openxmlformats.org/drawingml/2006/compatibility" xmlns:p14="http://schemas.microsoft.com/office/powerpoint/2010/main" xmlns:p15="http://schemas.microsoft.com/office/powerpoint/2012/main" xmlns:ahyp="http://schemas.microsoft.com/office/drawing/2018/hyperlinkcolor" showMasterPhAnim="0" showMasterSp="0">
+  <p:cSld>
+    <p:spTree>
+      <p:nvGrpSpPr>
+        <p:cNvPr id="144" name="Shape 144"/>
+        <p:cNvGrpSpPr/>
+        <p:nvPr/>
+      </p:nvGrpSpPr>
+      <p:grpSpPr>
+        <a:xfrm>
+          <a:off x="0" y="0"/>
+          <a:ext cx="0" cy="0"/>
+          <a:chOff x="0" y="0"/>
+          <a:chExt cx="0" cy="0"/>
+        </a:xfrm>
+      </p:grpSpPr>
+      <p:sp>
+        <p:nvSpPr>
+          <p:cNvPr id="145" name="Google Shape;145;g8fd38cc354_1_7:notes"/>
+          <p:cNvSpPr/>
+          <p:nvPr>
+            <p:ph idx="2" type="sldImg"/>
+          </p:nvPr>
+        </p:nvSpPr>
+        <p:spPr>
+          <a:xfrm>
+            <a:off x="381300" y="685800"/>
+            <a:ext cx="6096000" cy="3429000"/>
+          </a:xfrm>
+          <a:custGeom>
+            <a:rect b="b" l="l" r="r" t="t"/>
+            <a:pathLst>
+              <a:path extrusionOk="0" h="120000" w="120000">
+                <a:moveTo>
+                  <a:pt x="0" y="0"/>
+                </a:moveTo>
+                <a:lnTo>
+                  <a:pt x="120000" y="0"/>
+                </a:lnTo>
+                <a:lnTo>
+                  <a:pt x="120000" y="120000"/>
+                </a:lnTo>
+                <a:lnTo>
+                  <a:pt x="0" y="120000"/>
+                </a:lnTo>
+                <a:close/>
+              </a:path>
+            </a:pathLst>
+          </a:custGeom>
+        </p:spPr>
+      </p:sp>
+      <p:sp>
+        <p:nvSpPr>
+          <p:cNvPr id="146" name="Google Shape;146;g8fd38cc354_1_7:notes"/>
+          <p:cNvSpPr txBox="1"/>
+          <p:nvPr>
+            <p:ph idx="1" type="body"/>
+          </p:nvPr>
+        </p:nvSpPr>
+        <p:spPr>
+          <a:xfrm>
+            <a:off x="685800" y="4343400"/>
+            <a:ext cx="5486400" cy="4114800"/>
+          </a:xfrm>
+          <a:prstGeom prst="rect">
+            <a:avLst/>
+          </a:prstGeom>
+        </p:spPr>
+        <p:txBody>
+          <a:bodyPr anchorCtr="0" anchor="t" bIns="91425" lIns="91425" spcFirstLastPara="1" rIns="91425" wrap="square" tIns="91425">
+            <a:noAutofit/>
+          </a:bodyPr>
+          <a:lstStyle/>
+          <a:p>
+            <a:pPr indent="0" lvl="0" marL="0" rtl="0" algn="l">
+              <a:spcBef>
+                <a:spcPts val="0"/>
+              </a:spcBef>
+              <a:spcAft>
+                <a:spcPts val="0"/>
+              </a:spcAft>
+              <a:buNone/>
+            </a:pPr>
+            <a:r>
+              <a:t/>
+            </a:r>
+            <a:endParaRPr/>
+          </a:p>
+        </p:txBody>
+      </p:sp>
+    </p:spTree>
+  </p:cSld>
+  <p:clrMapOvr>
+    <a:masterClrMapping/>
+  </p:clrMapOvr>
+</p:notes>
+</file>
+
+<file path=ppt/notesSlides/notesSlide14.xml><?xml version="1.0" encoding="utf-8"?>
+<p:notes xmlns:a="http://schemas.openxmlformats.org/drawingml/2006/main" xmlns:r="http://schemas.openxmlformats.org/officeDocument/2006/relationships" xmlns:mc="http://schemas.openxmlformats.org/markup-compatibility/2006" xmlns:mv="urn:schemas-microsoft-com:mac:vml" xmlns:p="http://schemas.openxmlformats.org/presentationml/2006/main" xmlns:c="http://schemas.openxmlformats.org/drawingml/2006/chart" xmlns:dgm="http://schemas.openxmlformats.org/drawingml/2006/diagram" xmlns:o="urn:schemas-microsoft-com:office:office" xmlns:v="urn:schemas-microsoft-com:vml" xmlns:pvml="urn:schemas-microsoft-com:office:powerpoint" xmlns:com="http://schemas.openxmlformats.org/drawingml/2006/compatibility" xmlns:p14="http://schemas.microsoft.com/office/powerpoint/2010/main" xmlns:p15="http://schemas.microsoft.com/office/powerpoint/2012/main" xmlns:ahyp="http://schemas.microsoft.com/office/drawing/2018/hyperlinkcolor" showMasterPhAnim="0" showMasterSp="0">
+  <p:cSld>
+    <p:spTree>
+      <p:nvGrpSpPr>
+        <p:cNvPr id="152" name="Shape 152"/>
+        <p:cNvGrpSpPr/>
+        <p:nvPr/>
+      </p:nvGrpSpPr>
+      <p:grpSpPr>
+        <a:xfrm>
+          <a:off x="0" y="0"/>
+          <a:ext cx="0" cy="0"/>
+          <a:chOff x="0" y="0"/>
+          <a:chExt cx="0" cy="0"/>
+        </a:xfrm>
+      </p:grpSpPr>
+      <p:sp>
+        <p:nvSpPr>
+          <p:cNvPr id="153" name="Google Shape;153;g8c35b87562_0_3:notes"/>
+          <p:cNvSpPr/>
+          <p:nvPr>
+            <p:ph idx="2" type="sldImg"/>
+          </p:nvPr>
+        </p:nvSpPr>
+        <p:spPr>
+          <a:xfrm>
+            <a:off x="381300" y="685800"/>
+            <a:ext cx="6096000" cy="3429000"/>
+          </a:xfrm>
+          <a:custGeom>
+            <a:rect b="b" l="l" r="r" t="t"/>
+            <a:pathLst>
+              <a:path extrusionOk="0" h="120000" w="120000">
+                <a:moveTo>
+                  <a:pt x="0" y="0"/>
+                </a:moveTo>
+                <a:lnTo>
+                  <a:pt x="120000" y="0"/>
+                </a:lnTo>
+                <a:lnTo>
+                  <a:pt x="120000" y="120000"/>
+                </a:lnTo>
+                <a:lnTo>
+                  <a:pt x="0" y="120000"/>
+                </a:lnTo>
+                <a:close/>
+              </a:path>
+            </a:pathLst>
+          </a:custGeom>
+        </p:spPr>
+      </p:sp>
+      <p:sp>
+        <p:nvSpPr>
+          <p:cNvPr id="154" name="Google Shape;154;g8c35b87562_0_3:notes"/>
+          <p:cNvSpPr txBox="1"/>
+          <p:nvPr>
+            <p:ph idx="1" type="body"/>
+          </p:nvPr>
+        </p:nvSpPr>
+        <p:spPr>
+          <a:xfrm>
+            <a:off x="685800" y="4343400"/>
+            <a:ext cx="5486400" cy="4114800"/>
+          </a:xfrm>
+          <a:prstGeom prst="rect">
+            <a:avLst/>
+          </a:prstGeom>
+        </p:spPr>
+        <p:txBody>
+          <a:bodyPr anchorCtr="0" anchor="t" bIns="91425" lIns="91425" spcFirstLastPara="1" rIns="91425" wrap="square" tIns="91425">
+            <a:noAutofit/>
+          </a:bodyPr>
+          <a:lstStyle/>
+          <a:p>
+            <a:pPr indent="0" lvl="0" marL="0" rtl="0" algn="l">
+              <a:spcBef>
+                <a:spcPts val="0"/>
+              </a:spcBef>
+              <a:spcAft>
+                <a:spcPts val="0"/>
+              </a:spcAft>
+              <a:buNone/>
+            </a:pPr>
+            <a:r>
+              <a:t/>
+            </a:r>
+            <a:endParaRPr/>
+          </a:p>
+        </p:txBody>
+      </p:sp>
+    </p:spTree>
+  </p:cSld>
+  <p:clrMapOvr>
+    <a:masterClrMapping/>
+  </p:clrMapOvr>
+</p:notes>
+</file>
+
+<file path=ppt/notesSlides/notesSlide15.xml><?xml version="1.0" encoding="utf-8"?>
+<p:notes xmlns:a="http://schemas.openxmlformats.org/drawingml/2006/main" xmlns:r="http://schemas.openxmlformats.org/officeDocument/2006/relationships" xmlns:mc="http://schemas.openxmlformats.org/markup-compatibility/2006" xmlns:mv="urn:schemas-microsoft-com:mac:vml" xmlns:p="http://schemas.openxmlformats.org/presentationml/2006/main" xmlns:c="http://schemas.openxmlformats.org/drawingml/2006/chart" xmlns:dgm="http://schemas.openxmlformats.org/drawingml/2006/diagram" xmlns:o="urn:schemas-microsoft-com:office:office" xmlns:v="urn:schemas-microsoft-com:vml" xmlns:pvml="urn:schemas-microsoft-com:office:powerpoint" xmlns:com="http://schemas.openxmlformats.org/drawingml/2006/compatibility" xmlns:p14="http://schemas.microsoft.com/office/powerpoint/2010/main" xmlns:p15="http://schemas.microsoft.com/office/powerpoint/2012/main" xmlns:ahyp="http://schemas.microsoft.com/office/drawing/2018/hyperlinkcolor" showMasterPhAnim="0" showMasterSp="0">
+  <p:cSld>
+    <p:spTree>
+      <p:nvGrpSpPr>
+        <p:cNvPr id="159" name="Shape 159"/>
+        <p:cNvGrpSpPr/>
+        <p:nvPr/>
+      </p:nvGrpSpPr>
+      <p:grpSpPr>
+        <a:xfrm>
+          <a:off x="0" y="0"/>
+          <a:ext cx="0" cy="0"/>
+          <a:chOff x="0" y="0"/>
+          <a:chExt cx="0" cy="0"/>
+        </a:xfrm>
+      </p:grpSpPr>
+      <p:sp>
+        <p:nvSpPr>
+          <p:cNvPr id="160" name="Google Shape;160;g8fb1f6987e_1_7:notes"/>
+          <p:cNvSpPr/>
+          <p:nvPr>
+            <p:ph idx="2" type="sldImg"/>
+          </p:nvPr>
+        </p:nvSpPr>
+        <p:spPr>
+          <a:xfrm>
+            <a:off x="381300" y="685800"/>
+            <a:ext cx="6096000" cy="3429000"/>
+          </a:xfrm>
+          <a:custGeom>
+            <a:rect b="b" l="l" r="r" t="t"/>
+            <a:pathLst>
+              <a:path extrusionOk="0" h="120000" w="120000">
+                <a:moveTo>
+                  <a:pt x="0" y="0"/>
+                </a:moveTo>
+                <a:lnTo>
+                  <a:pt x="120000" y="0"/>
+                </a:lnTo>
+                <a:lnTo>
+                  <a:pt x="120000" y="120000"/>
+                </a:lnTo>
+                <a:lnTo>
+                  <a:pt x="0" y="120000"/>
+                </a:lnTo>
+                <a:close/>
+              </a:path>
+            </a:pathLst>
+          </a:custGeom>
+        </p:spPr>
+      </p:sp>
+      <p:sp>
+        <p:nvSpPr>
+          <p:cNvPr id="161" name="Google Shape;161;g8fb1f6987e_1_7:notes"/>
+          <p:cNvSpPr txBox="1"/>
+          <p:nvPr>
+            <p:ph idx="1" type="body"/>
+          </p:nvPr>
+        </p:nvSpPr>
+        <p:spPr>
+          <a:xfrm>
+            <a:off x="685800" y="4343400"/>
+            <a:ext cx="5486400" cy="4114800"/>
+          </a:xfrm>
+          <a:prstGeom prst="rect">
+            <a:avLst/>
+          </a:prstGeom>
+        </p:spPr>
+        <p:txBody>
+          <a:bodyPr anchorCtr="0" anchor="t" bIns="91425" lIns="91425" spcFirstLastPara="1" rIns="91425" wrap="square" tIns="91425">
+            <a:noAutofit/>
+          </a:bodyPr>
+          <a:lstStyle/>
+          <a:p>
+            <a:pPr indent="0" lvl="0" marL="0" rtl="0" algn="l">
+              <a:spcBef>
+                <a:spcPts val="0"/>
+              </a:spcBef>
+              <a:spcAft>
+                <a:spcPts val="0"/>
+              </a:spcAft>
+              <a:buNone/>
+            </a:pPr>
+            <a:r>
+              <a:t/>
+            </a:r>
+            <a:endParaRPr/>
+          </a:p>
+        </p:txBody>
+      </p:sp>
+    </p:spTree>
+  </p:cSld>
+  <p:clrMapOvr>
+    <a:masterClrMapping/>
+  </p:clrMapOvr>
+</p:notes>
+</file>
+
+<file path=ppt/notesSlides/notesSlide16.xml><?xml version="1.0" encoding="utf-8"?>
+<p:notes xmlns:a="http://schemas.openxmlformats.org/drawingml/2006/main" xmlns:r="http://schemas.openxmlformats.org/officeDocument/2006/relationships" xmlns:mc="http://schemas.openxmlformats.org/markup-compatibility/2006" xmlns:mv="urn:schemas-microsoft-com:mac:vml" xmlns:p="http://schemas.openxmlformats.org/presentationml/2006/main" xmlns:c="http://schemas.openxmlformats.org/drawingml/2006/chart" xmlns:dgm="http://schemas.openxmlformats.org/drawingml/2006/diagram" xmlns:o="urn:schemas-microsoft-com:office:office" xmlns:v="urn:schemas-microsoft-com:vml" xmlns:pvml="urn:schemas-microsoft-com:office:powerpoint" xmlns:com="http://schemas.openxmlformats.org/drawingml/2006/compatibility" xmlns:p14="http://schemas.microsoft.com/office/powerpoint/2010/main" xmlns:p15="http://schemas.microsoft.com/office/powerpoint/2012/main" xmlns:ahyp="http://schemas.microsoft.com/office/drawing/2018/hyperlinkcolor" showMasterPhAnim="0" showMasterSp="0">
+  <p:cSld>
+    <p:spTree>
+      <p:nvGrpSpPr>
+        <p:cNvPr id="167" name="Shape 167"/>
+        <p:cNvGrpSpPr/>
+        <p:nvPr/>
+      </p:nvGrpSpPr>
+      <p:grpSpPr>
+        <a:xfrm>
+          <a:off x="0" y="0"/>
+          <a:ext cx="0" cy="0"/>
+          <a:chOff x="0" y="0"/>
+          <a:chExt cx="0" cy="0"/>
+        </a:xfrm>
+      </p:grpSpPr>
+      <p:sp>
+        <p:nvSpPr>
+          <p:cNvPr id="168" name="Google Shape;168;g9024d7bddb_0_3:notes"/>
+          <p:cNvSpPr/>
+          <p:nvPr>
+            <p:ph idx="2" type="sldImg"/>
+          </p:nvPr>
+        </p:nvSpPr>
+        <p:spPr>
+          <a:xfrm>
+            <a:off x="381300" y="685800"/>
+            <a:ext cx="6096000" cy="3429000"/>
+          </a:xfrm>
+          <a:custGeom>
+            <a:rect b="b" l="l" r="r" t="t"/>
+            <a:pathLst>
+              <a:path extrusionOk="0" h="120000" w="120000">
+                <a:moveTo>
+                  <a:pt x="0" y="0"/>
+                </a:moveTo>
+                <a:lnTo>
+                  <a:pt x="120000" y="0"/>
+                </a:lnTo>
+                <a:lnTo>
+                  <a:pt x="120000" y="120000"/>
+                </a:lnTo>
+                <a:lnTo>
+                  <a:pt x="0" y="120000"/>
+                </a:lnTo>
+                <a:close/>
+              </a:path>
+            </a:pathLst>
+          </a:custGeom>
+        </p:spPr>
+      </p:sp>
+      <p:sp>
+        <p:nvSpPr>
+          <p:cNvPr id="169" name="Google Shape;169;g9024d7bddb_0_3:notes"/>
           <p:cNvSpPr txBox="1"/>
           <p:nvPr>
             <p:ph idx="1" type="body"/>
@@ -1475,6 +1880,48 @@
               <a:buNone/>
             </a:pPr>
             <a:r>
+              <a:rPr lang="en" u="sng">
+                <a:solidFill>
+                  <a:schemeClr val="hlink"/>
+                </a:solidFill>
+                <a:hlinkClick r:id="rId2"/>
+              </a:rPr>
+              <a:t>https://deno.land/std@0.64.0</a:t>
+            </a:r>
+            <a:endParaRPr/>
+          </a:p>
+          <a:p>
+            <a:pPr indent="0" lvl="0" marL="0" rtl="0" algn="l">
+              <a:spcBef>
+                <a:spcPts val="0"/>
+              </a:spcBef>
+              <a:spcAft>
+                <a:spcPts val="0"/>
+              </a:spcAft>
+              <a:buNone/>
+            </a:pPr>
+            <a:r>
+              <a:rPr lang="en" u="sng">
+                <a:solidFill>
+                  <a:schemeClr val="hlink"/>
+                </a:solidFill>
+                <a:hlinkClick r:id="rId3"/>
+              </a:rPr>
+              <a:t>https://deno.land/std@0.64.0/http/server.ts</a:t>
+            </a:r>
+            <a:endParaRPr/>
+          </a:p>
+          <a:p>
+            <a:pPr indent="0" lvl="0" marL="0" rtl="0" algn="l">
+              <a:spcBef>
+                <a:spcPts val="0"/>
+              </a:spcBef>
+              <a:spcAft>
+                <a:spcPts val="0"/>
+              </a:spcAft>
+              <a:buNone/>
+            </a:pPr>
+            <a:r>
               <a:t/>
             </a:r>
             <a:endParaRPr/>
@@ -1574,9 +2021,43 @@
               <a:buNone/>
             </a:pPr>
             <a:r>
+              <a:rPr lang="en" sz="1400" u="sng">
+                <a:solidFill>
+                  <a:schemeClr val="hlink"/>
+                </a:solidFill>
+                <a:hlinkClick r:id="rId2"/>
+              </a:rPr>
+              <a:t>https://deno.land/manual</a:t>
+            </a:r>
+            <a:endParaRPr sz="1400">
+              <a:solidFill>
+                <a:schemeClr val="dk1"/>
+              </a:solidFill>
+            </a:endParaRPr>
+          </a:p>
+          <a:p>
+            <a:pPr indent="0" lvl="0" marL="0" rtl="0" algn="l">
+              <a:spcBef>
+                <a:spcPts val="0"/>
+              </a:spcBef>
+              <a:spcAft>
+                <a:spcPts val="0"/>
+              </a:spcAft>
+              <a:buClr>
+                <a:schemeClr val="dk1"/>
+              </a:buClr>
+              <a:buSzPts val="1100"/>
+              <a:buFont typeface="Arial"/>
+              <a:buNone/>
+            </a:pPr>
+            <a:r>
               <a:t/>
             </a:r>
-            <a:endParaRPr/>
+            <a:endParaRPr sz="1400">
+              <a:solidFill>
+                <a:schemeClr val="dk1"/>
+              </a:solidFill>
+            </a:endParaRPr>
           </a:p>
         </p:txBody>
       </p:sp>
@@ -6625,7 +7106,7 @@
             </a:pPr>
             <a:r>
               <a:rPr lang="en"/>
-              <a:t>A secure runtime for JavaScript and TypeScript.</a:t>
+              <a:t>A secure runtime for JavaScript and TypeScript</a:t>
             </a:r>
             <a:endParaRPr/>
           </a:p>
@@ -6718,7 +7199,7 @@
             </a:pPr>
             <a:r>
               <a:rPr lang="en"/>
-              <a:t>Conclusions</a:t>
+              <a:t>Conclusions: Pros of Deno</a:t>
             </a:r>
             <a:endParaRPr b="1" sz="2300"/>
           </a:p>
@@ -6775,8 +7256,8 @@
         </p:nvSpPr>
         <p:spPr>
           <a:xfrm>
-            <a:off x="558150" y="1347225"/>
-            <a:ext cx="8027700" cy="3116700"/>
+            <a:off x="558150" y="1903200"/>
+            <a:ext cx="8027700" cy="1743600"/>
           </a:xfrm>
           <a:prstGeom prst="rect">
             <a:avLst/>
@@ -6802,80 +7283,114 @@
               <a:buNone/>
             </a:pPr>
             <a:r>
-              <a:rPr lang="en"/>
+              <a:rPr lang="en" sz="1600"/>
               <a:t>Deno has some </a:t>
             </a:r>
             <a:r>
-              <a:rPr lang="en"/>
+              <a:rPr lang="en" sz="1600"/>
               <a:t>great</a:t>
             </a:r>
             <a:r>
-              <a:rPr lang="en"/>
+              <a:rPr lang="en" sz="1600"/>
               <a:t> ideas: </a:t>
             </a:r>
-            <a:endParaRPr/>
-          </a:p>
-          <a:p>
-            <a:pPr indent="-317500" lvl="0" marL="457200" rtl="0" algn="l">
-              <a:spcBef>
-                <a:spcPts val="0"/>
-              </a:spcBef>
-              <a:spcAft>
-                <a:spcPts val="0"/>
-              </a:spcAft>
-              <a:buSzPts val="1400"/>
+            <a:endParaRPr sz="1600"/>
+          </a:p>
+          <a:p>
+            <a:pPr indent="-330200" lvl="0" marL="457200" rtl="0" algn="l">
+              <a:spcBef>
+                <a:spcPts val="0"/>
+              </a:spcBef>
+              <a:spcAft>
+                <a:spcPts val="0"/>
+              </a:spcAft>
+              <a:buSzPts val="1600"/>
               <a:buChar char="●"/>
             </a:pPr>
             <a:r>
-              <a:rPr lang="en"/>
+              <a:rPr lang="en" sz="1600"/>
               <a:t>Supports both Javascript and Typescript out of the box. </a:t>
             </a:r>
-            <a:endParaRPr/>
-          </a:p>
-          <a:p>
-            <a:pPr indent="-317500" lvl="0" marL="457200" rtl="0" algn="l">
-              <a:spcBef>
-                <a:spcPts val="0"/>
-              </a:spcBef>
-              <a:spcAft>
-                <a:spcPts val="0"/>
-              </a:spcAft>
-              <a:buSzPts val="1400"/>
+            <a:endParaRPr sz="1600"/>
+          </a:p>
+          <a:p>
+            <a:pPr indent="-330200" lvl="0" marL="457200" rtl="0" algn="l">
+              <a:spcBef>
+                <a:spcPts val="0"/>
+              </a:spcBef>
+              <a:spcAft>
+                <a:spcPts val="0"/>
+              </a:spcAft>
+              <a:buSzPts val="1600"/>
               <a:buChar char="●"/>
             </a:pPr>
             <a:r>
-              <a:rPr lang="en"/>
+              <a:rPr lang="en" sz="1600"/>
               <a:t>Has easy to use bindings for WebAssembly.</a:t>
             </a:r>
-            <a:endParaRPr/>
-          </a:p>
-          <a:p>
-            <a:pPr indent="-317500" lvl="0" marL="457200" rtl="0" algn="l">
-              <a:spcBef>
-                <a:spcPts val="0"/>
-              </a:spcBef>
-              <a:spcAft>
-                <a:spcPts val="0"/>
-              </a:spcAft>
-              <a:buSzPts val="1400"/>
+            <a:endParaRPr sz="1600"/>
+          </a:p>
+          <a:p>
+            <a:pPr indent="-330200" lvl="0" marL="457200" rtl="0" algn="l">
+              <a:spcBef>
+                <a:spcPts val="0"/>
+              </a:spcBef>
+              <a:spcAft>
+                <a:spcPts val="0"/>
+              </a:spcAft>
+              <a:buSzPts val="1600"/>
               <a:buChar char="●"/>
             </a:pPr>
             <a:r>
-              <a:rPr lang="en"/>
+              <a:rPr lang="en" sz="1600"/>
               <a:t>Works very well on </a:t>
             </a:r>
             <a:r>
-              <a:rPr lang="en"/>
+              <a:rPr lang="en" sz="1600"/>
               <a:t>server-side</a:t>
             </a:r>
             <a:r>
-              <a:rPr lang="en"/>
+              <a:rPr lang="en" sz="1600"/>
               <a:t> Typescript.</a:t>
             </a:r>
-            <a:endParaRPr/>
-          </a:p>
-          <a:p>
-            <a:pPr indent="0" lvl="0" marL="0" rtl="0" algn="l">
+            <a:endParaRPr sz="1600"/>
+          </a:p>
+          <a:p>
+            <a:pPr indent="-330200" lvl="0" marL="457200" rtl="0" algn="l">
+              <a:spcBef>
+                <a:spcPts val="0"/>
+              </a:spcBef>
+              <a:spcAft>
+                <a:spcPts val="0"/>
+              </a:spcAft>
+              <a:buSzPts val="1600"/>
+              <a:buChar char="●"/>
+            </a:pPr>
+            <a:r>
+              <a:rPr lang="en" sz="1600"/>
+              <a:t>Core libraries seem to be the most stable part of the system. </a:t>
+            </a:r>
+            <a:endParaRPr sz="1600"/>
+          </a:p>
+          <a:p>
+            <a:pPr indent="-330200" lvl="0" marL="457200" rtl="0" algn="l">
+              <a:spcBef>
+                <a:spcPts val="0"/>
+              </a:spcBef>
+              <a:spcAft>
+                <a:spcPts val="0"/>
+              </a:spcAft>
+              <a:buSzPts val="1600"/>
+              <a:buChar char="●"/>
+            </a:pPr>
+            <a:r>
+              <a:rPr lang="en" sz="1600"/>
+              <a:t>I found year old projects still working on the Deno core API.</a:t>
+            </a:r>
+            <a:endParaRPr sz="1600"/>
+          </a:p>
+          <a:p>
+            <a:pPr indent="0" lvl="0" marL="457200" rtl="0" algn="l">
               <a:spcBef>
                 <a:spcPts val="0"/>
               </a:spcBef>
@@ -6886,145 +7401,6 @@
             </a:pPr>
             <a:r>
               <a:t/>
-            </a:r>
-            <a:endParaRPr/>
-          </a:p>
-          <a:p>
-            <a:pPr indent="0" lvl="0" marL="0" rtl="0" algn="l">
-              <a:spcBef>
-                <a:spcPts val="0"/>
-              </a:spcBef>
-              <a:spcAft>
-                <a:spcPts val="0"/>
-              </a:spcAft>
-              <a:buNone/>
-            </a:pPr>
-            <a:r>
-              <a:rPr lang="en"/>
-              <a:t>3rd party Deno </a:t>
-            </a:r>
-            <a:r>
-              <a:rPr lang="en"/>
-              <a:t>Libraries</a:t>
-            </a:r>
-            <a:r>
-              <a:rPr lang="en"/>
-              <a:t> need work:</a:t>
-            </a:r>
-            <a:endParaRPr/>
-          </a:p>
-          <a:p>
-            <a:pPr indent="-317500" lvl="0" marL="457200" rtl="0" algn="l">
-              <a:spcBef>
-                <a:spcPts val="0"/>
-              </a:spcBef>
-              <a:spcAft>
-                <a:spcPts val="0"/>
-              </a:spcAft>
-              <a:buSzPts val="1400"/>
-              <a:buChar char="●"/>
-            </a:pPr>
-            <a:r>
-              <a:rPr lang="en"/>
-              <a:t>When doing </a:t>
-            </a:r>
-            <a:r>
-              <a:rPr lang="en"/>
-              <a:t>research</a:t>
-            </a:r>
-            <a:r>
-              <a:rPr lang="en"/>
-              <a:t> for this project, lots of third parties doing the same things (REST API, ORMS, etc…) with </a:t>
-            </a:r>
-            <a:r>
-              <a:rPr lang="en"/>
-              <a:t>varying</a:t>
-            </a:r>
-            <a:r>
-              <a:rPr lang="en"/>
-              <a:t> degrees of longevity. </a:t>
-            </a:r>
-            <a:endParaRPr/>
-          </a:p>
-          <a:p>
-            <a:pPr indent="-317500" lvl="0" marL="457200" rtl="0" algn="l">
-              <a:spcBef>
-                <a:spcPts val="0"/>
-              </a:spcBef>
-              <a:spcAft>
-                <a:spcPts val="0"/>
-              </a:spcAft>
-              <a:buSzPts val="1400"/>
-              <a:buChar char="●"/>
-            </a:pPr>
-            <a:r>
-              <a:rPr lang="en"/>
-              <a:t>Issues with installing 3rd parties that do not support the most recent version of Deno.</a:t>
-            </a:r>
-            <a:endParaRPr/>
-          </a:p>
-          <a:p>
-            <a:pPr indent="0" lvl="0" marL="0" rtl="0" algn="l">
-              <a:spcBef>
-                <a:spcPts val="0"/>
-              </a:spcBef>
-              <a:spcAft>
-                <a:spcPts val="0"/>
-              </a:spcAft>
-              <a:buNone/>
-            </a:pPr>
-            <a:r>
-              <a:t/>
-            </a:r>
-            <a:endParaRPr/>
-          </a:p>
-          <a:p>
-            <a:pPr indent="0" lvl="0" marL="0" rtl="0" algn="l">
-              <a:spcBef>
-                <a:spcPts val="0"/>
-              </a:spcBef>
-              <a:spcAft>
-                <a:spcPts val="0"/>
-              </a:spcAft>
-              <a:buNone/>
-            </a:pPr>
-            <a:r>
-              <a:rPr lang="en"/>
-              <a:t>Opinionated:</a:t>
-            </a:r>
-            <a:endParaRPr/>
-          </a:p>
-          <a:p>
-            <a:pPr indent="-317500" lvl="0" marL="457200" rtl="0" algn="l">
-              <a:spcBef>
-                <a:spcPts val="0"/>
-              </a:spcBef>
-              <a:spcAft>
-                <a:spcPts val="0"/>
-              </a:spcAft>
-              <a:buSzPts val="1400"/>
-              <a:buChar char="●"/>
-            </a:pPr>
-            <a:r>
-              <a:rPr lang="en"/>
-              <a:t>You will either love or hate the import of libraries in deno.</a:t>
-            </a:r>
-            <a:endParaRPr/>
-          </a:p>
-          <a:p>
-            <a:pPr indent="-317500" lvl="0" marL="457200" rtl="0" algn="l">
-              <a:spcBef>
-                <a:spcPts val="0"/>
-              </a:spcBef>
-              <a:spcAft>
-                <a:spcPts val="0"/>
-              </a:spcAft>
-              <a:buSzPts val="1400"/>
-              <a:buChar char="●"/>
-            </a:pPr>
-            <a:r>
-              <a:rPr lang="en"/>
-              <a:t>When dealing with import errors, found myself forking and adding fixes to own github repositories.</a:t>
             </a:r>
             <a:endParaRPr/>
           </a:p>
@@ -7060,25 +7436,25 @@
           <p:cNvPr id="134" name="Google Shape;134;p23"/>
           <p:cNvSpPr txBox="1"/>
           <p:nvPr>
-            <p:ph type="ctrTitle"/>
+            <p:ph type="title"/>
           </p:nvPr>
         </p:nvSpPr>
         <p:spPr>
           <a:xfrm>
-            <a:off x="231783" y="1908675"/>
-            <a:ext cx="8520600" cy="2052600"/>
+            <a:off x="742950" y="105375"/>
+            <a:ext cx="8520600" cy="572700"/>
           </a:xfrm>
           <a:prstGeom prst="rect">
             <a:avLst/>
           </a:prstGeom>
         </p:spPr>
         <p:txBody>
-          <a:bodyPr anchorCtr="0" anchor="b" bIns="91425" lIns="91425" spcFirstLastPara="1" rIns="91425" wrap="square" tIns="91425">
+          <a:bodyPr anchorCtr="0" anchor="t" bIns="91425" lIns="91425" spcFirstLastPara="1" rIns="91425" wrap="square" tIns="91425">
             <a:noAutofit/>
           </a:bodyPr>
           <a:lstStyle/>
           <a:p>
-            <a:pPr indent="0" lvl="0" marL="0" rtl="0" algn="ctr">
+            <a:pPr indent="0" lvl="0" marL="0" rtl="0" algn="l">
               <a:spcBef>
                 <a:spcPts val="0"/>
               </a:spcBef>
@@ -7089,7 +7465,22 @@
             </a:pPr>
             <a:r>
               <a:rPr lang="en"/>
-              <a:t>Questions?</a:t>
+              <a:t>Conclusions: Not-so Pros of Deno</a:t>
+            </a:r>
+            <a:endParaRPr b="1" sz="2300"/>
+          </a:p>
+          <a:p>
+            <a:pPr indent="0" lvl="0" marL="0" rtl="0" algn="l">
+              <a:spcBef>
+                <a:spcPts val="0"/>
+              </a:spcBef>
+              <a:spcAft>
+                <a:spcPts val="0"/>
+              </a:spcAft>
+              <a:buNone/>
+            </a:pPr>
+            <a:r>
+              <a:t/>
             </a:r>
             <a:endParaRPr/>
           </a:p>
@@ -7111,8 +7502,8 @@
         </p:blipFill>
         <p:spPr>
           <a:xfrm>
-            <a:off x="2961600" y="0"/>
-            <a:ext cx="3148150" cy="3148124"/>
+            <a:off x="0" y="-1"/>
+            <a:ext cx="678075" cy="678075"/>
           </a:xfrm>
           <a:prstGeom prst="rect">
             <a:avLst/>
@@ -7123,6 +7514,112 @@
           </a:ln>
         </p:spPr>
       </p:pic>
+      <p:sp>
+        <p:nvSpPr>
+          <p:cNvPr id="136" name="Google Shape;136;p23"/>
+          <p:cNvSpPr txBox="1"/>
+          <p:nvPr/>
+        </p:nvSpPr>
+        <p:spPr>
+          <a:xfrm>
+            <a:off x="558150" y="1855925"/>
+            <a:ext cx="8027700" cy="1525800"/>
+          </a:xfrm>
+          <a:prstGeom prst="rect">
+            <a:avLst/>
+          </a:prstGeom>
+          <a:noFill/>
+          <a:ln>
+            <a:noFill/>
+          </a:ln>
+        </p:spPr>
+        <p:txBody>
+          <a:bodyPr anchorCtr="0" anchor="t" bIns="91425" lIns="91425" spcFirstLastPara="1" rIns="91425" wrap="square" tIns="91425">
+            <a:noAutofit/>
+          </a:bodyPr>
+          <a:lstStyle/>
+          <a:p>
+            <a:pPr indent="0" lvl="0" marL="0" rtl="0" algn="l">
+              <a:spcBef>
+                <a:spcPts val="0"/>
+              </a:spcBef>
+              <a:spcAft>
+                <a:spcPts val="0"/>
+              </a:spcAft>
+              <a:buNone/>
+            </a:pPr>
+            <a:r>
+              <a:rPr lang="en" sz="1600"/>
+              <a:t>3rd party Deno Libraries need work:</a:t>
+            </a:r>
+            <a:endParaRPr sz="1600"/>
+          </a:p>
+          <a:p>
+            <a:pPr indent="-330200" lvl="0" marL="457200" rtl="0" algn="l">
+              <a:spcBef>
+                <a:spcPts val="0"/>
+              </a:spcBef>
+              <a:spcAft>
+                <a:spcPts val="0"/>
+              </a:spcAft>
+              <a:buSzPts val="1600"/>
+              <a:buChar char="●"/>
+            </a:pPr>
+            <a:r>
+              <a:rPr lang="en" sz="1600"/>
+              <a:t>When doing research for this presentation, there were an abundant amount of libraries doing the same things (REST API, ORMS, etc…) with varying degrees of longevity. </a:t>
+            </a:r>
+            <a:endParaRPr sz="1600"/>
+          </a:p>
+          <a:p>
+            <a:pPr indent="-330200" lvl="0" marL="457200" rtl="0" algn="l">
+              <a:spcBef>
+                <a:spcPts val="0"/>
+              </a:spcBef>
+              <a:spcAft>
+                <a:spcPts val="0"/>
+              </a:spcAft>
+              <a:buSzPts val="1600"/>
+              <a:buChar char="●"/>
+            </a:pPr>
+            <a:r>
+              <a:rPr lang="en" sz="1600"/>
+              <a:t>Issues with installing 3rd parties that do not support the most recent version of Deno.</a:t>
+            </a:r>
+            <a:endParaRPr sz="1600"/>
+          </a:p>
+          <a:p>
+            <a:pPr indent="0" lvl="0" marL="0" rtl="0" algn="l">
+              <a:spcBef>
+                <a:spcPts val="0"/>
+              </a:spcBef>
+              <a:spcAft>
+                <a:spcPts val="0"/>
+              </a:spcAft>
+              <a:buNone/>
+            </a:pPr>
+            <a:r>
+              <a:t/>
+            </a:r>
+            <a:endParaRPr/>
+          </a:p>
+          <a:p>
+            <a:pPr indent="0" lvl="0" marL="457200" rtl="0" algn="l">
+              <a:spcBef>
+                <a:spcPts val="0"/>
+              </a:spcBef>
+              <a:spcAft>
+                <a:spcPts val="0"/>
+              </a:spcAft>
+              <a:buNone/>
+            </a:pPr>
+            <a:r>
+              <a:t/>
+            </a:r>
+            <a:endParaRPr/>
+          </a:p>
+        </p:txBody>
+      </p:sp>
     </p:spTree>
   </p:cSld>
   <p:clrMapOvr>
@@ -7136,7 +7633,7 @@
   <p:cSld>
     <p:spTree>
       <p:nvGrpSpPr>
-        <p:cNvPr id="139" name="Shape 139"/>
+        <p:cNvPr id="140" name="Shape 140"/>
         <p:cNvGrpSpPr/>
         <p:nvPr/>
       </p:nvGrpSpPr>
@@ -7150,7 +7647,7 @@
       </p:grpSpPr>
       <p:sp>
         <p:nvSpPr>
-          <p:cNvPr id="140" name="Google Shape;140;p24"/>
+          <p:cNvPr id="141" name="Google Shape;141;p24"/>
           <p:cNvSpPr txBox="1"/>
           <p:nvPr>
             <p:ph type="title"/>
@@ -7158,7 +7655,7 @@
         </p:nvSpPr>
         <p:spPr>
           <a:xfrm>
-            <a:off x="678075" y="105375"/>
+            <a:off x="742950" y="105375"/>
             <a:ext cx="8520600" cy="572700"/>
           </a:xfrm>
           <a:prstGeom prst="rect">
@@ -7182,7 +7679,205 @@
             </a:pPr>
             <a:r>
               <a:rPr lang="en"/>
-              <a:t>References and Resources</a:t>
+              <a:t>Conclusions: Opinions</a:t>
+            </a:r>
+            <a:endParaRPr b="1" sz="2300"/>
+          </a:p>
+          <a:p>
+            <a:pPr indent="0" lvl="0" marL="0" rtl="0" algn="l">
+              <a:spcBef>
+                <a:spcPts val="0"/>
+              </a:spcBef>
+              <a:spcAft>
+                <a:spcPts val="0"/>
+              </a:spcAft>
+              <a:buNone/>
+            </a:pPr>
+            <a:r>
+              <a:t/>
+            </a:r>
+            <a:endParaRPr/>
+          </a:p>
+        </p:txBody>
+      </p:sp>
+      <p:pic>
+        <p:nvPicPr>
+          <p:cNvPr id="142" name="Google Shape;142;p24"/>
+          <p:cNvPicPr preferRelativeResize="0"/>
+          <p:nvPr/>
+        </p:nvPicPr>
+        <p:blipFill>
+          <a:blip r:embed="rId3">
+            <a:alphaModFix/>
+          </a:blip>
+          <a:stretch>
+            <a:fillRect/>
+          </a:stretch>
+        </p:blipFill>
+        <p:spPr>
+          <a:xfrm>
+            <a:off x="0" y="-1"/>
+            <a:ext cx="678075" cy="678075"/>
+          </a:xfrm>
+          <a:prstGeom prst="rect">
+            <a:avLst/>
+          </a:prstGeom>
+          <a:noFill/>
+          <a:ln>
+            <a:noFill/>
+          </a:ln>
+        </p:spPr>
+      </p:pic>
+      <p:sp>
+        <p:nvSpPr>
+          <p:cNvPr id="143" name="Google Shape;143;p24"/>
+          <p:cNvSpPr txBox="1"/>
+          <p:nvPr/>
+        </p:nvSpPr>
+        <p:spPr>
+          <a:xfrm>
+            <a:off x="558150" y="1917750"/>
+            <a:ext cx="8027700" cy="1329600"/>
+          </a:xfrm>
+          <a:prstGeom prst="rect">
+            <a:avLst/>
+          </a:prstGeom>
+          <a:noFill/>
+          <a:ln>
+            <a:noFill/>
+          </a:ln>
+        </p:spPr>
+        <p:txBody>
+          <a:bodyPr anchorCtr="0" anchor="t" bIns="91425" lIns="91425" spcFirstLastPara="1" rIns="91425" wrap="square" tIns="91425">
+            <a:noAutofit/>
+          </a:bodyPr>
+          <a:lstStyle/>
+          <a:p>
+            <a:pPr indent="0" lvl="0" marL="0" rtl="0" algn="l">
+              <a:spcBef>
+                <a:spcPts val="0"/>
+              </a:spcBef>
+              <a:spcAft>
+                <a:spcPts val="0"/>
+              </a:spcAft>
+              <a:buNone/>
+            </a:pPr>
+            <a:r>
+              <a:t/>
+            </a:r>
+            <a:endParaRPr/>
+          </a:p>
+          <a:p>
+            <a:pPr indent="-330200" lvl="0" marL="457200" rtl="0" algn="l">
+              <a:spcBef>
+                <a:spcPts val="0"/>
+              </a:spcBef>
+              <a:spcAft>
+                <a:spcPts val="0"/>
+              </a:spcAft>
+              <a:buSzPts val="1600"/>
+              <a:buChar char="●"/>
+            </a:pPr>
+            <a:r>
+              <a:rPr lang="en" sz="1600"/>
+              <a:t>You will either love or hate the import process in Deno. It’s very similar to how Go deals with importing its libraries.</a:t>
+            </a:r>
+            <a:endParaRPr sz="1600"/>
+          </a:p>
+          <a:p>
+            <a:pPr indent="-330200" lvl="0" marL="457200" rtl="0" algn="l">
+              <a:spcBef>
+                <a:spcPts val="0"/>
+              </a:spcBef>
+              <a:spcAft>
+                <a:spcPts val="0"/>
+              </a:spcAft>
+              <a:buSzPts val="1600"/>
+              <a:buChar char="●"/>
+            </a:pPr>
+            <a:r>
+              <a:rPr lang="en" sz="1600"/>
+              <a:t>When dealing with import errors, found myself forking and adding fixes to own github repositories.</a:t>
+            </a:r>
+            <a:endParaRPr sz="1600"/>
+          </a:p>
+          <a:p>
+            <a:pPr indent="0" lvl="0" marL="457200" rtl="0" algn="l">
+              <a:spcBef>
+                <a:spcPts val="0"/>
+              </a:spcBef>
+              <a:spcAft>
+                <a:spcPts val="0"/>
+              </a:spcAft>
+              <a:buNone/>
+            </a:pPr>
+            <a:r>
+              <a:t/>
+            </a:r>
+            <a:endParaRPr/>
+          </a:p>
+        </p:txBody>
+      </p:sp>
+    </p:spTree>
+  </p:cSld>
+  <p:clrMapOvr>
+    <a:masterClrMapping/>
+  </p:clrMapOvr>
+</p:sld>
+</file>
+
+<file path=ppt/slides/slide13.xml><?xml version="1.0" encoding="utf-8"?>
+<p:sld xmlns:a="http://schemas.openxmlformats.org/drawingml/2006/main" xmlns:r="http://schemas.openxmlformats.org/officeDocument/2006/relationships" xmlns:mc="http://schemas.openxmlformats.org/markup-compatibility/2006" xmlns:mv="urn:schemas-microsoft-com:mac:vml" xmlns:p="http://schemas.openxmlformats.org/presentationml/2006/main" xmlns:c="http://schemas.openxmlformats.org/drawingml/2006/chart" xmlns:dgm="http://schemas.openxmlformats.org/drawingml/2006/diagram" xmlns:o="urn:schemas-microsoft-com:office:office" xmlns:v="urn:schemas-microsoft-com:vml" xmlns:pvml="urn:schemas-microsoft-com:office:powerpoint" xmlns:com="http://schemas.openxmlformats.org/drawingml/2006/compatibility" xmlns:p14="http://schemas.microsoft.com/office/powerpoint/2010/main" xmlns:p15="http://schemas.microsoft.com/office/powerpoint/2012/main" xmlns:ahyp="http://schemas.microsoft.com/office/drawing/2018/hyperlinkcolor">
+  <p:cSld>
+    <p:spTree>
+      <p:nvGrpSpPr>
+        <p:cNvPr id="147" name="Shape 147"/>
+        <p:cNvGrpSpPr/>
+        <p:nvPr/>
+      </p:nvGrpSpPr>
+      <p:grpSpPr>
+        <a:xfrm>
+          <a:off x="0" y="0"/>
+          <a:ext cx="0" cy="0"/>
+          <a:chOff x="0" y="0"/>
+          <a:chExt cx="0" cy="0"/>
+        </a:xfrm>
+      </p:grpSpPr>
+      <p:sp>
+        <p:nvSpPr>
+          <p:cNvPr id="148" name="Google Shape;148;p25"/>
+          <p:cNvSpPr txBox="1"/>
+          <p:nvPr>
+            <p:ph type="title"/>
+          </p:nvPr>
+        </p:nvSpPr>
+        <p:spPr>
+          <a:xfrm>
+            <a:off x="678075" y="105375"/>
+            <a:ext cx="8520600" cy="572700"/>
+          </a:xfrm>
+          <a:prstGeom prst="rect">
+            <a:avLst/>
+          </a:prstGeom>
+        </p:spPr>
+        <p:txBody>
+          <a:bodyPr anchorCtr="0" anchor="t" bIns="91425" lIns="91425" spcFirstLastPara="1" rIns="91425" wrap="square" tIns="91425">
+            <a:noAutofit/>
+          </a:bodyPr>
+          <a:lstStyle/>
+          <a:p>
+            <a:pPr indent="0" lvl="0" marL="0" rtl="0" algn="l">
+              <a:spcBef>
+                <a:spcPts val="0"/>
+              </a:spcBef>
+              <a:spcAft>
+                <a:spcPts val="0"/>
+              </a:spcAft>
+              <a:buNone/>
+            </a:pPr>
+            <a:r>
+              <a:rPr lang="en"/>
+              <a:t>Youtube Resources</a:t>
             </a:r>
             <a:endParaRPr/>
           </a:p>
@@ -7190,7 +7885,246 @@
       </p:sp>
       <p:sp>
         <p:nvSpPr>
-          <p:cNvPr id="141" name="Google Shape;141;p24"/>
+          <p:cNvPr id="149" name="Google Shape;149;p25"/>
+          <p:cNvSpPr txBox="1"/>
+          <p:nvPr>
+            <p:ph idx="1" type="body"/>
+          </p:nvPr>
+        </p:nvSpPr>
+        <p:spPr>
+          <a:xfrm>
+            <a:off x="311700" y="905775"/>
+            <a:ext cx="8520600" cy="3416400"/>
+          </a:xfrm>
+          <a:prstGeom prst="rect">
+            <a:avLst/>
+          </a:prstGeom>
+        </p:spPr>
+        <p:txBody>
+          <a:bodyPr anchorCtr="0" anchor="t" bIns="91425" lIns="91425" spcFirstLastPara="1" rIns="91425" wrap="square" tIns="91425">
+            <a:noAutofit/>
+          </a:bodyPr>
+          <a:lstStyle/>
+          <a:p>
+            <a:pPr indent="-342900" lvl="0" marL="457200" rtl="0" algn="l">
+              <a:spcBef>
+                <a:spcPts val="0"/>
+              </a:spcBef>
+              <a:spcAft>
+                <a:spcPts val="0"/>
+              </a:spcAft>
+              <a:buSzPts val="1800"/>
+              <a:buChar char="●"/>
+            </a:pPr>
+            <a:r>
+              <a:rPr lang="en"/>
+              <a:t>10 Things I Regret About Node.js - Ryan Dahl - JSConf</a:t>
+            </a:r>
+            <a:r>
+              <a:rPr lang="en"/>
+              <a:t> EU</a:t>
+            </a:r>
+            <a:endParaRPr/>
+          </a:p>
+          <a:p>
+            <a:pPr indent="0" lvl="0" marL="457200" rtl="0" algn="l">
+              <a:spcBef>
+                <a:spcPts val="1600"/>
+              </a:spcBef>
+              <a:spcAft>
+                <a:spcPts val="0"/>
+              </a:spcAft>
+              <a:buNone/>
+            </a:pPr>
+            <a:r>
+              <a:rPr lang="en" u="sng">
+                <a:solidFill>
+                  <a:schemeClr val="hlink"/>
+                </a:solidFill>
+                <a:hlinkClick r:id="rId3"/>
+              </a:rPr>
+              <a:t>https://www.youtube.com/watch?v=M3BM9TB-8yA</a:t>
+            </a:r>
+            <a:endParaRPr/>
+          </a:p>
+          <a:p>
+            <a:pPr indent="-342900" lvl="0" marL="457200" rtl="0" algn="l">
+              <a:spcBef>
+                <a:spcPts val="1600"/>
+              </a:spcBef>
+              <a:spcAft>
+                <a:spcPts val="0"/>
+              </a:spcAft>
+              <a:buSzPts val="1800"/>
+              <a:buChar char="●"/>
+            </a:pPr>
+            <a:r>
+              <a:rPr lang="en"/>
+              <a:t>Deno in 100 seconds: </a:t>
+            </a:r>
+            <a:r>
+              <a:rPr lang="en" u="sng">
+                <a:solidFill>
+                  <a:schemeClr val="hlink"/>
+                </a:solidFill>
+                <a:hlinkClick r:id="rId4"/>
+              </a:rPr>
+              <a:t>https://www.youtube.com/watch?v=F0G9lZ7gecE</a:t>
+            </a:r>
+            <a:endParaRPr/>
+          </a:p>
+          <a:p>
+            <a:pPr indent="-342900" lvl="0" marL="457200" rtl="0" algn="l">
+              <a:spcBef>
+                <a:spcPts val="0"/>
+              </a:spcBef>
+              <a:spcAft>
+                <a:spcPts val="0"/>
+              </a:spcAft>
+              <a:buSzPts val="1800"/>
+              <a:buChar char="●"/>
+            </a:pPr>
+            <a:r>
+              <a:rPr lang="en"/>
+              <a:t>(6 hours) Deno Course - Better than Node.js? - </a:t>
+            </a:r>
+            <a:r>
+              <a:rPr lang="en" u="sng">
+                <a:solidFill>
+                  <a:schemeClr val="hlink"/>
+                </a:solidFill>
+                <a:hlinkClick r:id="rId5"/>
+              </a:rPr>
+              <a:t>https://www.youtube.com/watch?v=TQUy8ENesGY</a:t>
+            </a:r>
+            <a:endParaRPr/>
+          </a:p>
+        </p:txBody>
+      </p:sp>
+      <p:pic>
+        <p:nvPicPr>
+          <p:cNvPr id="150" name="Google Shape;150;p25"/>
+          <p:cNvPicPr preferRelativeResize="0"/>
+          <p:nvPr/>
+        </p:nvPicPr>
+        <p:blipFill>
+          <a:blip r:embed="rId6">
+            <a:alphaModFix/>
+          </a:blip>
+          <a:stretch>
+            <a:fillRect/>
+          </a:stretch>
+        </p:blipFill>
+        <p:spPr>
+          <a:xfrm>
+            <a:off x="0" y="-1"/>
+            <a:ext cx="678075" cy="678075"/>
+          </a:xfrm>
+          <a:prstGeom prst="rect">
+            <a:avLst/>
+          </a:prstGeom>
+          <a:noFill/>
+          <a:ln>
+            <a:noFill/>
+          </a:ln>
+        </p:spPr>
+      </p:pic>
+      <p:pic>
+        <p:nvPicPr>
+          <p:cNvPr id="151" name="Google Shape;151;p25"/>
+          <p:cNvPicPr preferRelativeResize="0"/>
+          <p:nvPr/>
+        </p:nvPicPr>
+        <p:blipFill>
+          <a:blip r:embed="rId7">
+            <a:alphaModFix/>
+          </a:blip>
+          <a:stretch>
+            <a:fillRect/>
+          </a:stretch>
+        </p:blipFill>
+        <p:spPr>
+          <a:xfrm>
+            <a:off x="2404650" y="3054075"/>
+            <a:ext cx="3763200" cy="1926751"/>
+          </a:xfrm>
+          <a:prstGeom prst="rect">
+            <a:avLst/>
+          </a:prstGeom>
+          <a:noFill/>
+          <a:ln>
+            <a:noFill/>
+          </a:ln>
+        </p:spPr>
+      </p:pic>
+    </p:spTree>
+  </p:cSld>
+  <p:clrMapOvr>
+    <a:masterClrMapping/>
+  </p:clrMapOvr>
+</p:sld>
+</file>
+
+<file path=ppt/slides/slide14.xml><?xml version="1.0" encoding="utf-8"?>
+<p:sld xmlns:a="http://schemas.openxmlformats.org/drawingml/2006/main" xmlns:r="http://schemas.openxmlformats.org/officeDocument/2006/relationships" xmlns:mc="http://schemas.openxmlformats.org/markup-compatibility/2006" xmlns:mv="urn:schemas-microsoft-com:mac:vml" xmlns:p="http://schemas.openxmlformats.org/presentationml/2006/main" xmlns:c="http://schemas.openxmlformats.org/drawingml/2006/chart" xmlns:dgm="http://schemas.openxmlformats.org/drawingml/2006/diagram" xmlns:o="urn:schemas-microsoft-com:office:office" xmlns:v="urn:schemas-microsoft-com:vml" xmlns:pvml="urn:schemas-microsoft-com:office:powerpoint" xmlns:com="http://schemas.openxmlformats.org/drawingml/2006/compatibility" xmlns:p14="http://schemas.microsoft.com/office/powerpoint/2010/main" xmlns:p15="http://schemas.microsoft.com/office/powerpoint/2012/main" xmlns:ahyp="http://schemas.microsoft.com/office/drawing/2018/hyperlinkcolor">
+  <p:cSld>
+    <p:spTree>
+      <p:nvGrpSpPr>
+        <p:cNvPr id="155" name="Shape 155"/>
+        <p:cNvGrpSpPr/>
+        <p:nvPr/>
+      </p:nvGrpSpPr>
+      <p:grpSpPr>
+        <a:xfrm>
+          <a:off x="0" y="0"/>
+          <a:ext cx="0" cy="0"/>
+          <a:chOff x="0" y="0"/>
+          <a:chExt cx="0" cy="0"/>
+        </a:xfrm>
+      </p:grpSpPr>
+      <p:sp>
+        <p:nvSpPr>
+          <p:cNvPr id="156" name="Google Shape;156;p26"/>
+          <p:cNvSpPr txBox="1"/>
+          <p:nvPr>
+            <p:ph type="title"/>
+          </p:nvPr>
+        </p:nvSpPr>
+        <p:spPr>
+          <a:xfrm>
+            <a:off x="678075" y="105375"/>
+            <a:ext cx="8520600" cy="572700"/>
+          </a:xfrm>
+          <a:prstGeom prst="rect">
+            <a:avLst/>
+          </a:prstGeom>
+        </p:spPr>
+        <p:txBody>
+          <a:bodyPr anchorCtr="0" anchor="t" bIns="91425" lIns="91425" spcFirstLastPara="1" rIns="91425" wrap="square" tIns="91425">
+            <a:noAutofit/>
+          </a:bodyPr>
+          <a:lstStyle/>
+          <a:p>
+            <a:pPr indent="0" lvl="0" marL="0" rtl="0" algn="l">
+              <a:spcBef>
+                <a:spcPts val="0"/>
+              </a:spcBef>
+              <a:spcAft>
+                <a:spcPts val="0"/>
+              </a:spcAft>
+              <a:buNone/>
+            </a:pPr>
+            <a:r>
+              <a:rPr lang="en"/>
+              <a:t>References and Resources</a:t>
+            </a:r>
+            <a:endParaRPr/>
+          </a:p>
+        </p:txBody>
+      </p:sp>
+      <p:sp>
+        <p:nvSpPr>
+          <p:cNvPr id="157" name="Google Shape;157;p26"/>
           <p:cNvSpPr txBox="1"/>
           <p:nvPr>
             <p:ph idx="1" type="body"/>
@@ -7396,7 +8330,7 @@
       </p:sp>
       <p:pic>
         <p:nvPicPr>
-          <p:cNvPr id="142" name="Google Shape;142;p24"/>
+          <p:cNvPr id="158" name="Google Shape;158;p26"/>
           <p:cNvPicPr preferRelativeResize="0"/>
           <p:nvPr/>
         </p:nvPicPr>
@@ -7412,6 +8346,308 @@
           <a:xfrm>
             <a:off x="0" y="-1"/>
             <a:ext cx="678075" cy="678075"/>
+          </a:xfrm>
+          <a:prstGeom prst="rect">
+            <a:avLst/>
+          </a:prstGeom>
+          <a:noFill/>
+          <a:ln>
+            <a:noFill/>
+          </a:ln>
+        </p:spPr>
+      </p:pic>
+    </p:spTree>
+  </p:cSld>
+  <p:clrMapOvr>
+    <a:masterClrMapping/>
+  </p:clrMapOvr>
+</p:sld>
+</file>
+
+<file path=ppt/slides/slide15.xml><?xml version="1.0" encoding="utf-8"?>
+<p:sld xmlns:a="http://schemas.openxmlformats.org/drawingml/2006/main" xmlns:r="http://schemas.openxmlformats.org/officeDocument/2006/relationships" xmlns:mc="http://schemas.openxmlformats.org/markup-compatibility/2006" xmlns:mv="urn:schemas-microsoft-com:mac:vml" xmlns:p="http://schemas.openxmlformats.org/presentationml/2006/main" xmlns:c="http://schemas.openxmlformats.org/drawingml/2006/chart" xmlns:dgm="http://schemas.openxmlformats.org/drawingml/2006/diagram" xmlns:o="urn:schemas-microsoft-com:office:office" xmlns:v="urn:schemas-microsoft-com:vml" xmlns:pvml="urn:schemas-microsoft-com:office:powerpoint" xmlns:com="http://schemas.openxmlformats.org/drawingml/2006/compatibility" xmlns:p14="http://schemas.microsoft.com/office/powerpoint/2010/main" xmlns:p15="http://schemas.microsoft.com/office/powerpoint/2012/main" xmlns:ahyp="http://schemas.microsoft.com/office/drawing/2018/hyperlinkcolor">
+  <p:cSld>
+    <p:spTree>
+      <p:nvGrpSpPr>
+        <p:cNvPr id="162" name="Shape 162"/>
+        <p:cNvGrpSpPr/>
+        <p:nvPr/>
+      </p:nvGrpSpPr>
+      <p:grpSpPr>
+        <a:xfrm>
+          <a:off x="0" y="0"/>
+          <a:ext cx="0" cy="0"/>
+          <a:chOff x="0" y="0"/>
+          <a:chExt cx="0" cy="0"/>
+        </a:xfrm>
+      </p:grpSpPr>
+      <p:sp>
+        <p:nvSpPr>
+          <p:cNvPr id="163" name="Google Shape;163;p27"/>
+          <p:cNvSpPr txBox="1"/>
+          <p:nvPr>
+            <p:ph type="ctrTitle"/>
+          </p:nvPr>
+        </p:nvSpPr>
+        <p:spPr>
+          <a:xfrm>
+            <a:off x="231783" y="2213475"/>
+            <a:ext cx="8520600" cy="2052600"/>
+          </a:xfrm>
+          <a:prstGeom prst="rect">
+            <a:avLst/>
+          </a:prstGeom>
+        </p:spPr>
+        <p:txBody>
+          <a:bodyPr anchorCtr="0" anchor="b" bIns="91425" lIns="91425" spcFirstLastPara="1" rIns="91425" wrap="square" tIns="91425">
+            <a:noAutofit/>
+          </a:bodyPr>
+          <a:lstStyle/>
+          <a:p>
+            <a:pPr indent="0" lvl="0" marL="0" rtl="0" algn="ctr">
+              <a:spcBef>
+                <a:spcPts val="0"/>
+              </a:spcBef>
+              <a:spcAft>
+                <a:spcPts val="0"/>
+              </a:spcAft>
+              <a:buNone/>
+            </a:pPr>
+            <a:r>
+              <a:rPr lang="en"/>
+              <a:t>Questions?</a:t>
+            </a:r>
+            <a:endParaRPr/>
+          </a:p>
+        </p:txBody>
+      </p:sp>
+      <p:pic>
+        <p:nvPicPr>
+          <p:cNvPr id="164" name="Google Shape;164;p27"/>
+          <p:cNvPicPr preferRelativeResize="0"/>
+          <p:nvPr/>
+        </p:nvPicPr>
+        <p:blipFill>
+          <a:blip r:embed="rId3">
+            <a:alphaModFix/>
+          </a:blip>
+          <a:stretch>
+            <a:fillRect/>
+          </a:stretch>
+        </p:blipFill>
+        <p:spPr>
+          <a:xfrm>
+            <a:off x="2961600" y="304800"/>
+            <a:ext cx="3148150" cy="3148124"/>
+          </a:xfrm>
+          <a:prstGeom prst="rect">
+            <a:avLst/>
+          </a:prstGeom>
+          <a:noFill/>
+          <a:ln>
+            <a:noFill/>
+          </a:ln>
+        </p:spPr>
+      </p:pic>
+      <p:pic>
+        <p:nvPicPr>
+          <p:cNvPr id="165" name="Google Shape;165;p27"/>
+          <p:cNvPicPr preferRelativeResize="0"/>
+          <p:nvPr/>
+        </p:nvPicPr>
+        <p:blipFill>
+          <a:blip r:embed="rId4">
+            <a:alphaModFix/>
+          </a:blip>
+          <a:stretch>
+            <a:fillRect/>
+          </a:stretch>
+        </p:blipFill>
+        <p:spPr>
+          <a:xfrm>
+            <a:off x="6254875" y="1735800"/>
+            <a:ext cx="2415475" cy="1603875"/>
+          </a:xfrm>
+          <a:prstGeom prst="rect">
+            <a:avLst/>
+          </a:prstGeom>
+          <a:noFill/>
+          <a:ln>
+            <a:noFill/>
+          </a:ln>
+        </p:spPr>
+      </p:pic>
+      <p:pic>
+        <p:nvPicPr>
+          <p:cNvPr id="166" name="Google Shape;166;p27"/>
+          <p:cNvPicPr preferRelativeResize="0"/>
+          <p:nvPr/>
+        </p:nvPicPr>
+        <p:blipFill>
+          <a:blip r:embed="rId5">
+            <a:alphaModFix/>
+          </a:blip>
+          <a:stretch>
+            <a:fillRect/>
+          </a:stretch>
+        </p:blipFill>
+        <p:spPr>
+          <a:xfrm>
+            <a:off x="188725" y="1739375"/>
+            <a:ext cx="2410644" cy="1603875"/>
+          </a:xfrm>
+          <a:prstGeom prst="rect">
+            <a:avLst/>
+          </a:prstGeom>
+          <a:noFill/>
+          <a:ln>
+            <a:noFill/>
+          </a:ln>
+        </p:spPr>
+      </p:pic>
+    </p:spTree>
+  </p:cSld>
+  <p:clrMapOvr>
+    <a:masterClrMapping/>
+  </p:clrMapOvr>
+</p:sld>
+</file>
+
+<file path=ppt/slides/slide16.xml><?xml version="1.0" encoding="utf-8"?>
+<p:sld xmlns:a="http://schemas.openxmlformats.org/drawingml/2006/main" xmlns:r="http://schemas.openxmlformats.org/officeDocument/2006/relationships" xmlns:mc="http://schemas.openxmlformats.org/markup-compatibility/2006" xmlns:mv="urn:schemas-microsoft-com:mac:vml" xmlns:p="http://schemas.openxmlformats.org/presentationml/2006/main" xmlns:c="http://schemas.openxmlformats.org/drawingml/2006/chart" xmlns:dgm="http://schemas.openxmlformats.org/drawingml/2006/diagram" xmlns:o="urn:schemas-microsoft-com:office:office" xmlns:v="urn:schemas-microsoft-com:vml" xmlns:pvml="urn:schemas-microsoft-com:office:powerpoint" xmlns:com="http://schemas.openxmlformats.org/drawingml/2006/compatibility" xmlns:p14="http://schemas.microsoft.com/office/powerpoint/2010/main" xmlns:p15="http://schemas.microsoft.com/office/powerpoint/2012/main" xmlns:ahyp="http://schemas.microsoft.com/office/drawing/2018/hyperlinkcolor">
+  <p:cSld>
+    <p:spTree>
+      <p:nvGrpSpPr>
+        <p:cNvPr id="170" name="Shape 170"/>
+        <p:cNvGrpSpPr/>
+        <p:nvPr/>
+      </p:nvGrpSpPr>
+      <p:grpSpPr>
+        <a:xfrm>
+          <a:off x="0" y="0"/>
+          <a:ext cx="0" cy="0"/>
+          <a:chOff x="0" y="0"/>
+          <a:chExt cx="0" cy="0"/>
+        </a:xfrm>
+      </p:grpSpPr>
+      <p:sp>
+        <p:nvSpPr>
+          <p:cNvPr id="171" name="Google Shape;171;p28"/>
+          <p:cNvSpPr txBox="1"/>
+          <p:nvPr>
+            <p:ph type="title"/>
+          </p:nvPr>
+        </p:nvSpPr>
+        <p:spPr>
+          <a:xfrm>
+            <a:off x="311700" y="445025"/>
+            <a:ext cx="8520600" cy="572700"/>
+          </a:xfrm>
+          <a:prstGeom prst="rect">
+            <a:avLst/>
+          </a:prstGeom>
+        </p:spPr>
+        <p:txBody>
+          <a:bodyPr anchorCtr="0" anchor="t" bIns="91425" lIns="91425" spcFirstLastPara="1" rIns="91425" wrap="square" tIns="91425">
+            <a:noAutofit/>
+          </a:bodyPr>
+          <a:lstStyle/>
+          <a:p>
+            <a:pPr indent="0" lvl="0" marL="0" rtl="0" algn="l">
+              <a:spcBef>
+                <a:spcPts val="0"/>
+              </a:spcBef>
+              <a:spcAft>
+                <a:spcPts val="0"/>
+              </a:spcAft>
+              <a:buNone/>
+            </a:pPr>
+            <a:r>
+              <a:rPr lang="en"/>
+              <a:t>CC Dino pics!</a:t>
+            </a:r>
+            <a:endParaRPr/>
+          </a:p>
+        </p:txBody>
+      </p:sp>
+      <p:sp>
+        <p:nvSpPr>
+          <p:cNvPr id="172" name="Google Shape;172;p28"/>
+          <p:cNvSpPr txBox="1"/>
+          <p:nvPr>
+            <p:ph idx="1" type="body"/>
+          </p:nvPr>
+        </p:nvSpPr>
+        <p:spPr>
+          <a:xfrm>
+            <a:off x="311700" y="1152475"/>
+            <a:ext cx="8520600" cy="3416400"/>
+          </a:xfrm>
+          <a:prstGeom prst="rect">
+            <a:avLst/>
+          </a:prstGeom>
+        </p:spPr>
+        <p:txBody>
+          <a:bodyPr anchorCtr="0" anchor="t" bIns="91425" lIns="91425" spcFirstLastPara="1" rIns="91425" wrap="square" tIns="91425">
+            <a:noAutofit/>
+          </a:bodyPr>
+          <a:lstStyle/>
+          <a:p>
+            <a:pPr indent="0" lvl="0" marL="0" rtl="0" algn="l">
+              <a:spcBef>
+                <a:spcPts val="0"/>
+              </a:spcBef>
+              <a:spcAft>
+                <a:spcPts val="0"/>
+              </a:spcAft>
+              <a:buNone/>
+            </a:pPr>
+            <a:r>
+              <a:rPr lang="en" u="sng">
+                <a:solidFill>
+                  <a:schemeClr val="hlink"/>
+                </a:solidFill>
+                <a:hlinkClick r:id="rId3"/>
+              </a:rPr>
+              <a:t>https://search.creativecommons.org/search?q=dinosaur</a:t>
+            </a:r>
+            <a:endParaRPr/>
+          </a:p>
+          <a:p>
+            <a:pPr indent="0" lvl="0" marL="0" rtl="0" algn="l">
+              <a:spcBef>
+                <a:spcPts val="1600"/>
+              </a:spcBef>
+              <a:spcAft>
+                <a:spcPts val="1600"/>
+              </a:spcAft>
+              <a:buNone/>
+            </a:pPr>
+            <a:r>
+              <a:t/>
+            </a:r>
+            <a:endParaRPr/>
+          </a:p>
+        </p:txBody>
+      </p:sp>
+      <p:pic>
+        <p:nvPicPr>
+          <p:cNvPr id="173" name="Google Shape;173;p28"/>
+          <p:cNvPicPr preferRelativeResize="0"/>
+          <p:nvPr/>
+        </p:nvPicPr>
+        <p:blipFill>
+          <a:blip r:embed="rId4">
+            <a:alphaModFix/>
+          </a:blip>
+          <a:stretch>
+            <a:fillRect/>
+          </a:stretch>
+        </p:blipFill>
+        <p:spPr>
+          <a:xfrm>
+            <a:off x="2246450" y="1658950"/>
+            <a:ext cx="4762500" cy="3162300"/>
           </a:xfrm>
           <a:prstGeom prst="rect">
             <a:avLst/>
@@ -7566,7 +8802,7 @@
                   <a:schemeClr val="dk1"/>
                 </a:solidFill>
               </a:rPr>
-              <a:t>Deno is a simple, modern and secure runtime for JavaScript and TypeScript that uses V8 and is built in Rust.</a:t>
+              <a:t>Deno is a simple, modern and secure runtime for JavaScript and TypeScript that uses V8 Engine (same as Node) and is built in Rust.</a:t>
             </a:r>
             <a:endParaRPr sz="1600">
               <a:solidFill>
@@ -7706,7 +8942,7 @@
                   <a:schemeClr val="dk1"/>
                 </a:solidFill>
               </a:rPr>
-              <a:t> like a dependency inspector (deno info) and a code formatter (deno fmt).</a:t>
+              <a:t> like a dependency inspector (called “deno info”) and a code formatter (called “deno fmt”).</a:t>
             </a:r>
             <a:endParaRPr sz="1600">
               <a:solidFill>
@@ -7924,7 +9160,7 @@
                   <a:schemeClr val="dk1"/>
                 </a:solidFill>
               </a:rPr>
-              <a:t>Sounds like nodejs? Same person who created nodejs created deno!</a:t>
+              <a:t>Sounds like Node.js? Same person (Ryan Dahl) who created Node.js created Deno!</a:t>
             </a:r>
             <a:endParaRPr sz="1600">
               <a:solidFill>
@@ -7955,7 +9191,7 @@
                   <a:schemeClr val="dk1"/>
                 </a:solidFill>
               </a:rPr>
-              <a:t>Both Javascript and Typescript can be used outside of the browser. No need to transpile, deno works with typescript.</a:t>
+              <a:t>Both Javascript and Typescript can be used outside of the browser. No need to transpile, Deno works with Typescript.</a:t>
             </a:r>
             <a:endParaRPr sz="1600">
               <a:solidFill>
@@ -8017,7 +9253,7 @@
                   <a:schemeClr val="dk1"/>
                 </a:solidFill>
               </a:rPr>
-              <a:t>Deno can use web assembly.</a:t>
+              <a:t>Deno can use WebAssembly.</a:t>
             </a:r>
             <a:endParaRPr sz="1600">
               <a:solidFill>
@@ -8048,7 +9284,101 @@
                   <a:schemeClr val="dk1"/>
                 </a:solidFill>
               </a:rPr>
-              <a:t>No package.jsons needed! (most controversial change but more later)</a:t>
+              <a:t>No package.jsons needed! (most controversial change but more on that later)</a:t>
+            </a:r>
+            <a:endParaRPr sz="1600">
+              <a:solidFill>
+                <a:schemeClr val="dk1"/>
+              </a:solidFill>
+            </a:endParaRPr>
+          </a:p>
+          <a:p>
+            <a:pPr indent="-330200" lvl="0" marL="457200" rtl="0" algn="l">
+              <a:lnSpc>
+                <a:spcPct val="115000"/>
+              </a:lnSpc>
+              <a:spcBef>
+                <a:spcPts val="0"/>
+              </a:spcBef>
+              <a:spcAft>
+                <a:spcPts val="0"/>
+              </a:spcAft>
+              <a:buClr>
+                <a:schemeClr val="dk1"/>
+              </a:buClr>
+              <a:buSzPts val="1600"/>
+              <a:buAutoNum type="arabicPeriod"/>
+            </a:pPr>
+            <a:r>
+              <a:rPr lang="en" sz="1600">
+                <a:solidFill>
+                  <a:schemeClr val="dk1"/>
+                </a:solidFill>
+              </a:rPr>
+              <a:t>Enforces styling/auto-linting of Typescript at runtime!</a:t>
+            </a:r>
+            <a:endParaRPr sz="1600">
+              <a:solidFill>
+                <a:schemeClr val="dk1"/>
+              </a:solidFill>
+            </a:endParaRPr>
+          </a:p>
+          <a:p>
+            <a:pPr indent="-330200" lvl="0" marL="457200" rtl="0" algn="l">
+              <a:lnSpc>
+                <a:spcPct val="115000"/>
+              </a:lnSpc>
+              <a:spcBef>
+                <a:spcPts val="0"/>
+              </a:spcBef>
+              <a:spcAft>
+                <a:spcPts val="0"/>
+              </a:spcAft>
+              <a:buClr>
+                <a:schemeClr val="dk1"/>
+              </a:buClr>
+              <a:buSzPts val="1600"/>
+              <a:buAutoNum type="arabicPeriod"/>
+            </a:pPr>
+            <a:r>
+              <a:rPr lang="en" sz="1600">
+                <a:solidFill>
+                  <a:schemeClr val="dk1"/>
+                </a:solidFill>
+              </a:rPr>
+              <a:t>Just made it to V1.0+ this year so </a:t>
+            </a:r>
+            <a:r>
+              <a:rPr lang="en" sz="1600">
+                <a:solidFill>
+                  <a:schemeClr val="dk1"/>
+                </a:solidFill>
+              </a:rPr>
+              <a:t>it's</a:t>
+            </a:r>
+            <a:r>
+              <a:rPr lang="en" sz="1600">
+                <a:solidFill>
+                  <a:schemeClr val="dk1"/>
+                </a:solidFill>
+              </a:rPr>
+              <a:t> </a:t>
+            </a:r>
+            <a:r>
+              <a:rPr lang="en" sz="1600">
+                <a:solidFill>
+                  <a:schemeClr val="dk1"/>
+                </a:solidFill>
+              </a:rPr>
+              <a:t>(mostly) </a:t>
+            </a:r>
+            <a:r>
+              <a:rPr lang="en" sz="1600">
+                <a:solidFill>
+                  <a:schemeClr val="dk1"/>
+                </a:solidFill>
+              </a:rPr>
+              <a:t>ready for production.</a:t>
             </a:r>
             <a:endParaRPr sz="1600">
               <a:solidFill>
@@ -8821,7 +10151,7 @@
             </a:pPr>
             <a:r>
               <a:rPr lang="en"/>
-              <a:t>Example REST API</a:t>
+              <a:t>Example: REST API</a:t>
             </a:r>
             <a:endParaRPr/>
           </a:p>
@@ -9265,7 +10595,7 @@
             </a:pPr>
             <a:r>
               <a:rPr lang="en"/>
-              <a:t>WebAssembly</a:t>
+              <a:t>WebAssembly - A quick look</a:t>
             </a:r>
             <a:endParaRPr b="1" sz="2300"/>
           </a:p>
@@ -9322,7 +10652,7 @@
         </p:nvSpPr>
         <p:spPr>
           <a:xfrm>
-            <a:off x="558150" y="1347225"/>
+            <a:off x="558150" y="1271025"/>
             <a:ext cx="8027700" cy="3116700"/>
           </a:xfrm>
           <a:prstGeom prst="rect">
@@ -9430,21 +10760,6 @@
               <a:buNone/>
             </a:pPr>
             <a:r>
-              <a:t/>
-            </a:r>
-            <a:endParaRPr/>
-          </a:p>
-          <a:p>
-            <a:pPr indent="0" lvl="0" marL="0" rtl="0" algn="l">
-              <a:spcBef>
-                <a:spcPts val="0"/>
-              </a:spcBef>
-              <a:spcAft>
-                <a:spcPts val="0"/>
-              </a:spcAft>
-              <a:buNone/>
-            </a:pPr>
-            <a:r>
               <a:rPr lang="en" sz="1600"/>
               <a:t>Example:</a:t>
             </a:r>
@@ -9462,7 +10777,7 @@
             </a:pPr>
             <a:r>
               <a:rPr lang="en"/>
-              <a:t>LISP interpreter in the browser (javascript bindings into C -&gt; LISP)!</a:t>
+              <a:t>LISP interpreter in the browser (Javascript bindings into C -&gt; LISP)!</a:t>
             </a:r>
             <a:endParaRPr/>
           </a:p>
@@ -9655,7 +10970,7 @@
         </p:nvSpPr>
         <p:spPr>
           <a:xfrm>
-            <a:off x="558150" y="1347225"/>
+            <a:off x="558150" y="1194825"/>
             <a:ext cx="8027700" cy="3116700"/>
           </a:xfrm>
           <a:prstGeom prst="rect">

</xml_diff>